<commit_message>
slides till pandas with notebooks
</commit_message>
<xml_diff>
--- a/EDYODA_DW/slides/Class1.pptx
+++ b/EDYODA_DW/slides/Class1.pptx
@@ -5,7 +5,7 @@
     <p:sldMasterId id="2147483648" r:id="rId1"/>
   </p:sldMasterIdLst>
   <p:notesMasterIdLst>
-    <p:notesMasterId r:id="rId16"/>
+    <p:notesMasterId r:id="rId23"/>
   </p:notesMasterIdLst>
   <p:sldIdLst>
     <p:sldId id="256" r:id="rId2"/>
@@ -22,6 +22,13 @@
     <p:sldId id="268" r:id="rId13"/>
     <p:sldId id="265" r:id="rId14"/>
     <p:sldId id="266" r:id="rId15"/>
+    <p:sldId id="271" r:id="rId16"/>
+    <p:sldId id="267" r:id="rId17"/>
+    <p:sldId id="272" r:id="rId18"/>
+    <p:sldId id="273" r:id="rId19"/>
+    <p:sldId id="274" r:id="rId20"/>
+    <p:sldId id="275" r:id="rId21"/>
+    <p:sldId id="276" r:id="rId22"/>
   </p:sldIdLst>
   <p:sldSz cx="12192000" cy="6858000"/>
   <p:notesSz cx="6858000" cy="9144000"/>
@@ -120,6 +127,11 @@
       </a:defRPr>
     </a:lvl9pPr>
   </p:defaultTextStyle>
+  <p:extLst>
+    <p:ext uri="{EFAFB233-063F-42B5-8137-9DF3F51BA10A}">
+      <p15:sldGuideLst xmlns:p15="http://schemas.microsoft.com/office/powerpoint/2012/main"/>
+    </p:ext>
+  </p:extLst>
 </p:presentation>
 </file>
 
@@ -2885,6 +2897,79 @@
 </dgm:styleDef>
 </file>
 
+<file path=ppt/ink/ink1.xml><?xml version="1.0" encoding="utf-8"?>
+<inkml:ink xmlns:inkml="http://www.w3.org/2003/InkML">
+  <inkml:definitions>
+    <inkml:context xml:id="ctx0">
+      <inkml:inkSource xml:id="inkSrc0">
+        <inkml:traceFormat>
+          <inkml:channel name="X" type="integer" max="32767" units="cm"/>
+          <inkml:channel name="Y" type="integer" max="32767" units="cm"/>
+          <inkml:channel name="F" type="integer" max="2047" units="deg"/>
+          <inkml:channel name="T" type="integer" max="2.14748E9" units="dev"/>
+        </inkml:traceFormat>
+        <inkml:channelProperties>
+          <inkml:channelProperty channel="X" name="resolution" value="1516.99072" units="1/cm"/>
+          <inkml:channelProperty channel="Y" name="resolution" value="2427.1853" units="1/cm"/>
+          <inkml:channelProperty channel="F" name="resolution" value="5.68611" units="1/deg"/>
+          <inkml:channelProperty channel="T" name="resolution" value="1" units="1/dev"/>
+        </inkml:channelProperties>
+      </inkml:inkSource>
+      <inkml:timestamp xml:id="ts0" timeString="2022-12-15T14:40:22.847"/>
+    </inkml:context>
+    <inkml:brush xml:id="br0">
+      <inkml:brushProperty name="width" value="0.05292" units="cm"/>
+      <inkml:brushProperty name="height" value="0.05292" units="cm"/>
+      <inkml:brushProperty name="color" value="#FF0000"/>
+    </inkml:brush>
+  </inkml:definitions>
+  <inkml:trace contextRef="#ctx0" brushRef="#br0">4158 3428 68 0,'0'0'55'0,"0"0"23"0,0 0-8 0,0 0 65 0,0 0-88 16,0 0-33-16,0 0-9 15,-14-1-2-15,14 1-3 16,0 0 8-16,0 0-8 15,0 0-2-15,0 0 0 16,0 0-9-16,0 0 3 0,17 0 1 16,11 0 7-16,11 0 5 15,10-1-3-15,9-13 0 16,9-3 5-16,8-3-4 16,10 0-3-16,9-1 6 15,6 0-6-15,4 0 0 16,2 1 0-16,0-1 1 15,-3 2-2-15,-4 3-17 16,-5 0 5-16,-6 2 1 16,-11 1-10-16,-10 1 17 15,-17 1-32-15,-16 5 10 16,-18 3-35-16,-11-1 11 0,-5 0 42 16,-2 3-1-16,-20-1-78 15</inkml:trace>
+  <inkml:trace contextRef="#ctx0" brushRef="#br0" timeOffset="1117.65">3973 3656 12 0,'0'0'51'0,"0"0"-51"16,0 0 7-16,0 0 45 16,12 107-20-16,-4-59 9 15,3 3-10-15,0 0 30 16,0 0-42-16,1-3-13 16,3-2 14-16,2-1-6 15,0-2-2-15,0 2-8 16,2-2-3-16,-2 0 5 15,-1-6-6-15,-2-2 0 16,-3-9 2-16,-3-3 1 0,3-7-3 16,-3-9 0-16,-2-3-2 15,-1-4 1-15,-1 0-5 16,1 0-2-16,1 0 1 16,6-6 7-16,0-5 12 15,7-1-12-15,5-7 0 16,7-2 9-16,8-3-9 15,6-5-5-15,13-1 2 16,6-4 2-16,12-2-1 16,5-1 2-16,5 2 6 15,5 4-6-15,0 0 3 16,3 6 2-16,0 1-5 0,-1 3-12 16,-2 4 12-16,1-1 9 15,1 0-9-15,-1-3-14 16,1 2 4-16,-1-3 8 15,-1 0-3-15,-3 1-22 16,-7 4 20-16,-16 1 6 16,-15 4 2-16,-12 3 0 15,-15 3-1-15,-8 4 8 16,-9-1 11-16,-6 3 13 16,0 0 10-16,0-3 4 15,0 1-21-15,0 0 16 16,0-3-29-16,0 0 12 15,0-3-15-15,-2-1-8 16,-4-3-1-16,-1-6 0 0,-2 0 4 16,-3-6-4-16,4-4 0 15,-5-5 4-15,1-5-5 16,-4-5 2-16,1-4-1 16,-3-6 0-16,0 0 1 15,-3 2 0-15,2 3-1 16,2 7 0-16,1 9 6 15,4 7-6-15,1 6 4 16,1 8 17-16,3 4-15 16,2 1-3-16,-1 6-3 15,6 0-5-15,-3 0-20 16,-1 0-32-16,-2 0-17 16,0 6-29-16,-2 1-45 0</inkml:trace>
+  <inkml:trace contextRef="#ctx0" brushRef="#br0" timeOffset="2713.79">6460 2583 4 0,'0'0'12'15,"0"0"-9"-15,0 0 15 16,0 0-5-16,0 0 1 15,0 0-2-15,-5-11-12 16,5 11-15-16,0 0-15 16</inkml:trace>
+  <inkml:trace contextRef="#ctx0" brushRef="#br0" timeOffset="3713.75">7847 2543 39 0,'0'0'90'0,"0"0"-57"16,0 0 17-16,0 0 43 15,0 0-17-15,0 0-31 16,39-27-22-16,-17 18-6 16,5 0-7-16,12-3-3 15,13-5 3-15,18-1-4 16,17-7 17-16,14-5-17 15,17-4-5-15,9-1-1 16,6-4 0-16,-3 4-9 0,-11 0-10 16,-10 4 7-16,-11 4-9 15,-11 3 12-15,-11 4-34 16,-13 3 23-16,-13 5 20 16,-17 3-20-16,-15 4 19 15,-12 2 2-15,-6-2 1 16,0 2 10-16,3-2-4 15,-3 0-2-15,3 3-4 16,-3 1-1-16,0 1-1 16,0 0-7-16,2 0-27 15,-2 0-115-15,0 0-68 16</inkml:trace>
+  <inkml:trace contextRef="#ctx0" brushRef="#br0" timeOffset="5041.68">7897 2588 4 0,'0'0'35'0,"0"0"29"16,0 0-37-16,0 0 11 0,5 93 30 15,4-57-29-15,3 4 10 16,5 9-13-16,-1 0-21 15,2 1-2-15,-1-2-7 16,0-1-3-16,-3-12-3 16,-1-6 0-16,-2-6 6 15,-3-7-3-15,-2-6-3 16,-1-4 1-16,-2-4 2 16,-3 4-4-16,3-2 1 15,-3 2 0-15,0 2 4 16,0-5-4-16,3-2 0 15,-3-1 0-15,0 0 3 0,2 0 2 16,-1 0-5-16,5 0 0 16,9 0 0-1,4-8 14-15,15-6-14 0,5-6-1 16,8-3 1-16,9-5 8 16,9-4-8-16,9-2 0 15,14-3-15-15,6 0 30 16,9 1-30-16,10 1 15 15,-4 3-27-15,-3 10 27 16,-12 5-8-16,-13 5 13 16,-5 0-5-16,-12 4 3 15,-6 2-3-15,-7-3 0 16,0 1 0-16,-1-2 13 0,0-1 4 16,-3 0-17-16,0 1 3 15,-4-1 0-15,-6 0-3 16,-4 4 10-16,-6-4-8 15,-2 1-1-15,-1 2 3 16,2-4-5-16,2 0 1 16,0-1 0-16,4 2 7 15,-4-1-7-15,-1 4 2 16,-5 0 2-16,-4 0-4 16,-2 1 0-16,-7 2 7 15,-1-1-6-15,-4 3 5 16,1 2 1-16,-4 0 3 15,-1-1 6-15,0 2-6 16,0 0 9-16,0-3 1 0,0-1-13 16,0 0 0-16,0-2 5 15,-1-2-7-15,-11-2 6 16,0 1-11-16,-3-6 5 16,-3 1 4-16,2-6-9 15,1 1 5-15,-2-7 9 16,4-2-13-16,0-3 13 15,2-5-7-15,2 3 0 16,1-4-7-16,0 1 0 16,0 4 1-16,2 3-3 15,2 4 2-15,-1 5-4 0,1 4 7 16,1 0-3 0,1 2 0-16,-1-2 1 0,-1 2-1 15,1 3 0-15,0 6 1 16,3-1-2-16,-2 4 2 15,2 2-1-15,0 0 0 16,0 0 1-16,-1 0-1 16,1 0 0-16,0 0 0 15,-2 0 8-15,2 0-1 16,-3 0 1-16,-8 0-8 16,-13 0-5-16,-17 0-2 15,-18 12-53-15,-18 5-23 16,-15 1-14-16,-18 2-39 15,-14 7 26-15,-12 6-8 0</inkml:trace>
+  <inkml:trace contextRef="#ctx0" brushRef="#br0" timeOffset="7215.65">3546 4038 39 0,'0'0'67'15,"0"0"-10"-15,0 0-7 16,0 0-15-16,0 0-8 16,0 0-4-16,0 0-3 15,0 6-17-15,0-4-3 0,0 4 4 16,0 3 7-16,0 4 12 16,0 0-12-16,8 0-7 15,0 3 6-15,-2-2-10 16,2 0 3-16,-2-1-2 15,-3-3 2-15,1-2-2 16,-1-1-1-16,0-2-27 16,2-3-25-16,-2-2-37 15,1 0 1-15,2 0 5 16</inkml:trace>
+  <inkml:trace contextRef="#ctx0" brushRef="#br0" timeOffset="7559.65">3646 4058 50 0,'0'0'23'0,"0"0"-17"15,0 0 28-15,0 0 26 16,0 0-19-16,0 0-19 16,12 56-3-16,-6-44-4 15,1 0-8-15,1 0-2 16,2-4 5-16,-1-3-10 15,-3-2 6-15,0-2-2 16,0-1 5-16,-3 0 24 16,3 0-19-16,-3-3 17 15,3-8 3-15,-6-4-4 16,3 1 8-16,-3-3-16 0,0 2-11 16,0 0 18-16,-3 2-13 15,-3 3-4-15,-3 4-10 16,-1 2-2-16,1 1 0 15,-2 3-18-15,5 0-47 16,-4 0-71-16,8 0-123 16</inkml:trace>
+  <inkml:trace contextRef="#ctx0" brushRef="#br0" timeOffset="10672.34">4738 3050 6 0,'0'0'44'0,"0"0"1"16,0 0 3-16,0 0-10 16,0 0 4-16,0 0-17 15,0 0-10-15,-2 0 8 16,2 0-4-16,0 0 4 15,0 0 0-15,0 0-16 16,0 0 3-16,0-2-10 16,0-3 0-16,5-3-12 15,-2 3 12-15,3-1 21 16,3 3-21-16,-2 2-8 0,-1 1 3 16,0 0-3-16,-1 0 1 15,-2 0-3-15,1 3-4 16,-4 5 12-16,0-2-4 15,0 2 6-15,0 0 8 16,0 1-2-16,0-1 1 16,0-1 6-16,0 0-13 15,0 0 6-15,0 3-5 16,0-2 0-16,0-1 3 16,3-2-4-16,0-2 0 15,3 1 2-15,2-1-1 16,1-3-1-16,4 0 0 0,5 0-15 15,3 0-61 1,0-4-89-16</inkml:trace>
+  <inkml:trace contextRef="#ctx0" brushRef="#br0" timeOffset="11027.51">5045 2904 76 0,'0'0'68'16,"0"0"-20"-16,0 0 3 16,0 0-30-16,0 0 8 15,0 0-4-15,-43 57-11 0,43-43 0 16,0 1-11 0,0-1-2-16,0-2-1 0,0-3 2 15,4-2-7-15,-1-2 1 16,0-3 4-16,-1-2-1 15,-2 0-10-15,3 0 8 16,0 0 3-16,3-6 19 16,-1-7 3-16,0-3-1 15,-3 0-7-15,-1 2 4 16,-1 2-16-16,0 1 9 16,0 5-11-16,0 0-3 15,-5 3 3-15,-3 3-8 0,-4 0-116 16,2 0-140-16</inkml:trace>
+  <inkml:trace contextRef="#ctx0" brushRef="#br0" timeOffset="12081.82">7486 2863 106 0,'0'0'85'0,"0"0"-56"16,0 0-17-16,0 0 6 0,0 0 1 16,0 0 21-16,0 39-5 15,0-20-5-15,0 1-20 16,2 2 3-16,-1-2-10 15,2 0-1-15,-1-5-2 16,1-2-6-16,-2-1-30 16,2-9-28-16,1-1-14 15,1-2-18-15</inkml:trace>
+  <inkml:trace contextRef="#ctx0" brushRef="#br0" timeOffset="12392.33">7596 2867 91 0,'0'0'145'0,"0"0"-70"16,0 0-55-16,0 0-15 15,0 0 1-15,0 0 8 16,0 37 15-16,5-19-16 16,4 1-1-16,-1-3-8 15,3-2-2-15,-3-7 2 16,-2-4-4-16,0-1-5 15,-3-2 5-15,6 0 0 16,-5 0 7-16,1-8 24 16,-1-6-21-16,-2-3 26 15,-2-2 3-15,0 3-2 0,0 1-20 16,-12 1-16 0,-6 1-1-16,0 2-18 0,-6 3-43 15,0-4-40-15,-1 1-115 16</inkml:trace>
+  <inkml:trace contextRef="#ctx0" brushRef="#br0" timeOffset="12908.6">8256 2088 176 0,'0'0'41'16,"0"0"-20"-16,0 0 29 15,0 0 27-15,0 0-42 16,0 0-8-16,28-44-22 0,-23 44-5 16,1 0-9-16,7 0-6 15,-2 6 15-15,-1 6 0 16,-1-1-1-16,-3 4 0 15,0 0 1-15,-3 3 0 16,-3 0 29-16,0-2-3 16,0-4 7-16,3-3-15 15,-1-3 8-15,2-3-5 16,0-1-8-16,1-1-9 16,4-1 14-16,7 0-18 15,2 0 0-15,3-4-20 16,4-9-107-16,-2-2-34 0,1-6-113 15</inkml:trace>
+  <inkml:trace contextRef="#ctx0" brushRef="#br0" timeOffset="13215.75">8660 1923 28 0,'0'0'108'16,"0"0"-82"-16,0 0 20 15,0 0 15-15,0 0-26 16,0 0-24-16,-16 93 17 16,16-79-20-16,6-2-7 15,0-5 10-15,0 0-9 0,-3-6 1 16,4-1 4-16,-1 0 1 16,-1 0 50-16,-1 0 1 15,1-13-18-15,-1-1-16 16,-1-4-15-16,-3 0 8 15,0 1-11-15,0 0-4 16,0 5 13-16,0 0-16 16,-6 6-20-16,-4-1-44 15,-5 4-76-15,1 3-113 16</inkml:trace>
+  <inkml:trace contextRef="#ctx0" brushRef="#br0" timeOffset="17679.31">4759 5732 14 0,'0'0'36'0,"0"0"0"15,0 0 15-15,0 0-18 16,0 0-10-16,0 0 1 16,0 0-11-16,-6 0-4 15,6 0-4-15,0 0-5 16,6 0-6-16,10 0 6 16,10-3 24-16,2-6 19 15,5-1-12-15,3-2-3 16,1-1-11-16,3 1-10 15,-1-2 13-15,4-1-13 0,2 2 0 16,1 2-6-16,5-6-1 16,7-2 1-16,9-5 5 15,10-4-6-15,14-1 18 16,11-2-18-16,9-5-5 16,13 2 2-16,-5-3-4 15,3 0-20-15,-5-2 24 16,-8 2-15-16,-7 2 4 15,-11 2 6-15,-10 4-22 16,-18 9 17-16,-14 3 13 16,-16 5 10-16,-17 5 13 15,-8 5-4-15,-7 2 17 0,-1 0 2 16,0 0 9 0,0-2-8-16,0 1-16 0,0-2-22 15,0-3-1-15,0 3-9 16,0 2-16-16,-1-1-8 15,-4 2-4-15,-5 0-41 16,-7 0-114-16</inkml:trace>
+  <inkml:trace contextRef="#ctx0" brushRef="#br0" timeOffset="19153.79">4653 5868 62 0,'0'0'42'16,"0"0"-34"-16,0 0 3 0,0 0 19 15,0 0-13-15,0 0-1 16,28-26-14-16,-20 29 13 16,5 11 12-16,1 5 4 15,0 3 7-15,0 3-5 16,2 2-8-16,-1 4-4 16,0-1-17-16,-1-1 6 15,-1 1-7-15,-1 0-2 16,0-3 1-16,0 0 0 15,-2 2 7-15,1-3-5 16,-1-2-3-16,2-2 2 16,-1-2-3-16,-1-8 2 0,-4-4-4 15,-3-1-1 1,0-4-8-16,0-1-5 16,-3-1 16-16,0-1 1 0,3 0-1 15,-3 0 0-15,0 0 4 16,0 0 1-16,0 0-2 15,3 0 5-15,3 0 0 16,1-3-2-16,4-8 18 16,5-1-18-16,1-4-3 15,5 2 3-15,2-2 1 16,0 2-6-16,3-1-1 16,1 1 1-16,5-2 2 15,4-1 5-15,8-3 0 0,8-4-1 16,12-6 11-1,14-3-7-15,12-1-11 0,7 1 4 16,4 1-5-16,-2 1 1 16,1 0-1-16,-1 2 1 15,-6-4 0-15,-10 9-7 16,-8-2 0-16,-6 1 7 16,-6 0 1-16,0-2 0 15,-1 0 5-15,-2 2 2 16,-3-2-3-16,-4 4 0 15,-5 5-5-15,-7 3 0 16,-5 2-3-16,-7 1 3 16,0 2 0-16,-8 3 3 15,-1 0-3-15,-3 3 0 16,4-2 0-16,-2-1-3 16,7-2 3-16,-2 0-1 0,5-2 1 15,-5 1-1-15,-1 1-6 16,-6 1 7-16,-3 4 4 15,-8-4-4-15,-2 6 4 16,-2-1-4-16,-2 1 11 16,-1 1-4-16,0-3 26 15,0 1-10-15,0-1-2 16,0-4-14-16,0 1 1 16,-1-2-5-16,-5 1 14 15,-3-4-15-15,-3-1 0 16,0 0-1-16,-3-5 0 0,-1-2-1 15,-2-8 0-15,-2-3 0 16,-2 1 0-16,1-8 2 16,3 5 2-16,0 5-4 15,6 4 0-15,2 8 2 16,4 5-2-16,0 2 1 16,3 2 1-16,0 2 2 15,1-1 0-15,2 2 1 16,-1 0-3-16,1 1 1 15,-2 0-2-15,2 3 5 16,0 0 3-16,0 0-9 16,0 0 0-16,-1 0 0 15,1 0-6-15,0 0 6 16,0 0-6-16,0 0 5 0,-3 0-1 16,-10 0-2-16,-11 0 4 15,-10 11-41-15,-20 10-28 16,-10 2-27-16,-17 5-163 15</inkml:trace>
+  <inkml:trace contextRef="#ctx0" brushRef="#br0" timeOffset="20147.08">5047 6561 112 0,'0'0'168'15,"0"0"-140"-15,0 0 6 16,0 0 12-16,0 0-24 16,0 0-18-16,36-30 17 15,-19 17-11-15,3 4-3 16,5-1-3-16,7-1 2 15,7-4 0-15,10-4-1 16,7-3-3-16,13-6-2 16,13-1 6-16,10-2-6 0,7-4 0 15,7-3-1 1,0 2-4-16,-2-2-1 16,-2 3-3-16,-1 1-6 0,-10 3-14 15,0 4 8-15,-7-1-15 16,-2 3 0-16,-5 2 30 15,-5 0-9-15,-3 5-6 16,-5 0 21-16,-6 1 11 16,-12 3-9-16,-7 4-1 15,-11 1 0-15,-11 5 8 16,-1-2-6-16,-7 5 0 16,-3-2 9-16,1 0 1 15,1 0 19-15,1-5-15 0,3 4-8 16,-2-3 7-1,-2 3-5-15,-1 0 1 0,-2-2 2 16,2 5-9-16,-2-1-5 16,-1 1 0-16,1-1 0 15,-2 2 0-15,-2-1-3 16,-1 1-3-16,0 0 0 16,0 0-7-16,0-2-8 15,0 2-19-15,0 0-42 16,-6 0-73-16</inkml:trace>
+  <inkml:trace contextRef="#ctx0" brushRef="#br0" timeOffset="21509.58">5053 6618 42 0,'0'0'12'16,"0"0"-10"-16,0 0 12 15,0 0 35-15,0 0 14 16,0 0-8-16,34 97-11 16,-29-73-21-16,-1 0-3 15,2 2-5-15,0-2 2 0,-3-2-2 16,6 1-8-1,0-1 0-15,-2 2-3 0,2 3 1 16,-1 1-3-16,2-1-1 16,-1-4 2-16,-1-7 1 15,-2-3-2-15,1-4 1 16,-3-2-2-16,1-4 4 16,1-2 4-16,2-1 2 15,5 0 13-15,2 0-14 16,6-13-6-16,4-4-2 15,2-2-1-15,4-6 2 16,5-2 1-16,3-3-2 16,5 2-1-16,3-1-1 0,5 1 2 15,3-1-2-15,1-2 0 16,3-4 5-16,2 5-5 16,4-3 1-16,3 3-1 15,1 4 0-15,-2-3-1 16,-3 4 1-16,0-2 0 15,-6 1 0-15,-1 0 0 16,-2 4-1-16,-4 1 0 16,3 1 1-16,-2 0 0 15,-3 0 2-15,3 0-2 16,-3 2 0-16,-2 2-2 16,-1 2 0-16,-6 1 2 15,1-1 3-15,-4 1-3 16,0-3-1-16,-1 0 1 0,0 2 0 15,-3-2 0 1,-2 3-4-16,-4-1 4 0,-2 2-1 16,-1 1 2-16,-1 1-2 15,2-2 0-15,0 0 1 16,-1 1 1-16,-3 0-1 16,-2 4 0-16,-5 0 0 15,2 1 0-15,-5 2-1 16,-1 0-2-16,-6 1 3 15,1 1 3-15,-5 1-3 16,3-1 2-16,-3 1 0 16,0 1 5-16,0-2 6 15,0 2-2-15,0 0 0 16,3-1 3-16,-3 1 4 0,0-3 14 16,0 0 4-16,0-2-5 15,0-4-22-15,0 0-3 16,-3-3 2-16,-5-2-1 15,1 0 0-15,-3-5-2 16,-1-1-2-16,-2-2 5 16,-2-1 3-16,-1-3-4 15,-1 0-4-15,4 5-3 16,2 3-4-16,7 11 1 16,1 4-1-16,1 3-35 15,-1 0-57-15,-7 0-130 0</inkml:trace>
+  <inkml:trace contextRef="#ctx0" brushRef="#br0" timeOffset="22612.95">7966 5037 157 0,'0'0'23'15,"0"0"-23"-15,0 0 23 16,0 0 50-16,0 0-16 16,-11 94-19-16,11-71-8 15,0 3-8-15,0-2-6 16,0-4-3-16,4-5-2 15,3-4-11-15,-4-4 4 16,-1-5-4-16,1-2 0 16,0 0 5-16,3-6-1 15,6-11 35-15,-2-6-20 0,1-3-19 16,2-2-2-16,-7 3 2 16,-1 2 3-16,-5 4 1 15,0 1 9-15,0 1 1 16,-8 3 12-16,-5 3-12 15,2 2-4-15,4 4 1 16,2 1-9-16,2 4-4 16,-1 0 2-16,1 0-9 15,-3 6-22-15,0 0-50 16,3 0-19-16,3 1-65 16,0-4-58-16</inkml:trace>
+  <inkml:trace contextRef="#ctx0" brushRef="#br0" timeOffset="23152.46">8148 4997 48 0,'0'0'68'0,"0"0"-6"15,0 0 7-15,0 0-17 16,0 0 7-16,0 0-19 15,48 66-10-15,-43-52-23 16,-2-2 0-16,1-2-6 16,-4-1 2-16,0-3 0 0,0-4-2 15,0 0 2-15,0-2-1 16,0 0 17-16,0 0 29 16,0 0-3-16,-10-12-42 15,2-2 6-15,4-1-8 16,2-2 1-16,2 3-2 15,0-3-2-15,0 8 2 16,2-3-4-16,4 4-3 16,1 5-3-16,-2-2 4 15,-1 4-13-15,-4 1 17 16,0 0-3-16,0 0 2 16,0 0-5-16,0 0 0 15,0 0 8-15,0 2 0 0,0 5 0 16,0 2 3-1,0 2-3-15,0-3 5 0,0 0-3 16,0-1-2-16,0 2 3 16,3-1 0-16,2-2-3 15,-1 2 2-15,4-3-2 16,-1 4 3-16,0-3-1 16,1-2-1-16,-2 0 1 15,0-2-2-15,4-2-6 16,1 0-87-16,-1-2-204 15</inkml:trace>
+  <inkml:trace contextRef="#ctx0" brushRef="#br0" timeOffset="23715.02">9175 4507 262 0,'0'0'87'0,"0"0"-38"16,0 0 2-16,0 0-18 0,0 0-29 16,0 0 18-16,67 0 8 15,-26-9-3-15,5-3-11 16,-3-3-12-16,-1 1 3 15,-5-1-4-15,-9 1-1 16,-8 0-2-16,-2 4-24 16,-9 4-48-16,-5 4 3 15,-4 2-64-15,0 0-80 16</inkml:trace>
+  <inkml:trace contextRef="#ctx0" brushRef="#br0" timeOffset="25063.62">9181 4539 32 0,'0'0'47'0,"0"0"-8"16,0 0 4-16,0 0 8 16,0 0-3-16,0 0-25 15,-3 23-11-15,3-8 36 0,0 5-25 16,0 0 7-16,0 4-7 16,5 1 5-16,4 2-5 15,2-4-7-15,-2 0-6 16,-1-3-3-16,2-1-5 15,-2-4 2-15,-2-5-4 16,0-2 0-16,1-2 6 16,-1 0-6-16,0-4 1 15,0 0-1-15,0 0 5 16,1-2 2-16,-2 0-4 16,1 1 2-16,1-1 4 15,1 0-8-15,7 0 11 16,0 0 0-16,1 0-3 0,8-5-6 15,-3-3-3 1,1 1 1-16,2-1-2 0,-2-1 2 16,-1 0-1-16,5-3 0 15,2-2 3-15,8 0-4 16,5-1 2-16,6-4-2 16,6 2 2-16,6-1-4 15,3-2 3-15,2 1-3 16,4-3 3-16,2 0-3 15,0 2 6-15,-3 1-3 16,-1 0 1-16,-2-1 1 16,-3 4-2-16,2-1 0 0,-4 0 0 15,-1 3 0-15,-5 3 0 16,-1 0 0-16,-7 0 2 16,-8-1 0-16,-3 1-1 15,-5 2-1-15,-4-1 1 16,-5 3 4-16,-3-1-5 15,-3 3 2-15,1-5 6 16,-2 1-2-16,2-1 0 16,2-2-6-16,3 3 6 15,3-3-6-15,-2 3 0 16,-2-2 0-16,-4 2 3 16,-3 2-1-16,-6 2-2 15,-2 2 2-15,-1-2-2 0,-3 3 9 16,2-4-1-1,-2 0 12-15,0-1 9 0,0-2-15 16,0-2-5-16,0-3 2 16,0-1-11-16,0-5 5 15,0 0-5-15,0-2 2 16,0-1 2-16,0-2-4 16,-5-5 1-16,-2 1-1 15,1-5 1-15,-4 2-1 16,1 3 0-16,-2 3 0 15,5 4-1-15,-3 6 2 16,5 5-1-16,-1 4 0 16,2 4 4-16,0 2-8 15,2 1 4-15,-1 0 0 0,-2 0-3 16,-7 0 1 0,-4 3-2-16,-5 9 4 0,-6 4-9 15,-2 1 7-15,1 1-5 16,-7-1 0-16,-2-1 5 15,-6 0-10-15,-4 4 3 16,-10-1-4-16,-12 5-10 16,-5-2 6-16,-6 4 7 15,-5 3 8-15,-7 1-2 16,-10 4-2-16,-1 0 6 16,-1-4-1-16,5 5 1 15,8-4 1-15,11-1-1 16,14 1 0-16,10-5 0 0,10-4 4 15,10-2-4-15,10-10 0 16,12-3 1-16,7-4-3 16,4-3 2-16,2 0 0 15,0 0-2-15,0 0 2 16,-1 0 0-16,-1 0 0 16,-1 0 3-16,-1 0-1 15,2 0-2-15,1 0 0 16,-1 0-1-16,2 0 1 15,0 0-1-15,0 0-3 16,0 5-50-16,0-3-41 16,0-2-167-16</inkml:trace>
+  <inkml:trace contextRef="#ctx0" brushRef="#br0" timeOffset="25927.34">11141 3739 3 0,'0'0'32'0,"0"0"2"0,0 0 16 15,0 0-3-15,0 0 1 16,0 0 1-16,-3-5-5 16,3 5-21-16,0 1-17 15,0 14-3-15,0 5 52 16,5 6-14-16,2 1-22 16,1 2 1-16,4 3-19 15,-2 2 7-15,1 3-8 16,-1 3 0-16,-4-3 3 15,2-5-3-15,-2-4 1 16,-2-8-1-16,0-8 2 16,-2-2 0-16,-1-8-2 0,-1-2 0 15,0 0 3-15,0 0-3 16,0 0-1-16,0 0-11 16,0 0-9-16,0 0-16 15,0 0 30-15,-3 0 5 16,-4 0-4-16,3 0-45 15,-1 0-21-15,2 0-8 16,0 0-46-16</inkml:trace>
+  <inkml:trace contextRef="#ctx0" brushRef="#br0" timeOffset="27741.57">11194 3730 26 0,'0'0'8'16,"0"0"15"-16,0 0-12 15,0 0 10-15,0 0 25 16,0 0-21-16,-2-35 3 15,2 35-9-15,0 0 19 16,0 0-1-16,0 0-8 0,0-1-1 16,0-1 5-1,9 1-21-15,6-5 1 0,7 2-9 16,-1-3 11-16,2 1-14 16,2 2 9-16,-1-1 4 15,1 1 7-15,3-1-21 16,4-2 13-16,2 3-6 15,10 0-6-15,8-3 1 16,7-3-2-16,12 0 0 16,0-3-3-16,10 0-16 15,4-1 16-15,-6 2 3 16,4-2-28-16,-8 0 28 16,-11 2-6-16,-4-1 6 15,-9 3 7-15,-4-3 14 16,0 0-10-16,-4-1 7 0,-3 2-12 15,-6 1 3-15,-5 4-8 16,-9 1 0-16,-4 2 10 16,-5 3-10-16,-5 0 13 15,-1-1 1-15,-4 2-12 16,1 0 5-16,-1 0-7 16,2-3 1-16,2 0 16 15,4 0-10-15,-2-1 4 16,-1 0-5-16,0 3-5 15,-3-1 10-15,0 1-6 16,-3 1 2-16,0 0 9 16,0 0-16-16,0 0 2 0,0-1-3 15,2 1 2-15,-1 0-2 16,2-2 0-16,0 2 0 16,-2-1 4-16,-1 1-3 15,0 0-1-15,0 0 0 16,0 0-1-16,0 0-4 15,0 0 4-15,0 0-3 16,0 0 3-16,0 0-12 16,0 3 11-16,2 5 0 15,-1-2 4-15,1 4 0 16,-2-4-2-16,0 4 0 16,0 3-1-16,0 1 5 15,0 1-4-15,0 3 0 16,0-2 0-16,0 4-2 15,0-4 2-15,0 2 0 0,0 0 0 16,3 3 0-16,-1-1 0 16,1 3 0-16,0-6 2 15,0 0-2-15,-2-3 0 16,2-3 0-16,0-1 0 16,0-4 2-16,-2 1-2 15,1-3 0-15,-2 1 1 16,0-4-1-16,0 3 0 15,0-2 0-15,0-2-1 16,0 1 2-16,0 0-1 16,0 1 0-16,0-1 0 15,0 2 1-15,0 1-1 0,0-2 3 16,0 3-3-16,0-2 2 16,0 2-1-16,-5 1-1 15,0-3 0-15,0 3 0 16,-2-1 0-16,0-2 0 15,0 3 0-15,0-3 2 16,2 1-4-16,2 0 2 16,0-1 0-16,0-2-1 15,0 1 2-15,0 1-1 16,-1-3 0-16,-4 3 2 16,1-1 0-16,-4 1-2 15,0 0 0-15,-3-2 2 16,-5 2-1-16,1-1-1 0,-3 0 0 15,-6 1 5-15,-1 0-4 16,-7 0-1-16,-7 5 0 16,-7 4-1-16,-10-1 4 15,-7 3-4-15,-6 5 1 16,-5 0 0-16,-11 3 0 16,1 3 0-16,-4-1 0 15,6-2-2-15,15-2 4 16,9-3-2-16,9 3 0 15,11-7 0-15,10-2-1 16,12-3 1-16,10-3 0 16,3-2-1-16,6-1 1 0,0-1 0 15,0-1 0 1,0 0 1-16,0 0-2 0,0 0 1 16,0 0 0-16,0 0 0 15,0 1 2-15,0-1-1 16,0 0 0-16,0 0 1 15,-3 0 6-15,3 0-1 16,0 2-6-16,-6 1 3 16,0-2-2-16,-3 5-2 15,0-2 0-15,2-2 2 16,-1 0-6-16,5 0 4 16,0 1 0-16,0-2 0 15,1-1 3-15,0 0-3 16,2 0 0-16,-2 2 2 15,2-2-2-15,0 0 0 0,0 0 0 16,0 0 0-16,-1 0 1 16,-4 0-1-16,1 0 0 15,-2 0 2-15,1 2-2 16,1-2 0-16,-2 0 0 16,3 0-2-16,-2 0 3 15,1 4-1-15,-2-3 0 16,1 0 3-16,1 2-7 15,1-3 4-15,2 0 0 16,1 0-1-16,0 0 3 16,0 0-3-16,0 0 1 15,0 0-25-15,0 0-14 0,0 0-33 16,0 0-22-16,-2 1-26 16,1-1-43-16</inkml:trace>
+  <inkml:trace contextRef="#ctx0" brushRef="#br0" timeOffset="35924.47">5806 5593 56 0,'0'0'69'0,"0"0"-7"16,0 0-2-16,0 0-24 16,0 0 1-16,0 0-17 15,0 0-8-15,0 0 0 16,0 10 5-16,0 3 4 16,0 1-13-16,0 2-5 15,0-1 3-15,0 2-6 16,0-3 0-16,0 0-29 15,0 0-41-15,0-5-55 16,0-3-35-16</inkml:trace>
+  <inkml:trace contextRef="#ctx0" brushRef="#br0" timeOffset="36299.58">5715 5568 41 0,'0'0'64'0,"0"0"-10"16,0 0-13-16,79-10-6 16,-52 10-3-16,0 0-17 15,1 0 7-15,-4 0-21 0,-4 2-1 16,-7 6-7-16,-7 2 2 15,-3 1-1-15,-3 0 6 16,0 4 5-16,0 0-4 16,-11 2 21-16,-5 4 1 15,-3-3-22-15,-1-2 11 16,1-3-11-16,4-2 5 16,0-5 2-16,3 2-6 15,-1-5 7-15,8 0-8 16,1-2 3-16,2 1-8 15,2-2-17-15,0 0-35 16,0 0-63-16</inkml:trace>
+  <inkml:trace contextRef="#ctx0" brushRef="#br0" timeOffset="36562.94">6050 5478 147 0,'0'0'108'15,"0"0"-52"-15,0 0-33 16,0 0-19-16,0 0 32 16,0 0 3-16,14 62-9 0,-9-42-14 15,-1-2-9-15,-2 2-3 16,1-2-2-16,0-2-2 15,1 1 0-15,-4-2-4 16,3-2-62-16,-3-4-78 16</inkml:trace>
+  <inkml:trace contextRef="#ctx0" brushRef="#br0" timeOffset="37333.83">6103 6311 122 0,'0'0'57'15,"0"0"-57"-15,0 0 3 16,0 0 0-16,0 0 1 15,0 0-4-15,2 59 5 16,-2-41-5-16,0-3-6 16,0-1 3-16,0-2-18 15,0-5-51-15</inkml:trace>
+  <inkml:trace contextRef="#ctx0" brushRef="#br0" timeOffset="37680.04">6070 6275 56 0,'0'0'32'0,"0"0"21"0,0 0-14 15,0 0 1-15,0 0-13 16,91-13 5-16,-76 13-23 15,-1 6 1-15,-4 8-9 16,-1-1 12-16,-3-1 3 16,-3 1-10-16,0 0 15 15,-3-2-8-15,0 1-9 16,0-1 25-16,-8 1-21 16,-2 0 6-16,1-3-3 15,-1-3-8-15,-2 0 5 0,4-3-7 16,2-2-1-16,0-1 0 15,2 0-29-15,-3 0-64 16,4 0-53-16</inkml:trace>
+  <inkml:trace contextRef="#ctx0" brushRef="#br0" timeOffset="38047.03">6339 6193 57 0,'0'0'48'0,"0"0"-5"16,0 0-2-16,0 0 0 16,0 0-13-16,0 0 1 15,46 32-8-15,-44-19-1 16,-2-1 9-16,0 5 8 15,0-3-12-15,0 0-4 16,0 0-20-16,-5-3 31 16,1-1-22-16,1-2-2 15,1-2 6-15,2-3-14 16,0-2 7-16,0 1-3 16,0-2-1-16,0 0 6 0,3 0 5 15,8 0 12-15,2 0-5 16,4-12-21-16,-3 4-38 15,0-4-34-15,-4 1-121 16</inkml:trace>
+  <inkml:trace contextRef="#ctx0" brushRef="#br0" timeOffset="38911.69">4841 3679 211 0,'0'0'5'15,"0"0"-1"-15,0 0-4 16,0 0 2-16,39 91-2 16,-32-74 1-16,-4 0 1 15,0-5 1-15,0-1-2 16,-1-1-2-16,-1-5-16 15,-1-1-119-15</inkml:trace>
+  <inkml:trace contextRef="#ctx0" brushRef="#br0" timeOffset="39239.41">4829 3636 72 0,'0'0'57'0,"0"0"-32"16,0 0 19-16,79-8-5 16,-61 8-8-16,3 0-3 15,-2 8-18-15,1 2 20 16,-2 3-11-16,-2 2-17 16,-2 5-2-16,-7 2-8 15,-7 1 8-15,0 0 2 0,-3-4 16 16,-12 0 5-16,1-1-2 15,0-4-10-15,-3-3 2 16,4-1-10-16,-1-1 2 16,1-5-5-16,4-1 3 15,0-2-9-15,3-1-12 16,0 0-69-16,3 0-11 16,3 0-75-16</inkml:trace>
+  <inkml:trace contextRef="#ctx0" brushRef="#br0" timeOffset="39511.49">5232 3519 137 0,'0'0'87'15,"0"0"38"-15,0 0-52 16,0 0-12-16,37 99-8 16,-28-76-31-16,1 0-10 15,-2 0-6-15,-2 2-3 16,2-2 0-16,-3-7-3 16,0-1-23-16,-4-4-36 0,1-4-57 15,-2-5-98-15</inkml:trace>
+  <inkml:trace contextRef="#ctx0" brushRef="#br0" timeOffset="40410.73">8908 2446 125 0,'0'0'80'0,"0"0"-15"16,0 0 9-16,0 0-2 0,0 0-5 15,0 0-4-15,0 0-32 16,-21-30-31-16,21 44-3 16,0 11 2-16,0 5 1 15,4-2 6-15,1 0-4 16,1-3 0-16,-1-4 1 16,-1-3-1-16,2-7-4 15,-3-1-37-15,-2-6-25 16,1-4-24-16,-2 0-45 15,0 0-81-15</inkml:trace>
+  <inkml:trace contextRef="#ctx0" brushRef="#br0" timeOffset="40709.8">8910 2373 186 0,'0'0'37'16,"0"0"16"-16,80 13-29 16,-53-1-13-16,-9-1-2 15,0 1-2-15,-5-1 12 16,-1 3 7-16,-6 6-15 16,0-4 15-16,-6 1-3 15,0 1-1-15,0 3-6 0,-17-1-12 16,-3 0 4-16,-4-3-1 15,4-5-4-15,1 0 6 16,4-6-9-16,5-4-14 16,-2-2-37-16,0 0-60 15,6 0-52-15</inkml:trace>
+  <inkml:trace contextRef="#ctx0" brushRef="#br0" timeOffset="41024.11">9108 2337 57 0,'0'0'85'16,"0"0"-10"-16,0 0-21 0,88-27 7 15,-72 27-12-15,1 0-1 16,-4 0-3-16,-4 4-28 16,0 6 5-16,-3-2-9 15,-3 6-3-15,2 2 9 16,-5 5-9-16,0 0-1 15,0 3 14-15,-5 0-12 16,-1-5-10-16,0-4 10 16,3-3-9-16,3-4 5 15,0-2-4-15,9-2 3 16,8 1 11-16,5-5-1 16,5 0-13-16,1 0-3 0,5-7-5 15,0-5-49 1,-5 2-47-16,-3-2-118 0</inkml:trace>
+  <inkml:trace contextRef="#ctx0" brushRef="#br0" timeOffset="41947.47">9991 4334 231 0,'0'0'144'16,"0"0"-141"-16,0 0 2 16,0 0-5-16,0 0 23 15,0 0 6-15,21 48-11 16,-16-39 5-16,1 2-18 16,-2 1 3-16,-1 2-4 15,-2 0-4-15,-1 0 1 16,0-3-1-16,0-2-14 15,0-1-6-15,0-8-17 16,0 0-11-16,0 0-41 0,0 0-8 16,0 0-81-1</inkml:trace>
+  <inkml:trace contextRef="#ctx0" brushRef="#br0" timeOffset="42270.41">9995 4293 38 0,'0'0'72'0,"0"0"5"15,0 0-6-15,0 0-9 16,96 28-16-16,-79-17-24 16,-3 0-8-16,-3 1-7 15,-5-3-1-15,-3 2-2 0,-3 1 1 16,0 0 17-16,0 3 2 15,-11 0 11-15,-11 3-15 16,-2-4-6-16,0-1 2 16,5-1-13-16,7-7-2 15,3 0 0-15,6-3 1 16,2 0-4-16,1-2-7 16,0 0-43-16,0 0-8 15,0 0-21-15,0 0-36 16,8 0-79-16</inkml:trace>
+  <inkml:trace contextRef="#ctx0" brushRef="#br0" timeOffset="42502.36">10270 4275 151 0,'0'0'162'15,"0"0"-61"-15,0 0-43 16,0 0-37-16,0 0-16 15,0 0 41-15,15 43-17 16,-9-25-7-16,-3 2-13 16,0-2-3-16,0-3-2 15,0 1-3-15,-3-3-1 16,1-2-12-16,1 1-33 16,-2-6-17-16,0-3-39 0,1-3-131 15</inkml:trace>
+  <inkml:trace contextRef="#ctx0" brushRef="#br0" timeOffset="43372.92">11999 3705 141 0,'0'0'87'16,"0"0"-72"-16,0 0 65 0,0 0-19 15,0 0-22-15,0 0-20 16,-3 64-7-16,3-49-12 16,-4-1 0-16,1-1 2 15,0 0-2-15,-2-2-14 16,1-3-27-16,1-2-27 16,-2-2-29-16,2-4-48 15</inkml:trace>
+  <inkml:trace contextRef="#ctx0" brushRef="#br0" timeOffset="43710.89">11922 3681 126 0,'0'0'113'0,"0"0"-70"15,0 0 43-15,0 0-39 16,0 0 1-16,92-8-19 15,-73 8-15-15,1 0-5 16,-2 8-3-16,-6 2-2 16,4 0 6-16,-5 1-4 15,-4 2 1-15,-1-1 1 16,-6 0-6-16,0 3 6 16,0 2 8-16,-15 2-2 15,-3 2 21-15,-3-1-25 0,-1 0 0 16,4-6-3-16,2-4-6 15,5 0 5-15,1-5-6 16,5 2-22-16,-1-4-18 16,0-1-31-16,3-2-51 15,3 0-112-15</inkml:trace>
+  <inkml:trace contextRef="#ctx0" brushRef="#br0" timeOffset="44130.5">12247 3622 48 0,'0'0'180'15,"0"0"-104"-15,0 0-25 16,0 0-4-16,0 0 3 15,0 0-15-15,49 10-13 16,-40-1 7-16,-2 0-20 16,-2-2 4-16,1 3-4 15,-4 2-6-15,-1-4 11 16,-1 3-7-16,0 1 6 16,0 0 10-16,-6 4-9 0,-5-4 3 15,3 0-10-15,3-3-5 16,4 0-1-16,1-3 0 15,0 1-1-15,0-4 2 16,1-3 2-16,11 0 4 16,3 0 0-16,3 0-4 15,0 0-4-15,0-5-1 16,-3-2-33-16,-2 4-25 16,-4 2-35-16,-3 1-70 15,-3 0-178-15</inkml:trace>
+  <inkml:trace contextRef="#ctx0" brushRef="#br0" timeOffset="58408.51">9560 6000 24 0,'0'0'118'0,"0"0"-60"15,0 0-3 1,0 0-6-16,0 0 4 0,0 0-46 16,0 0-7-16,0 0 0 15,0 0 2-15,4 13 10 16,1-1 0-16,-1 1-2 16,1-2 5-16,-1-1-11 15,-2-3 4-15,-1-1-7 16,1-2 0-16,-2-1 4 15,0-2-5-15,0 1 0 16,0-2 2-16,0 0 1 16,0 0-3-16,0 0 6 15,0 0-1-15,0 0 24 16,0 0-1-16,0 0 10 16,3-12-14-16,-3-3-24 0,4-2 0 15,1-4-2-15,1 0 2 16,3-5-1-16,2 1 1 15,3 2-6-15,-2 1-12 16,1 10 2-16,-5 8 16 16,-1 4 3-16,-2 0-3 15,7 0-5-15,-2 11 3 16,3 4 4-16,-2-3 1 16,0 1-3-16,0-2 0 15,-3 0 0-15,-1 0-16 16,-2-2-48-16,-5-2-47 15,3-3-65-15</inkml:trace>
+  <inkml:trace contextRef="#ctx0" brushRef="#br0" timeOffset="58926.46">9881 5917 64 0,'0'0'54'0,"0"0"-17"16,9 81-10-16,-6-54-20 15,0-2-2-15,-2-5-2 0,-1-8-2 16,2-4-1-16,-2-6 2 15,0-1-1-15,0-1 47 16,0 0 50-16,0-3-6 16,0-14-79-16,-3-1-10 15,-3-6 12-15,0-2 3 16,0-2-3-16,-3-6-5 16,3 1-10-16,4-2 0 15,2 7 0-15,0 6 0 16,2 6-7-16,11 6 4 0,-2 5-20 15,1 2 22 1,1 3-8-16,-2 0 5 0,-1 4-3 16,-4 9 4-16,-2-1 3 15,-4-1 0-15,0-1 2 16,0-1 3-16,0-2 10 16,0 1 0-16,-1-3-2 15,-5 3-7-15,0-2-4 16,2-2-2-16,-1-2-31 15,4 0-26-15,-1-2-68 16,2 0-91-16</inkml:trace>
+  <inkml:trace contextRef="#ctx0" brushRef="#br0" timeOffset="59093.13">10075 5795 142 0,'0'0'86'16,"0"0"-38"-16,0 0 4 16,0 0-28-16,0 0-24 15,0 0-31-15,4 0-114 16</inkml:trace>
+</inkml:ink>
+</file>
+
 <file path=ppt/notesMasters/notesMaster1.xml><?xml version="1.0" encoding="utf-8"?>
 <p:notesMaster xmlns:a="http://schemas.openxmlformats.org/drawingml/2006/main" xmlns:r="http://schemas.openxmlformats.org/officeDocument/2006/relationships" xmlns:p="http://schemas.openxmlformats.org/presentationml/2006/main">
   <p:cSld>
@@ -2967,7 +3052,7 @@
           <a:p>
             <a:fld id="{B535DB69-913B-41DB-A53E-3F20C7706EC0}" type="datetimeFigureOut">
               <a:rPr lang="en-US" smtClean="0"/>
-              <a:t>13-Dec-22</a:t>
+              <a:t>15-Dec-22</a:t>
             </a:fld>
             <a:endParaRPr lang="en-US"/>
           </a:p>
@@ -3485,7 +3570,7 @@
           <a:p>
             <a:fld id="{E66EBA75-61DB-42BC-B227-112539E2E989}" type="datetimeFigureOut">
               <a:rPr lang="en-US" smtClean="0"/>
-              <a:t>13-Dec-22</a:t>
+              <a:t>15-Dec-22</a:t>
             </a:fld>
             <a:endParaRPr lang="en-US"/>
           </a:p>
@@ -3683,7 +3768,7 @@
           <a:p>
             <a:fld id="{E66EBA75-61DB-42BC-B227-112539E2E989}" type="datetimeFigureOut">
               <a:rPr lang="en-US" smtClean="0"/>
-              <a:t>13-Dec-22</a:t>
+              <a:t>15-Dec-22</a:t>
             </a:fld>
             <a:endParaRPr lang="en-US"/>
           </a:p>
@@ -3891,7 +3976,7 @@
           <a:p>
             <a:fld id="{E66EBA75-61DB-42BC-B227-112539E2E989}" type="datetimeFigureOut">
               <a:rPr lang="en-US" smtClean="0"/>
-              <a:t>13-Dec-22</a:t>
+              <a:t>15-Dec-22</a:t>
             </a:fld>
             <a:endParaRPr lang="en-US"/>
           </a:p>
@@ -4089,7 +4174,7 @@
           <a:p>
             <a:fld id="{E66EBA75-61DB-42BC-B227-112539E2E989}" type="datetimeFigureOut">
               <a:rPr lang="en-US" smtClean="0"/>
-              <a:t>13-Dec-22</a:t>
+              <a:t>15-Dec-22</a:t>
             </a:fld>
             <a:endParaRPr lang="en-US"/>
           </a:p>
@@ -4364,7 +4449,7 @@
           <a:p>
             <a:fld id="{E66EBA75-61DB-42BC-B227-112539E2E989}" type="datetimeFigureOut">
               <a:rPr lang="en-US" smtClean="0"/>
-              <a:t>13-Dec-22</a:t>
+              <a:t>15-Dec-22</a:t>
             </a:fld>
             <a:endParaRPr lang="en-US"/>
           </a:p>
@@ -4629,7 +4714,7 @@
           <a:p>
             <a:fld id="{E66EBA75-61DB-42BC-B227-112539E2E989}" type="datetimeFigureOut">
               <a:rPr lang="en-US" smtClean="0"/>
-              <a:t>13-Dec-22</a:t>
+              <a:t>15-Dec-22</a:t>
             </a:fld>
             <a:endParaRPr lang="en-US"/>
           </a:p>
@@ -5041,7 +5126,7 @@
           <a:p>
             <a:fld id="{E66EBA75-61DB-42BC-B227-112539E2E989}" type="datetimeFigureOut">
               <a:rPr lang="en-US" smtClean="0"/>
-              <a:t>13-Dec-22</a:t>
+              <a:t>15-Dec-22</a:t>
             </a:fld>
             <a:endParaRPr lang="en-US"/>
           </a:p>
@@ -5182,7 +5267,7 @@
           <a:p>
             <a:fld id="{E66EBA75-61DB-42BC-B227-112539E2E989}" type="datetimeFigureOut">
               <a:rPr lang="en-US" smtClean="0"/>
-              <a:t>13-Dec-22</a:t>
+              <a:t>15-Dec-22</a:t>
             </a:fld>
             <a:endParaRPr lang="en-US"/>
           </a:p>
@@ -5295,7 +5380,7 @@
           <a:p>
             <a:fld id="{E66EBA75-61DB-42BC-B227-112539E2E989}" type="datetimeFigureOut">
               <a:rPr lang="en-US" smtClean="0"/>
-              <a:t>13-Dec-22</a:t>
+              <a:t>15-Dec-22</a:t>
             </a:fld>
             <a:endParaRPr lang="en-US"/>
           </a:p>
@@ -5606,7 +5691,7 @@
           <a:p>
             <a:fld id="{E66EBA75-61DB-42BC-B227-112539E2E989}" type="datetimeFigureOut">
               <a:rPr lang="en-US" smtClean="0"/>
-              <a:t>13-Dec-22</a:t>
+              <a:t>15-Dec-22</a:t>
             </a:fld>
             <a:endParaRPr lang="en-US"/>
           </a:p>
@@ -5894,7 +5979,7 @@
           <a:p>
             <a:fld id="{E66EBA75-61DB-42BC-B227-112539E2E989}" type="datetimeFigureOut">
               <a:rPr lang="en-US" smtClean="0"/>
-              <a:t>13-Dec-22</a:t>
+              <a:t>15-Dec-22</a:t>
             </a:fld>
             <a:endParaRPr lang="en-US"/>
           </a:p>
@@ -6135,7 +6220,7 @@
           <a:p>
             <a:fld id="{E66EBA75-61DB-42BC-B227-112539E2E989}" type="datetimeFigureOut">
               <a:rPr lang="en-US" smtClean="0"/>
-              <a:t>13-Dec-22</a:t>
+              <a:t>15-Dec-22</a:t>
             </a:fld>
             <a:endParaRPr lang="en-US"/>
           </a:p>
@@ -7141,6 +7226,693 @@
 </p:sld>
 </file>
 
+<file path=ppt/slides/slide15.xml><?xml version="1.0" encoding="utf-8"?>
+<p:sld xmlns:a="http://schemas.openxmlformats.org/drawingml/2006/main" xmlns:r="http://schemas.openxmlformats.org/officeDocument/2006/relationships" xmlns:p="http://schemas.openxmlformats.org/presentationml/2006/main">
+  <p:cSld>
+    <p:spTree>
+      <p:nvGrpSpPr>
+        <p:cNvPr id="1" name=""/>
+        <p:cNvGrpSpPr/>
+        <p:nvPr/>
+      </p:nvGrpSpPr>
+      <p:grpSpPr>
+        <a:xfrm>
+          <a:off x="0" y="0"/>
+          <a:ext cx="0" cy="0"/>
+          <a:chOff x="0" y="0"/>
+          <a:chExt cx="0" cy="0"/>
+        </a:xfrm>
+      </p:grpSpPr>
+      <p:sp>
+        <p:nvSpPr>
+          <p:cNvPr id="2" name="Title 1">
+            <a:extLst>
+              <a:ext uri="{FF2B5EF4-FFF2-40B4-BE49-F238E27FC236}">
+                <a16:creationId xmlns:a16="http://schemas.microsoft.com/office/drawing/2014/main" id="{2298A18C-CD7E-372D-F355-D1EB8AD8DFAC}"/>
+              </a:ext>
+            </a:extLst>
+          </p:cNvPr>
+          <p:cNvSpPr>
+            <a:spLocks noGrp="1"/>
+          </p:cNvSpPr>
+          <p:nvPr>
+            <p:ph type="ctrTitle"/>
+          </p:nvPr>
+        </p:nvSpPr>
+        <p:spPr>
+          <a:xfrm>
+            <a:off x="1320800" y="1889919"/>
+            <a:ext cx="9144000" cy="2387600"/>
+          </a:xfrm>
+        </p:spPr>
+        <p:txBody>
+          <a:bodyPr/>
+          <a:lstStyle/>
+          <a:p>
+            <a:r>
+              <a:rPr lang="en-US" dirty="0" err="1"/>
+              <a:t>Numpy</a:t>
+            </a:r>
+            <a:r>
+              <a:rPr lang="en-US" dirty="0"/>
+              <a:t> and its Image Application</a:t>
+            </a:r>
+          </a:p>
+        </p:txBody>
+      </p:sp>
+      <p:pic>
+        <p:nvPicPr>
+          <p:cNvPr id="1028" name="Picture 4">
+            <a:extLst>
+              <a:ext uri="{FF2B5EF4-FFF2-40B4-BE49-F238E27FC236}">
+                <a16:creationId xmlns:a16="http://schemas.microsoft.com/office/drawing/2014/main" id="{1245E6F0-A1C0-277A-9ED6-3B2726073F97}"/>
+              </a:ext>
+            </a:extLst>
+          </p:cNvPr>
+          <p:cNvPicPr>
+            <a:picLocks noChangeAspect="1" noChangeArrowheads="1"/>
+          </p:cNvPicPr>
+          <p:nvPr/>
+        </p:nvPicPr>
+        <p:blipFill>
+          <a:blip r:embed="rId2">
+            <a:extLst>
+              <a:ext uri="{28A0092B-C50C-407E-A947-70E740481C1C}">
+                <a14:useLocalDpi xmlns:a14="http://schemas.microsoft.com/office/drawing/2010/main" val="0"/>
+              </a:ext>
+            </a:extLst>
+          </a:blip>
+          <a:srcRect/>
+          <a:stretch>
+            <a:fillRect/>
+          </a:stretch>
+        </p:blipFill>
+        <p:spPr bwMode="auto">
+          <a:xfrm>
+            <a:off x="9389534" y="186267"/>
+            <a:ext cx="2432050" cy="2432050"/>
+          </a:xfrm>
+          <a:prstGeom prst="rect">
+            <a:avLst/>
+          </a:prstGeom>
+          <a:noFill/>
+          <a:extLst>
+            <a:ext uri="{909E8E84-426E-40DD-AFC4-6F175D3DCCD1}">
+              <a14:hiddenFill xmlns:a14="http://schemas.microsoft.com/office/drawing/2010/main">
+                <a:solidFill>
+                  <a:srgbClr val="FFFFFF"/>
+                </a:solidFill>
+              </a14:hiddenFill>
+            </a:ext>
+          </a:extLst>
+        </p:spPr>
+      </p:pic>
+    </p:spTree>
+    <p:extLst>
+      <p:ext uri="{BB962C8B-B14F-4D97-AF65-F5344CB8AC3E}">
+        <p14:creationId xmlns:p14="http://schemas.microsoft.com/office/powerpoint/2010/main" val="110787655"/>
+      </p:ext>
+    </p:extLst>
+  </p:cSld>
+  <p:clrMapOvr>
+    <a:masterClrMapping/>
+  </p:clrMapOvr>
+</p:sld>
+</file>
+
+<file path=ppt/slides/slide16.xml><?xml version="1.0" encoding="utf-8"?>
+<p:sld xmlns:a="http://schemas.openxmlformats.org/drawingml/2006/main" xmlns:r="http://schemas.openxmlformats.org/officeDocument/2006/relationships" xmlns:p="http://schemas.openxmlformats.org/presentationml/2006/main">
+  <p:cSld>
+    <p:spTree>
+      <p:nvGrpSpPr>
+        <p:cNvPr id="1" name=""/>
+        <p:cNvGrpSpPr/>
+        <p:nvPr/>
+      </p:nvGrpSpPr>
+      <p:grpSpPr>
+        <a:xfrm>
+          <a:off x="0" y="0"/>
+          <a:ext cx="0" cy="0"/>
+          <a:chOff x="0" y="0"/>
+          <a:chExt cx="0" cy="0"/>
+        </a:xfrm>
+      </p:grpSpPr>
+      <p:sp>
+        <p:nvSpPr>
+          <p:cNvPr id="2" name="Title 1">
+            <a:extLst>
+              <a:ext uri="{FF2B5EF4-FFF2-40B4-BE49-F238E27FC236}">
+                <a16:creationId xmlns:a16="http://schemas.microsoft.com/office/drawing/2014/main" id="{4EF75412-8E74-564F-D0E5-1D5EEC9C3826}"/>
+              </a:ext>
+            </a:extLst>
+          </p:cNvPr>
+          <p:cNvSpPr>
+            <a:spLocks noGrp="1"/>
+          </p:cNvSpPr>
+          <p:nvPr>
+            <p:ph type="title"/>
+          </p:nvPr>
+        </p:nvSpPr>
+        <p:spPr/>
+        <p:txBody>
+          <a:bodyPr/>
+          <a:lstStyle/>
+          <a:p>
+            <a:r>
+              <a:rPr lang="en-US" dirty="0"/>
+              <a:t>RGB Image</a:t>
+            </a:r>
+          </a:p>
+        </p:txBody>
+      </p:sp>
+      <p:pic>
+        <p:nvPicPr>
+          <p:cNvPr id="1026" name="Picture 2">
+            <a:extLst>
+              <a:ext uri="{FF2B5EF4-FFF2-40B4-BE49-F238E27FC236}">
+                <a16:creationId xmlns:a16="http://schemas.microsoft.com/office/drawing/2014/main" id="{ADC4F14E-B410-F751-0A2F-EB757A175A7D}"/>
+              </a:ext>
+            </a:extLst>
+          </p:cNvPr>
+          <p:cNvPicPr>
+            <a:picLocks noChangeAspect="1" noChangeArrowheads="1"/>
+          </p:cNvPicPr>
+          <p:nvPr/>
+        </p:nvPicPr>
+        <p:blipFill>
+          <a:blip r:embed="rId2">
+            <a:extLst>
+              <a:ext uri="{28A0092B-C50C-407E-A947-70E740481C1C}">
+                <a14:useLocalDpi xmlns:a14="http://schemas.microsoft.com/office/drawing/2010/main" val="0"/>
+              </a:ext>
+            </a:extLst>
+          </a:blip>
+          <a:srcRect/>
+          <a:stretch>
+            <a:fillRect/>
+          </a:stretch>
+        </p:blipFill>
+        <p:spPr bwMode="auto">
+          <a:xfrm>
+            <a:off x="5180790" y="1024404"/>
+            <a:ext cx="1830419" cy="5468471"/>
+          </a:xfrm>
+          <a:prstGeom prst="rect">
+            <a:avLst/>
+          </a:prstGeom>
+          <a:noFill/>
+          <a:extLst>
+            <a:ext uri="{909E8E84-426E-40DD-AFC4-6F175D3DCCD1}">
+              <a14:hiddenFill xmlns:a14="http://schemas.microsoft.com/office/drawing/2010/main">
+                <a:solidFill>
+                  <a:srgbClr val="FFFFFF"/>
+                </a:solidFill>
+              </a14:hiddenFill>
+            </a:ext>
+          </a:extLst>
+        </p:spPr>
+      </p:pic>
+    </p:spTree>
+    <p:extLst>
+      <p:ext uri="{BB962C8B-B14F-4D97-AF65-F5344CB8AC3E}">
+        <p14:creationId xmlns:p14="http://schemas.microsoft.com/office/powerpoint/2010/main" val="243046938"/>
+      </p:ext>
+    </p:extLst>
+  </p:cSld>
+  <p:clrMapOvr>
+    <a:masterClrMapping/>
+  </p:clrMapOvr>
+</p:sld>
+</file>
+
+<file path=ppt/slides/slide17.xml><?xml version="1.0" encoding="utf-8"?>
+<p:sld xmlns:a="http://schemas.openxmlformats.org/drawingml/2006/main" xmlns:r="http://schemas.openxmlformats.org/officeDocument/2006/relationships" xmlns:p="http://schemas.openxmlformats.org/presentationml/2006/main">
+  <p:cSld>
+    <p:spTree>
+      <p:nvGrpSpPr>
+        <p:cNvPr id="1" name=""/>
+        <p:cNvGrpSpPr/>
+        <p:nvPr/>
+      </p:nvGrpSpPr>
+      <p:grpSpPr>
+        <a:xfrm>
+          <a:off x="0" y="0"/>
+          <a:ext cx="0" cy="0"/>
+          <a:chOff x="0" y="0"/>
+          <a:chExt cx="0" cy="0"/>
+        </a:xfrm>
+      </p:grpSpPr>
+      <p:sp>
+        <p:nvSpPr>
+          <p:cNvPr id="2" name="Title 1">
+            <a:extLst>
+              <a:ext uri="{FF2B5EF4-FFF2-40B4-BE49-F238E27FC236}">
+                <a16:creationId xmlns:a16="http://schemas.microsoft.com/office/drawing/2014/main" id="{CF326A5D-B092-BF88-B34B-5B641F4CB308}"/>
+              </a:ext>
+            </a:extLst>
+          </p:cNvPr>
+          <p:cNvSpPr>
+            <a:spLocks noGrp="1"/>
+          </p:cNvSpPr>
+          <p:nvPr>
+            <p:ph type="title"/>
+          </p:nvPr>
+        </p:nvSpPr>
+        <p:spPr/>
+        <p:txBody>
+          <a:bodyPr/>
+          <a:lstStyle/>
+          <a:p>
+            <a:r>
+              <a:rPr lang="en-US" dirty="0"/>
+              <a:t>3 D representation</a:t>
+            </a:r>
+          </a:p>
+        </p:txBody>
+      </p:sp>
+      <p:pic>
+        <p:nvPicPr>
+          <p:cNvPr id="2050" name="Picture 2" descr="RGB image planes">
+            <a:extLst>
+              <a:ext uri="{FF2B5EF4-FFF2-40B4-BE49-F238E27FC236}">
+                <a16:creationId xmlns:a16="http://schemas.microsoft.com/office/drawing/2014/main" id="{B2A1B6BD-BA8E-E40E-D509-4356CE53C42A}"/>
+              </a:ext>
+            </a:extLst>
+          </p:cNvPr>
+          <p:cNvPicPr>
+            <a:picLocks noChangeAspect="1" noChangeArrowheads="1"/>
+          </p:cNvPicPr>
+          <p:nvPr/>
+        </p:nvPicPr>
+        <p:blipFill>
+          <a:blip r:embed="rId2">
+            <a:extLst>
+              <a:ext uri="{28A0092B-C50C-407E-A947-70E740481C1C}">
+                <a14:useLocalDpi xmlns:a14="http://schemas.microsoft.com/office/drawing/2010/main" val="0"/>
+              </a:ext>
+            </a:extLst>
+          </a:blip>
+          <a:srcRect/>
+          <a:stretch>
+            <a:fillRect/>
+          </a:stretch>
+        </p:blipFill>
+        <p:spPr bwMode="auto">
+          <a:xfrm>
+            <a:off x="659404" y="2032746"/>
+            <a:ext cx="4880784" cy="2745441"/>
+          </a:xfrm>
+          <a:prstGeom prst="rect">
+            <a:avLst/>
+          </a:prstGeom>
+          <a:noFill/>
+          <a:extLst>
+            <a:ext uri="{909E8E84-426E-40DD-AFC4-6F175D3DCCD1}">
+              <a14:hiddenFill xmlns:a14="http://schemas.microsoft.com/office/drawing/2010/main">
+                <a:solidFill>
+                  <a:srgbClr val="FFFFFF"/>
+                </a:solidFill>
+              </a14:hiddenFill>
+            </a:ext>
+          </a:extLst>
+        </p:spPr>
+      </p:pic>
+      <p:pic>
+        <p:nvPicPr>
+          <p:cNvPr id="2052" name="Picture 4" descr="Pixel in an RGB image">
+            <a:extLst>
+              <a:ext uri="{FF2B5EF4-FFF2-40B4-BE49-F238E27FC236}">
+                <a16:creationId xmlns:a16="http://schemas.microsoft.com/office/drawing/2014/main" id="{6F140EBA-0FA3-E46C-6E0D-B2659DDCFC95}"/>
+              </a:ext>
+            </a:extLst>
+          </p:cNvPr>
+          <p:cNvPicPr>
+            <a:picLocks noChangeAspect="1" noChangeArrowheads="1"/>
+          </p:cNvPicPr>
+          <p:nvPr/>
+        </p:nvPicPr>
+        <p:blipFill>
+          <a:blip r:embed="rId3">
+            <a:extLst>
+              <a:ext uri="{28A0092B-C50C-407E-A947-70E740481C1C}">
+                <a14:useLocalDpi xmlns:a14="http://schemas.microsoft.com/office/drawing/2010/main" val="0"/>
+              </a:ext>
+            </a:extLst>
+          </a:blip>
+          <a:srcRect/>
+          <a:stretch>
+            <a:fillRect/>
+          </a:stretch>
+        </p:blipFill>
+        <p:spPr bwMode="auto">
+          <a:xfrm>
+            <a:off x="6369921" y="2056279"/>
+            <a:ext cx="4838947" cy="2721908"/>
+          </a:xfrm>
+          <a:prstGeom prst="rect">
+            <a:avLst/>
+          </a:prstGeom>
+          <a:noFill/>
+          <a:extLst>
+            <a:ext uri="{909E8E84-426E-40DD-AFC4-6F175D3DCCD1}">
+              <a14:hiddenFill xmlns:a14="http://schemas.microsoft.com/office/drawing/2010/main">
+                <a:solidFill>
+                  <a:srgbClr val="FFFFFF"/>
+                </a:solidFill>
+              </a14:hiddenFill>
+            </a:ext>
+          </a:extLst>
+        </p:spPr>
+      </p:pic>
+      <p:sp>
+        <p:nvSpPr>
+          <p:cNvPr id="5" name="TextBox 4">
+            <a:extLst>
+              <a:ext uri="{FF2B5EF4-FFF2-40B4-BE49-F238E27FC236}">
+                <a16:creationId xmlns:a16="http://schemas.microsoft.com/office/drawing/2014/main" id="{56B3AEE9-0C2E-4A61-F9F0-FFCFDAE0A851}"/>
+              </a:ext>
+            </a:extLst>
+          </p:cNvPr>
+          <p:cNvSpPr txBox="1"/>
+          <p:nvPr/>
+        </p:nvSpPr>
+        <p:spPr>
+          <a:xfrm>
+            <a:off x="1488140" y="5432628"/>
+            <a:ext cx="9072283" cy="646331"/>
+          </a:xfrm>
+          <a:prstGeom prst="rect">
+            <a:avLst/>
+          </a:prstGeom>
+          <a:noFill/>
+        </p:spPr>
+        <p:txBody>
+          <a:bodyPr wrap="square">
+            <a:spAutoFit/>
+          </a:bodyPr>
+          <a:lstStyle/>
+          <a:p>
+            <a:r>
+              <a:rPr lang="en-US" b="0" i="0" dirty="0">
+                <a:effectLst/>
+                <a:latin typeface="source-serif-pro"/>
+              </a:rPr>
+              <a:t>A pixel value has just a single number ranging from 0 to 255 (both inclusive). The pixel value 0 represents black and the pixel value 255 represents white</a:t>
+            </a:r>
+            <a:endParaRPr lang="en-US" dirty="0"/>
+          </a:p>
+        </p:txBody>
+      </p:sp>
+    </p:spTree>
+    <p:extLst>
+      <p:ext uri="{BB962C8B-B14F-4D97-AF65-F5344CB8AC3E}">
+        <p14:creationId xmlns:p14="http://schemas.microsoft.com/office/powerpoint/2010/main" val="291445928"/>
+      </p:ext>
+    </p:extLst>
+  </p:cSld>
+  <p:clrMapOvr>
+    <a:masterClrMapping/>
+  </p:clrMapOvr>
+</p:sld>
+</file>
+
+<file path=ppt/slides/slide18.xml><?xml version="1.0" encoding="utf-8"?>
+<p:sld xmlns:a="http://schemas.openxmlformats.org/drawingml/2006/main" xmlns:r="http://schemas.openxmlformats.org/officeDocument/2006/relationships" xmlns:p="http://schemas.openxmlformats.org/presentationml/2006/main">
+  <p:cSld>
+    <p:spTree>
+      <p:nvGrpSpPr>
+        <p:cNvPr id="1" name=""/>
+        <p:cNvGrpSpPr/>
+        <p:nvPr/>
+      </p:nvGrpSpPr>
+      <p:grpSpPr>
+        <a:xfrm>
+          <a:off x="0" y="0"/>
+          <a:ext cx="0" cy="0"/>
+          <a:chOff x="0" y="0"/>
+          <a:chExt cx="0" cy="0"/>
+        </a:xfrm>
+      </p:grpSpPr>
+      <p:sp>
+        <p:nvSpPr>
+          <p:cNvPr id="2" name="Title 1">
+            <a:extLst>
+              <a:ext uri="{FF2B5EF4-FFF2-40B4-BE49-F238E27FC236}">
+                <a16:creationId xmlns:a16="http://schemas.microsoft.com/office/drawing/2014/main" id="{2298A18C-CD7E-372D-F355-D1EB8AD8DFAC}"/>
+              </a:ext>
+            </a:extLst>
+          </p:cNvPr>
+          <p:cNvSpPr>
+            <a:spLocks noGrp="1"/>
+          </p:cNvSpPr>
+          <p:nvPr>
+            <p:ph type="ctrTitle"/>
+          </p:nvPr>
+        </p:nvSpPr>
+        <p:spPr>
+          <a:xfrm>
+            <a:off x="1320800" y="1889919"/>
+            <a:ext cx="9144000" cy="2387600"/>
+          </a:xfrm>
+        </p:spPr>
+        <p:txBody>
+          <a:bodyPr/>
+          <a:lstStyle/>
+          <a:p>
+            <a:r>
+              <a:rPr lang="en-US" dirty="0">
+                <a:hlinkClick r:id="rId2"/>
+              </a:rPr>
+              <a:t>Notebook</a:t>
+            </a:r>
+            <a:r>
+              <a:rPr lang="en-US" dirty="0"/>
+              <a:t> Walkthrough</a:t>
+            </a:r>
+          </a:p>
+        </p:txBody>
+      </p:sp>
+      <p:pic>
+        <p:nvPicPr>
+          <p:cNvPr id="1026" name="Picture 2" descr="upload.wikimedia.org/wikipedia/commons/thumb/3/...">
+            <a:extLst>
+              <a:ext uri="{FF2B5EF4-FFF2-40B4-BE49-F238E27FC236}">
+                <a16:creationId xmlns:a16="http://schemas.microsoft.com/office/drawing/2014/main" id="{3C5F509E-8F3F-B25B-696F-DA6DB7064AD1}"/>
+              </a:ext>
+            </a:extLst>
+          </p:cNvPr>
+          <p:cNvPicPr>
+            <a:picLocks noChangeAspect="1" noChangeArrowheads="1"/>
+          </p:cNvPicPr>
+          <p:nvPr/>
+        </p:nvPicPr>
+        <p:blipFill>
+          <a:blip r:embed="rId3">
+            <a:extLst>
+              <a:ext uri="{28A0092B-C50C-407E-A947-70E740481C1C}">
+                <a14:useLocalDpi xmlns:a14="http://schemas.microsoft.com/office/drawing/2010/main" val="0"/>
+              </a:ext>
+            </a:extLst>
+          </a:blip>
+          <a:srcRect/>
+          <a:stretch>
+            <a:fillRect/>
+          </a:stretch>
+        </p:blipFill>
+        <p:spPr bwMode="auto">
+          <a:xfrm>
+            <a:off x="6448611" y="71717"/>
+            <a:ext cx="5528236" cy="2487706"/>
+          </a:xfrm>
+          <a:prstGeom prst="rect">
+            <a:avLst/>
+          </a:prstGeom>
+          <a:noFill/>
+          <a:extLst>
+            <a:ext uri="{909E8E84-426E-40DD-AFC4-6F175D3DCCD1}">
+              <a14:hiddenFill xmlns:a14="http://schemas.microsoft.com/office/drawing/2010/main">
+                <a:solidFill>
+                  <a:srgbClr val="FFFFFF"/>
+                </a:solidFill>
+              </a14:hiddenFill>
+            </a:ext>
+          </a:extLst>
+        </p:spPr>
+      </p:pic>
+      <mc:AlternateContent xmlns:mc="http://schemas.openxmlformats.org/markup-compatibility/2006">
+        <mc:Choice xmlns:p14="http://schemas.microsoft.com/office/powerpoint/2010/main" Requires="p14">
+          <p:contentPart p14:bwMode="auto" r:id="rId4">
+            <p14:nvContentPartPr>
+              <p14:cNvPr id="3" name="Ink 2">
+                <a:extLst>
+                  <a:ext uri="{FF2B5EF4-FFF2-40B4-BE49-F238E27FC236}">
+                    <a16:creationId xmlns:a16="http://schemas.microsoft.com/office/drawing/2014/main" id="{450DD3AE-D2A0-7BF9-A39A-95B1768F9425}"/>
+                  </a:ext>
+                </a:extLst>
+              </p14:cNvPr>
+              <p14:cNvContentPartPr/>
+              <p14:nvPr/>
+            </p14:nvContentPartPr>
+            <p14:xfrm>
+              <a:off x="1276560" y="691200"/>
+              <a:ext cx="3299760" cy="1850040"/>
+            </p14:xfrm>
+          </p:contentPart>
+        </mc:Choice>
+        <mc:Fallback>
+          <p:pic>
+            <p:nvPicPr>
+              <p:cNvPr id="3" name="Ink 2">
+                <a:extLst>
+                  <a:ext uri="{FF2B5EF4-FFF2-40B4-BE49-F238E27FC236}">
+                    <a16:creationId xmlns:a16="http://schemas.microsoft.com/office/drawing/2014/main" id="{450DD3AE-D2A0-7BF9-A39A-95B1768F9425}"/>
+                  </a:ext>
+                </a:extLst>
+              </p:cNvPr>
+              <p:cNvPicPr/>
+              <p:nvPr/>
+            </p:nvPicPr>
+            <p:blipFill>
+              <a:blip r:embed="rId5"/>
+              <a:stretch>
+                <a:fillRect/>
+              </a:stretch>
+            </p:blipFill>
+            <p:spPr>
+              <a:xfrm>
+                <a:off x="1267200" y="681840"/>
+                <a:ext cx="3318480" cy="1868760"/>
+              </a:xfrm>
+              <a:prstGeom prst="rect">
+                <a:avLst/>
+              </a:prstGeom>
+            </p:spPr>
+          </p:pic>
+        </mc:Fallback>
+      </mc:AlternateContent>
+    </p:spTree>
+    <p:extLst>
+      <p:ext uri="{BB962C8B-B14F-4D97-AF65-F5344CB8AC3E}">
+        <p14:creationId xmlns:p14="http://schemas.microsoft.com/office/powerpoint/2010/main" val="3344926013"/>
+      </p:ext>
+    </p:extLst>
+  </p:cSld>
+  <p:clrMapOvr>
+    <a:masterClrMapping/>
+  </p:clrMapOvr>
+</p:sld>
+</file>
+
+<file path=ppt/slides/slide19.xml><?xml version="1.0" encoding="utf-8"?>
+<p:sld xmlns:a="http://schemas.openxmlformats.org/drawingml/2006/main" xmlns:r="http://schemas.openxmlformats.org/officeDocument/2006/relationships" xmlns:p="http://schemas.openxmlformats.org/presentationml/2006/main">
+  <p:cSld>
+    <p:spTree>
+      <p:nvGrpSpPr>
+        <p:cNvPr id="1" name=""/>
+        <p:cNvGrpSpPr/>
+        <p:nvPr/>
+      </p:nvGrpSpPr>
+      <p:grpSpPr>
+        <a:xfrm>
+          <a:off x="0" y="0"/>
+          <a:ext cx="0" cy="0"/>
+          <a:chOff x="0" y="0"/>
+          <a:chExt cx="0" cy="0"/>
+        </a:xfrm>
+      </p:grpSpPr>
+      <p:sp>
+        <p:nvSpPr>
+          <p:cNvPr id="2" name="Title 1">
+            <a:extLst>
+              <a:ext uri="{FF2B5EF4-FFF2-40B4-BE49-F238E27FC236}">
+                <a16:creationId xmlns:a16="http://schemas.microsoft.com/office/drawing/2014/main" id="{2298A18C-CD7E-372D-F355-D1EB8AD8DFAC}"/>
+              </a:ext>
+            </a:extLst>
+          </p:cNvPr>
+          <p:cNvSpPr>
+            <a:spLocks noGrp="1"/>
+          </p:cNvSpPr>
+          <p:nvPr>
+            <p:ph type="ctrTitle"/>
+          </p:nvPr>
+        </p:nvSpPr>
+        <p:spPr>
+          <a:xfrm>
+            <a:off x="1320800" y="1889919"/>
+            <a:ext cx="9144000" cy="2387600"/>
+          </a:xfrm>
+        </p:spPr>
+        <p:txBody>
+          <a:bodyPr/>
+          <a:lstStyle/>
+          <a:p>
+            <a:r>
+              <a:rPr lang="en-US" dirty="0"/>
+              <a:t>Introduction to Pandas</a:t>
+            </a:r>
+          </a:p>
+        </p:txBody>
+      </p:sp>
+      <p:pic>
+        <p:nvPicPr>
+          <p:cNvPr id="3" name="Picture 2" descr="pandas (software) - Wikipedia">
+            <a:extLst>
+              <a:ext uri="{FF2B5EF4-FFF2-40B4-BE49-F238E27FC236}">
+                <a16:creationId xmlns:a16="http://schemas.microsoft.com/office/drawing/2014/main" id="{C234372A-E549-828E-B7E4-5EEDED6B98DF}"/>
+              </a:ext>
+            </a:extLst>
+          </p:cNvPr>
+          <p:cNvPicPr>
+            <a:picLocks noChangeAspect="1" noChangeArrowheads="1"/>
+          </p:cNvPicPr>
+          <p:nvPr/>
+        </p:nvPicPr>
+        <p:blipFill>
+          <a:blip r:embed="rId2">
+            <a:extLst>
+              <a:ext uri="{28A0092B-C50C-407E-A947-70E740481C1C}">
+                <a14:useLocalDpi xmlns:a14="http://schemas.microsoft.com/office/drawing/2010/main" val="0"/>
+              </a:ext>
+            </a:extLst>
+          </a:blip>
+          <a:srcRect/>
+          <a:stretch>
+            <a:fillRect/>
+          </a:stretch>
+        </p:blipFill>
+        <p:spPr bwMode="auto">
+          <a:xfrm>
+            <a:off x="8323450" y="300598"/>
+            <a:ext cx="3362325" cy="1362075"/>
+          </a:xfrm>
+          <a:prstGeom prst="rect">
+            <a:avLst/>
+          </a:prstGeom>
+          <a:noFill/>
+          <a:extLst>
+            <a:ext uri="{909E8E84-426E-40DD-AFC4-6F175D3DCCD1}">
+              <a14:hiddenFill xmlns:a14="http://schemas.microsoft.com/office/drawing/2010/main">
+                <a:solidFill>
+                  <a:srgbClr val="FFFFFF"/>
+                </a:solidFill>
+              </a14:hiddenFill>
+            </a:ext>
+          </a:extLst>
+        </p:spPr>
+      </p:pic>
+    </p:spTree>
+    <p:extLst>
+      <p:ext uri="{BB962C8B-B14F-4D97-AF65-F5344CB8AC3E}">
+        <p14:creationId xmlns:p14="http://schemas.microsoft.com/office/powerpoint/2010/main" val="2587890632"/>
+      </p:ext>
+    </p:extLst>
+  </p:cSld>
+  <p:clrMapOvr>
+    <a:masterClrMapping/>
+  </p:clrMapOvr>
+</p:sld>
+</file>
+
 <file path=ppt/slides/slide2.xml><?xml version="1.0" encoding="utf-8"?>
 <p:sld xmlns:a="http://schemas.openxmlformats.org/drawingml/2006/main" xmlns:r="http://schemas.openxmlformats.org/officeDocument/2006/relationships" xmlns:p="http://schemas.openxmlformats.org/presentationml/2006/main">
   <p:cSld>
@@ -7242,6 +8014,266 @@
     <p:extLst>
       <p:ext uri="{BB962C8B-B14F-4D97-AF65-F5344CB8AC3E}">
         <p14:creationId xmlns:p14="http://schemas.microsoft.com/office/powerpoint/2010/main" val="3071602854"/>
+      </p:ext>
+    </p:extLst>
+  </p:cSld>
+  <p:clrMapOvr>
+    <a:masterClrMapping/>
+  </p:clrMapOvr>
+</p:sld>
+</file>
+
+<file path=ppt/slides/slide20.xml><?xml version="1.0" encoding="utf-8"?>
+<p:sld xmlns:a="http://schemas.openxmlformats.org/drawingml/2006/main" xmlns:r="http://schemas.openxmlformats.org/officeDocument/2006/relationships" xmlns:p="http://schemas.openxmlformats.org/presentationml/2006/main">
+  <p:cSld>
+    <p:spTree>
+      <p:nvGrpSpPr>
+        <p:cNvPr id="1" name=""/>
+        <p:cNvGrpSpPr/>
+        <p:nvPr/>
+      </p:nvGrpSpPr>
+      <p:grpSpPr>
+        <a:xfrm>
+          <a:off x="0" y="0"/>
+          <a:ext cx="0" cy="0"/>
+          <a:chOff x="0" y="0"/>
+          <a:chExt cx="0" cy="0"/>
+        </a:xfrm>
+      </p:grpSpPr>
+      <p:sp>
+        <p:nvSpPr>
+          <p:cNvPr id="3" name="Content Placeholder 2">
+            <a:extLst>
+              <a:ext uri="{FF2B5EF4-FFF2-40B4-BE49-F238E27FC236}">
+                <a16:creationId xmlns:a16="http://schemas.microsoft.com/office/drawing/2014/main" id="{254647D9-1D97-6B97-97B5-610BBFA6B076}"/>
+              </a:ext>
+            </a:extLst>
+          </p:cNvPr>
+          <p:cNvSpPr>
+            <a:spLocks noGrp="1"/>
+          </p:cNvSpPr>
+          <p:nvPr>
+            <p:ph idx="1"/>
+          </p:nvPr>
+        </p:nvSpPr>
+        <p:spPr/>
+        <p:txBody>
+          <a:bodyPr/>
+          <a:lstStyle/>
+          <a:p>
+            <a:pPr marL="0" indent="0" algn="ctr">
+              <a:buNone/>
+            </a:pPr>
+            <a:r>
+              <a:rPr lang="en-US" b="1" dirty="0">
+                <a:effectLst/>
+              </a:rPr>
+              <a:t>Pandas</a:t>
+            </a:r>
+            <a:r>
+              <a:rPr lang="en-US" dirty="0">
+                <a:effectLst/>
+              </a:rPr>
+              <a:t> is a fast, powerful, flexible and easy to use open source data analysis and manipulation tool,</a:t>
+            </a:r>
+            <a:br>
+              <a:rPr lang="en-US" dirty="0">
+                <a:effectLst/>
+              </a:rPr>
+            </a:br>
+            <a:r>
+              <a:rPr lang="en-US" dirty="0">
+                <a:effectLst/>
+              </a:rPr>
+              <a:t>built on top of the </a:t>
+            </a:r>
+            <a:r>
+              <a:rPr lang="en-US" dirty="0"/>
+              <a:t>Python </a:t>
+            </a:r>
+            <a:r>
+              <a:rPr lang="en-US" dirty="0">
+                <a:effectLst/>
+              </a:rPr>
+              <a:t>programming language.</a:t>
+            </a:r>
+          </a:p>
+          <a:p>
+            <a:br>
+              <a:rPr lang="en-US" b="0" i="0" dirty="0">
+                <a:solidFill>
+                  <a:srgbClr val="444444"/>
+                </a:solidFill>
+                <a:effectLst/>
+                <a:latin typeface="system-ui"/>
+              </a:rPr>
+            </a:br>
+            <a:endParaRPr lang="en-US" dirty="0"/>
+          </a:p>
+        </p:txBody>
+      </p:sp>
+    </p:spTree>
+    <p:extLst>
+      <p:ext uri="{BB962C8B-B14F-4D97-AF65-F5344CB8AC3E}">
+        <p14:creationId xmlns:p14="http://schemas.microsoft.com/office/powerpoint/2010/main" val="2532859650"/>
+      </p:ext>
+    </p:extLst>
+  </p:cSld>
+  <p:clrMapOvr>
+    <a:masterClrMapping/>
+  </p:clrMapOvr>
+</p:sld>
+</file>
+
+<file path=ppt/slides/slide21.xml><?xml version="1.0" encoding="utf-8"?>
+<p:sld xmlns:a="http://schemas.openxmlformats.org/drawingml/2006/main" xmlns:r="http://schemas.openxmlformats.org/officeDocument/2006/relationships" xmlns:p="http://schemas.openxmlformats.org/presentationml/2006/main">
+  <p:cSld>
+    <p:spTree>
+      <p:nvGrpSpPr>
+        <p:cNvPr id="1" name=""/>
+        <p:cNvGrpSpPr/>
+        <p:nvPr/>
+      </p:nvGrpSpPr>
+      <p:grpSpPr>
+        <a:xfrm>
+          <a:off x="0" y="0"/>
+          <a:ext cx="0" cy="0"/>
+          <a:chOff x="0" y="0"/>
+          <a:chExt cx="0" cy="0"/>
+        </a:xfrm>
+      </p:grpSpPr>
+      <p:sp>
+        <p:nvSpPr>
+          <p:cNvPr id="2" name="Title 1">
+            <a:extLst>
+              <a:ext uri="{FF2B5EF4-FFF2-40B4-BE49-F238E27FC236}">
+                <a16:creationId xmlns:a16="http://schemas.microsoft.com/office/drawing/2014/main" id="{ECDAD102-A05A-5CB8-EE72-8A3D70D5B223}"/>
+              </a:ext>
+            </a:extLst>
+          </p:cNvPr>
+          <p:cNvSpPr>
+            <a:spLocks noGrp="1"/>
+          </p:cNvSpPr>
+          <p:nvPr>
+            <p:ph type="title"/>
+          </p:nvPr>
+        </p:nvSpPr>
+        <p:spPr/>
+        <p:txBody>
+          <a:bodyPr/>
+          <a:lstStyle/>
+          <a:p>
+            <a:r>
+              <a:rPr lang="en-US" dirty="0"/>
+              <a:t>Difference between </a:t>
+            </a:r>
+            <a:r>
+              <a:rPr lang="en-US" dirty="0" err="1"/>
+              <a:t>Numpy</a:t>
+            </a:r>
+            <a:r>
+              <a:rPr lang="en-US" dirty="0"/>
+              <a:t> and Pandas</a:t>
+            </a:r>
+          </a:p>
+        </p:txBody>
+      </p:sp>
+      <p:sp>
+        <p:nvSpPr>
+          <p:cNvPr id="3" name="Content Placeholder 2">
+            <a:extLst>
+              <a:ext uri="{FF2B5EF4-FFF2-40B4-BE49-F238E27FC236}">
+                <a16:creationId xmlns:a16="http://schemas.microsoft.com/office/drawing/2014/main" id="{B49C034E-D036-A390-C8B9-535FBFDD2601}"/>
+              </a:ext>
+            </a:extLst>
+          </p:cNvPr>
+          <p:cNvSpPr>
+            <a:spLocks noGrp="1"/>
+          </p:cNvSpPr>
+          <p:nvPr>
+            <p:ph idx="1"/>
+          </p:nvPr>
+        </p:nvSpPr>
+        <p:spPr/>
+        <p:txBody>
+          <a:bodyPr/>
+          <a:lstStyle/>
+          <a:p>
+            <a:r>
+              <a:rPr lang="en-US" dirty="0"/>
+              <a:t>Pandas</a:t>
+            </a:r>
+          </a:p>
+          <a:p>
+            <a:pPr lvl="1"/>
+            <a:r>
+              <a:rPr lang="en-US" dirty="0"/>
+              <a:t>Tabular Data</a:t>
+            </a:r>
+          </a:p>
+          <a:p>
+            <a:pPr lvl="1"/>
+            <a:r>
+              <a:rPr lang="en-US" dirty="0"/>
+              <a:t>1D- Series and 2D – </a:t>
+            </a:r>
+            <a:r>
+              <a:rPr lang="en-US" dirty="0" err="1"/>
+              <a:t>Dataframe</a:t>
+            </a:r>
+            <a:endParaRPr lang="en-US" dirty="0"/>
+          </a:p>
+          <a:p>
+            <a:pPr lvl="1"/>
+            <a:r>
+              <a:rPr lang="en-US" dirty="0"/>
+              <a:t>Load, manipulate and model the data</a:t>
+            </a:r>
+          </a:p>
+          <a:p>
+            <a:pPr lvl="1"/>
+            <a:endParaRPr lang="en-US" dirty="0"/>
+          </a:p>
+          <a:p>
+            <a:r>
+              <a:rPr lang="en-US" dirty="0" err="1"/>
+              <a:t>Numpy</a:t>
+            </a:r>
+            <a:endParaRPr lang="en-US" dirty="0"/>
+          </a:p>
+          <a:p>
+            <a:pPr lvl="1"/>
+            <a:r>
+              <a:rPr lang="en-US" dirty="0"/>
+              <a:t>Numerical Calculations</a:t>
+            </a:r>
+          </a:p>
+          <a:p>
+            <a:pPr lvl="1"/>
+            <a:r>
+              <a:rPr lang="en-US" dirty="0"/>
+              <a:t>Multidimension</a:t>
+            </a:r>
+          </a:p>
+          <a:p>
+            <a:pPr lvl="1"/>
+            <a:r>
+              <a:rPr lang="en-US" dirty="0"/>
+              <a:t>More memory efficient</a:t>
+            </a:r>
+          </a:p>
+          <a:p>
+            <a:pPr marL="457200" lvl="1" indent="0">
+              <a:buNone/>
+            </a:pPr>
+            <a:endParaRPr lang="en-US" dirty="0"/>
+          </a:p>
+        </p:txBody>
+      </p:sp>
+    </p:spTree>
+    <p:extLst>
+      <p:ext uri="{BB962C8B-B14F-4D97-AF65-F5344CB8AC3E}">
+        <p14:creationId xmlns:p14="http://schemas.microsoft.com/office/powerpoint/2010/main" val="2404441187"/>
       </p:ext>
     </p:extLst>
   </p:cSld>

</xml_diff>

<commit_message>
slides till pandas, manupulation with notebooks
</commit_message>
<xml_diff>
--- a/EDYODA_DW/slides/Class1.pptx
+++ b/EDYODA_DW/slides/Class1.pptx
@@ -5,7 +5,7 @@
     <p:sldMasterId id="2147483648" r:id="rId1"/>
   </p:sldMasterIdLst>
   <p:notesMasterIdLst>
-    <p:notesMasterId r:id="rId34"/>
+    <p:notesMasterId r:id="rId39"/>
   </p:notesMasterIdLst>
   <p:sldIdLst>
     <p:sldId id="256" r:id="rId2"/>
@@ -40,6 +40,11 @@
     <p:sldId id="279" r:id="rId31"/>
     <p:sldId id="290" r:id="rId32"/>
     <p:sldId id="291" r:id="rId33"/>
+    <p:sldId id="282" r:id="rId34"/>
+    <p:sldId id="283" r:id="rId35"/>
+    <p:sldId id="284" r:id="rId36"/>
+    <p:sldId id="286" r:id="rId37"/>
+    <p:sldId id="285" r:id="rId38"/>
   </p:sldIdLst>
   <p:sldSz cx="12192000" cy="6858000"/>
   <p:notesSz cx="6858000" cy="9144000"/>
@@ -2935,7 +2940,7 @@
     </inkml:brush>
   </inkml:definitions>
   <inkml:trace contextRef="#ctx0" brushRef="#br0">4158 3428 68 0,'0'0'55'0,"0"0"23"0,0 0-8 0,0 0 65 0,0 0-88 16,0 0-33-16,0 0-9 15,-14-1-2-15,14 1-3 16,0 0 8-16,0 0-8 15,0 0-2-15,0 0 0 16,0 0-9-16,0 0 3 0,17 0 1 16,11 0 7-16,11 0 5 15,10-1-3-15,9-13 0 16,9-3 5-16,8-3-4 16,10 0-3-16,9-1 6 15,6 0-6-15,4 0 0 16,2 1 0-16,0-1 1 15,-3 2-2-15,-4 3-17 16,-5 0 5-16,-6 2 1 16,-11 1-10-16,-10 1 17 15,-17 1-32-15,-16 5 10 16,-18 3-35-16,-11-1 11 0,-5 0 42 16,-2 3-1-16,-20-1-78 15</inkml:trace>
-  <inkml:trace contextRef="#ctx0" brushRef="#br0" timeOffset="1117.64">3973 3656 12 0,'0'0'51'0,"0"0"-51"16,0 0 7-16,0 0 45 16,12 107-20-16,-4-59 9 15,3 3-10-15,0 0 30 16,0 0-42-16,1-3-13 16,3-2 14-16,2-1-6 15,0-2-2-15,0 2-8 16,2-2-3-16,-2 0 5 15,-1-6-6-15,-2-2 0 16,-3-9 2-16,-3-3 1 0,3-7-3 16,-3-9 0-16,-2-3-2 15,-1-4 1-15,-1 0-5 16,1 0-2-16,1 0 1 16,6-6 7-16,0-5 12 15,7-1-12-15,5-7 0 16,7-2 9-16,8-3-9 15,6-5-5-15,13-1 2 16,6-4 2-16,12-2-1 16,5-1 2-16,5 2 6 15,5 4-6-15,0 0 3 16,3 6 2-16,0 1-5 0,-1 3-12 16,-2 4 12-16,1-1 9 15,1 0-9-15,-1-3-14 16,1 2 4-16,-1-3 8 15,-1 0-3-15,-3 1-22 16,-7 4 20-16,-16 1 6 16,-15 4 2-16,-12 3 0 15,-15 3-1-15,-8 4 8 16,-9-1 11-16,-6 3 13 16,0 0 10-16,0-3 4 15,0 1-21-15,0 0 16 16,0-3-29-16,0 0 12 15,0-3-15-15,-2-1-8 16,-4-3-1-16,-1-6 0 0,-2 0 4 16,-3-6-4-16,4-4 0 15,-5-5 4-15,1-5-5 16,-4-5 2-16,1-4-1 16,-3-6 0-16,0 0 1 15,-3 2 0-15,2 3-1 16,2 7 0-16,1 9 6 15,4 7-6-15,1 6 4 16,1 8 17-16,3 4-15 16,2 1-3-16,-1 6-3 15,6 0-5-15,-3 0-20 16,-1 0-32-16,-2 0-17 16,0 6-29-16,-2 1-45 0</inkml:trace>
+  <inkml:trace contextRef="#ctx0" brushRef="#br0" timeOffset="1117.63">3973 3656 12 0,'0'0'51'0,"0"0"-51"16,0 0 7-16,0 0 45 16,12 107-20-16,-4-59 9 15,3 3-10-15,0 0 30 16,0 0-42-16,1-3-13 16,3-2 14-16,2-1-6 15,0-2-2-15,0 2-8 16,2-2-3-16,-2 0 5 15,-1-6-6-15,-2-2 0 16,-3-9 2-16,-3-3 1 0,3-7-3 16,-3-9 0-16,-2-3-2 15,-1-4 1-15,-1 0-5 16,1 0-2-16,1 0 1 16,6-6 7-16,0-5 12 15,7-1-12-15,5-7 0 16,7-2 9-16,8-3-9 15,6-5-5-15,13-1 2 16,6-4 2-16,12-2-1 16,5-1 2-16,5 2 6 15,5 4-6-15,0 0 3 16,3 6 2-16,0 1-5 0,-1 3-12 16,-2 4 12-16,1-1 9 15,1 0-9-15,-1-3-14 16,1 2 4-16,-1-3 8 15,-1 0-3-15,-3 1-22 16,-7 4 20-16,-16 1 6 16,-15 4 2-16,-12 3 0 15,-15 3-1-15,-8 4 8 16,-9-1 11-16,-6 3 13 16,0 0 10-16,0-3 4 15,0 1-21-15,0 0 16 16,0-3-29-16,0 0 12 15,0-3-15-15,-2-1-8 16,-4-3-1-16,-1-6 0 0,-2 0 4 16,-3-6-4-16,4-4 0 15,-5-5 4-15,1-5-5 16,-4-5 2-16,1-4-1 16,-3-6 0-16,0 0 1 15,-3 2 0-15,2 3-1 16,2 7 0-16,1 9 6 15,4 7-6-15,1 6 4 16,1 8 17-16,3 4-15 16,2 1-3-16,-1 6-3 15,6 0-5-15,-3 0-20 16,-1 0-32-16,-2 0-17 16,0 6-29-16,-2 1-45 0</inkml:trace>
   <inkml:trace contextRef="#ctx0" brushRef="#br0" timeOffset="2713.79">6460 2583 4 0,'0'0'12'15,"0"0"-9"-15,0 0 15 16,0 0-5-16,0 0 1 15,0 0-2-15,-5-11-12 16,5 11-15-16,0 0-15 16</inkml:trace>
   <inkml:trace contextRef="#ctx0" brushRef="#br0" timeOffset="3713.75">7847 2543 39 0,'0'0'90'0,"0"0"-57"16,0 0 17-16,0 0 43 15,0 0-17-15,0 0-31 16,39-27-22-16,-17 18-6 16,5 0-7-16,12-3-3 15,13-5 3-15,18-1-4 16,17-7 17-16,14-5-17 15,17-4-5-15,9-1-1 16,6-4 0-16,-3 4-9 0,-11 0-10 16,-10 4 7-16,-11 4-9 15,-11 3 12-15,-11 4-34 16,-13 3 23-16,-13 5 20 16,-17 3-20-16,-15 4 19 15,-12 2 2-15,-6-2 1 16,0 2 10-16,3-2-4 15,-3 0-2-15,3 3-4 16,-3 1-1-16,0 1-1 16,0 0-7-16,2 0-27 15,-2 0-115-15,0 0-68 16</inkml:trace>
   <inkml:trace contextRef="#ctx0" brushRef="#br0" timeOffset="5041.68">7897 2588 4 0,'0'0'35'0,"0"0"29"16,0 0-37-16,0 0 11 0,5 93 30 15,4-57-29-15,3 4 10 16,5 9-13-16,-1 0-21 15,2 1-2-15,-1-2-7 16,0-1-3-16,-3-12-3 16,-1-6 0-16,-2-6 6 15,-3-7-3-15,-2-6-3 16,-1-4 1-16,-2-4 2 16,-3 4-4-16,3-2 1 15,-3 2 0-15,0 2 4 16,0-5-4-16,3-2 0 15,-3-1 0-15,0 0 3 0,2 0 2 16,-1 0-5-16,5 0 0 16,9 0 0-1,4-8 14-15,15-6-14 0,5-6-1 16,8-3 1-16,9-5 8 16,9-4-8-16,9-2 0 15,14-3-15-15,6 0 30 16,9 1-30-16,10 1 15 15,-4 3-27-15,-3 10 27 16,-12 5-8-16,-13 5 13 16,-5 0-5-16,-12 4 3 15,-6 2-3-15,-7-3 0 16,0 1 0-16,-1-2 13 0,0-1 4 16,-3 0-17-16,0 1 3 15,-4-1 0-15,-6 0-3 16,-4 4 10-16,-6-4-8 15,-2 1-1-15,-1 2 3 16,2-4-5-16,2 0 1 16,0-1 0-16,4 2 7 15,-4-1-7-15,-1 4 2 16,-5 0 2-16,-4 0-4 16,-2 1 0-16,-7 2 7 15,-1-1-6-15,-4 3 5 16,1 2 1-16,-4 0 3 15,-1-1 6-15,0 2-6 16,0 0 9-16,0-3 1 0,0-1-13 16,0 0 0-16,0-2 5 15,-1-2-7-15,-11-2 6 16,0 1-11-16,-3-6 5 16,-3 1 4-16,2-6-9 15,1 1 5-15,-2-7 9 16,4-2-13-16,0-3 13 15,2-5-7-15,2 3 0 16,1-4-7-16,0 1 0 16,0 4 1-16,2 3-3 15,2 4 2-15,-1 5-4 0,1 4 7 16,1 0-3 0,1 2 0-16,-1-2 1 0,-1 2-1 15,1 3 0-15,0 6 1 16,3-1-2-16,-2 4 2 15,2 2-1-15,0 0 0 16,0 0 1-16,-1 0-1 16,1 0 0-16,0 0 0 15,-2 0 8-15,2 0-1 16,-3 0 1-16,-8 0-8 16,-13 0-5-16,-17 0-2 15,-18 12-53-15,-18 5-23 16,-15 1-14-16,-18 2-39 15,-14 7 26-15,-12 6-8 0</inkml:trace>
@@ -2966,7 +2971,7 @@
   <inkml:trace contextRef="#ctx0" brushRef="#br0" timeOffset="38911.68">4841 3679 211 0,'0'0'5'15,"0"0"-1"-15,0 0-4 16,0 0 2-16,39 91-2 16,-32-74 1-16,-4 0 1 15,0-5 1-15,0-1-2 16,-1-1-2-16,-1-5-16 15,-1-1-119-15</inkml:trace>
   <inkml:trace contextRef="#ctx0" brushRef="#br0" timeOffset="39239.41">4829 3636 72 0,'0'0'57'0,"0"0"-32"16,0 0 19-16,79-8-5 16,-61 8-8-16,3 0-3 15,-2 8-18-15,1 2 20 16,-2 3-11-16,-2 2-17 16,-2 5-2-16,-7 2-8 15,-7 1 8-15,0 0 2 0,-3-4 16 16,-12 0 5-16,1-1-2 15,0-4-10-15,-3-3 2 16,4-1-10-16,-1-1 2 16,1-5-5-16,4-1 3 15,0-2-9-15,3-1-12 16,0 0-69-16,3 0-11 16,3 0-75-16</inkml:trace>
   <inkml:trace contextRef="#ctx0" brushRef="#br0" timeOffset="39511.49">5232 3519 137 0,'0'0'87'15,"0"0"38"-15,0 0-52 16,0 0-12-16,37 99-8 16,-28-76-31-16,1 0-10 15,-2 0-6-15,-2 2-3 16,2-2 0-16,-3-7-3 16,0-1-23-16,-4-4-36 0,1-4-57 15,-2-5-98-15</inkml:trace>
-  <inkml:trace contextRef="#ctx0" brushRef="#br0" timeOffset="40410.72">8908 2446 125 0,'0'0'80'0,"0"0"-15"16,0 0 9-16,0 0-2 0,0 0-5 15,0 0-4-15,0 0-32 16,-21-30-31-16,21 44-3 16,0 11 2-16,0 5 1 15,4-2 6-15,1 0-4 16,1-3 0-16,-1-4 1 16,-1-3-1-16,2-7-4 15,-3-1-37-15,-2-6-25 16,1-4-24-16,-2 0-45 15,0 0-81-15</inkml:trace>
+  <inkml:trace contextRef="#ctx0" brushRef="#br0" timeOffset="40410.71">8908 2446 125 0,'0'0'80'0,"0"0"-15"16,0 0 9-16,0 0-2 0,0 0-5 15,0 0-4-15,0 0-32 16,-21-30-31-16,21 44-3 16,0 11 2-16,0 5 1 15,4-2 6-15,1 0-4 16,1-3 0-16,-1-4 1 16,-1-3-1-16,2-7-4 15,-3-1-37-15,-2-6-25 16,1-4-24-16,-2 0-45 15,0 0-81-15</inkml:trace>
   <inkml:trace contextRef="#ctx0" brushRef="#br0" timeOffset="40709.8">8910 2373 186 0,'0'0'37'16,"0"0"16"-16,80 13-29 16,-53-1-13-16,-9-1-2 15,0 1-2-15,-5-1 12 16,-1 3 7-16,-6 6-15 16,0-4 15-16,-6 1-3 15,0 1-1-15,0 3-6 0,-17-1-12 16,-3 0 4-16,-4-3-1 15,4-5-4-15,1 0 6 16,4-6-9-16,5-4-14 16,-2-2-37-16,0 0-60 15,6 0-52-15</inkml:trace>
   <inkml:trace contextRef="#ctx0" brushRef="#br0" timeOffset="41024.11">9108 2337 57 0,'0'0'85'16,"0"0"-10"-16,0 0-21 0,88-27 7 15,-72 27-12-15,1 0-1 16,-4 0-3-16,-4 4-28 16,0 6 5-16,-3-2-9 15,-3 6-3-15,2 2 9 16,-5 5-9-16,0 0-1 15,0 3 14-15,-5 0-12 16,-1-5-10-16,0-4 10 16,3-3-9-16,3-4 5 15,0-2-4-15,9-2 3 16,8 1 11-16,5-5-1 16,5 0-13-16,1 0-3 0,5-7-5 15,0-5-49 1,-5 2-47-16,-3-2-118 0</inkml:trace>
   <inkml:trace contextRef="#ctx0" brushRef="#br0" timeOffset="41947.47">9991 4334 231 0,'0'0'144'16,"0"0"-141"-16,0 0 2 16,0 0-5-16,0 0 23 15,0 0 6-15,21 48-11 16,-16-39 5-16,1 2-18 16,-2 1 3-16,-1 2-4 15,-2 0-4-15,-1 0 1 16,0-3-1-16,0-2-14 15,0-1-6-15,0-8-17 16,0 0-11-16,0 0-41 0,0 0-8 16,0 0-81-1</inkml:trace>
@@ -3039,7 +3044,7 @@
   </inkml:definitions>
   <inkml:trace contextRef="#ctx0" brushRef="#br0">22834 1553 45 0,'0'0'58'15,"0"0"-10"-15,-54 106-32 16,33-50 64-16,0 10 44 15,5 7-55-15,0 14-14 16,2 14-10-16,-4 6-19 16,0 7 15-16,-4 3-32 0,-2-4 6 15,2-5-11 1,1-6 0-16,3-14-5 0,6-15 1 16,2-16 0-16,4-15 5 15,3-14-4-15,1-14 1 16,2-12-2-16,0-2-60 15,3-22-19-15,12-18-196 16</inkml:trace>
   <inkml:trace contextRef="#ctx0" brushRef="#br0" timeOffset="675.83">22813 1660 205 0,'0'0'95'15,"0"0"-27"-15,0 0-62 16,0 0 50-16,0 0 7 15,0 0 4-15,58-53-30 16,-41 37-7-16,-1 2-16 16,-3 3-14-16,-4 3-7 0,0 5-57 15,-1 1-56-15,-5 2-282 16</inkml:trace>
-  <inkml:trace contextRef="#ctx0" brushRef="#br0" timeOffset="1090.09">22555 3017 288 0,'0'0'35'0,"0"0"16"16,0 0 7-16,113 4-53 16,-67-4 11-16,1-7-16 15,0-9-127-15</inkml:trace>
+  <inkml:trace contextRef="#ctx0" brushRef="#br0" timeOffset="1090.08">22555 3017 288 0,'0'0'35'0,"0"0"16"16,0 0 7-16,113 4-53 16,-67-4 11-16,1-7-16 15,0-9-127-15</inkml:trace>
   <inkml:trace contextRef="#ctx0" brushRef="#br0" timeOffset="1535">23325 1925 573 0,'0'0'19'16,"0"0"-16"-16,-123 90 2 15,80-34 1-15,9 5-6 16,5 5 11-16,13-1-1 15,7 3-7-15,8-3-3 16,1-6 2-16,9-7-2 16,16-11-16-16,8-12-18 0,7-15 6 15,0-14 14-15,1-3 9 16,0-27 5-16,-5-8 27 16,-6-14-20-16,-8-6 20 15,-7-7-7-15,-7-4 22 16,-8 2-4-16,0 6-7 15,-5 11-6-15,-11 14-24 16,1 16-1-16,-1 18-28 16,2 2-80-16,5 20-86 15,7 7-161-15</inkml:trace>
   <inkml:trace contextRef="#ctx0" brushRef="#br0" timeOffset="1710.88">23824 2626 332 0,'0'0'58'15,"-35"84"7"-15,9-34-50 16,-2-5-12-16,-2-2-6 16,5-7-2-16,10-8-86 15,13-12-111-15</inkml:trace>
   <inkml:trace contextRef="#ctx0" brushRef="#br0" timeOffset="1973.66">24772 2141 409 0,'0'0'8'0,"-14"86"-3"15,7-38 1-15,-2-5-5 16,5-4 2-16,1-2 1 16,1-4-3-16,2-2-1 15,0-4 0-15,0-6-56 16,0-14-214-16</inkml:trace>
@@ -3619,6 +3624,448 @@
 </inkml:ink>
 </file>
 
+<file path=ppt/ink/ink14.xml><?xml version="1.0" encoding="utf-8"?>
+<inkml:ink xmlns:inkml="http://www.w3.org/2003/InkML">
+  <inkml:definitions>
+    <inkml:context xml:id="ctx0">
+      <inkml:inkSource xml:id="inkSrc0">
+        <inkml:traceFormat>
+          <inkml:channel name="X" type="integer" max="32767" units="cm"/>
+          <inkml:channel name="Y" type="integer" max="32767" units="cm"/>
+          <inkml:channel name="F" type="integer" max="2047" units="deg"/>
+          <inkml:channel name="T" type="integer" max="2.14748E9" units="dev"/>
+        </inkml:traceFormat>
+        <inkml:channelProperties>
+          <inkml:channelProperty channel="X" name="resolution" value="1516.99072" units="1/cm"/>
+          <inkml:channelProperty channel="Y" name="resolution" value="2427.1853" units="1/cm"/>
+          <inkml:channelProperty channel="F" name="resolution" value="5.68611" units="1/deg"/>
+          <inkml:channelProperty channel="T" name="resolution" value="1" units="1/dev"/>
+        </inkml:channelProperties>
+      </inkml:inkSource>
+      <inkml:timestamp xml:id="ts0" timeString="2022-11-09T15:20:04.845"/>
+    </inkml:context>
+    <inkml:brush xml:id="br0">
+      <inkml:brushProperty name="width" value="0.05292" units="cm"/>
+      <inkml:brushProperty name="height" value="0.05292" units="cm"/>
+      <inkml:brushProperty name="color" value="#FF0000"/>
+    </inkml:brush>
+  </inkml:definitions>
+  <inkml:trace contextRef="#ctx0" brushRef="#br0">13745 4007 328 0,'0'0'17'0,"0"0"-17"16,0 0-1-16,0 0-108 15,0 0 99-15,0 0 10 16,-23 38 10-16,73-35 38 16,14-3-25-16,12 0 8 15,5 0-29-15,-1 0 18 16,3-4 27-16,1-2-40 16,9-1 47-16,11-1-27 15,15 1-22-15,17-4 9 16,13 1-13-16,7 0 5 15,-3 3-4-15,-11 2 3 0,-17 1-4 16,-19-1-1-16,-13 2 8 16,-17-2-8-16,-19 2-4 15,-17 3 4-15,-22-1 0 16,-12 1-23-16,-6-4 19 16,0-2-78-16,-24-1-80 15</inkml:trace>
+  <inkml:trace contextRef="#ctx0" brushRef="#br0" timeOffset="456.25">13105 4044 110 0,'0'0'78'0,"97"-24"-59"16,-15 11 24-16,28 4-39 16,22 0 27-16,23 4-12 15,25-1 9-15,23-1 40 16,19-1-40-16,18 1-15 16,10 3-12-16,0 0-1 15,-11 1 5-15,-18-3-5 16,-27 4-21-16,-23-3 11 15,-24-2 1-15,-22 1 9 16,-22-3-18-16,-27-2 3 0,-24 1-7 16,-26-3-59-16,-26 1-41 15</inkml:trace>
+  <inkml:trace contextRef="#ctx0" brushRef="#br0" timeOffset="6032.29">26222 3360 332 0,'0'0'45'0,"0"0"-27"15,0 0-6-15,0 0 21 16,112 0-17-16,-52 0 0 16,10 0-16-16,3-8 0 15,-9-1-2-15,-13 0-36 16,-16 3-63-16,-23-2-124 15</inkml:trace>
+  <inkml:trace contextRef="#ctx0" brushRef="#br0" timeOffset="6348.13">26183 3500 176 0,'0'0'15'0,"0"0"-11"16,0 0 6-16,-19 135 28 16,10-62 6-16,1 26 6 15,2 25-15-15,2 19 26 16,1 10-18-16,3-3-27 16,0-10-3-16,1-1-2 15,14-6 4-15,2 5 12 16,1 1-6-16,-4-8-10 15,-1-7-4-15,-9-24-4 16,-4-26-2-16,0-27-1 0,0-24-1 16,0-16 1-16,-3-7-5 15,3-11-1-15,0-27-182 16</inkml:trace>
+  <inkml:trace contextRef="#ctx0" brushRef="#br0" timeOffset="7133.75">28153 3269 283 0,'0'0'36'0,"0"0"-31"16,0 0-3-16,104-11-1 16,-61 1 5-16,5 1-3 0,4-3 1 15,2-1 18-15,4 2-2 16,5 0-14-16,4 4-6 15,-1 0-4-15,-4 7-6 16,-7 0 7-16,-11 12 6 16,-7 12 5-16,-7 10 0 15,-6 9 18-15,-2 12-12 16,0 22 9-16,-2 17-16 16,-1 27-1-16,2 18 10 15,-3 18 16-15,1 11-15 16,-2 5-1-16,1 1 0 15,-4-4-16-15,-5-3 0 16,-2-1 4-16,-6-12-8 0,4-19 9 16,-1-20-10-16,5-30 10 15,-2-28-4-15,-1-25 2 16,-3-15-2-16,-1-14-1 16,-2-3-10-16,0-16-47 15,0-18-356-15</inkml:trace>
+  <inkml:trace contextRef="#ctx0" brushRef="#br0" timeOffset="8964.23">26403 3755 41 0,'0'0'327'16,"0"0"-248"-16,0 0-38 15,0 0 5-15,0 0 2 16,0 0 6-16,3 0-15 16,-2 0-19-16,-1 0-20 15,0 0 0-15,7 0-3 16,5 0 1-16,8 0 2 0,5-4 7 15,-1 3-3-15,-3-1-3 16,-2-1-1-16,-2 3-3 16,2 0-50-16,-1 0-79 15,-5 0-154 1</inkml:trace>
+  <inkml:trace contextRef="#ctx0" brushRef="#br0" timeOffset="9324.51">26480 4021 95 0,'0'0'56'0,"0"0"-7"16,0 0 13-16,0 0 20 16,0 0-10-16,0 0-20 15,0 13-26-15,1-10-14 16,9 1-12-16,4 3 2 15,9-1 5-15,7-2 5 0,4-4-12 16,3 0-28-16,-7 0-95 16,-12 0-253-16</inkml:trace>
+  <inkml:trace contextRef="#ctx0" brushRef="#br0" timeOffset="10673.39">26155 2957 264 0,'0'0'25'0,"0"0"26"16,-17 80-13-16,14-53-32 0,2-1 1 15,1-6 5-15,0-3-8 16,0-7-4-16,1-6-10 15,11-4-88-15,5 0-47 16</inkml:trace>
+  <inkml:trace contextRef="#ctx0" brushRef="#br0" timeOffset="10824.14">26186 2601 359 0,'0'0'77'0,"0"0"-53"16,0 0-24-16,0 0-34 0,0 0-69 16,0 0-76-16</inkml:trace>
+  <inkml:trace contextRef="#ctx0" brushRef="#br0" timeOffset="11212.66">26403 2909 402 0,'0'0'15'16,"0"0"-9"-16,-48 91 1 0,31-56 12 16,5 0-5-16,5-6-12 15,3-4-1-15,4-6-1 16,0-10-3-16,0-3 3 15,0-6 3-15,10-2 4 16,8-24 38-16,7-15-19 16,5-15-9-16,-3-8-17 15,-2-7 1-15,-8-7 11 16,-3 4-12-16,-4 6 3 16,-6 20 6-16,-1 19 44 15,-1 23 9-15,-2 6 0 16,0 10-62-16,0 23-25 0,0 12 25 15,0 9 4 1,0-3 0-16,0-4-3 0,0-4-2 16,7-2-39-16,11-5-48 15,10-11-58-15</inkml:trace>
+  <inkml:trace contextRef="#ctx0" brushRef="#br0" timeOffset="12040.08">27378 2635 327 0,'0'0'9'16,"-7"90"1"-16,-8-35-7 15,1-3 3-15,0-6-2 16,3-8 1-16,5-8-1 0,3-12-4 16,3-7 0-1,0-8-6-15,0-3 6 0,0 0 52 16,0-15 46-16,4-13-78 15,6-9-11-15,3-5-8 16,-1-4 11-16,0 0 6 16,0 7 9-16,-5 12-5 15,-2 11 0-15,-4 12-3 16,-1 4-12-16,0 0-7 16,0 9-20-16,0 13 6 15,0 5 13-15,3 0-8 16,3-1 8-16,3-5-13 0,0-1 12 15,0-8 2 1,0-5 0-16,-5-5-1 0,-1 0 1 16,-1-2 6-16,2 0 40 15,4-15 14-15,5-13-49 16,-1-1 0-16,1-6-2 16,-2-4-9-16,0-1 0 15,-1 1-2-15,-1 12-28 16,0 8-11-16,3 15-69 15,3 4-196-15</inkml:trace>
+  <inkml:trace contextRef="#ctx0" brushRef="#br0" timeOffset="12609.76">27841 2783 300 0,'0'0'176'0,"0"0"-145"15,0 0-31-15,0 0 2 16,0 0 14-16,0 0 13 16,-85 94-22-16,79-82-7 15,4-6-6-15,2-3 6 16,0-3 5-16,0 0 4 16,11-5 14-16,8-18 5 15,5-5-20-15,-4-4-5 16,-1 0 1-16,-6 3-4 0,-1 3 6 15,-6 10-6 1,-3 7 3-16,0 7 1 0,-3 1 5 16,0 1-9-16,2 0-7 15,2 0-6-15,6 1-18 16,2 8 27-16,5-1-40 16,-1 1 12-16,2-3 7 15,0 3 0-15,1-3 11 16,-1 1 10-16,-3-4-6 15,-3 1-1-15,-2 1-11 16,-3-5 8-16,-3 1 14 16,2-1 0-16,1 0 0 15,1 0 8-15,-4 0 48 16,-2 0 0-16,-1 0-12 0,-1 0-6 16,0 0-2-16,0 0-24 15,0 0-4-15,3 0-5 16,5 0-3-16,7 0 2 15,3 0 1-15,3-1 11 16,-2 1 0-16,-6 0-10 16,-1 0-1-16,2 0-3 15,3 0 0-15,5 0-6 16,4 0-67-16,0 0-201 16</inkml:trace>
+  <inkml:trace contextRef="#ctx0" brushRef="#br0" timeOffset="13313.58">30556 3024 247 0,'0'0'141'16,"0"0"-82"-16,0 0-27 0,0 0 15 16,0 0-11-16,110-41-18 15,-71 41-16-15,6 0 1 16,-2 0-2-16,-4 0-1 15,-6 0-6-15,-6 4-59 16,-7-1-91-16,-9-2-131 16</inkml:trace>
+  <inkml:trace contextRef="#ctx0" brushRef="#br0" timeOffset="13576.44">30774 3073 20 0,'0'0'72'0,"-27"82"-22"15,17-24-22-15,4 7-7 16,1 15 7-16,3 8-12 16,2 19-12-16,0 25 0 15,0 36 3-15,3 33 119 16,5 24 27-16,0 10-68 16,-1 0-36-16,9-5-16 15,5-11-14-15,10-18-17 16,8-30 0-16,0-36 2 15,-4-31-4-15,-9-29-11 16,-8-27 6-16,-4-20 1 16,2-22-61-16,2-16-70 15</inkml:trace>
+  <inkml:trace contextRef="#ctx0" brushRef="#br0" timeOffset="14125.43">30929 2353 187 0,'0'0'74'16,"0"0"-27"-16,0 0-9 15,-36 91-28-15,26-63 5 16,2-2-12-16,1-4-3 16,4-5-22-16,3-6-112 15</inkml:trace>
+  <inkml:trace contextRef="#ctx0" brushRef="#br0" timeOffset="14281.39">30906 2188 210 0,'0'0'53'15,"0"0"-52"-15,0 0-1 16,0 0-114-16,0 0-6 15</inkml:trace>
+  <inkml:trace contextRef="#ctx0" brushRef="#br0" timeOffset="14662.91">31223 2449 128 0,'0'0'65'0,"0"0"0"16,0 0-17-16,0 0-5 16,0 0-9-16,-84 61-20 15,77-43-11-15,4 3-1 16,3-2 2-16,0-5-1 16,0-4-6-16,0-7 0 15,0-3 3-15,10-1 66 16,13-21 1-16,5-7-42 15,2-7-19-15,1-8-1 0,-4-2-3 16,-3 1 0-16,0 4 3 16,-8 11-4-16,-5 12 3 15,-7 11 6-15,-2 6 42 16,-2 1-8-16,1 5-44 16,1 21-6-16,-1 12 4 15,1 7 2-15,-2 3-4 16,4 1-26-16,5-7-117 15,5-8-293-15</inkml:trace>
+  <inkml:trace contextRef="#ctx0" brushRef="#br0" timeOffset="15031.78">32145 2205 323 0,'0'0'111'15,"0"0"-111"-15,0 0 13 16,-9 93-6-16,6-39 19 16,0 1-8-16,0-2-13 15,3-1-1-15,0-5-4 16,2-1-106-16,12-13-121 15</inkml:trace>
+  <inkml:trace contextRef="#ctx0" brushRef="#br0" timeOffset="15315.46">32270 2523 134 0,'0'0'78'15,"0"0"-53"-15,0 0-24 16,0 0-1-16,0 0-6 16,0 0 6-16,-28 45 15 15,29-45 78-15,15 0-11 16,1-14-28-16,2-3-14 16,-3-3-9-16,-6 1 5 15,-3-1 11-15,-4 5-24 0,-3 5-19 16,0 3-4-16,0 7-30 15,-3 0-62-15,-8 6 19 16,0 14-36-16,5 0-66 16</inkml:trace>
+  <inkml:trace contextRef="#ctx0" brushRef="#br0" timeOffset="15510.84">32623 2469 321 0,'0'0'0'16,"0"0"-74"-16,0 0-17 15,0 0-6-15</inkml:trace>
+  <inkml:trace contextRef="#ctx0" brushRef="#br0" timeOffset="15791.26">32623 2469 157 0</inkml:trace>
+  <inkml:trace contextRef="#ctx0" brushRef="#br0" timeOffset="15914.3">32623 2469 157 0,'-22'-39'87'0,"11"39"-57"0,-1 0 2 0,-3 13-11 15,1 0 9-15,1 3-5 16,6 0-4-16,0 2-4 16,6 1-9-16,1-3-1 0,0 2-6 15,0 1 3-15,14-2-4 16,6-5 0-16,7-5-48 15,1-5-111-15</inkml:trace>
+  <inkml:trace contextRef="#ctx0" brushRef="#br0" timeOffset="16261.13">32727 2551 35 0,'0'0'13'0,"0"0"-7"16,0 0 1-16,0 0-6 16,0 0 0-16,0 0 17 15,42 27 15-15,-20-37 2 16,2-7 15-16,-2-6-7 16,-1-3-5-16,1-3 19 15,-5-5-23-15,-1-2-17 16,-4-1-9-16,-4 1-7 15,-3 9 32-15,-3 11 23 16,-2 12-2-16,0 4-18 16,0 5-36-16,0 25-15 15,-4 18 15-15,-7 9 5 16,1 0-4-16,5 4 5 16,5-1-5-16,0 6-2 15,0-6-9-15,3-9-149 0</inkml:trace>
+  <inkml:trace contextRef="#ctx0" brushRef="#br0" timeOffset="17730.99">33310 2775 103 0,'0'0'115'0,"0"0"-46"16,0 0-35-16,0 0 13 16,0 0 9-16,0 0-7 15,-4-61 5-15,4 56-36 0,0-1-4 16,7-1-3-16,1 4-4 16,1-3-7-1,7 2-8-15,1 2 6 0,6-1 2 16,6-2 1-16,-1 3-1 15,-1 2 0-15,-4 0-3 16,-3 11 1-16,1 14 1 16,1 8-5-16,-4 8 2 15,-3 6 4-15,-3 12-1 16,-1 9 1-16,-3 15 0 16,-5 14 1-16,-3 7-1 15,0 1-3-15,-4-6 3 16,-9-5 0-16,2 1 0 0,-1 12-3 15,2 16 6 1,-2 10-7-16,0 8 3 0,3-3 1 16,3-7 9-16,3-5-3 15,1-5 11-15,2-5 7 16,0-4-17-16,0-1 9 16,5 0-14-16,4-5 4 15,3-4-6-15,-5-10 7 16,1-16-7-16,-1-9 8 15,-1-6 1-15,5-6-5 16,-2-1 6-16,0-8-8 16,1-2-1-16,-1-3 1 15,0-3-1-15,0 0-1 0,-2-4 2 16,1-4 1 0,-4-5-3-16,1-8 4 0,-2-6-4 15,-3-5 0-15,0-2-2 16,0-4 2-16,0 0 0 15,0 0 7-15,0 0-2 16,0 0 2-16,0 0 1 16,0 0-5-16,0 0-3 15,0 0-2-15,0 0 1 16,0 0-1-16,0 0-1 16,0 1 3-16,0 2 0 15,0 3 4-15,0 2-3 16,-2 2 0-16,-2 1-1 15,1 1-2-15,1 6 0 0,-2-1-2 16,2 4 3-16,1 1 0 16,-2-4 1-16,3-4 4 15,0-3-1-15,0-7 0 16,0 2-3-16,0-3 2 16,0-3-2-16,0 1 2 15,0-1-2-15,0 0 2 16,0 0 0-16,-2 0 1 15,-2 0-3-15,-3-1-17 16,-7-8-12-16,-7 4-10 16,-4 0 6-16,-9 5 9 15,-1 0 21-15,-5 0-13 16,-2-2-91-16,-6-8-267 0</inkml:trace>
+  <inkml:trace contextRef="#ctx0" brushRef="#br0" timeOffset="20161.3">26765 5846 210 0,'0'0'76'16,"0"0"-23"-16,0 0-47 15,0 0 9-15,0 0 3 16,11 81 43-16,-7-42-19 16,-1 8-14-16,1 10-9 15,5 11 0-15,2 12 1 16,4 12-6-16,-3 10 6 16,-4-8-19-16,0-15 7 15,-5-19-8-15,0-22-2 16,-3-13-91-16,0-12-89 0,0-12-126 15</inkml:trace>
+  <inkml:trace contextRef="#ctx0" brushRef="#br0" timeOffset="20580.38">26711 5841 49 0,'0'0'99'16,"0"0"-46"-16,0 0-5 15,0 0-15-15,0 0 0 16,0 0 2-16,-29 63 5 16,29-60-14-16,0-3-12 15,0 0 4-15,0 0-3 16,0 0 2-16,0 0 5 16,0-7 16-16,10-9-24 15,3 0-7-15,-2 5-5 0,-2 6 17 16,-6 5 15-1,0 0-32-15,4 0-2 0,6 5-2 16,4 6 0-16,5 3-29 16,-1-1-65-16,-4-4-127 15</inkml:trace>
+  <inkml:trace contextRef="#ctx0" brushRef="#br0" timeOffset="22183.69">26841 6860 94 0,'0'0'29'15,"0"0"41"-15,0 0-24 16,7 82-16-16,-4-57 35 16,2-3-41-16,3 2 16 15,-2-6 2-15,4 1-9 16,3-5-4-16,7-3-20 15,16 3 7-15,22 0-12 16,27-1 23-16,25-3 4 16,23-5-25-16,12-2-6 15,10-3-10-15,3 0 6 0,11 0 4 16,8 0 4 0,6-4 17-16,10 4-18 0,7 0 15 15,6 0 5-15,4 0-9 16,0 0-7-16,-3 0 7 15,-3 0-13-15,-3 0-2 16,-7 1 2-16,-9 2-2 16,-14-1 1-16,-14 2 0 15,-24 0-5-15,-18 2 4 16,-21 0 2-16,-19-3 1 16,-16 5 1-16,-10-3-3 15,-14 1 3-15,-8-1-5 0,-12-3 8 16,-8-1-9-1,-5 1 3-15,-2 0 0 0,0-2 0 16,0 2 7-16,0-2-2 16,0 0 0-16,0 0-4 15,0 1-1-15,0-1 0 16,0 0-3-16,0 0-4 16,3 0 4-16,7 0-4 15,5 0 7-15,9 0 7 16,1 0-6-16,-3 0-1 15,-2 2 0-15,-5-1 0 16,-8 1 0-16,-2-2-1 16,-4 0 6-16,-1 0-4 15,0 0 1-15,0 0-2 16,0 0 2-16,0 0 1 0,0 0 7 16,2 0 6-1,3-2 4-15,-2-10-15 0,4-4-3 16,-4-2 13-16,0-5-7 15,-2-1 1-15,-1-1-6 16,2-3-2-16,-1-5 0 16,1-2-1-16,-1-9 0 15,-1-5-2-15,0-6 1 16,0-2-7-16,0 1 8 16,-1-2-2-16,-5 1 2 15,-2 0-5-15,1 4 4 16,3 10-13-16,2 10 14 0,0 9 3 15,2 11 6-15,0 7 10 16,0 2-11-16,0 4-5 16,0 0-3-16,0 0-2 15,0 0 0-15,0 0 1 16,0 0 1-16,0 0 0 16,0 0 0-16,0 0 0 15,0 0 0-15,0-1 5 16,0-7-5-16,7-3-2 15,1-4-4-15,0-2 4 16,-1-5 1-16,1 0-7 16,0-8 5-16,-1-2-13 15,-1-2 5-15,-2 1-7 16,-1 6 9-16,-1 6 9 16,-2 7 0-16,0 7-3 0,0 0-1 15,0 5 2-15,0-1-15 16,0 2 3-16,0 0-2 15,0 1 16-15,-11 0 3 16,-3 0 2-16,-6 8-5 16,-3 14-7-16,1 1 7 15,4 1 4-15,-1 0-4 16,5-5 2-16,3-4 2 16,3-5-4-16,3-3 1 15,4-6 0-15,1 1 0 16,0-2 4-16,0 0-1 15,0 0 11-15,0 0 10 0,0 0-2 16,0-3 3-16,12-15-6 16,7-6-18-16,-1-1-1 15,-3 9 1-15,-6 5-2 16,-2 8 0-16,-4 1 0 16,-1 0-1-16,-2 2-1 15,6 0-8-15,3 5-17 16,9 23-17-16,1 18 25 15,4 11-17-15,0 8-53 16,1-3-65-16,0-3-102 16</inkml:trace>
+  <inkml:trace contextRef="#ctx0" brushRef="#br0" timeOffset="23499.56">26865 5866 305 0,'0'0'78'16,"0"0"-60"-16,0 0-6 0,0 0-5 16,0 0 2-1,0 0-9-15,0 0 13 16,-89 87-1-16,80-81-6 0,4-2-5 16,2-1 1-16,1-3 0 15,2 1 3-15,0-1 0 16,0 0 2-16,0 0-2 15,0 0 1-15,-1 0 12 16,1 0 6-16,0 0 4 16,-2 0 16-16,1-13-21 15,-1-5-23-15,1-3 4 16,1 0-1-16,0-5 2 16,0 3-5-16,0 1 0 15,0 7 1-15,1 5 0 16,1 6 8-16,-2 4-2 0,0 0-7 15,0 0-10 1,0 0 1-16,0 3-7 0,0 9 16 16,0 2 2-16,0 2-2 15,0-2 5-15,-2 4-5 16,-11 5 0-16,0 0 7 16,-4 1-2-16,2-2 1 15,1-4-5-15,0-3 1 16,5-6 8-16,0-1-4 15,6-5-5-15,2 1 0 16,1-4 1-16,0 0-2 16,0 0 5-16,0 0 2 15,0 0 2-15,0 0 4 16,4-10 4-16,9-12-17 16,4-1 0-16,-1-1 0 0,-4 1-2 15,-2 5 1-15,-3 8 1 16,-3 4 2-16,-2 4-2 15,-1 2-2-15,-1 0 2 16,0 0 0-16,2 0-5 16,2 0-2-16,7 0-7 15,5 8 14-15,6 6 0 16,5 3-2-16,12 1-1 16,16-1-79-16,15-6-122 15</inkml:trace>
+  <inkml:trace contextRef="#ctx0" brushRef="#br0" timeOffset="24458.98">31494 6080 125 0,'0'0'154'15,"0"0"-82"-15,0 0-49 16,0 0 4-16,0 0 37 16,0 0-4-16,-105 48-19 15,69-23-27-15,3 0-1 16,6-4-4-16,5 0-9 16,7-3 2-16,6-6-4 15,3-5 4-15,5-5-4 16,1-2 4-16,0 0 1 15,0 0 7-15,0 0 26 0,3-9-7 16,13-8-9-16,7-6-20 16,4-4 7-16,2-1-6 15,-4 0-1-15,-1 3 0 16,-3 8 0-16,-11 8 0 16,0 9 0-16,0 7-10 15,2 21-4-15,7 9 14 16,3 4 11-16,1-2-9 15,4 4-4-15,4-1 4 16,5 3-1-16,7-1-1 16,-3-7-86-16,1-8-115 15,-3-9-164-15</inkml:trace>
+  <inkml:trace contextRef="#ctx0" brushRef="#br0" timeOffset="34469.55">27004 1666 402 0,'0'0'97'0,"0"0"-90"15,0 0-7-15,0 0 0 0,0 0 19 16,0 0 18-16,0 85-22 15,0-63-12-15,0-3 6 16,0 1-8-16,0-2-1 16,0-8-23-16,0-2-107 15,0-8-91-15,6 0 11 16</inkml:trace>
+  <inkml:trace contextRef="#ctx0" brushRef="#br0" timeOffset="34846.4">27011 1216 347 0,'0'0'99'16,"0"0"-30"-16,-109 20-52 0,69 31-10 16,0 21-5-16,5 11 13 15,7 9-12-15,7 0-1 16,9-6 6-16,11-3-4 15,1-4-8-15,4-5 8 16,17-9-4-16,3-9 4 16,6-17-4-16,4-14-12 15,6-16 1-15,7-9 5 16,6-9-1-16,7-25 5 16,3-15 4-16,-2-10 10 0,-5-12-12 15,-6-5 3 1,-7-5 7-16,-10 3 7 0,-8 1-6 15,-10 6-8-15,-6 5-1 16,-6 14-2-16,-3 7-17 16,0 13-6-16,-12 6-8 15,0 8-83-15,1 4-67 16</inkml:trace>
+  <inkml:trace contextRef="#ctx0" brushRef="#br0" timeOffset="35632.94">31447 1371 364 0,'0'0'161'0,"0"0"-80"15,0 0-48-15,0 0 5 16,0 0-7-16,0 0-20 16,28-14 10-16,-23 13-15 15,-2 1-3-15,-3 0-3 16,3 0-9-16,0 14 6 16,2 12-3-16,0 9 12 0,-5 3-5 15,0 1-1-15,0-3 0 16,-8-3 4-1,0-4-4-15,0-1 2 0,5-2 1 16,3-1-1-16,0-3-1 16,5-6-1-16,17-6-16 15,9-9 16-15,8-1-22 16,10-3-18-16,-1-18-36 16,0-4-84-16,-5-8 83 15,-5-9-90-15</inkml:trace>
+  <inkml:trace contextRef="#ctx0" brushRef="#br0" timeOffset="36001.43">31550 989 260 0,'-81'1'80'0,"-4"35"-16"15,3 16-51-15,12 15-7 16,15 11-5-16,19 7-1 15,21 3 3-15,15 6-2 16,0-7 25-16,16-5-13 16,11-10-7-16,6-11-11 15,8-9 5-15,5-16-1 16,4-15 1-16,3-17 6 16,2-4 43-16,6-23 14 15,5-14-51-15,2-5 6 0,-2-9-3 16,-8-3-15-16,-9-10 4 15,-8-12-1-15,-8-4-6 16,-8-2 7-16,-11 3 6 16,-7 9 1-16,-7 8 0 15,0 10-11-15,-13 11-4 16,-9 17-37-16,-8 15-11 16,-9 9-54-16,-8 3-66 15</inkml:trace>
+  <inkml:trace contextRef="#ctx0" brushRef="#br0" timeOffset="48372.45">28097 8343 187 0,'0'0'144'0,"0"0"-32"16,0 0-42-16,0 0-29 15,0 0-30-15,0 0-1 16,0 0-6-16,0 0 32 16,-31 122-20-16,25-77-11 15,2-1-4-15,0-5-2 16,1-6-19-16,2-6-44 16,1-11-41-16,0-15-139 0</inkml:trace>
+  <inkml:trace contextRef="#ctx0" brushRef="#br0" timeOffset="48526.36">28129 8118 167 0,'0'0'0'0,"0"0"-91"16</inkml:trace>
+  <inkml:trace contextRef="#ctx0" brushRef="#br0" timeOffset="48933.58">28358 8442 421 0,'0'0'74'0,"0"0"-30"16,0 0-44-16,0 0 0 16,-82 58 5-16,64-21 16 15,2 0-1-15,8-4-16 16,5-1 0-16,3-10-2 0,0-7-2 16,2-9-2-16,13-6 1 15,9 0 2-15,6-21 35 16,4-14-30-16,2-12-5 15,0-8-1-15,-5-2 0 16,-6-3-4-16,-5 2 4 16,-7 10 2-16,-3 17 1 15,-4 14 33-15,-4 13 16 16,-2 4 8-16,0 0-50 16,0 7-10-16,0 20-14 15,-8 7 14-15,-3 8 2 16,2 0 1-16,1-1-3 0,5-1-68 15,3-5-42-15,0-6-83 16,11-11-141-16</inkml:trace>
+  <inkml:trace contextRef="#ctx0" brushRef="#br0" timeOffset="49674.68">29825 8153 356 0,'0'0'114'0,"0"0"-109"0,0 0-4 15,-3 106 24-15,-9-56-6 16,-3-3-8-16,0-6-1 16,5-8-5-16,0-9-5 15,3-7 8-15,4-9-8 16,2-4 0-16,1-4 2 15,0 0-2-15,0-4 18 16,0-21 52-16,0-14-70 16,1-4 0-16,9-5 4 15,3-1-1-15,-1 3 5 16,-2 11-10-16,-1 11 5 0,-4 12-1 16,-4 11 14-16,1 1-16 15,2 12-6-15,5 15-4 16,6 3 10-16,0 0 5 15,1-4-5-15,-2-8-2 16,-1-5 1-16,-4-6 0 16,-1-3-3-16,-3-4 8 15,0 0-3-15,2 0 38 16,2-9 30-16,9-12-25 16,-1-6-41-16,1-1 9 15,-3 2-10-15,-1-1-4 16,-2 7-7-16,5-1-35 0,-4 7-34 15,5 5-96 1,-3 4-227-16</inkml:trace>
+  <inkml:trace contextRef="#ctx0" brushRef="#br0" timeOffset="50029.36">30234 8201 312 0,'0'0'62'0,"0"0"64"15,0 0-87-15,-52 91 2 16,41-72-34-16,4-2 2 16,5-6-8-16,2-5-1 15,0-3-10-15,6-3-1 0,12 0 11 16,7-11 49 0,2-11-24-16,-2-1-25 0,0-4-4 15,-6 0 4-15,-1 6 2 16,-8 8-2-16,-5 7 7 15,-4 5-5-15,-1 1 7 16,0 0 9-16,0 0-3 16,0 0-3-16,0 0-2 15,2 0 1-15,-2 0 10 16,1 0-9-16,8 0-12 16,3 0 6-16,10 7-6 15,8 6 0-15,3-3-22 16,4-5-107-16,5-2-241 15</inkml:trace>
+  <inkml:trace contextRef="#ctx0" brushRef="#br0" timeOffset="50375.52">31853 7846 89 0,'0'0'386'16,"0"0"-363"-16,0 0-13 16,0 121 11-16,0-57 27 15,-2 2-32-15,-5-5-7 16,-3-5-9-16,3-10-14 16,1-12-104-16,6-14-221 15</inkml:trace>
+  <inkml:trace contextRef="#ctx0" brushRef="#br0" timeOffset="50651.2">32005 8158 232 0,'0'0'66'16,"0"0"-8"-16,0 0-52 15,-61 107 3-15,59-85-9 16,2-3-2-16,0-10 2 15,22-4 3-15,13-5 26 16,4 0-13-16,-3-19 2 16,-7-2 8-16,-9-5 37 15,-11-1-31-15,-8 3 8 0,-1 2 30 16,-4 1-50 0,-22 7-5-16,-5 6-14 0,-9 6-1 15,2 2-53-15,8 3-74 16,14 9-91-16</inkml:trace>
+  <inkml:trace contextRef="#ctx0" brushRef="#br0" timeOffset="50924.37">32311 8207 327 0,'0'0'80'16,"0"0"-64"-16,0 0 20 16,0 0-8-16,-52 87-12 15,52-70-14-15,0-3-4 16,0-4-2-16,13-3 4 16,3-7 8-16,2 0 6 15,0 0-4-15,-3 0-10 16,0 0-5-16,-2-7-2 15,2-2-67-15,5-4-183 16</inkml:trace>
+  <inkml:trace contextRef="#ctx0" brushRef="#br0" timeOffset="51206.13">32609 7910 469 0,'0'0'121'0,"0"0"-107"15,0 0-5-15,0 0 12 16,-57 108-10-16,40-68-1 16,3 4 0-16,-2-1-10 15,2-5-2-15,2-10-74 16,3-12-24-16,5-5-22 16,4-9 39-16,0-2 83 15,0 0 70-15,1 0 80 16,19 0-83-16,6 0-39 0,6 0-18 15,1 0-10 1,-1 3-7-16,-2 3-14 0,-3-2-89 16,-13 2-92-16,-14-2-65 15</inkml:trace>
+  <inkml:trace contextRef="#ctx0" brushRef="#br0" timeOffset="51714.74">27999 8822 5 0,'0'0'168'0,"0"0"-61"15,95-3-18-15,-49-9-24 16,6 0-36-16,4-2 15 16,5 2-22-16,5-3-22 15,10 4-14-15,13 1 7 0,22 2 14 16,24 2 26-1,25 3-33-15,21 2 0 0,20-2 15 16,19 2-12-16,20 0 3 16,21 1 1-16,9 0-7 15,9 0 36-15,0 0-14 16,1 0 7-16,-4 5-7 16,-4 2-6-16,-13 7 11 15,-20-3-5-15,-20 0-4 16,-25 0-2-16,-19-1-14 15,-26-1 1-15,-25-2-3 16,-26-3-16-16,-26-2-15 16,-29-2-29-16,-38 0-44 15,-31 0-36-15,-57-9-265 0</inkml:trace>
+  <inkml:trace contextRef="#ctx0" brushRef="#br0" timeOffset="52510.39">28919 7922 212 0,'0'0'25'16,"0"80"-25"-16,0-2 10 15,0 22 43-15,0 19 18 16,0 14 23-16,-1 12-46 15,-2 13-14-15,3 25-15 16,0 13 2-16,0 6-15 16,13 3-6-16,11-22 0 15,5-8 0-15,-3-7 1 16,-6-17-1-16,-14-20-4 0,-6-21-17 16,-5-26-42-1,-17-28-22-15,1-28-87 0</inkml:trace>
+  <inkml:trace contextRef="#ctx0" brushRef="#br0" timeOffset="53012.21">30939 7925 97 0,'0'84'85'0,"2"39"-56"15,-1 34 30-15,-1 21-34 16,0 15-12-16,0 5-9 15,-3 7 30-15,-2 1-12 16,2-10 13-16,3-6-28 16,-2-20 12-16,2-9-18 15,-1-15 1-15,1-20 0 16,0-17-2-16,0-23 0 16,0-22 2-16,7-20-11 15,6-20-52-15,-2-23-251 16</inkml:trace>
+  <inkml:trace contextRef="#ctx0" brushRef="#br0" timeOffset="69328.2">977 7904 351 0,'0'0'59'0,"0"0"-13"15,0 0-15-15,0 0 8 16,0 0-30-16,0 0-3 16,-85 11 6-16,61 17-5 15,7 4 6-15,6 5-11 16,8-3-2-16,3-3-6 15,0 0 6-15,16-7-4 16,11 0 2-16,4-2 2 16,2-3 5-16,-3-1 3 15,-9-2-1-15,-2-4-4 0,-10-1 0 16,-3 1 7-16,-2-1 1 16,-4 1 3-1,0 2-10-15,0 0 12 0,-7 2 4 16,-3 2-18-16,-4-3 2 15,-1 0 3-15,5-4-7 16,-2-6-34-16,6-5-7 16,3 0-26-16,3-1-131 15</inkml:trace>
+  <inkml:trace contextRef="#ctx0" brushRef="#br0" timeOffset="69533.23">1132 7870 328 0,'0'0'238'0,"0"0"-186"15,0 0-52-15,0 0-22 16,0 0 22-16,45 116 24 16,-26-69-13-16,-4 0-11 15,-2-5 0-15,-2-3-16 16,-5-2-39-16,-3-9-156 15</inkml:trace>
+  <inkml:trace contextRef="#ctx0" brushRef="#br0" timeOffset="69673.45">1210 8180 91 0,'0'0'267'16,"0"0"-186"-16,0 0-35 0,0 0-3 15,-8-90-19-15,23 72-21 16,3 0-3-16,4 2-11 15,-2-4-55-15,-1 1-158 16</inkml:trace>
+  <inkml:trace contextRef="#ctx0" brushRef="#br0" timeOffset="69899.16">1342 7954 270 0,'0'0'88'16,"0"0"-23"-16,0 0 21 15,-19 89-47-15,16-62-34 0,3-2 2 16,0-2-5-1,6-3 4-15,6-5-6 0,1-8 2 16,-2-3-4-16,-1-4 7 16,-1 0-2-16,-3-11 20 15,-1-11 12-15,-1-7-7 16,-4-1-8-16,0 0-1 16,0 0-3-16,0 3-16 15,-10 3-30-15,-4 8-56 16,-2 6-200-16</inkml:trace>
+  <inkml:trace contextRef="#ctx0" brushRef="#br0" timeOffset="70105.89">1469 8004 107 0,'0'0'104'16,"0"0"-35"-16,0 0-26 15,0 0 5-15,21 86-15 16,-21-79 17-16,0-4 4 15,0-3 8-15,0 0 31 16,0-3-4-16,-1-19-58 16,-2-2-31-16,3-6-10 15,0 1-71-15,0 7-86 16,13 2-142-16</inkml:trace>
+  <inkml:trace contextRef="#ctx0" brushRef="#br0" timeOffset="70354.28">1623 7899 347 0,'0'0'140'0,"0"0"-103"16,0 0 26-16,0 0-4 16,0 0 31-16,-5-83-35 15,1 83-3-15,-2 0-21 16,0 24-31-16,3 13-8 15,3 15 6-15,0-4 1 16,0-7 1-16,15-8 0 16,3-10-17-16,-3-7-26 0,7-8 3 15,2-8-14-15,7 0-42 16,-1-23-199-16</inkml:trace>
+  <inkml:trace contextRef="#ctx0" brushRef="#br0" timeOffset="70595.28">1972 7491 416 0,'0'0'37'0,"42"81"16"15,-18-32 10-15,-2 1-3 0,0 0-17 16,-2 0-34-16,-4-4-9 16,-1-5-9-16,-2-11-70 15,-5-12-92-15,-8-9-207 16</inkml:trace>
+  <inkml:trace contextRef="#ctx0" brushRef="#br0" timeOffset="70873.45">1960 7270 529 0,'0'0'79'15,"0"0"-5"-15,0 0-67 16,0 0-7-16,0 0-36 16,0 0-195-16,-9 13-191 15</inkml:trace>
+  <inkml:trace contextRef="#ctx0" brushRef="#br0" timeOffset="71278.23">2414 7538 513 0,'0'0'126'0,"0"0"-48"15,0 0-45-15,0 0-7 16,0 0-22-16,0 0 0 16,-66 101-3-16,66-59 2 0,0-4-3 15,0-6 1-15,0-8-1 16,5-11-12 0,2-8-4-16,-3-5-3 0,2-8 18 15,3-27 1-15,0-13 7 16,-3-9-5-16,-6-6 3 15,0-8-10-15,0-2 5 16,-6 0-3-16,-4 12-3 16,2 20 6-16,4 17 0 15,4 20 40-15,0 4-26 16,1 21-14-16,16 21-12 16,5 14 12-16,-1 8 2 15,1-2-2-15,-5-2-41 0,-5-3-69 16,-5-9-167-1</inkml:trace>
+  <inkml:trace contextRef="#ctx0" brushRef="#br0" timeOffset="72034.85">974 8872 76 0,'0'0'141'16,"0"0"-88"-16,0 0 10 15,0 0 6-15,0 0-10 16,0 0-25-16,42-51 11 15,-27 34 1-15,4 2-9 16,11-5-9-16,9-4 1 16,16-3-19-16,22-12 4 0,22-8-14 15,29-18 10-15,33-17-5 16,29-18-3-16,33-11-4 16,15-9 0-16,5-8 2 15,9-2 5-15,-7 1-5 16,4 4-1-16,3 5 1 15,-6 9 3-15,-10 1-3 16,-18 5 5-16,-23 10-5 16,-32 7 0-16,-32 13 0 15,-27 9 4-15,-26 11 16 16,-20 11-17-16,-20 13-1 16,-19 11-4-16,-16 9 0 15,-3 8-15-15,-31 3-26 0,-23 7-59 16,-21 20-41-1,-19 5-120-15</inkml:trace>
+  <inkml:trace contextRef="#ctx0" brushRef="#br0" timeOffset="72792.89">2712 6683 109 0,'0'0'50'0,"0"0"-31"15,0 0 21-15,0 0 8 0,0 0-34 16,0 0 48-16,15 50 29 16,-2-13-54-16,8 14-16 15,10 19-4-15,10 24-9 16,12 20 8-16,10 23-12 15,13 17-4-15,9 21 0 16,0 5 13-16,6 7 37 16,-3-7-7-16,2-20-25 15,1-10-16-15,-6-16 1 16,-6-14-2-16,-13-2 0 16,-13-2 7-16,-12-11 3 15,-13-14-11-15,-16-25 7 16,-9-24-7-16,-3-22-43 15,-9-20-49-15,-16-14-147 0</inkml:trace>
+  <inkml:trace contextRef="#ctx0" brushRef="#br0" timeOffset="74212.25">3222 6878 243 0,'0'0'103'0,"0"0"-34"15,0 0-68-15,-82 81 30 16,73-38 15-16,2 5-46 16,7 1-6-16,4 1 6 15,13-6 18-15,2-4-17 16,2-6 1-16,-2-10-2 16,-1-9 0-16,-3-10-16 15,-2-5 9-15,-2-7 7 16,-2-18 15-16,-1-4-12 15,-7-5-3-15,-1 2-10 16,-9-3-10-16,-11 0 13 16,-5 4 7-16,0 4 27 0,7 7 2 15,6 9 4 1,9 10 13-16,3 1 2 0,0 1-48 16,12 24-5-16,15 6 5 15,4 0 4-15,-1-3 4 16,3-5-4-16,-5-8 0 15,-4-5 1-15,-3-5-5 16,-3-5-11-16,-2 0-34 16,2-9-9-16,0-16-65 15,0-7-167-15</inkml:trace>
+  <inkml:trace contextRef="#ctx0" brushRef="#br0" timeOffset="74363.82">3532 6813 324 0,'0'0'148'0,"0"0"-75"15,0 0-71-15,0 0 6 16,0 82 36-16,2-44-20 16,7 3-12-16,-3 0-6 15,0 4-6-15,0-8-23 16,-5-10-127-16,1-22-282 16</inkml:trace>
+  <inkml:trace contextRef="#ctx0" brushRef="#br0" timeOffset="74483.23">3477 6999 420 0,'0'0'95'0,"0"0"-56"16,0 0-28-1,0 0-11-15,78-88 2 0,-41 62-2 16,-1-3-183-16</inkml:trace>
+  <inkml:trace contextRef="#ctx0" brushRef="#br0" timeOffset="74983.25">4026 5936 328 0,'0'0'79'16,"0"0"-57"-16,17 154-22 16,17-59 60-16,14 26-7 0,13 16-36 15,15 11 13 1,11 17 19-16,7 6-14 0,0 11-7 16,-3 7-11-16,-5 7-12 15,-10-2 5-15,-7-17-6 16,-13-13-4-16,-11-29 5 15,-7-24-3-15,-13-20-2 16,-6-20 0-16,-10-21-3 16,-6-18-5-16,-3-15-31 15,0-10 4-15,0-7-10 16,-6 0-48-16,-10-3-90 16</inkml:trace>
+  <inkml:trace contextRef="#ctx0" brushRef="#br0" timeOffset="76251.19">4595 6125 312 0,'0'0'41'16,"0"0"-39"-16,0 0 24 16,0 0 8-16,46 97 3 15,-31-63-10-15,7-1-8 16,-1 2 3-16,3 1 0 16,0-8-17-16,-2-9 0 15,-5-8-5-15,1-7 0 16,-6-4 13-16,1 0-12 0,-1-16 9 15,1-11 10-15,-4-4-6 16,-4-7 10-16,-5-4-15 16,0-1 17-16,0 1-11 15,-11 7 0-15,0 9-10 16,0 14-5-16,3 12-59 16,0 0-79-16,0 0-141 15</inkml:trace>
+  <inkml:trace contextRef="#ctx0" brushRef="#br0" timeOffset="76882.88">4884 6156 208 0,'0'0'72'16,"0"0"-6"-16,0 0 18 15,0 0-19-15,56 101-32 16,-43-80-14-16,-3-6-7 15,-2-6-5-15,-1-8-3 16,-4-1 3-16,6 0-1 16,-1-18 12-16,2-6-11 15,-6-9-2-15,-2 1 2 16,-2-1-7-16,0 8 1 16,0 9 1-16,0 8 21 15,0 8 5-15,0 0-5 16,0 0-23-16,0 0-10 15,9 7 8-15,4 1 2 0,-4-1 0 16,2-2 2-16,-2-4-1 16,6-1 0-16,0 0 2 15,-2 0 4-15,4 0-5 16,-4 0 1-16,-3-4-1 16,-2 1-2-16,-1 1 3 15,1-3-3-15,-4 0 0 16,2 2 1-16,-1-3 4 15,3 1-5-15,-3-4 2 16,4 1-1-16,-3-7 0 16,3 0-1-16,-3-8-13 15,0-5-16-15,-2-3-16 0,-4-4-10 16,0-3-17 0,0-1-54-16,-1 2-22 0,-5 6 134 15,0 10 14-15,4 8 84 16,2 8-10-16,0 5 23 15,0 10-86-15,9 18-8 16,8 9 67-16,-1 2-27 16,-2 3-6-16,2 1-15 15,-2 0-9-15,2-4-5 16,-4-5-8-16,3-10-33 16,-6-8-26-16,-3-10-52 15,-6-6-158-15</inkml:trace>
+  <inkml:trace contextRef="#ctx0" brushRef="#br0" timeOffset="77002.56">5299 6031 429 0,'0'0'116'15,"0"0"-72"-15,0 0-22 16,0 0-1-16,0 0-21 16,0 0-28-16,79-85-178 15</inkml:trace>
+  <inkml:trace contextRef="#ctx0" brushRef="#br0" timeOffset="77646.47">5503 5184 62 0,'0'0'11'15,"0"0"59"-15,36 126 38 0,-11-64-10 16,5 1-11-16,0 2-37 16,6 7-30-16,4 9-7 15,11 12-7-15,13 14 1 16,11 24 19-16,7 18-8 15,-3 13 2-15,-6 11-20 16,-6-14 0-16,-1-16 1 16,-5-22 2-16,-6-17-3 15,-10-21 4-15,-12-20-1 16,-9-20-3-16,-13-18 17 16,-6-12-16-16,-5-13 3 15,0 0-4-15,-13-16-48 16,-14-20-232-16</inkml:trace>
+  <inkml:trace contextRef="#ctx0" brushRef="#br0" timeOffset="78567.55">4929 6739 174 0,'0'0'70'0,"0"0"-38"15,0 0 36-15,0 0-9 0,0 0-16 16,0 0-7-16,3 0-15 16,-3 0-8-16,3 0-11 15,3 0-2-15,7 0 1 16,11 0 2-16,10-6 11 15,11-12 1-15,9-6-15 16,7-6 10-16,8-4-10 16,4-9 2-16,3-2 1 15,4-2-3-15,4 4 0 16,1 1-1-16,-3 5 2 16,-6 5-2-16,-10 3 1 15,-11 5 0-15,-10 7 0 16,-14 6-2-16,-8 2 0 0,-7 1-1 15,-4 3-10 1,-2 1-3-16,-4-2 7 0,-1 3 1 16,-2 2 8-16,0-2-26 15,0 3-7-15,0-1-5 16,4 1 1-16,1 0 19 16,-1 0 4-16,-1 0-6 15,3 0 20-15,-3-2-1 16,0 0 0-16,3 0-6 15,0 1 7-15,-2 0 4 16,-4-1-4-16,-3 2-4 16,0 0-270-16</inkml:trace>
+  <inkml:trace contextRef="#ctx0" brushRef="#br0" timeOffset="80870.59">2454 12228 45 0,'0'0'12'16,"0"0"-12"-16,0 0-6 15,0 0 6-15,0 0 0 0,0 0-14 16,1 0 2-16,-1 0 12 16,0 0 38-16,0 0 4 15,0 0 16-15,0 0-1 16,0 0-11-16,0 0 3 16,0 0 1-16,0 0-30 15,-1 0-8-15,-1 0 0 16,1 0-1-16,-3-4-8 15,2 0 2-15,-1 2 12 16,3 1 0-16,0 0 13 0,-3-1-4 16,3-1-6-1,0 2-9-15,-3 0-4 0,3 1 6 16,0 0 5-16,0 0-5 16,0 0-6-16,0 0-4 15,0 0-3-15,0 0 0 16,0 0-1-16,0 0 1 15,0 0 0-15,0 0 0 16,0 0-2-16,0 0 1 16,0 0 1-16,19-6 0 15,8-6 0-15,9-4 5 16,7-11-3-16,8-6 1 16,7-4 1-16,8-9-1 15,4-3-3-15,18-5-1 16,12-4 1-16,16-1-1 0,13-2 2 15,8-6-5-15,11-5-11 16,11-3 14-16,11-7 1 16,12-2 0-16,11-7-3 15,13 0 8-15,7-7-3 16,9 1 23-16,-1-1-1 16,10-6-8-16,11-3-5 15,12 0-6-15,4-5-5 16,-3 4 6-16,-19 8-6 15,-23 15 0-15,-19 11-1 16,-18 9 1-16,-22 10 8 16,-24 10 3-16,-22 12 3 15,-30 13-8-15,-26 11-6 16,-25 9-24-16,-21 0-80 0,-6 17-62 16,-33 9-3-16</inkml:trace>
+  <inkml:trace contextRef="#ctx0" brushRef="#br0" timeOffset="81718.42">3849 10704 76 0,'0'0'30'0,"33"100"48"0,4-12 42 15,9 22-20-15,9 13-44 16,1 10 30-16,3 10-3 16,9 2-64-16,12-6-4 15,11-1-8-15,6-5 3 16,6-6-9-16,-8-3 12 15,-5-11-13-15,-14-16-1 16,-13-22-26-16,-16-21 5 16,-17-23-11-16,-15-17-1 15,-7-14-98-15,-8-6-120 16</inkml:trace>
+  <inkml:trace contextRef="#ctx0" brushRef="#br0" timeOffset="82197.42">5502 9908 182 0,'0'0'73'0,"0"0"-65"16,0 0-5-16,54 128 23 15,-7-21 29-15,16 34 47 16,12 28-17-16,7 13-39 16,3-5-23-16,-2-14-1 15,1-17-22-15,1-19 3 0,-5-21-8 16,-8-20-12-16,-8-26 6 15,-18-14-8-15,-25-17-15 16,-21-10-47-16,-23-10-79 16,-43-7-102-16</inkml:trace>
+  <inkml:trace contextRef="#ctx0" brushRef="#br0" timeOffset="82965.25">2591 11317 370 0,'0'0'100'16,"0"0"-46"-16,0 0-22 15,-100 41 6-15,84-31 10 16,7-6-5-16,9 3-9 16,0 7-34-16,16 10 0 15,20 8 0-15,4 4 4 16,5-1-2-16,-5 0 4 16,-10-2-5-16,-6 4-1 15,-12-2-2-15,-9 1-4 16,-3 0 12-16,0-3-9 0,-9-1 3 15,-6-4-3 1,0-6-19-16,5-8-17 0,4-9-14 16,1-5 18-16,2-2-15 15,0-27-215-15</inkml:trace>
+  <inkml:trace contextRef="#ctx0" brushRef="#br0" timeOffset="83555.23">2604 11210 376 0,'0'0'156'0,"0"0"-87"16,0 0-69-16,0 0-12 0,0 0 12 15,48 88 3 1,-33-58-3-16,-9-3-45 0,0-9-20 16,-4-4 12-16,-2-1-5 15,0-6 17-15,0 1 23 16,0-3 2-16,-2 0-4 15,-1 0 40-15,0-4-4 16,3-1-16-16,0 2-3 16,0-2 3-16,12 0 28 15,4 0 4-15,1-12-18 16,1-2-14-16,-6-2 0 16,-2 1 2-16,1 1 21 15,-7 3 30-15,-1 6-11 16,0-2-20-16,-3 5-7 0,0 2-7 15,0 0 12-15,0 0-20 16,0 0-9-16,0 4 9 16,0 9 2-16,0-2 14 15,3-1-10-15,3-6-6 16,-2-4 0-16,4 0 0 16,1 0 4-16,1-7 6 15,-4-3-5-15,-1-3-1 16,-2 5-3-16,0-2 17 15,0 1-14-15,0 4-4 16,0-1 0-16,4-2 0 16,2-1 0-16,2 2-1 15,2-1 1-15,-1 1-1 0,0 1 2 16,3 4-4-16,0 0 3 16,3 2 0-16,-1-2-4 15,0 0-7-15,-1-1 2 16,1-3 1-16,-1 3-10 15,-1-5-15-15,1 3-37 16,-5 1-134-16</inkml:trace>
+  <inkml:trace contextRef="#ctx0" brushRef="#br0" timeOffset="85223.61">2172 8674 362 0,'0'0'150'0,"0"0"-118"15,0 0-15-15,0 0 10 16,106-54 1-16,-42 31-14 16,8 3-10-16,5 8-4 15,5 3-28-15,-7 3-128 16</inkml:trace>
+  <inkml:trace contextRef="#ctx0" brushRef="#br0" timeOffset="85939.3">3524 12353 542 0,'0'0'95'15,"0"0"-82"-15,0 0-6 0,0 0 5 16,0 0 1-16,0 0-10 15,116-26 5-15,-52 6-8 16,2 2-57-16,-8-5-99 16</inkml:trace>
+  <inkml:trace contextRef="#ctx0" brushRef="#br0" timeOffset="86902.04">4423 10315 347 0,'0'0'116'15,"0"0"-18"-15,0 0-59 16,0 0 40-16,0 0-32 0,0 0-47 16,-12 68-2-16,27 11 2 15,5 11 2-15,-1-5 4 16,2-9-2-16,-3-10-4 16,6-12-26-16,-1-16-31 15,3-11-19-15,-2-17-56 16,4-10-193-16</inkml:trace>
+  <inkml:trace contextRef="#ctx0" brushRef="#br0" timeOffset="87164.6">4647 10726 307 0,'0'0'26'15,"0"0"-9"1,-6 100-14-16,7-75-3 0,16-11 2 15,5-8 2-15,2-6 3 16,1 0 9-16,-2-21 28 16,-7-6 3-16,-5-4 11 15,-8-6 3-15,-3-2-14 16,0 2-4-16,-6 4-16 16,-6 10-7-16,-3 7-17 15,6 10-3-15,4 6-45 16,1 0-42-16,4 11-37 15,0 1-84-15</inkml:trace>
+  <inkml:trace contextRef="#ctx0" brushRef="#br0" timeOffset="87598.97">4866 10566 300 0,'0'0'174'15,"0"0"-71"-15,0 0-74 16,0 0-8-16,0 0-5 15,0 0-14-15,-34 75 4 16,34-45-6-16,6-2 5 16,13-3-11-16,1-6 6 15,1-8-14-15,-2-8 1 16,1-3-3-16,-1-4 15 16,-4-19 1-16,4-6 0 15,-5-4 0-15,-4-1-4 0,-4-4 4 16,0 0-1-16,-6 3 8 15,0-2-7-15,0 1 12 16,0-2 14-16,0 0-8 16,-12 1 0-16,4 4 11 15,0 10-21-15,3 9 14 16,5 9 10-16,0 5-10 16,0 6-22-16,2 23-16 15,12 9 13-15,0 5 6 16,4-2 2-16,-2 2-5 15,4-2 3-15,-2 2-1 16,1-4-2-16,0-1-2 0,-4-3-27 16,-3-7-27-16,-4-8-52 15,-7-15-89-15,-1-5-84 16</inkml:trace>
+  <inkml:trace contextRef="#ctx0" brushRef="#br0" timeOffset="87720.82">5059 10594 292 0,'0'0'145'16,"0"0"-66"-16,0 0-55 16,0 0-20-16,0 0 4 15,0 0-8-15,94-51-160 16</inkml:trace>
+  <inkml:trace contextRef="#ctx0" brushRef="#br0" timeOffset="87867.55">5293 10524 123 0,'0'0'78'0,"0"0"-44"16,0 0 11-16,0 0 31 16,0 0-26-16,0 0-14 15,6 61-29-15,-6-61 0 16,0 0-7-16,0 0-88 16,0-2-277-16</inkml:trace>
+  <inkml:trace contextRef="#ctx0" brushRef="#br0" timeOffset="88160.66">5284 10324 288 0,'0'0'223'15,"0"0"-151"-15,0 0-40 16,0 0-12-16,0 0-10 16,0 0-10-16,-3 13-2 15,3 8 0-15,7 2-9 16,4-3-11-16,5-3 1 15,-1-3-10-15,0 0 16 16,0-5 12-16,0 2-3 16,-6-1 6-16,3 1 3 15,1-1 1-15,-5-3 2 16,-4-3 10-16,-1-2 2 16,0-2 12-16,2 0 18 15,5-3-6-15,5-8-24 0,6-5-18 16,9-4-101-1,0-1-320-15</inkml:trace>
+  <inkml:trace contextRef="#ctx0" brushRef="#br0" timeOffset="88780.82">6577 9455 516 0,'0'0'112'0,"0"0"-70"16,-88 30-31-16,71-16-11 16,8-2 33-16,6 1-6 15,3 5-27-15,0 8 0 16,3 6 0-16,13 0 14 15,8-3-5-15,6 0 8 0,-3-6-13 16,-2 3 8-16,-7 0-11 16,-3-1 5-16,-8 2-6 15,-2-4 2-15,-5 3-2 16,0-2 0-16,0-3-1 16,-3-2-21-16,0-9-27 15,3-3-18-15,0-7-28 16,0 0-79-16,6-10-142 15</inkml:trace>
+  <inkml:trace contextRef="#ctx0" brushRef="#br0" timeOffset="88948.27">6825 9396 476 0,'0'0'59'0,"0"0"-54"16,0 0-4-1,39 119 7-15,-36-73 2 0,0 0-10 16,-3-3 0-16,0-4-43 16,0-9-161-16</inkml:trace>
+  <inkml:trace contextRef="#ctx0" brushRef="#br0" timeOffset="89090.68">6837 9740 349 0,'0'0'134'16,"0"0"-103"-16,0 0-23 0,97-76-8 16,-73 59-2-16,-2-1-49 15,-4 0-139-15</inkml:trace>
+  <inkml:trace contextRef="#ctx0" brushRef="#br0" timeOffset="90020.2">6821 9372 211 0,'0'0'149'16,"0"0"-95"-16,0 0-53 0,0 0 49 16,16 129 33-16,2-66-24 15,0-1-35-15,1-2 20 16,-2-8-20-16,-1-5-20 15,-2-7 3-15,-1-7-5 16,-4-10 2-16,-6-11-1 16,3-8 0-16,-6-1-1 15,0-3 4-15,0 0-2 16,0-19 12-16,0-13-11 16,0-10-5-16,0-10 0 15,-6-8-7-15,-5-6 0 0,0 4 6 16,0 10 2-16,2 18 0 15,6 16 6-15,0 12 12 16,3 6 19-16,0 7-38 16,9 19-19-16,12 8 17 15,2 0 3-15,-1-5-1 16,-3-9 0-16,-1-8 1 16,-5-7-2-16,-2-5-2 15,1 0 3-15,3-12 6 16,-3-13-1-16,-2-5-3 15,-1-5 2-15,-3-5-2 16,-1-4-1-16,-1-2-1 16,5 5-7-16,-5 14 2 0,1 13-7 15,1 14 8-15,10 12-6 16,1 26-5-16,5 12 15 16,-1 5 0-16,-3-4 0 15,3-10-1-15,-3-13-2 16,1-13-13-16,-1-14 10 15,2-1 6-15,3-8 6 16,4-20 1-16,0-4-6 16,0-2 2-16,-6 9 2 15,0 8 1-15,-5 11 5 16,-1 6 1-16,1 0-12 16,1 6-3-16,-1 15 0 0,-8 7-14 15,-8 4-104 1,0-2-380-16</inkml:trace>
+  <inkml:trace contextRef="#ctx0" brushRef="#br0" timeOffset="90885.1">5183 11418 452 0,'0'0'84'15,"0"0"-76"-15,0 0-3 16,82 0 16-16,-26-1 8 16,10-12-29-16,6 1-20 15,-13 3-180-15</inkml:trace>
+  <inkml:trace contextRef="#ctx0" brushRef="#br0" timeOffset="91062.08">5404 11864 4 0,'0'0'184'0,"0"0"-80"15,0 0-37-15,0 0 32 16,0 0-38-16,117 19-10 15,-63-29-24-15,9-6-27 16,-2-2-3-16,-8-5-249 16</inkml:trace>
+  <inkml:trace contextRef="#ctx0" brushRef="#br0" timeOffset="91212.46">5809 12319 321 0,'0'0'11'0,"0"0"-11"15,79-46-248-15</inkml:trace>
+  <inkml:trace contextRef="#ctx0" brushRef="#br0" timeOffset="91448.19">6765 10753 719 0,'0'0'46'15,"0"0"-46"-15,86 10-72 16,-13-10 14-16,3-2-41 16,-2-21-273-16</inkml:trace>
+  <inkml:trace contextRef="#ctx0" brushRef="#br0" timeOffset="91617.42">6986 11252 285 0,'0'0'86'16,"0"0"-47"-16,106 12-17 15,-55-18-5-15,9-17-14 16,2-5-3-16,-2-6-124 16</inkml:trace>
+  <inkml:trace contextRef="#ctx0" brushRef="#br0" timeOffset="111602.49">7737 8831 112 0,'0'0'121'0,"0"0"-47"16,0 0-36-16,0 0 0 16,0 0 24-16,0 0-29 15,0 0-16-15,0 0 24 16,-70-86-39-16,59 80 14 15,-5 2-16-15,-8-2 11 16,-9-1-23-16,-9 4 22 16,-10-1-10-16,-12 1 26 15,-9 2-25-15,-15 1 16 16,-5 0-14-16,-2 0 7 0,-4 11-10 16,-2 12 0-1,-2 10-4-15,4 14-9 0,1 12 26 16,0 17-25-16,5 10 14 15,2 12-2-15,10 1 0 16,13-2 7-16,11-1 1 16,23 3-8-16,13 8 3 15,21 11-10-15,6 12 7 16,33 3-14-16,16 2 14 16,17-8 0-16,10-16-1 15,15-17 1-15,16-23 0 16,23-18 0-16,21-9-1 15,14-11 1-15,11-20-38 0,-2-13 16 16,-5-32-23 0,-9-33 21-16,-8-29 24 0,-9-18 1 15,-12-8 13-15,-17-4-1 16,-29 1-5-16,-32 0-7 16,-29-6 3-16,-30-13-4 15,-15-3 9-15,-37-10 8 16,-25 5 41-16,-22 9-25 15,-19 10 17-15,-10 14-12 16,-17 14-26-16,-16 15-12 16,-24 16-3-16,-25 30-3 15,-25 36-57-15,-17 35-53 16,-16 65-107-16</inkml:trace>
+  <inkml:trace contextRef="#ctx0" brushRef="#br0" timeOffset="124579.29">3430 6129 275 0,'0'0'99'0,"0"0"6"15,0 0-38-15,0 0-25 16,0 0-5-16,-83-34-9 16,80 22-18-16,3-1-7 15,0-8 4-15,0-7-3 16,23-9-4-16,17-6 0 15,16-10 1-15,18-4-4 16,12-7 1-16,10-4-2 16,10 0 2-16,10 5-7 0,-1 8 2 15,0 12 6-15,-3 11-10 16,-9 15-7-16,-10 12 18 16,-21 5-7-16,-18 0 0 15,-17 16-8-15,-14 2-5 16,-10 3-21-16,-10-4 8 15,-3-5 17-15,0-3-14 16,-9-2 23-16,-7-3 3 16,4-3 4-16,0-1 28 15,2 0-24-15,-1 0 8 16,1-4-12-16,1-9-15 0,0 1-29 16,1 5-27-16,4 0 18 15,4 7 49-15,0 0-8 16,0 0-54-16,6 1 66 15,4 5 0-15,-1-2 0 16,0 0-25-16,-3-2 2 16,-6 2 12-16,0 1-133 15</inkml:trace>
+  <inkml:trace contextRef="#ctx0" brushRef="#br0" timeOffset="125091.51">3319 6034 233 0,'0'0'105'16,"0"0"-2"-16,0 0-64 15,0 0-27-15,0 0-12 16,0 0 1-16,5 25-1 16,-4-4 21-16,2-5-10 15,-1-5-10-15,-1-2 4 16,2-2-4-16,2 3-1 15,0-5 3-15,0-2-3 16,-2-1-27-16,3-2 2 0,0 0-51 16,0-5 19-16,3-15-16 15,-5-6-120-15</inkml:trace>
+  <inkml:trace contextRef="#ctx0" brushRef="#br0" timeOffset="125370.22">3637 5194 421 0,'0'0'84'15,"0"0"-84"-15,0 0 6 16,0 0-1-16,94 123 11 16,-66-78-6-16,-2-4-3 15,-3-9-11-15,0-8 4 16,2-7-40-16,-1-9-91 16,-2-8-175-16</inkml:trace>
+  <inkml:trace contextRef="#ctx0" brushRef="#br0" timeOffset="125518.9">3901 5218 295 0,'0'0'80'0,"0"0"21"15,-103 68-69-15,60-6-25 16,-8 13 46-16,5 1-52 16,4-1 10-16,15-3-11 15,18-3-42-15,9-12-117 16</inkml:trace>
+  <inkml:trace contextRef="#ctx0" brushRef="#br0" timeOffset="154838.03">1056 9106 144 0,'0'0'116'0,"0"0"-55"0,0 0 14 16,0 0-13-16,0 0-22 15,0 0 0-15,0 0-16 16,0 0-17-16,-3-7-7 15,6 9-6-15,18 28-5 16,13 27 11-16,14 22 1 16,3 22 14-16,-1 15-13 15,-5 5 16-15,-3-2-13 16,-8-9-4-16,-4-10 4 16,4-11-5-16,-7-10 7 15,0-12-7-15,-9-7 0 16,-3-8-2-16,-5-7 9 15,-5-8-9-15,-2-10 6 0,-3-5-4 16,0-9 0 0,0-6-36-16,0-6-66 0,-9-1-45 15,-6-8-1-15</inkml:trace>
+  <inkml:trace contextRef="#ctx0" brushRef="#br0" timeOffset="155207.44">480 9750 351 0,'0'0'109'15,"0"0"-97"-15,0 0-9 16,0 0 27-16,54 116-1 0,-38-68-5 15,-1-4-24 1,3-6 3-16,1-5-6 0,-1-9-46 16,0-6-37-16,-4-13-202 15</inkml:trace>
+  <inkml:trace contextRef="#ctx0" brushRef="#br0" timeOffset="155512.66">692 9785 330 0,'0'0'48'15,"9"98"-13"-15,-2-53-28 16,4-10-7-16,5-8 0 16,2-9 0-16,3-5 0 15,-3-10 3-15,-6-3-2 16,-3 0 2-16,-2-19 23 15,-7-14 26-15,0-11-29 16,0-6-4-16,0-2-5 16,-7 6 45-16,-5 8-16 15,-9 13 3-15,3 11-40 16,-3 14-6-16,-4 0-16 16,1 18-54-16,1 14 21 15,0 8-81-15,5-2-167 0</inkml:trace>
+  <inkml:trace contextRef="#ctx0" brushRef="#br0" timeOffset="162395.01">665 9839 208 0,'0'0'60'16,"0"0"-2"-16,0 0-8 0,0 0 26 16,0 0-23-16,0 0 4 15,0 0-19-15,0 0-8 16,-27-14 0-16,27 14-30 15,0 0 0-15,0 0-10 16,8 0 10-16,5 0 1 16,8 1 8-16,1-1 5 15,5 0-1-15,4-5-6 16,4-13 0-16,-4-3-2 16,2-1-5-16,-3 1-49 15,-12 6-41-15,-8 3-101 16,-10 8-160-16</inkml:trace>
+  <inkml:trace contextRef="#ctx0" brushRef="#br0" timeOffset="162846.37">619 9907 66 0,'0'0'44'0,"0"0"-9"15,9 92 26-15,-2-55 3 16,-1 3 28-16,2 1-31 16,1-1-32-16,1-8-11 15,-1-3 1-15,0-4-7 0,6-7-7 16,-5-4-4 0,1-2-1-16,-1-9 0 0,-1-1 0 15,0-2 2-15,1-2 0 16,1-18 16-16,7-7-1 15,-2-3 0-15,10 6-1 16,-1 9-16-16,9 12 0 16,4 3-3-16,-4 11 0 15,2 18 3-15,-8 4 1 16,-10 4 0-16,-6 1 3 16,-12 3 3-16,0 2 15 15,-3 0 26-15,-19 0-19 0,-4-4-8 16,-5-9-11-1,-2-3 5-15,-4-12 0 0,4-7-12 16,2-8-3-16,-1 0-34 16,1-5-12-16,4-19-42 15,-1-9-17-15,2-10-151 16</inkml:trace>
+  <inkml:trace contextRef="#ctx0" brushRef="#br0" timeOffset="163081.01">429 9986 250 0,'0'0'164'15,"0"0"-159"-15,0 0 6 0,0 0-11 16,0 0 10-16,105-46 16 15,-62 20-19-15,-3-1 11 16,1 0-18-16,-7 2-28 16,-7 7-33-16,-6 2-72 15</inkml:trace>
+  <inkml:trace contextRef="#ctx0" brushRef="#br0" timeOffset="163439.46">534 9952 179 0,'0'0'49'0,"0"0"-11"16,0 0 10-16,-6 82-6 16,4-49 11-16,2-1-27 15,0-3-11-15,0-8-13 16,0-6 1-16,2-6-3 15,1-6 0-15,0-1 3 16,4-1-3-16,-1-1 0 16,5 0 12-16,3-17-1 15,-3-10 2-15,-2-6-5 16,4-2 8-16,-5 2-16 16,-2 4 3-16,0 6-3 0,-6 9 3 15,3 8-3-15,-3 4-8 16,0 2-21-16,0 0-32 15,0 0-28-15,0 0-12 16,0 0 18-16,0 0-45 16</inkml:trace>
+  <inkml:trace contextRef="#ctx0" brushRef="#br0" timeOffset="163557.1">534 9952 107 0</inkml:trace>
+  <inkml:trace contextRef="#ctx0" brushRef="#br0" timeOffset="164150.47">534 9952 107 0,'-23'-28'175'0,"23"28"-111"0,0 11-64 0,0 15 9 0,8 6 75 16,4 5-40-16,1-4-8 16,-2 1-27-16,-1-5-6 15,2 0 10-15,-3-8-12 16,3 5 6-16,1-2-1 15,-2-3-5-15,-1-1-1 16,-1-3 4-16,-1-9-2 16,-5-2-1-16,-2-3 0 15,-1-3-1-15,2 0 2 16,-2 0-1-16,0 0 3 0,0 0 5 16,0 0-4-16,0 0 9 15,0 0-7-15,0 0-3 16,0 0-1-16,0 0-3 15,0 0-8-15,3 4 1 16,2 3 7-16,3 0 0 16,-2 0 1-16,0-3 0 15,-3-3-1-15,0 3 0 16,-3-2 0-16,3 0 0 16,0-1 3-16,-2-1-2 15,-1 0-1-15,0 0 3 16,0 0 3-16,0 0-4 0,2 0 0 15,2 0 2-15,7-7-3 16,5-7 6-16,4-3-2 16,2-1-4-16,9 1 0 15,4 0-1-15,5 7 0 16,6 6-2-16,-1 4 1 16,3 3-3-16,-8 18 4 15,-7 6-4-15,-8 4 3 16,-7 4-1-16,-9-2-1 15,-6 0-1-15,-3 4 4 16,0 0 30-16,-12 1-4 16,-9 3-7-16,-6-5-4 15,-1-7-12-15,-3-8 30 0,-2-1-30 16,0-6 4 0,-3-6-7-16,0-7-15 0,0-1-10 15,5-14-40-15,6-15-16 16,1-6-175-16</inkml:trace>
+  <inkml:trace contextRef="#ctx0" brushRef="#br0" timeOffset="164407.31">598 9928 315 0,'0'0'87'0,"0"0"-46"15,0 0-12-15,0 0 1 16,0 0 3-16,65-80-19 16,-32 56-14-16,-3 3 0 15,1 0 0-15,-11 5-50 16,-1 5-66-16,-11 5-81 15</inkml:trace>
+  <inkml:trace contextRef="#ctx0" brushRef="#br0" timeOffset="164870.54">586 9910 64 0,'0'0'102'16,"0"0"-33"-16,3 127-49 15,13-77-6-15,-1-4 15 16,0-4-4-16,-1-5 7 16,-2-7-3-16,-2-5 11 15,-4-4-8-15,3-7-10 16,0-4-5-16,-3-4-7 16,-3-5-4-16,0-1-3 15,1 0 1-15,4-2-2 16,5-17 13-16,5-5-5 0,3 3-10 15,7 3 0 1,8 9-1-16,3 9 10 0,4 0-20 16,-1 10 14-16,-3 12-4 15,-4 4 1-15,-7 0-3 16,-8 3 1-16,-5 3 4 16,-12 8 11-16,-3 2 9 15,0 1 3-15,-10-3-4 16,-8-1 12-16,-9-3 7 15,2-8-16-15,-2-2-2 16,0-10-13-16,6-3 1 16,2-3-5-16,1-6-5 15,6-4-4-15,4 0-24 0,2 0-24 16,5-9-35-16,1-11-65 16,0-5-174-16</inkml:trace>
+  <inkml:trace contextRef="#ctx0" brushRef="#br0" timeOffset="169182.51">1909 13061 124 0,'0'0'115'16,"0"0"-18"-16,0 0-6 15,0 0-24-15,0 0-23 16,0 0-19-16,0 0-20 16,-1-3 7-16,10 3-10 15,4-1 5-15,5-2 12 16,0-1-14-16,-3-5 3 15,1 1 0-15,-2-5-6 16,2-1-1-16,-1 0 6 16,-3 2-7-16,-9 5-14 15,0 6-16-15,-3 1 21 16,0 0-4-16,-5 21-39 0,-17 19 42 16,-9 12 10-16,-5 6 2 15,3-3-2-15,8-6 0 16,9-13 21-16,11-7-21 15,5-7-10-15,5-3-1 16,17 0 11-16,6-6 2 16,5-2 5-16,0 0-5 15,-5-2 0-15,-4 4 10 16,-6 1-10-16,-8-1 4 16,-5 3-5-16,-5 1 4 15,0 2 13-15,0 7-5 16,-5 2-3-16,-2 0-17 0,1-4 7 15,6-4-41-15,0-4-45 16,12-9-125-16</inkml:trace>
+  <inkml:trace contextRef="#ctx0" brushRef="#br0" timeOffset="169504.06">2311 13112 595 0,'0'0'64'0,"0"0"-53"16,0 0-10-16,0 106 2 15,0-59-3-15,13 0-5 16,11-5 5-16,9-5 1 16,5-10-1-16,-3-13-7 0,-4-11-52 15,-4-3 59-15,-9-14 6 16,-9-20-6-16,-5-14 13 15,-4-11-5-15,-4-7 19 16,-17-2-3-16,-6-1 12 16,-6 4-25-16,-4 11-3 15,-5 16-8-15,2 16 0 16,4 17-22-16,8 5 6 16,4 19-48-16,9 23 9 15,3 4-137-15</inkml:trace>
+  <inkml:trace contextRef="#ctx0" brushRef="#br0" timeOffset="183684.52">3910 15432 245 0,'0'0'68'16,"0"0"-3"-16,0 0-21 15,0 0 17-15,0 0-29 16,-99 19-2-16,74 19-8 0,0 9 4 16,1 8 6-16,6 4-8 15,6 5-9-15,12-6 3 16,0-7-18-16,36-12 0 15,15-4 3-15,16-2-2 16,4 0 10-16,-7 3-11 16,-14-4 2-16,-13-1-2 15,-16 2 4-15,-9-2-5 16,-12 1 2-16,0 8 2 16,-27 2 6-16,-13 4 1 15,-5-3-10-15,-7-3 11 16,7-12-11-16,9-14 0 15,14-13-2-15,8-2-22 0,9-38-59 16,5-24-181-16</inkml:trace>
+  <inkml:trace contextRef="#ctx0" brushRef="#br0" timeOffset="184067.21">3744 14783 87 0,'-155'59'302'0,"-3"41"-225"16,10 37-47-16,19 39 19 15,30 30 6-15,35 13 20 16,40 5-43-16,31-22-8 16,52-18-6-16,32-18-14 0,31-14 7 15,17-20-11-15,10-25-68 16,6-36 54-16,-1-43-45 15,1-28 26-15,-6-31 33 16,-5-41 18-16,-15-30 8 16,-15-26 0-16,-22-26-15 15,-19-15 27-15,-28-10-13 16,-27-5 1-16,-18-1-22 16,-24-3-4-16,-25 11 3 15,-11 12-3-15,-18 22 0 16,-22 36-2-16,-26 33-16 15,-21 26 0-15,-24 26-55 16,-5 22 19-16,-7 42-96 0,-7 50-202 16</inkml:trace>
+</inkml:ink>
+</file>
+
+<file path=ppt/ink/ink15.xml><?xml version="1.0" encoding="utf-8"?>
+<inkml:ink xmlns:inkml="http://www.w3.org/2003/InkML">
+  <inkml:definitions>
+    <inkml:context xml:id="ctx0">
+      <inkml:inkSource xml:id="inkSrc0">
+        <inkml:traceFormat>
+          <inkml:channel name="X" type="integer" max="32767" units="cm"/>
+          <inkml:channel name="Y" type="integer" max="32767" units="cm"/>
+          <inkml:channel name="F" type="integer" max="2047" units="deg"/>
+          <inkml:channel name="T" type="integer" max="2.14748E9" units="dev"/>
+        </inkml:traceFormat>
+        <inkml:channelProperties>
+          <inkml:channelProperty channel="X" name="resolution" value="1516.99072" units="1/cm"/>
+          <inkml:channelProperty channel="Y" name="resolution" value="2427.1853" units="1/cm"/>
+          <inkml:channelProperty channel="F" name="resolution" value="5.68611" units="1/deg"/>
+          <inkml:channelProperty channel="T" name="resolution" value="1" units="1/dev"/>
+        </inkml:channelProperties>
+      </inkml:inkSource>
+      <inkml:timestamp xml:id="ts0" timeString="2022-11-09T15:23:30.351"/>
+    </inkml:context>
+    <inkml:brush xml:id="br0">
+      <inkml:brushProperty name="width" value="0.05292" units="cm"/>
+      <inkml:brushProperty name="height" value="0.05292" units="cm"/>
+      <inkml:brushProperty name="color" value="#FF0000"/>
+    </inkml:brush>
+  </inkml:definitions>
+  <inkml:trace contextRef="#ctx0" brushRef="#br0">11610 5673 51 0,'0'0'249'16,"0"0"-209"-16,0 0-31 16,0 0-8-16,0 0 26 0,0 0 4 15,0 0-25-15,101 66 0 16,-66-66-6-16,-2 0-38 16,-8-10 31-16,-1 1-62 15,-12 2-1-15,-7 3 26 16,-5 4 39-16,-5 0 5 15,-22 0 19-15,-13 8 27 16,-5 14 23-16,0-1-31 16,6 3 10-16,9-3 26 15,12 2-31-15,8-4-15 0,9 5-15 16,1 0-10 0,9 2 1-16,14-1 3 0,4 2-7 15,-3 0 8-15,0 0-5 16,-9-1-3-16,-6 0 0 15,-9-5-2-15,0 1 1 16,0-2 1-16,-14 0 0 16,-8-3 8-16,-2-1-7 15,-1-6-1-15,1-2 1 16,2-3 4-16,2-2-10 16,1-3 0-16,4 0-85 15,4 0-238-15</inkml:trace>
+  <inkml:trace contextRef="#ctx0" brushRef="#br0" timeOffset="1201.33">20384 5823 103 0,'0'0'108'0,"0"0"-55"16,0 0-43-16,0 0 2 15,0 0-10-15,-82-1 3 16,68 7 26-16,4 2 2 15,3 1-11-15,2 3 12 16,5 6-23-16,0 7 14 16,6 4-24-16,18 5 5 15,4-1 7-15,-1 0-12 16,-5 1 16-16,-8-2-17 16,-6-6 4-16,-7-5-2 15,-1-5-2-15,0-2 0 16,-17 0 15-16,-8 0-10 15,-5 1 3-15,-1-6-8 0,6 0 1 16,8-7-2-16,5-2-17 16,11 0-42-16,1-24-107 15</inkml:trace>
+  <inkml:trace contextRef="#ctx0" brushRef="#br0" timeOffset="1495.92">20703 5922 245 0,'0'0'82'15,"0"0"-25"-15,-37 95-26 0,31-59-18 16,4-1 14-16,2-3 10 16,0-10-24-16,17-8-2 15,5-7-7-15,5-7 24 16,1 0 38-16,2-17-25 15,-5-9-30-15,-2-6 3 16,-7-3-13-16,-8-1 26 16,-8 0-4-16,0 1-8 15,-18 1-8-15,-18 4-7 16,-7 3-26-16,-8 10-7 16,-1 7-51-16,1 10-47 15</inkml:trace>
+  <inkml:trace contextRef="#ctx0" brushRef="#br0" timeOffset="2821.12">20115 13912 10 0,'0'0'97'0,"0"0"-43"0,0 0 10 16,0 0-1-16,0 0-27 15,0 0-5-15,0 0-17 16,-4 3-4-16,-10 12 19 16,-3 6-1-16,-1 2-5 15,0 3-1-15,0 1-20 16,1 3 18-16,0 0-10 16,1-2-8-16,5-3 5 15,6 0-3-15,5-6-4 16,0 2 12-16,20-2-5 15,1-1 16-15,1 1-17 0,-3-3 0 16,-7 0 4 0,-6-5-5-16,-4-2-3 0,-2-2 11 15,0 0-13-15,0 2 20 16,-12 0-1-16,-6-1 4 16,0 1 1-16,0-2-19 15,3-1 3-15,0-4-3 16,6 2 0-16,2-3-7 15,4 1 2-15,3 3-21 16,0-3-27-16,0 1-47 16,4-3-35-16,11 0-164 15</inkml:trace>
+  <inkml:trace contextRef="#ctx0" brushRef="#br0" timeOffset="3164.65">20484 14048 295 0,'0'0'120'16,"0"0"-96"-16,0 0-21 15,0 0 22-15,0 0-5 16,-76 95-1-16,70-67-16 15,6 5 1-15,0-3 14 16,9-1-13-16,3-1 4 0,-2 2-7 16,1-1 4-16,-5 0-7 15,-6-1 1-15,0-1 0 16,0 0 6-16,-18-6-5 16,-5 2 10-16,-5-3 0 15,-3-5-7-15,-1 2-1 16,4-8-3-16,4 3-7 15,6-4-27-15,8-8-117 16</inkml:trace>
+</inkml:ink>
+</file>
+
+<file path=ppt/ink/ink16.xml><?xml version="1.0" encoding="utf-8"?>
+<inkml:ink xmlns:inkml="http://www.w3.org/2003/InkML">
+  <inkml:definitions>
+    <inkml:context xml:id="ctx0">
+      <inkml:inkSource xml:id="inkSrc0">
+        <inkml:traceFormat>
+          <inkml:channel name="X" type="integer" max="32767" units="cm"/>
+          <inkml:channel name="Y" type="integer" max="32767" units="cm"/>
+          <inkml:channel name="F" type="integer" max="2047" units="deg"/>
+          <inkml:channel name="T" type="integer" max="2.14748E9" units="dev"/>
+        </inkml:traceFormat>
+        <inkml:channelProperties>
+          <inkml:channelProperty channel="X" name="resolution" value="1516.99072" units="1/cm"/>
+          <inkml:channelProperty channel="Y" name="resolution" value="2427.1853" units="1/cm"/>
+          <inkml:channelProperty channel="F" name="resolution" value="5.68611" units="1/deg"/>
+          <inkml:channelProperty channel="T" name="resolution" value="1" units="1/dev"/>
+        </inkml:channelProperties>
+      </inkml:inkSource>
+      <inkml:timestamp xml:id="ts0" timeString="2022-11-09T15:23:48.578"/>
+    </inkml:context>
+    <inkml:brush xml:id="br0">
+      <inkml:brushProperty name="width" value="0.05292" units="cm"/>
+      <inkml:brushProperty name="height" value="0.05292" units="cm"/>
+      <inkml:brushProperty name="color" value="#FF0000"/>
+    </inkml:brush>
+  </inkml:definitions>
+  <inkml:trace contextRef="#ctx0" brushRef="#br0">11592 5297 176 0,'0'0'122'15,"0"0"-58"-15,0 0-12 16,0 0-4-16,0 0-48 15,0 0 8-15,0 0 4 16,0 0-11-16,70 7 1 16,-52-4-2-16,0-3-2 15,-3 0-1-15,-3 0-32 0,-6 0-48 16,-6 0-71-16</inkml:trace>
+  <inkml:trace contextRef="#ctx0" brushRef="#br0" timeOffset="214.06">11507 5373 36 0,'0'0'89'16,"0"0"10"-16,-18 89-54 16,12-51 37-16,-2 2-19 15,-2 2-36-15,1 0 17 16,2-3-37-16,-2-3-1 0,6-5 2 15,3-2-3 1,0-6-10-16,0-3-1 0,7-6-58 16,2-7-89-16</inkml:trace>
+  <inkml:trace contextRef="#ctx0" brushRef="#br0" timeOffset="1439.05">11526 5168 186 0,'0'0'144'16,"0"0"-109"-16,0 0-17 16,0 99 13-16,-7-48 17 0,-2-1-16 15,-3-2-15 1,0 0 4-16,3 1-2 0,-1-1-8 15,2-5 1-15,1-1-12 16,2-7 3-16,-2-10-3 16,4-5 3-16,3-8-3 15,-2-8 0-15,2-3 0 16,-1-1 13-16,-2 0-11 16,0-8 13-16,-2-14-15 15,2-9 1-15,3-7-11 16,0-6 6-16,0-2-16 15,3-4 11-15,11-4-19 16,7 4 19-16,4-1 7 16,8 7-6-16,3 5 7 0,0 9-1 15,1 12 2 1,3 8-5-16,-3 10 10 0,2 5-5 16,-4 17 0-16,-9 4-2 15,-6 2-5-15,-11 3 7 16,-9 1 0-16,0 3-1 15,-15 2 9-15,-14 1-8 16,-5 3 0-16,-8 0 4 16,-1-3-2-16,6-5-2 15,5-8 0-15,10-6 2 16,13-5 1-16,7 2-6 16,2 4-5-16,8 0 8 15,17 0-1-15,1 1 1 16,-1-5 0-16,-4 0 1 15,-3-3 1-15,-11 0-2 0,-2-2 6 16,-5 0 1-16,0 0 21 16,-5 2 7-16,-20 1 17 15,-2-2-6-15,-4 0-37 16,0-6 9-16,2-2-6 16,4-4-11-16,10 0 5 15,7 0-2-15,4 0-4 16,4 0 0-16,0 0-78 15,9 0-97-15,9-5-219 16</inkml:trace>
+  <inkml:trace contextRef="#ctx0" brushRef="#br0" timeOffset="2128.69">12008 5579 260 0,'0'0'119'16,"0"0"-17"-16,0 0-72 16,-82 14 5-16,61 10 2 15,3 2-17-15,5-1 7 16,6-5-25-16,4-3 1 16,3-2-3-16,0-6 1 15,0-6-1-15,0 0 0 16,13-3 1-16,0 0-1 0,7-12 0 15,1-8-9-15,0-2 2 16,-5 1-11-16,-4 2 18 16,-8 7 4-16,-2 4 0 15,-1 7 8-15,-1 1 11 16,0 0-19-16,0 4-4 16,0 15-11-16,0 2 11 15,0 1 4-15,0-3 2 16,0-4-5-16,0-3-1 15,0-1 3-15,2-5-7 16,1-1 4-16,3-2-1 16,1-3-4-16,5 0-55 15,4-5 40-15,3-15 8 0,3 0-18 16,-1-6 10-16,0 0-42 16,1-3-7-16,-4 4 14 15,-3 3 55-15,-3 2 3 16,-6 6 34-16,-3 6 29 15,-3 4 8-15,0 1-20 16,0 3 3-16,1 0-38 16,7 6-8-16,5 13-6 15,5 5 14-15,6-1-6 16,0 6-5-16,-2-1-8 16,-2 3 0-16,-7 0 0 15,-9-3 11-15,-4-3-15 16,0-5 8-16,-11-5-4 15,-6-4 15-15,-4-4-15 0,-1 0 8 16,4-5-8-16,-1-1-3 16,6-1-21-16,5 0-14 15,8 0-13-15,0 0-9 16,0-10-84-16,21 1-66 16</inkml:trace>
+  <inkml:trace contextRef="#ctx0" brushRef="#br0" timeOffset="2323.08">12538 5624 174 0,'0'0'184'16,"0"0"-24"-16,0 0-82 15,0 0 19-15,0 0-30 0,0 0-43 16,-31-45-15-16,11 72-4 16,7 7 0-16,7 1 8 15,6-1-13-15,0-3 0 16,22-5-5-16,5-6-22 15,13-2-34-15,2-7-40 16,4-4-354-16</inkml:trace>
+  <inkml:trace contextRef="#ctx0" brushRef="#br0" timeOffset="2833.78">13202 5579 306 0,'0'0'153'16,"0"0"-74"-16,0 0-3 15,0 0 3-15,-84-17-60 16,59 47 13-16,4 7-20 16,6 5-7-16,6 2 19 0,6-2-18 15,3-1-6 1,0-3 0-16,0-7 6 0,3-8-7 16,6-11 1-16,5-7-27 15,6-5 27-15,9-17 0 16,4-14 11-16,1-10-11 15,-4-6-4-15,-8-4 3 16,-1-9-10-16,-11-3-1 16,-4-4 9-16,-4 2-13 15,-2 9 12-15,0 17-1 16,0 14 10-16,0 15-3 16,0 10 14-16,0 15-16 15,0 27-1-15,0 15 0 0,0 11 1 16,0 1 0-1,0-5-5-15,0-5 4 0,12-13-90 16,6-10-59-16,4-12-142 16</inkml:trace>
+  <inkml:trace contextRef="#ctx0" brushRef="#br0" timeOffset="3304.8">13469 5673 319 0,'0'0'164'15,"0"0"-66"-15,0 0-30 16,0 0-31-16,-81 18 8 16,65 14-36-16,5 0-2 15,7 1 3-15,4-3-5 0,0-6-10 16,3-11-3-16,12-3-23 16,1-9 24-16,2-1 3 15,2-1 4-15,-3-17 0 16,1-4-20-16,-1-6 19 15,-1-3 0-15,2-3 1 16,-4 12-1-16,-3 7 2 16,-5 9-1-16,-3 6 27 15,-1 0-25-15,2 0 5 16,1 10-7-16,5 0 0 16,-2-4 9-16,5-6-6 15,5 0-3-15,3 0 16 16,-2-16-15-16,-1-5 17 0,-6-4-15 15,0-8 4-15,-6-2-5 16,0 0-2-16,-1 13 0 16,-4 10-5-16,-1 11 11 15,0 1-12-15,0 19-7 16,0 18 13-16,0 8 5 16,0 3-5-16,0 3 4 15,-9 0-4-15,1-6 0 16,-3-9-14-16,5-11-150 15,3-15-317-15</inkml:trace>
+  <inkml:trace contextRef="#ctx0" brushRef="#br0" timeOffset="3472.41">13673 5671 362 0,'0'0'164'0,"0"0"-114"15,0 0-17-15,0 0 22 16,85-12-38-16,-52 12-14 15,3 0-6-15,0 0-4 16,-6 0-43-16,-7 0-27 16,-9 0-63-16,1 4-103 15</inkml:trace>
+  <inkml:trace contextRef="#ctx0" brushRef="#br0" timeOffset="4888.76">14285 6240 119 0,'0'0'149'0,"0"0"-54"15,0 0-24-15,0 0-10 16,0 0 10-16,0 0-31 15,0 0-9-15,0 0-6 16,0 0-17-16,3 0 15 16,9-2-14-16,7 2-1 0,3-3-8 15,3 3-2 1,1 0-50-16,4 0-27 0,-4 0-92 16,-4 0-210-16</inkml:trace>
+  <inkml:trace contextRef="#ctx0" brushRef="#br0" timeOffset="5197.14">14379 6720 69 0,'0'0'70'0,"0"0"-3"16,0 0 7-16,0 0 6 15,0 0-34-15,0 0-25 16,79 8-11-16,-52-8-7 15,3-3-3-15,-5-5-70 16,-4-2-236-16</inkml:trace>
+  <inkml:trace contextRef="#ctx0" brushRef="#br0" timeOffset="5645.38">14446 7239 437 0,'0'0'128'16,"0"0"-48"-16,0 0-67 0,0 0-13 15,0 0 0 1,0 0 7-16,54 1-6 0,-32-1-1 16,-2 0-63-16,-4 0-88 15</inkml:trace>
+  <inkml:trace contextRef="#ctx0" brushRef="#br0" timeOffset="6155.7">14374 5755 271 0,'0'0'63'0,"0"0"-8"16,0 0-8-16,0 0-4 16,-34 106-4-16,28-72-17 15,6-1-9-15,0-2-5 16,0-4-3-16,6-5-5 16,6-8 0-16,6-8-51 15,-2-6-63-15,4-5-215 16</inkml:trace>
+  <inkml:trace contextRef="#ctx0" brushRef="#br0" timeOffset="6352.45">14389 5449 39 0,'0'0'333'0,"0"0"-237"16,0 0-96-16,0 0-2 16,0 0-16-16,0 0-74 0,20 58-250 15</inkml:trace>
+  <inkml:trace contextRef="#ctx0" brushRef="#br0" timeOffset="6793.95">14570 5770 317 0,'0'0'113'16,"0"0"-29"-16,0 0-36 15,0 0-31-15,0 0 15 0,-90 42-29 16,81-9 3-1,3 6-6-15,5 4 7 0,1-4-4 16,0-5-3-16,3-5 0 16,7-8 0-16,-2-12 2 15,5-5-5-15,1-4 6 16,2-14 0-16,4-14 15 16,2-10-18-16,0-4 0 15,-5-4 0-15,-1-2-15 16,-5 3 13-16,-5 6-7 15,-5 11 9-15,-1 13 5 16,0 12 1-16,0 3 1 0,0 15-7 16,0 13-2-1,0 9 2-15,0-2 0 0,0 3 1 16,0-1-3-16,0-3 2 16,3-1 0-16,4 0-14 15,-1-2-48-15,2-4-35 16,-2-4-122-16</inkml:trace>
+  <inkml:trace contextRef="#ctx0" brushRef="#br0" timeOffset="7565.96">14661 5472 114 0,'0'0'116'0,"0"0"-51"16,0 0 2-16,0 0 0 16,0 0-40-16,0 0 26 15,-34 35-33-15,26 2 7 0,-1 5 14 16,6 2-36-16,3-1 18 16,0 0-23-16,0-5 0 15,0-3-8-15,3-2-1 16,6-5-22-16,0-6-10 15,3-2-68-15,0-8-161 16</inkml:trace>
+  <inkml:trace contextRef="#ctx0" brushRef="#br0" timeOffset="8727.92">14498 6234 243 0,'0'0'144'16,"0"0"-51"-16,0 0-41 15,0 0-35-15,0 0-7 16,0 0 48-16,-3 63-29 15,3-34-15-15,0 1-7 16,0 0-2-16,0 2-4 16,2 2-1-16,2 0-59 15,-2-5-126-15</inkml:trace>
+  <inkml:trace contextRef="#ctx0" brushRef="#br0" timeOffset="9170.76">14536 6838 381 0,'0'0'71'0,"0"0"-69"15,0 0 9-15,81 0-9 16,-68 0 22-16,-4 5 0 15,-5 4 0-15,-1 7-5 16,-3 2-15-16,-3 9 24 16,-15 2 13-16,-3 0-21 15,3-3-1-15,2-6-15 16,8-1-4-16,5-5 10 16,3-3-10-16,0-2-3 15,12-5 1-15,14-3-27 0,4-1-34 16,-1 0-132-16</inkml:trace>
+  <inkml:trace contextRef="#ctx0" brushRef="#br0" timeOffset="9611.74">14429 7531 487 0,'0'0'96'16,"0"0"-21"-16,0 0-75 15,0 0 32-15,0 0 5 16,0 0-17-16,25-30-14 15,-21 37-4-15,5 14-2 16,-2 8 2-16,-1 4 3 16,8 12-10-16,-1 8-8 15,6 3-2-15,3 2 3 16,-2-4 6-16,-5-7 6 16,-9-1-2-16,-6-7-6 15,0-4-4-15,-3-12 5 16,-10-1 7-16,1-6 14 15,-4-1 5-15,-6 0-1 0,-1-4 2 16,-4 1-16-16,0-7-4 16,5 3-4-16,7-3-61 15,3-4-81-15,7-1-202 16</inkml:trace>
+  <inkml:trace contextRef="#ctx0" brushRef="#br0" timeOffset="13553.84">20053 5331 17 0,'0'0'50'16,"0"0"-19"-16,0 0 15 16,0 0 2-16,0 0-24 15,0 0-11-15,0 0 63 16,0 78 17-16,0-32-15 15,0 2-33-15,0 3-1 16,-5-2-14-16,-2-3-26 16,-5-4 8-16,3-6-12 15,1-6 4-15,2-6-3 0,2-7 0 16,3-6-1-16,-1-5 0 16,2-5-11-16,0-1-21 15,0 0-40-15,2 0-42 16,6-5-20-16,1-12-120 15</inkml:trace>
+  <inkml:trace contextRef="#ctx0" brushRef="#br0" timeOffset="14171.81">20063 5307 129 0,'0'0'107'0,"0"0"-19"0,0 0-56 16,87-14 15-16,-56 14-17 16,8 3-26-16,-2 4 21 15,0 0-20-15,-2-1 2 16,-5-4 11-16,-5 0 1 16,-4-2 5-16,-6 0-6 15,-5 0-12-15,-3 1 5 16,-2 10-11-16,-2 9-7 15,-1 15 7-15,-2 12 38 16,0 11 7-16,-8 7-9 16,-5-1-16-16,1 3 1 15,0-2-15-15,3-4-3 16,3-3-3-16,1-5 7 0,4-8-8 16,1-8 1-16,0-9 0 15,0-7-2-15,0-7 6 16,0-7-4-16,0-4 0 15,0-1 5-15,0-2-4 16,0 0 0-16,-3 0 1 16,-6 0-1-16,-4 0 6 15,-7-10-7-15,-2 0 1 16,-7-3 6-16,-2 2-7 16,-3 2 0-16,-3 5 0 0,2 4-7 15,2 0 11 1,5 0-4-16,1 0 0 0,6 0 0 15,3 0 0-15,8 0 0 16,5 0 2-16,4 0 6 16,1 0-3-16,0 0-2 15,0 0-3-15,0-8 0 16,9-9-2-16,5-3-7 16,5-4-7-16,1-4 4 15,2 0-50-15,0 2-36 16,-1 4-91-16,-6 1-111 15</inkml:trace>
+  <inkml:trace contextRef="#ctx0" brushRef="#br0" timeOffset="15494.05">19650 5747 242 0,'0'0'127'16,"0"0"-57"-16,-110-63-50 15,54 36 7-15,-14-3-2 16,-10 0 20-16,-18-5-18 0,-18 3-23 16,-22 2-1-1,-24 6-3-15,-15 7 0 0,-11 7 9 16,-6 10-6-16,-2 0 12 15,-3 15-15-15,3 12 1 16,6 7-3-16,22 2 4 16,31 1-2-16,31-4 18 15,31-1-8-15,20-3 1 16,16-1-11-16,14-6 0 16,10-4 0-16,8-3 0 15,4-2-13-15,3-2 11 16,0-1-12-16,0-3 14 15,0-1-4-15,0-5 2 16,-2 1-7-16,1-2 7 16,-2 0 2-16,-4 0 6 0,-3 0-2 15,-2 0-4 1,0 0 0-16,-1 0 6 0,-1 0-9 16,0 3 3-16,0 1 0 15,2 0 4-15,8-2 0 16,-1-1-4-16,5-1 7 15,-1 0-4-15,1 0 0 16,0 0-3-16,0 0 0 16,0 0-2-16,0 0-3 15,0 0-2-15,0 0-32 16,0-16-134-16</inkml:trace>
+  <inkml:trace contextRef="#ctx0" brushRef="#br0" timeOffset="15786.33">16778 5655 293 0,'0'0'85'16,"0"0"-36"-16,0 0-48 16,0 0 17-16,0 0 17 15,0 0 0-15,-42 50 16 16,23-28-19-16,-1 3-15 15,4-3 31-15,0-1-34 16,5-2 4-16,5-5 3 16,2-4-20-16,4-3 8 15,0 1-9-15,0-4 0 0,15 4 11 16,7-5-11-16,12 0-1 16,7 1-5-16,2 2-105 15,-5-5-31-15,-11 1-219 16</inkml:trace>
+</inkml:ink>
+</file>
+
+<file path=ppt/ink/ink17.xml><?xml version="1.0" encoding="utf-8"?>
+<inkml:ink xmlns:inkml="http://www.w3.org/2003/InkML">
+  <inkml:definitions>
+    <inkml:context xml:id="ctx0">
+      <inkml:inkSource xml:id="inkSrc0">
+        <inkml:traceFormat>
+          <inkml:channel name="X" type="integer" max="32767" units="cm"/>
+          <inkml:channel name="Y" type="integer" max="32767" units="cm"/>
+          <inkml:channel name="F" type="integer" max="2047" units="deg"/>
+          <inkml:channel name="T" type="integer" max="2.14748E9" units="dev"/>
+        </inkml:traceFormat>
+        <inkml:channelProperties>
+          <inkml:channelProperty channel="X" name="resolution" value="1516.99072" units="1/cm"/>
+          <inkml:channelProperty channel="Y" name="resolution" value="2427.1853" units="1/cm"/>
+          <inkml:channelProperty channel="F" name="resolution" value="5.68611" units="1/deg"/>
+          <inkml:channelProperty channel="T" name="resolution" value="1" units="1/dev"/>
+        </inkml:channelProperties>
+      </inkml:inkSource>
+      <inkml:timestamp xml:id="ts0" timeString="2022-11-09T15:53:50.485"/>
+    </inkml:context>
+    <inkml:brush xml:id="br0">
+      <inkml:brushProperty name="width" value="0.05292" units="cm"/>
+      <inkml:brushProperty name="height" value="0.05292" units="cm"/>
+      <inkml:brushProperty name="color" value="#FF0000"/>
+    </inkml:brush>
+  </inkml:definitions>
+  <inkml:trace contextRef="#ctx0" brushRef="#br0">4608 4982 13 0,'0'0'204'16,"0"0"-112"-16,0 0-26 0,0 0 5 15,0 0-14-15,0 0 9 16,-49-18-19-16,46 18-32 15,3 0 7-15,0 0-3 16,0 0 12-16,0 0 14 16,0 0-20-16,0 0 13 15,0 0-16-15,0 0-19 16,0 0-3-16,0 0 0 16,0 0-6-16,3 0-30 15,3 9-55-15,-6-7-116 16</inkml:trace>
+  <inkml:trace contextRef="#ctx0" brushRef="#br0" timeOffset="1508.48">4647 4952 66 0,'0'0'90'16,"0"0"-21"-16,0 0-20 15,0 0 7-15,0 0-8 16,0 0-4-16,0 0-39 16,0 0 11-16,17-9-12 15,0 9-3-15,15 0 6 16,5 6-3-16,14-3 3 0,7-2-7 16,9-1 8-16,18 0-8 15,9 1 1-15,9 6-1 16,6-2 5-16,3-4-5 15,13-1 1-15,8 0 29 16,13-4-14-16,12-7 3 16,0-4-5-16,5 5-7 15,-3 3-7-15,1-4 0 16,9 1 1-16,-3 2 4 16,9-9-4-16,3 7-1 15,-2-2 0-15,-2-2 7 16,-6 5-18-16,-11 1 11 15,-12 3 0-15,-13 3 2 16,-8 2-2-16,-10 0 0 0,-12 0-2 16,-12 0 12-16,-12 0-13 15,-18 0 3-15,-16 0 0 16,-18-1-8-16,-15-1 13 16,-9 0-9-16,-3 0 4 15,0-5-71-15,-11 5-38 16,-11-3-92-16</inkml:trace>
+  <inkml:trace contextRef="#ctx0" brushRef="#br0" timeOffset="3729.67">4532 4906 7 0,'0'0'77'0,"0"0"-12"16,0 0 22-16,0 0 15 15,0 0-96-15,0 0-6 16,-15-11 0-16,15 28 1 16,0 5 20-16,3 7-12 0,-1-1-7 15,-2 13 15 1,0 2-13-16,0 4-1 0,0 13-2 15,0 1 0 1,0 3 4-16,-5 9-5 0,-2-1 0 16,-1 6-1-16,4-1 10 15,1 1-9-15,3 0 3 16,0-2 1-16,3-3 6 16,6 1-10-16,6-1 8 15,-3 2-6-15,-1 8 3 16,-3 4-1-16,-5 5-3 15,0 4 9-15,-3-4-7 16,0 0-3-16,0 0 2 16,0 3 2-16,-6 4 6 15,3-1 7-15,1-4-9 16,2 1-1-16,0-5 3 16,0 2-3-16,0 2-7 0,0 1 0 15,0-1 3-15,0-4-3 16,0-6 0-16,0-3 1 15,0-5 3-15,0-1-4 16,0 1 0-16,0-5 1 16,-4-1-1-16,-5-7 0 15,2-2-1-15,-1-3 2 16,-2-1-1-16,2 0 0 16,1-2 2-16,-1 2-2 15,1 2-1-15,-2 1 1 0,0 3-1 16,-4-4 3-1,1-8-5-15,1-5 10 0,1-10-7 16,7-1 0-16,1-12 1 16,2-1-4-16,0-7-1 15,0-5 4-15,0-1-2 16,0-2 0-16,0-4 2 16,0 1 6-16,0-4 1 15,0 0 6-15,0 0-8 16,0 0-5-16,0 0 6 15,0 0-6-15,0 0 0 16,0 0 4-16,9 0-2 16,9 0 11-16,9-2 11 15,12-3-16-15,13-4 5 16,15 6-11-16,9 2 2 0,15 1-4 16,6 0-2-1,6 0 2-15,9 6-5 0,3-1 18 16,6-3-6-16,10-2-4 15,8 0-3-15,7 0 16 16,17 0-13-16,8 0 6 16,4 0-8-16,7 5 5 15,0 1 7-15,1-3-10 16,4 0 4-16,4-3-7 16,10 0 10-16,3 0-10 15,1 0 0-15,-1-2 10 16,-7-5-14-16,-7-1 4 0,-8 2 0 15,-9-3-1-15,-9-1 1 16,-10 0 0-16,-7-1 0 16,-7-1 6-16,-13-1-6 15,-9 1 0-15,-15 2 0 16,-15 1-6-16,-12 0 5 16,-16-1 1-16,-9-2 2 15,-14 2 3-15,-3-5 1 16,-7 1-6-16,-5-5 1 15,-8 1-6-15,-5-2 5 16,-5-8 0-16,-4-6 2 16,0-2 6-16,-16-7-4 15,-6 0-4-15,-8-2 3 16,2 1-7-16,-5-2 5 16,0-9-1-16,-1 0 0 0,-1-7 8 15,4-7-6-15,1-3-2 16,2-10 1-16,4-4-2 15,3-8 5-15,0-5-4 16,7-4 15-16,1-10-13 16,4-1 11-16,6-2-13 15,2-5 0-15,1 10 3 16,0 10-1-16,0 2-2 16,7 10 7-16,2-4-3 15,1-3 2-15,1 1-6 16,-2-2 0-16,0 1-3 15,-3 1 4-15,-3 5-1 0,-2 4 0 16,1 7 4 0,1 7-2-16,-2 5-2 0,2 3 0 15,-1 2-5-15,-2 7 4 16,0 4 1-16,0 3 0 16,0 3 6-16,0 1-10 15,-9 3 4-15,0 0 0 16,-3 5-1-16,0-2-1 15,3-2 2-15,-4 6 0 16,2 0 7-16,1 2-12 16,-1 7 5-16,4 2 0 15,1 1-2-15,3 7 3 16,3 0-1-16,-3-1 0 16,3 3 6-16,0 2-10 0,-1 2 4 15,-1-1 0-15,1 9-2 16,-2-7 4-16,-2 1-2 15,-4-3 0-15,-6-5 0 16,-1 6-3-16,-5 0 3 16,0-6 0-16,0-5-5 15,-3 1 6-15,0-5-1 16,1-1 0-16,0 5 6 16,-1-6-12-16,0 2 6 15,2 1 0-15,1 1-1 16,2 1-1-16,-2 1 2 0,0 1 0 15,0 4 7-15,0-1-11 16,2 3 4-16,1 0 0 16,1 4-7-16,-2-1 6 15,-3 3-4-15,-13 7-18 16,-23 0-38-16,-33 0-24 16,-34 4-161-16</inkml:trace>
+  <inkml:trace contextRef="#ctx0" brushRef="#br0" timeOffset="6247.89">5090 4191 72 0,'0'0'103'16,"0"0"-28"-16,0 0-43 15,0 0-9-15,0 0-15 16,0 0 3-16,0 0-11 16,-9-23 0-16,9 21 0 15,-1 0 0-15,1-1 0 16,-2 3 1-16,2 0 5 15,0 0-6-15,0 0 0 16,0 0 0-16,0 0-1 0,0 0 1 16,-1 0 0-16,1 0 0 15,0 0-2-15,0 0 0 16,0 0 0-16,0 0 2 16,0-1-1-16,-2 1-8 15,2 0 9-15,0 0 1 16,-3 0 5-16,3 0-8 15,0 0 2-15,0 0 0 16,0 0-4-16,0 0 4 16,0 0 0-16,0 0 0 15,0 0 5-15,0 0-5 16,0 0 0-16,0 3 0 16,0-2-1-16,0-1-23 0,0 0-89 15,0 0-15 1</inkml:trace>
+  <inkml:trace contextRef="#ctx0" brushRef="#br0" timeOffset="7441.66">4793 3818 124 0,'0'0'58'15,"0"0"2"-15,0 0 17 16,-101 3-25-16,65 28-4 16,3 12-8-16,5 7-13 15,8 7 0-15,10 1-15 0,7 0 9 16,3-1 1-16,9-5-18 15,13-6 6-15,7-7-10 16,5-10-8-16,15-13-39 16,8-13-85-16,2-3-110 15</inkml:trace>
+  <inkml:trace contextRef="#ctx0" brushRef="#br0" timeOffset="7657.38">5148 3742 219 0,'0'0'173'0,"0"0"-100"15,0 0-65-15,-13 88 5 16,7-22 20-16,0 13-12 16,5-4 1-16,-1-7-22 15,-1 1 6-15,3-7 0 16,0-5-6-16,0-4-48 15,0-10-95-15,0-16-139 16</inkml:trace>
+  <inkml:trace contextRef="#ctx0" brushRef="#br0" timeOffset="7786.42">5114 4143 122 0,'0'0'0'0,"0"0"-3"0,0 0-79 15,0 0 56-15,0 0 15 16</inkml:trace>
+  <inkml:trace contextRef="#ctx0" brushRef="#br0" timeOffset="8354.93">5363 4137 17 0,'0'0'391'0,"0"0"-293"15,0 0-42-15,0 0-49 16,0 0 9-16,-98 66-2 16,80-26-4-16,10-4 4 15,5-3-10-15,3-10-2 16,0-8-2-16,0-6-1 15,6-9 0-15,9 0 2 16,6-7 3-16,3-14 17 16,-2-8-21-16,-1-7 3 15,-3 4-3-15,-2 3 6 16,-5 11-2-16,-5 9-1 16,-6 9-1-16,5 0-2 15,0 0-16-15,1 14 16 0,2 3-4 16,-2 8 8-1,3-13-11-15,4 1 7 0,1-5-19 16,2-8 4-16,8 0-43 16,0 0-32-16,0 0 18 15,-5-3 28-15,-2-4 44 16,-3-1 8-16,-3 2 3 16,2 0 3-16,1 3-12 15,2-1 22-15,-1-2-7 16,3 5-10-16,-5 0 14 15,2-1 0-15,-6 2-1 16,-3 0-1-16,-1 0-19 0,-2 3 14 16,-2 6-1-16,2 2-13 15,0-2 11-15,-2 2-10 16,1 1-2-16,-2 1-27 16,0-2-217-16</inkml:trace>
+  <inkml:trace contextRef="#ctx0" brushRef="#br0" timeOffset="9276.01">6103 4989 216 0,'0'0'115'0,"0"0"-106"16,0 0 4-16,0 0-13 16,0 82 23-16,0-44-1 15,-1 2 9-15,-4-2-26 16,2 2 8-16,2 7-8 16,1 7-3-16,0 7 7 15,0 8-5-15,0 5-1 16,0 4-3-16,0 0 2 15,0 2-2-15,0-1 1 16,0 12 0-16,0 2-1 0,-12 12-2 16,-8 16 2-16,-8 6-3 15,3 11-12-15,-2 6 8 16,7-4 7-16,-2 5 1 16,6-3 25-16,-1 0-6 15,1-6 0-15,2 4 2 16,-2-2-16-16,1 1 5 15,2 0-8-15,1 3 2 16,-2 2 17-16,-2 5 1 16,2-4 1-16,4-8 2 15,4-12-17-15,6-16 11 16,0-13-9-16,0-14-4 16,6-17 1-16,3-17-5 0,-3-22-3 15,1-21 0 1,4-5-41-16,4-38 24 0,1-27-64 15,-1-29-109-15</inkml:trace>
+  <inkml:trace contextRef="#ctx0" brushRef="#br0" timeOffset="10293.64">5942 4211 287 0,'0'0'69'0,"0"0"-47"16,0 0 29-16,0 0-28 15,-27 95-2-15,21-72-15 16,0-4-4-16,3-4-4 15,3-3-12-15,0-8-82 16,3-4-128-16</inkml:trace>
+  <inkml:trace contextRef="#ctx0" brushRef="#br0" timeOffset="10448.62">5984 3896 55 0,'0'0'151'16,"0"0"-90"-16,0 0-60 16,0 0-1-16,0 0-130 15,0 0-5-15</inkml:trace>
+  <inkml:trace contextRef="#ctx0" brushRef="#br0" timeOffset="10808.42">6155 4168 241 0,'0'0'134'0,"0"0"-69"16,0 0-33-16,-105 78-4 16,79-47 16-16,7-3-27 15,8-4-11-15,11-8 0 16,0-6-6-16,0-9-3 15,11-1 3-15,8-1 23 16,5-22 25-16,3-7-24 16,0-12-19-16,-5-7 5 15,2-4-6-15,-3-2-4 16,0 4 0-16,-2 16 4 16,-7 11-5-16,-3 15 2 15,-4 9 0-15,2 8-1 0,-3 21-14 16,1 14 14-16,-5 10-2 15,0 7 10-15,0 7-7 16,-2 8-1-16,2-2-41 16,0-6-179-16</inkml:trace>
+  <inkml:trace contextRef="#ctx0" brushRef="#br0" timeOffset="12254.83">7774 4077 30 0,'0'0'33'0,"0"0"35"0,-49 115-38 15,33-78-16-15,2-7 31 16,6-9-24-16,3-8 2 16,3-3 2-16,1-7-6 15,1-1 5-15,0-2 46 16,0-6 29-16,7-23-33 16,8-12-65-16,7-6 8 15,-2-8 7-15,-1-1-13 16,0-5 10-16,-5 1-12 15,-1 10-1-15,-4 10 21 16,-6 18-15-16,-1 13 21 0,1 9-27 16,-2 25-1-16,4 23-3 15,-2 10 4-15,0 6 0 16,-3-2 3-16,7-8 0 16,-2-10-3-16,4-9 0 15,1-11 4-15,0-4-8 16,-2-9 4-16,3-9 0 15,-1-2 6-15,2-10-5 16,1-16 29-16,4-8-9 16,-3-2-17-16,3-7 6 15,-2 2-9-15,-3 0-1 16,-3 13 0-16,-3 10-4 16,3 11-9-16,-2 7-33 0,2 17-118 15,4 12 12-15,4 4-168 16</inkml:trace>
+  <inkml:trace contextRef="#ctx0" brushRef="#br0" timeOffset="12741.87">8259 4140 293 0,'0'0'147'0,"0"0"-80"15,0 0-33-15,0 0 4 16,-97 73 7-16,89-44-7 15,4 0-37-15,4-5 2 16,0-5-3-16,4-5 1 16,13-8-9-16,2-6-2 0,-1 0 10 15,3-16-4-15,-3-11 5 16,-4-7-1-16,-3 0 2 16,-5 3-1-16,-1 10 8 15,-4 8-8-15,1 7 3 16,-2 6 13-16,0 0-17 15,0 8-3-15,0 12-2 16,0 0 10-16,7-3-7 16,2-7 2-16,2-5 0 15,-1-5-1-15,0 0 7 16,1 0-6-16,-2 0 5 16,0-5 0-16,-2-2 1 15,-1 3-6-15,-1 2 0 0,1 2-1 16,6 0 0-16,0 0 1 15,5 0 0-15,2 3 3 16,4 0-3-16,3-1 0 16,-1-2 2-16,2 0 5 15,-3 0-7-15,4 0 0 16,1 5-2-16,-3 5 0 16,-2 10-21-16,-9 2-84 15,-13 1-204-15</inkml:trace>
+  <inkml:trace contextRef="#ctx0" brushRef="#br0" timeOffset="13981.93">5171 5208 25 0,'0'0'16'0,"0"0"-8"16,0 0 11-16,0 0 17 0,0 0 1 15,0 0 16 1,0 0-6-16,0-10-6 0,0 10 1 16,0 0-21-16,0 0-11 15,0 0 16-15,0 0-1 16,0 0 1-16,0 4-26 15,0 14 7-15,0 7 2 16,0 3 13-16,0 1-11 16,-2-7 3-16,2-3-13 15,0-4 5-15,0-1-6 16,0-4 3-16,0 4 0 16,0 0-3-16,0-3-140 15</inkml:trace>
+  <inkml:trace contextRef="#ctx0" brushRef="#br0" timeOffset="19694.54">5238 5910 24 0,'0'0'48'0,"0"0"21"16,0 0 25-16,0 0-20 16,0 0-21-16,0 0-53 15,0 0-9-15,-11 74 9 16,13-13 15-16,7 4 21 16,-5 7-16-16,-2 2 22 15,-2 3-22-15,0 10-7 0,-5 1-7 16,-7 2 3-1,-4-2-3-15,2-1 2 0,-5 0-8 16,1 0 0-16,-3-7 1 16,4-6-1-16,3-5 3 15,1-1 1-15,7-7-1 16,3-6-6-16,3-9 3 16,0-11 0-16,13-10 0 15,2-8-4-15,0-4-16 16,-6-6 6-16,-2 0 11 15,-1-4 2-15,-4-2 0 16,-2 0 1-16,0 1 0 16,0-2-41-16,0 4-81 15,3 1-66-15</inkml:trace>
+  <inkml:trace contextRef="#ctx0" brushRef="#br0" timeOffset="20163.06">5039 8452 289 0,'0'0'18'0,"0"0"39"0,0 0 24 16,2 108-31 0,-4-72-20-16,-11 4-1 0,1-1-11 15,4-2-9-15,1-4-2 16,6-4-7-16,1-11-14 15,3-8-71-15,16-10-111 16</inkml:trace>
+  <inkml:trace contextRef="#ctx0" brushRef="#br0" timeOffset="20445.68">5202 8564 326 0,'0'0'113'0,"0"0"-39"15,-46 99-61-15,38-67-1 16,4-1-9-16,4-4 1 16,0-3 12-16,4-9-16 15,11-6-2-15,5-9 2 16,-1 0 6-16,0-9 50 16,-4-6-34-16,-7 5-19 15,-2 4 13-15,-6 5-3 16,0 1 14-16,0 0-10 15,0 0-14-15,0 0-3 16,-6 0-1-16,-5 0-26 16,4 0-25-16,-5 0-43 15,0 0-194-15</inkml:trace>
+  <inkml:trace contextRef="#ctx0" brushRef="#br0" timeOffset="21829.74">7322 8664 110 0,'0'0'58'15,"0"0"18"-15,-36 90-46 16,21-65 48-16,-1 3-2 16,1-3-34-16,3-4-20 15,5-7-13-15,4-6-1 16,1-8-8-16,2 0 18 15,0 0 42-15,0-15-4 16,13-12-37-16,4-7-17 16,2-5-2-16,-2 1 8 15,7-1-15-15,-5 6 7 16,3 7-9-16,-7 9-4 16,-7 7 5-16,2 10 4 0,-5 0 1 15,-1 19-15-15,-1 5 16 16,-1 1 2-16,-2 2 0 15,0-3 0-15,0-4-7 16,0-3 5-16,0-5 2 16,0-3-4-16,0-6-5 15,-5-1-7-15,1 0 16 16,-1-1 2-16,2 2 0 16,-6-3 31-16,2 0 22 15,-5-3-22-15,-9-8-16 0,3-6-2 16,-10 2-4-1,-8 2-11-15,-1 6-27 0,1 6-29 16,6 1 35-16,11 0 15 16,10 0 6-16,6 0-56 15,3 7-114-15,0-3-76 16</inkml:trace>
+  <inkml:trace contextRef="#ctx0" brushRef="#br0" timeOffset="22064.17">7667 8469 448 0,'0'0'59'15,"0"0"-53"-15,-18 88-4 0,7-35 8 16,1 2 12-16,1-2 20 15,5-7-31-15,4-3-4 16,0-6-7-16,4-4 0 16,17-6-65-16,1-10-119 15</inkml:trace>
+  <inkml:trace contextRef="#ctx0" brushRef="#br0" timeOffset="22468.76">7880 8706 449 0,'0'0'99'0,"0"0"-59"16,0 0-5-16,0 0-16 15,-88-3-4-15,73 19-10 16,0 1-5-16,8 4 0 15,2-4-5-15,2-2 1 16,3-3 0-16,0-5-13 16,9-4 2-16,6-3-3 15,0 0-13-15,5 0 8 0,-4-3-17 16,-4-4 13 0,-2 0 27-16,-5 1 3 0,-2 3-1 15,-2 0 14-15,-1 3 11 16,0 0-1-16,0 0-1 15,2 0-17-15,-2 0-8 16,1 0 0-16,5 0 1 16,4-1 2-16,1-3 5 15,4-1-8-15,0 0-38 16,-3-1-112-16,1 2-158 16</inkml:trace>
+  <inkml:trace contextRef="#ctx0" brushRef="#br0" timeOffset="23188.76">8060 8411 334 0,'0'0'44'16,"0"0"-26"-16,0 120 13 0,-1-56 53 15,-2-1-18-15,-4-5-34 16,1 0-10-16,0-3-3 16,0-4-11-16,1-5-7 15,1-12-1-15,4-15 3 16,0-9-2-16,0-9 5 16,0-1-6-16,4-18 10 15,14-16-10-15,6-10-31 16,6 0 7-16,0 2-3 15,-2 6-11-15,-6 9 0 16,-7 12 26-16,-7 7 12 16,-5 8 56-16,-3 0 8 15,0 0-21-15,0 0-43 0,-6 13 2 16,-2 5 34 0,-1 3-10-16,4 2-1 0,3 5-10 15,2-3-8-15,0-1-5 16,0-4 2-16,7-4-2 15,4-4-4-15,5-3-42 16,10-9-14-16,5 0-28 16,6-16-50-16,-3-11-223 15</inkml:trace>
+  <inkml:trace contextRef="#ctx0" brushRef="#br0" timeOffset="24974.95">3850 2985 448 0,'0'0'83'0,"0"0"-31"0,0 0 2 16,0 0-49-1,0 0 6-15,8-83-11 16,14 68 2-16,-1 5-2 0,-6 2 0 16,-2 6 0-16,-2 2-2 15,-2 0-7-15,1 17 0 16,-7 15 9-16,0 1 0 16,-3 9-4-16,-3 0 9 15,-10-4-5-15,-2-3 2 16,0-11 5-16,9-8-1 15,3-3-2-15,0-9-1 16,3 2-3-16,0-6-3 16,6 0 3-16,19 0 12 15,13-10-12-15,11-12 0 16,2-6-58-16,1-4-53 0,-2-2-104 16</inkml:trace>
+  <inkml:trace contextRef="#ctx0" brushRef="#br0" timeOffset="25348.66">4316 2783 419 0,'0'0'76'16,"0"0"-62"-16,0 0-2 0,-39 87 19 15,26-52 9-15,4-1-31 16,6 1-3-16,3-8-5 16,0-4-1-16,0-1 0 15,7-9 7-15,8 1-7 16,3-11 0-16,3-3-12 16,1-5 12-16,2-22 1 15,-3-10-1-15,3-8 6 16,-8-5-6-16,-7 2 1 15,-7 0 15-15,-2 3 26 16,-8 7-8-16,-7 8-18 16,-3 10-16-16,-1 20-11 15,1 0-10-15,0 6-37 0,5 19-12 16,5-2-69 0,8 4-103-16</inkml:trace>
+  <inkml:trace contextRef="#ctx0" brushRef="#br0" timeOffset="25671.62">4632 2634 214 0,'0'0'99'15,"0"0"-66"-15,0 0 2 0,0 0 0 16,0 0-25-16,0 0 12 16,32 36 13-16,-28-11 1 15,-4 6 12-15,0 6-8 16,0-7-17-16,-3-1 13 16,0-3-20-16,3-10-5 15,0 0-9-15,0-5 5 16,2-4-5-16,12 2 3 15,7-8-5-15,3-1-19 16,8 0-65-16,3-19-98 16</inkml:trace>
+  <inkml:trace contextRef="#ctx0" brushRef="#br0" timeOffset="25936.14">5087 2509 275 0,'0'0'114'0,"0"0"-89"16,0 0-23-16,0 0 4 16,0 0 33-16,0 0 9 15,21 92-8-15,-21-56-17 16,0 5 21-16,-6 1-29 16,-4 0 9-16,4-6-22 15,3-2 0-15,3-13-2 16,0-5-1-16,3-4 1 0,11-12 11 15,3 0-11-15,5 0-2 16,2-12-51-16,6-8-74 16,-4-4-149-16</inkml:trace>
+  <inkml:trace contextRef="#ctx0" brushRef="#br0" timeOffset="26400.67">4565 2668 226 0,'0'0'101'16,"0"0"-40"-16,0 0 30 15,0 0-43-15,0 0-5 0,0 0-12 16,9-38-25-1,0 34 5-15,3 3-11 0,1 1-2 16,4 0-3-16,-1 15 4 16,-4 11-1-16,0 7 2 15,-5 2-5-15,-7 2 5 16,0 0 3-16,0-6-1 16,-1-1 4-16,1-6-6 15,0-9 0-15,4-2 0 16,16-1-25-16,7-9-45 15,1-3-191-15</inkml:trace>
+  <inkml:trace contextRef="#ctx0" brushRef="#br0" timeOffset="30019.37">14136 3861 36 0,'0'0'53'0,"0"0"-12"15,0 0 21-15,0 0-10 0,0 0-14 16,0 0 4-16,0 0-21 15,-5 3-9-15,5 0-1 16,0-3-10-16,0 2 1 16,0-1-2-16,0 1-7 15,0 2 0-15,5 0 7 16,7 2 6-16,6 0 22 16,4-2-16-16,2 3 14 15,6-3-20-15,7-1 8 16,9 0-1-16,11 1-9 15,7-2 12-15,6 0-16 16,2 1 12-16,4 2-12 0,10-3 11 16,21-1-7-16,16-1 5 15,14 0 13-15,5 0-22 16,6 0 0-16,10 0 5 16,15 0 1-16,18 0 6 15,10 0 12-15,8 0-24 16,0 0 1-16,0 0-1 15,-2 5 5-15,-3 3-4 16,-11 0 8-16,-26 7-8 16,-28 1 3-16,-28-4-4 15,-22-1 1-15,-10-5-1 16,-12-3 6-16,-15-3-1 16,-17 0 5-16,-19 0-10 0,-10 0-8 15,-6 0 7-15,0-5-20 16,-7 5-67-16,-28-4-218 15</inkml:trace>
+  <inkml:trace contextRef="#ctx0" brushRef="#br0" timeOffset="33614.21">13988 3969 43 0,'0'0'48'16,"0"0"-11"-16,0 0 3 0,0 0-34 16,0 0-5-16,0 0 34 15,6 93-15-15,-2-64-7 16,-1 0-9-16,2-1-2 15,-1 1 7-15,2-4-7 16,0 0 6-16,3 1 11 16,-1 7-8-16,-2 2 16 15,1 5-2-15,-1 4-5 16,1 0-5-16,-2 0-9 16,3-3 16-16,-4 2-12 15,-2 4-7-15,-1-2 6 16,1 3-2-16,2-1-4 15,-1 5 1-15,0 3 5 0,1 1-7 16,-2 6 5 0,-2 4-5-16,0 0 7 0,0 6-4 15,0 2 1-15,0 1 12 16,0 4-16-16,0-2 13 16,0-1-12-16,0-3-1 15,0-3 1-15,0-1-3 16,0-1 7-16,-2-1-8 15,2 8 1-15,-1-1 0 16,1 5 7-16,0 10-3 16,0-3 2-16,0 7-6 15,0 1 0-15,0-3 0 16,0-3 4-16,0 1-4 16,0-2 1-16,0 1 5 0,0-2-9 15,0-2 3-15,0 5 0 16,-3 2 0-16,0 0 0 15,-4 7 0-15,1 4 0 16,0 4 0-16,-2-4 0 16,2 1 2-16,-3-3-1 15,2 2 9-15,-2-3-10 16,-3-3 3-16,4-3-3 16,-1 1 6-16,0 1-5 15,-1 3-1-15,3 11 0 16,-1-1 1-16,-1 0-1 15,2 1 0-15,1-6-2 16,1-6 6-16,1-1-5 0,-1-4 1 16,-2-4 0-16,5-3 0 15,1-1 5-15,-2-1-5 16,1 2 9-16,2 6-9 16,0 7 15-16,0 5-9 15,0 1-5-15,0-2 4 16,-3-5-5-16,0-5 0 15,-1-2 0-15,-1-5 1 16,1-6 3-16,0 1-2 16,-1 2-1-16,-1 0-1 15,0 2 0-15,0 3 0 16,-1 2 0-16,2 4 4 0,1-4-1 16,1 0-3-16,-2 4 0 15,-1 4 0-15,-3 0 4 16,0 2-2-16,2-9-2 15,1-3 0-15,2-6 1 16,2-5-1-16,2 2 0 16,0-3-1-16,0 9 1 15,0-2 0-15,0 2 3 16,0-2-1-16,0-9 3 16,0-2-5-16,0-4 0 15,0 0-3-15,0-1 4 16,0 0-1-16,0-4 16 15,0 2-11-15,0-6 2 16,0-2-7-16,0-1 0 16,0-3 0-16,0 3 0 0,0-2 0 15,0 4 0-15,-3 10 3 16,0 7-4-16,2 2 2 16,-2-3 0-16,1-13-1 15,2-13 0-15,0-9 0 16,0-5 2-16,0-4 0 15,0 3 5-15,6 0-1 16,0-4-4-16,1-3 3 16,1-4-5-16,-1 1 0 15,-2-5 0-15,1-1 1 0,-2-6 1 16,-1-2-2 0,-1-3 0-16,-1-1-2 0,1 2 3 15,1 0-1-15,-2-1 0 16,1 0 3-16,-2-1-3 15,1 0 0-15,-1-1 0 16,0-3-3-16,0 2 5 16,2-2-2-16,-2 0 3 15,0 0 1-15,1 0-6 16,4 0 2-16,6 0 0 16,6 0 0-16,8 0 1 15,7 0-1-15,5-2 5 16,8-5-2-16,4-2-3 15,5 2 0-15,4 0 1 16,9 3 0-16,13-2-1 0,16-1 0 16,10-1 5-16,15-1-3 15,9-2-2-15,10 1 0 16,7 2 0-16,3-2-3 16,0 3 3-16,5 2 0 15,1 1 6-15,5-3-4 16,8 1-4-16,7-2 2 15,7 0 0-15,5-2 0 16,2-2-3-16,-4 7 3 16,-5 4 0-16,-5 1-11 15,-11 0 7-15,-2 0 4 16,-12 1 0-16,-2 2-3 0,-2-1-2 16,-7 0-2-16,1-2 3 15,-4 0-3-15,-6 2 1 16,-4-2 5-16,-3 0 0 15,-8 0 1-15,-13 0-5 16,-7 0 5-16,-14 0 7 16,-9 0-6-16,-9 0-1 15,-7 0-5-15,-9-5 5 16,-10-5 9-16,-5 2-7 16,-6-4-1-16,-6 0-1 15,-6-1 2-15,-3-5 12 16,-3-3-14-16,-2-8 9 15,-2-5-9-15,-2-8 4 0,0-6-8 16,-3-9 7-16,0-3-3 16,0-2 8-16,0-3-8 15,4 0 0-15,0-4 0 16,4-7 1-16,-2-4-1 16,2-11 0-16,-3-6 5 15,-5-6-8-15,0-8 3 16,0-3 0-16,0-7-2 15,-7-5 2-15,0 1 0 16,-2-2-1-16,-2 4 10 16,4 5 0-16,-4-7-3 15,-2-3-1-15,-1-6-3 16,-2-3 0-16,3-8-2 16,2 5 0-16,6 5 0 0,5 6-3 15,2 12 6-15,16 4 2 16,4 0 7-16,-1 0-11 15,-4 1 6-15,-3-6-5 16,-3-5 4-16,-6 0-12 16,-5-4 5-16,0 4 1 15,0 0 0-15,0 4-2 16,0-4 2-16,0-7-2 16,0-5 4-16,-2-1-3 15,-2-4 1-15,-3 5 0 16,-3 11-1-16,0 7 1 15,-5 8-7-15,-5 5 6 16,-3 3-9-16,-6 2 8 0,-4 1-4 16,1 1 6-1,-6 1 0-15,1 4 0 0,1-1 0 16,8-1-2-16,5 0 5 16,6-3-7-16,6 8 4 15,5 5 0-15,6 2-1 16,0 3 1-16,0 4 0 15,0 4-5-15,6 0 10 16,3 0-3-16,1-2-2 16,2-3 3-16,4 0-3 15,1 3 0-15,-2 1 0 16,0 1 1-16,-3-3 3 0,0 0-4 16,0 4 0-1,0 1-1-15,1 1 0 0,1 4 1 16,2-3 0-16,-1-4 0 15,1 5 0-15,-2 1 0 16,2 0 0-16,3 3 5 16,0-3-12-16,1 3 10 15,0 1-3-15,1 4 0 16,-4 5 5-16,-3 1-6 16,-1 2 1-16,-2 2 0 15,-5 1-1-15,-3 3 1 16,-3-2 0-16,0-4-3 15,0 7 6-15,0 3-3 0,-2-2 0 16,-2 6 0 0,-2-1-4-16,-4 3 4 0,2 3 0 15,-4 0-2-15,-3 2 2 16,-1 0 0-16,-5 0-1 16,0-1 1-16,2 4-4 15,-2-2 4-15,4 4 0 16,1 0 3-16,4-2 1 15,0 5-2-15,3-2-2 16,0 1 3-16,-3 5-6 16,0-1 3-16,0 3 0 15,-3 2-4-15,2-1 7 0,-3 2-4 16,2-2 1 0,-1 3-2-16,3 0-3 0,-1 0 3 15,2 2 2-15,-1-1-2 16,1-2 10-16,-1-3-8 15,-2-3 0-15,1 0 1 16,2-2-2-16,0 3 1 16,1-1 0-16,4 3 1 15,-1 2 2-15,0 0-3 16,1 3 0-16,-2-4 1 16,2 2 1-16,-1-1-2 15,2-2 0-15,1 1 10 16,-2-1-7-16,-2-2-3 15,-3 3 0-15,-6-1-1 16,-8 2-2-16,-5-1 3 0,-11 5 0 16,-9 2-5-1,-17 6 9-15,-24 0-8 0,-27 8 1 16,-27 8-58-16,-33 2-8 16,-42-8-48-16,-37-10-158 15</inkml:trace>
+  <inkml:trace contextRef="#ctx0" brushRef="#br0" timeOffset="34812.51">14036 3389 255 0,'0'0'57'16,"0"0"-39"-16,0 0-17 15,40-120 10-15,-13 67 16 16,0-2 31-16,-1-6-27 15,-1-8-14-15,-3 0 4 16,-4 1-3-16,-5 0-4 16,-4 13 11-16,-3 21-2 15,-5 10-10-15,-1 18 40 16,0 8-35-16,0 35-18 16,0 23 0-16,-10 16 10 15,3 6 1-15,5-3-11 16,2-16 11-16,0-7-17 0,2-6 13 15,7-17-11 1,1-6 4-16,-2-11-4 0,-2-12-2 16,-3-2 2-16,1-2 4 15,0-16 20-15,1-6-19 16,-4-13 13-16,-1 4 23 16,-6 0-24-16,-19-1-6 15,-9 5-7-15,-8 7-5 16,2 10-5-16,1 10-26 15,6 0 8-15,5 11-18 16,10 7-13-16,12-3-42 16,6-5-96-16,4-6-88 15</inkml:trace>
+  <inkml:trace contextRef="#ctx0" brushRef="#br0" timeOffset="35007.61">14457 2822 295 0,'0'0'177'0,"0"0"-158"16,0 0-17-16,-11 86 18 15,-3-45 9-15,3-2 2 16,0-6-12-16,8 3-16 16,2-3 1-16,1-2-4 15,0 4-7-15,9-11-53 0,11-6-100 16</inkml:trace>
+  <inkml:trace contextRef="#ctx0" brushRef="#br0" timeOffset="35164">14627 3059 151 0,'0'0'125'16,"0"0"-76"-16,0 0-37 15,0 0-12-15,-50 89-64 16,43-81-136-16</inkml:trace>
+  <inkml:trace contextRef="#ctx0" brushRef="#br0" timeOffset="35584.68">14650 2677 217 0,'0'0'20'15,"0"86"94"-15,-7-37-4 16,-3 6-32-16,-3-1-22 15,2 0-22-15,2 2-21 16,1-6 1-16,5 1-14 16,3-5-1-16,0-8-33 0,6-11-53 15,16-11-70-15,11-14-220 16</inkml:trace>
+  <inkml:trace contextRef="#ctx0" brushRef="#br0" timeOffset="36130.17">15659 2557 369 0,'0'0'265'16,"0"0"-241"-16,0 0-18 15,0 0-7-15,-90 55 3 16,77-33-2-16,4-6 0 16,9 0-2-16,0 0 1 15,0 8 1-15,3-11-4 0,21 0-5 16,9-8 3 0,6-5-22-16,1 3 0 0,-9-3 2 15,-11 0 25-15,-14 0-3 16,-6 3 2-16,0 8 2 15,-29 10 8-15,-11 6 39 16,-12 6 2-16,2 2-34 16,9 0 8-16,13-1-2 15,12 0-9-15,10-4-5 16,6-1-7-16,2 0 0 16,23-6-6-16,17-7-1 15,15-6-47-15,7-7-62 16,3-3-284-16</inkml:trace>
+  <inkml:trace contextRef="#ctx0" brushRef="#br0" timeOffset="36493.15">16022 2949 436 0,'0'0'122'0,"0"0"-53"15,-88 51-69-15,58-26 12 16,6 3 36-16,4-3-46 15,10-2 3-15,4-5-4 16,6-9-1-16,0 0-2 16,0-9 2-16,15 0 15 0,12-20 11 15,7-17-22 1,5-4-3-16,0-10 6 0,1-6-5 16,-6-8-4-16,-2-7 2 15,-6-3-7-15,-4-3 5 16,-5 15 2-16,-6 20 1 15,-4 22 9-15,-6 21 33 16,-1 7-43-16,0 30-3 16,-5 24 3-16,-10 14 17 15,-4-2-14-15,2 0 3 16,5-6-6-16,12-13-49 16,0-11-23-16,13-14-67 15,13-16-71-15</inkml:trace>
+  <inkml:trace contextRef="#ctx0" brushRef="#br0" timeOffset="36823.15">16335 2898 289 0,'0'0'63'16,"0"0"31"-16,-8 82-33 16,2-48-15-16,5-11-22 15,1-4-9-15,0-8-12 16,9-11 4-16,12 0 11 15,2-8 4-15,2-21-8 16,-3-1 0-16,-4-9 10 16,-3 3 37-16,-8 9-11 15,0 11-26-15,-5 12 12 0,-2 4-10 16,0 20-26-16,0 20 0 16,-12 13 0-16,-1 4 24 15,-7 2-13-15,1-4-2 16,-5-3-3-16,-3 0-2 15,-1-5-4-15,6-6-14 16,5-8-49-16,12-20-16 16,5-13-28-16,19 0-75 15,15-28-144-15</inkml:trace>
+  <inkml:trace contextRef="#ctx0" brushRef="#br0" timeOffset="37106.18">16732 2912 11 0,'0'0'600'16,"0"0"-567"-16,0 0-28 15,0 0-1-15,-42 105 14 16,36-79-4-16,3-3-13 16,3-3-1-16,0-10 0 15,0-5-5-15,4-5 5 16,10 0 11-16,2-17 4 15,-2-8-4-15,-1-4-7 16,-5-1 7-16,-5-3 5 16,-3 7-1-16,0 7-3 0,-2 2-4 15,-7 10-7-15,2 2-1 16,-2 3-35-16,1 2-50 16,4 2-111-16</inkml:trace>
+  <inkml:trace contextRef="#ctx0" brushRef="#br0" timeOffset="37531.94">17094 2894 443 0,'0'0'129'0,"0"0"-46"15,0 0-46-15,-86-21-2 0,45 56-26 16,4 12 20-16,3 6-14 16,11-2-7-16,13-11-7 15,10-11-2-15,0-9 6 16,15-9-5-16,13-11 3 16,4 0 11-16,3-15 1 15,1-13-9-15,-3-14-4 16,0-9-2-16,-2-8-8 15,-2-12 3-15,-6-6 4 16,0-6-4-16,0 0-3 16,0 11 8-16,-2 24 5 15,-6 21 0-15,-8 22 16 0,-7 5-1 16,0 36-20-16,-10 24-6 16,-10 17 6-16,-3 6 6 15,2 2-6-15,10-8-14 16,11-15-50-16,11-8-35 15,27-20-54-15,9-13-110 16</inkml:trace>
+  <inkml:trace contextRef="#ctx0" brushRef="#br0" timeOffset="37962.89">17626 2985 508 0,'0'0'117'16,"0"0"-38"-16,0 0-59 0,0 0 2 15,-101 18 4-15,72 0 10 16,6-1-32-16,10-2-2 16,7-5-4-16,6-3 0 15,0-1 2-15,0 2 3 16,0 1 0-16,0 1 2 16,9-4-5-16,14-5-7 15,12-1-3-15,7 0-23 16,-1-4-29-16,-8-6 22 15,-10 4 40-15,-8 3 2 16,-8 2-1-16,-4 1 7 16,-3 0 13-16,0-2-6 15,0-1-14-15,2 2 0 0,2-3-1 16,8-1 7-16,3-4-5 16,3-4-4-16,-3 1 2 15,-4 0-15-15,-4 5 15 16,-3 0 1-16,-4 6 13 15,2 1 0-15,-2 0-4 16,0 0-10-16,0 11-1 16,0 16 1-16,-3 6 8 15,-2 6-8-15,2-3-11 16,1-2-243-16</inkml:trace>
+  <inkml:trace contextRef="#ctx0" brushRef="#br0" timeOffset="40093.33">15635 4091 24 0,'0'0'45'15,"0"0"-11"-15,0 0-8 0,18-103-19 16,-16 81 4-16,-1 4-4 16,1 5 6-16,-2 2 24 15,0 5 30-15,0 5 4 16,1 1-48-16,-1 0-22 15,0 0 14-15,0 0-13 16,0 0 13-16,0 12 8 16,0 14-22-16,0 21 47 15,0-4-3-15,0 3-20 16,-4 6 8-16,-5-8-26 0,-1 15 13 16,-1-2-12-16,2 0 2 15,0 10-8-15,0-10-2 16,3 1 1-16,0 3 5 15,0-2-6-15,0 3-5 16,1-1 5-16,0-3 5 16,2 4-4-16,3 0-1 15,0 8-1-15,0 9 1 16,0 2 1-16,0 1 1 16,0-2 7-16,0-4 3 15,0 5-1-15,0 1-11 16,0-2 0-16,0 3 17 15,0 3-17-15,0 2 2 0,0 5 5 16,4 1-2 0,2 6 2-16,0 5-7 0,1 2 3 15,2 2-2-15,-1-5 6 16,-4 0 3-16,2 1-6 16,-3-3 3-16,3 0 7 15,3 1-8-15,1-3-5 16,4-2 1-16,1 4-2 15,1 4 1-15,4 3 0 16,-1 1 4-16,-2-5-2 16,0 4-3-16,-2-7 0 15,3 5-1-15,-3-4 6 16,0-3-3-16,-1 3-2 16,0-3 0-16,0 4 2 0,1 4 0 15,0 0-2-15,-3-2 0 16,1-4 0-16,-2-4 0 15,0-2 2-15,-3 0 1 16,1-2-5-16,-2-1 2 16,-1 2 0-16,-1-2-2 15,-2 2 6-15,-2 1-4 16,1 6 0-16,1 0 1 16,-3 3 1-16,1-4-2 15,-1-2-3-15,0-2 3 16,0-3 0-16,0-1 0 15,-6-5 0-15,0-3 1 16,-3-1-1-16,3 1 0 16,-1 0 0-16,1 3 5 0,-4 3-3 15,1 3-2-15,-1 0 0 16,0 0 4-16,0-3-4 16,-1 0 0-16,1 1 0 15,1 1-3-15,0-4 3 16,3-3 0-16,-1 0 3 15,4-3-3-15,0-1 0 16,3 3 2-16,0 1-2 16,0 4 10-16,0-1-6 15,0-4 0-15,0-3-3 16,7-3 3-16,5 0-4 0,-2-2 0 16,4-3 0-1,-2-2 0-15,0-2 1 0,1-4-1 16,-1 0 0-16,1-7 2 15,-1-3 0-15,3 0-2 16,0-4 0-16,-1-3-1 16,1 5 1-16,-3-2 1 15,-1-3 3-15,-3-1-4 16,-1-5 0-16,-2-6 0 16,-2 1 4-16,-3-5-7 15,0 2 3-15,0-3 0 16,0-2-1-16,0 0 1 15,0-3 0-15,-1-6 3 0,-1-6-1 16,2-3-4 0,0-5 1-16,0 1 1 0,0-5 0 15,0 0 2-15,0-1-5 16,0 2 3-16,0-3 0 16,0 1 0-16,0-2 0 15,0 0 0-15,0 0-1 16,0 0-8-16,0 0 2 15,0 0 2-15,0 0-13 16,0 0 4-16,0 0-2 16,0 0-1-16,0 0-2 15,0-10-8-15,0-10-54 0,0-7-62 16,3-7-142 0</inkml:trace>
+  <inkml:trace contextRef="#ctx0" brushRef="#br0" timeOffset="54086.75">9345 4816 286 0,'0'0'52'0,"0"0"-6"15,0 0-38-15,0 0 10 16,0 0-14-16,0 0-3 16,0 0 10-16,-13 0-8 15,26 0 16-15,5 0-5 0,7 0 2 16,5 0 2-1,9 0-18-15,13 0 3 0,11-2-1 16,13-1 3-16,6-2-5 16,6-3 0-16,1 2 0 15,2-2 0-15,-1 2 1 16,-3 2 0-16,-2 2-1 16,-3 2 0-16,-3 0-10 15,9 0-18-15,1 0-14 16,1 0 14-16,-4 2 4 15,-11-2 20-15,-8 0 4 16,-7 0-1-16,-3 0 4 16,-5-4-2-16,-6 1 7 15,-1 0 0-15,-6 3-8 16,-4 0 0-16,0 0 12 0,-4 0 0 16,-1 0 14-16,3 3-15 15,-3 1-4-15,-2-1-1 16,-1 2-6-16,-5-2 0 15,-4 0 1-15,-6 1 1 16,-3 0-2-16,-6 0 0 16,4-2 0-16,-4-1 0 15,-1-1 0-15,-1 0 0 16,-1 0 1-16,0 0 0 16,2 0 2-16,-2 0-2 15,0 0 12-15,1 0 22 16,-1 0-8-16,0 0-7 0,2 0 8 15,-2 0-18 1,1 0-7-16,-1 0-3 0,2 0 1 16,-2-2 4-16,1 1-5 15,-1-3 0-15,2 0 6 16,-1 1-4-16,1 2-1 16,-2 0-1-16,0 1-1 15,1 0 1-15,2 2-8 16,3 19 2-16,-2 7 3 15,1 7 5-15,3 2-2 16,-2 9 0-16,4 10 0 16,-3 12 2-16,2 8 2 15,-1 12-4-15,-1 6 10 16,-2 5-8-16,-2 8-2 16,-3 2 1-16,3 4 0 0,3-6 0 15,4-9-1-15,5-4 0 16,9-7-1-16,-6-2 1 15,4-1 0-15,-3 1 0 16,-3-3 1-16,0-2 3 16,-4 1-3-16,-3 1 3 15,0 0 16-15,-6-3-20 16,0-1 4-16,-3-7-1 16,0 0-2-16,0-1 7 15,0 7 6-15,0 6-8 16,-2 3 9-16,-4-2-13 15,-1-3 0-15,1-10-1 0,3-11 2 16,3-6 1-16,0-9-2 16,0-1-1-16,0-1 4 15,0 7-2-15,0 4-3 16,3 0 0-16,0-4 1 16,0-4 3-16,0-7-4 15,1-10 2-15,-1-4-3 16,-1-4 3-16,-1-3-2 15,-1-3 0-15,0 1-3 16,0-1 1-16,0 4 0 16,0 5 1-16,0 1 0 15,0 3 1-15,0-1 0 16,0-2-2-16,0-4 3 0,0-3-1 16,0-1 0-1,0 1 0-15,0 3-6 0,0 7 6 16,-1 4-1-16,-2 1-4 15,0-2-5-15,-3-4 5 16,1-9-5-16,1-2 10 16,-1-1 0-16,1 5 0 15,-4 2 0-15,1 5 0 16,0 0 1-16,-1-7 0 16,6-8-1-16,1-8 0 15,-1-4 8-15,2 0-3 16,0-7-2-16,0-8-1 0,0-2-1 15,0 3 7 1,-3 2-8-16,-2 1 1 0,-6 0 11 16,-8 5-10-16,-7 0-4 15,-12 5 0-15,-13 1 2 16,-15 0 2-16,-13 0-2 16,-10 0-3-16,-8 3 0 15,-12 2-1-15,-6 2 1 16,-8-3 2-16,-5 2 1 15,-6 5 10-15,0 0-10 16,0 2 4-16,8 0-13 16,19-6 8-16,19-6-1 15,22-1-1-15,20-10-60 16,22-26-113-16</inkml:trace>
+  <inkml:trace contextRef="#ctx0" brushRef="#br0" timeOffset="54930.12">9881 3870 232 0,'0'0'29'0,"0"0"-4"15,0 0 48-15,79 0 7 16,-61 0-23-16,-6 0-1 16,-5 0 5-16,-3 0-19 15,-2 0-19-15,1 7-17 0,0 16-3 16,2 12 2 0,-5 5 2-16,0-2-5 0,0-3 8 15,-2-9-10-15,-1-7 1 16,3-3 1-16,0-2-2 15,3-3-8-15,16-7-23 16,8-4-37-16,9 0-32 16,3-9-210-16</inkml:trace>
+  <inkml:trace contextRef="#ctx0" brushRef="#br0" timeOffset="55179.08">10300 3923 407 0,'0'0'87'0,"0"0"-74"15,0 0 5-15,-82 108 1 0,63-72-9 16,8-1-3-16,8-7-7 16,3-4 0-16,3-5 6 15,14-7-6-15,3-8-4 16,3-4 4-16,-2 0 0 16,-2-18 3-16,-1-7 1 15,-6-5-1-15,-6-2 9 16,-3-2-10-16,-3 0 5 15,0 2-5-15,-8 3-2 16,-8 9-14-16,-5 8-79 16,3 8-148-16</inkml:trace>
+  <inkml:trace contextRef="#ctx0" brushRef="#br0" timeOffset="55470.18">10300 3923 273 0,'91'33'118'0,"-91"-4"-57"15,-4 4-39-15,1-3-1 16,3-3-1-16,0-4-6 16,3-5-4-16,11-5-7 15,1-8 6-15,3-5-6 16,-1 0 39-16,-1-20 1 0,-2-2-34 15,-4-2 9-15,-6-3-15 16,-4 3 2-16,0-2-5 16,-1-1-2-16,-17 4-6 15,-3 5-39-15,2 1-23 16,-1 1-58-16,7 2-193 16</inkml:trace>
+  <inkml:trace contextRef="#ctx0" brushRef="#br0" timeOffset="55673.91">10561 3839 103 0,'0'0'94'16,"0"0"-6"-16,0 0 25 15,0 0-13-15,0 0-30 16,0 0 7-16,52 116-28 0,-64-75-13 16,0-6-4-16,1-5-25 15,8-7 7-15,3-4-14 16,3-5 0-16,20-2 0 15,9-10 0-15,8-2-45 16,2 0-37-16,-6 0-125 16</inkml:trace>
+  <inkml:trace contextRef="#ctx0" brushRef="#br0" timeOffset="56544.31">10384 3879 199 0,'0'0'133'0,"0"0"-43"15,0 0-21-15,0 0-14 16,0 0-4-16,0 0-42 15,26-31-4-15,-12 31-5 16,1 14 0-16,-6 4 0 16,-5 12 4-16,-2 6 3 15,-2 3 10-15,0 7 2 16,-11-3-3-16,-1-5-5 16,-1-4-11-16,10-3 4 15,3-6-3-15,0-4-1 16,1-2 0-16,23-9 0 15,6-5-10-15,15-5-43 0,9 0-56 16,2-13-225-16</inkml:trace>
+  <inkml:trace contextRef="#ctx0" brushRef="#br0" timeOffset="57248.47">11040 3850 401 0,'0'0'7'0,"0"0"67"0,-3 125-48 16,-3-80 10-16,-3-4 6 15,1-7-3-15,0-6-26 16,3-11-10-16,2-7-3 16,2-7 12-16,1-3-7 15,0 0 8-15,0 0 2 16,0-13 18-16,0-15-8 16,0-12-25-16,10-11-3 15,11-8 2-15,6-7-8 16,-2 8 7-16,0 7-6 15,-5 19-11-15,-5 14 9 0,-9 11 5 16,-5 7 5-16,-1 0-2 16,0 7-4-16,-9 20 5 15,-8 13 1-15,-3 6 16 16,4 0 8-16,5 0-18 16,7 0-5-16,4-7 3 15,0-2 1-15,16-6-3 16,3-8-2-16,3-5-21 15,3-8-16-15,2-8-19 16,1-2 0-16,0 0-16 16,-1-18-2-16,-4-9 54 0,-2-2 17 15,-7-5 3-15,-6 1 5 16,-5 7 51-16,-3 7 6 16,0 10 0-16,0 9 6 15,-6 0-9-15,-7 16-57 16,-1 10-1-16,-1 3 2 15,9 1-3-15,3-5 0 16,3-4 10-16,0-5-10 16,5-8 2-16,9-3 4 15,3-4-5-15,4-1 14 16,1 0-14-16,-1-9-1 16,3-5-26-16,0 3-61 15,-6 4-65-15,-5 2-232 16</inkml:trace>
+  <inkml:trace contextRef="#ctx0" brushRef="#br0" timeOffset="59220.91">10430 5064 20 0,'0'0'62'16,"0"0"-28"-16,0 0-2 16,0 0 6-16,0 0 19 15,0 0-30-15,0-10 5 16,0 9 13-16,0 0-23 15,0-1-4-15,0 1 8 16,0 0-17-16,0 1 15 16,-2-2-2-16,-5-1 6 15,-2 3 2-15,-3 0-28 16,-3 0 10-16,0 0 2 0,-1 0-13 16,2 0 17-1,-1 9-5-15,5 0-6 0,1 9-6 16,0 5-1-16,6 7 0 15,3 4-2-15,2 3 2 16,17-3 0-16,3-1 4 16,-1-3-3-16,-3-2 5 15,-4-6-6-15,-6 0 0 16,-3-7 0-16,-5-7 1 16,0-3-1-16,0-5 4 15,0 0 5-15,-2 0 19 16,-11 0 4-16,1 0-12 0,4 0 0 15,1-11-8-15,6-6 11 16,1-12-3-16,0 2-11 16,19-7-9-16,8 4-1 15,3 5-31-15,4 1-43 16,-1-1-64-16,-5 6-283 16</inkml:trace>
+  <inkml:trace contextRef="#ctx0" brushRef="#br0" timeOffset="59573.17">10709 5082 342 0,'0'0'117'0,"0"0"-76"15,0 0 8-15,-82 49-1 16,61-20 13-16,6 5-40 15,6 3-12-15,2-2-1 16,5-4-4-16,2-4 0 16,0-6 0-16,2-8-1 15,8-5-3-15,0-6 6 16,1-2 3-16,8 0 11 16,3-19-10-16,-2-6-1 15,-2-5-6-15,-3 1 2 16,-5-2-6-16,-4-1 5 15,-3-2-4-15,-3 3 0 0,0 8 1 16,0 6-2-16,-6 8-22 16,-7 9-36-16,4 0-58 15,0 20-136-15</inkml:trace>
+  <inkml:trace contextRef="#ctx0" brushRef="#br0" timeOffset="59771.9">10943 5289 154 0,'0'0'127'0,"0"0"-49"0,0 0-14 16,3 90 1-16,-3-69-32 15,-4-3-19-15,-1-1-14 16,-1-5-17-16,3-11-145 15</inkml:trace>
+  <inkml:trace contextRef="#ctx0" brushRef="#br0" timeOffset="59919.25">10786 5042 442 0,'0'0'76'0,"0"0"-73"15,0 0-2 1,0 0-1-16,33 84-188 0</inkml:trace>
+  <inkml:trace contextRef="#ctx0" brushRef="#br0" timeOffset="60077.53">10982 5599 545 0,'0'0'94'16,"0"0"-55"-16,0 0-3 16,0 0-14-16,0 0-22 0,0 0-74 15,13-10-313 1</inkml:trace>
+  <inkml:trace contextRef="#ctx0" brushRef="#br0" timeOffset="60631.81">10355 6052 214 0,'0'0'98'16,"0"0"20"-16,118-32-59 15,-79 22-13-15,-8 0-7 16,-4 4-14-16,-12 3-4 15,-8 0 5-15,-5 3-3 16,-2 5-6-16,-3 25-8 16,-19 17 8-16,-8 16 42 15,0 1-36-15,3 3-17 16,7-1-5-16,10-5-1 16,6-8-28-16,4-9-27 15,0-14-15-15,0-13-79 16,1-16-249-16</inkml:trace>
+  <inkml:trace contextRef="#ctx0" brushRef="#br0" timeOffset="60751.87">10437 6306 293 0,'0'0'141'15,"0"0"-49"-15,0 0-11 16,6-84-28-16,18 67-21 16,16 1-29-16,6 2-3 15,4 2-7-15,-1 2-172 16</inkml:trace>
+  <inkml:trace contextRef="#ctx0" brushRef="#br0" timeOffset="60982.97">10755 6200 422 0,'0'0'79'0,"0"0"-28"16,-37 84-6-16,31-47 14 15,6 0-22-15,0-3-26 16,4-8-4-16,14-11-6 15,3-12 6-15,1-3 16 16,1-13 23-16,-1-15 1 16,-4-6-27-16,0-6-13 15,-6 3-7-15,-8 0 0 16,-4 0-29-16,0 6-40 16,-15 7-24-16,-10 10-146 15</inkml:trace>
+  <inkml:trace contextRef="#ctx0" brushRef="#br0" timeOffset="62321.75">10622 8422 182 0,'0'0'176'16,"0"0"-62"-16,0 0-78 16,0 0-22-16,0 0 10 15,0 0-11-15,-83 17 5 16,71-2-8-16,4-2-2 16,1-5-2-16,7-2-6 15,0-4 3-15,0-2 2 16,3 0-5-16,12 0 0 0,-2 0 8 15,2-4-8-15,-4 0 1 16,-5 1 8-16,-1 3 2 16,1 0 0-16,2 5-9 15,-4 15 5-15,-2 5 0 16,-2 4 1-16,0 1 19 16,-8-1-17-16,-9 0 10 15,-3-4-2-15,-1-2-9 16,2-8 1-16,4-5-9 15,4-3-1-15,6-5 1 16,3-2-2-16,2 0-55 16,0 0-3-16,13-10-39 0,11-12-226 15</inkml:trace>
+  <inkml:trace contextRef="#ctx0" brushRef="#br0" timeOffset="62618.92">10731 8520 324 0,'0'0'139'0,"0"0"-68"16,0 0-52-16,-39 106 2 16,33-74 23-16,6-3-9 15,0-6-14-15,0-3-16 16,11-5 0-16,2-7 4 16,1-7-9-16,2-1 16 15,1 0 8-15,2-18-16 16,-4-8-2-16,4-8-3 15,-7-5-3-15,-3-3 4 0,-6 0-4 16,-3 6 15-16,-3 6 21 16,-15 10-10-16,-4 7-20 15,4 10-6-15,-3 3-1 16,3 0-5-16,3 3-32 16,11 11-42-16,4-1-42 15,3-5-117-15</inkml:trace>
+  <inkml:trace contextRef="#ctx0" brushRef="#br0" timeOffset="62813.67">11165 8571 283 0,'0'0'149'0,"0"0"-83"15,0 0-13-15,8 103 10 16,-20-74-5-16,-2-2-26 15,2-3-24-15,1-1-2 16,0-8-6-16,6-5-11 16,1-8-62-16,0-2-129 15</inkml:trace>
+  <inkml:trace contextRef="#ctx0" brushRef="#br0" timeOffset="62956.88">10985 8511 274 0,'0'0'149'16,"0"0"-149"-16,0 0-2 15,0 0-5-15,0 0-105 16</inkml:trace>
+  <inkml:trace contextRef="#ctx0" brushRef="#br0" timeOffset="63108.47">11389 8827 364 0,'0'0'129'0,"0"0"-111"16,0 0-18-16,0 0-18 16,0 0-314-16</inkml:trace>
+  <inkml:trace contextRef="#ctx0" brushRef="#br0" timeOffset="67091.64">15440 1284 311 0,'0'0'148'0,"0"0"-138"16,3 104 8-16,-3-40 33 15,0-4 8-15,0-2 1 16,0-2-37-16,0-2-8 16,-2-4-15-16,-2-5 0 0,1-5-18 15,0-7-69-15,0-9-47 16,-2-11-156-16</inkml:trace>
+  <inkml:trace contextRef="#ctx0" brushRef="#br0" timeOffset="67502.89">15456 1269 289 0,'0'0'128'0,"0"0"-63"16,100-66-40-16,-69 60-17 15,-5 6 3-15,-11 0 12 16,-7 0-23-16,-6 19 0 15,-2 12 2-15,-6 10 9 0,-19 8 6 16,-8 1-10-16,-6 1-1 16,0-2-6-16,7-2-26 15,11-4-14-15,15-2 13 16,6-6 16-16,22-1 11 16,11-1 4-16,4-1-4 15,-1-2 3-15,-8 2 0 16,-5-6-2-16,-14-1 5 15,-8-1 3-15,-1-5 33 16,0-4 1-16,-16-1 29 16,-11 0-1-16,-9 0-32 15,-1-1-16-15,-3-3-11 0,8-4-12 16,11-2 0-16,11-4-16 16,10 0-36-16,0 0-7 15,10 0-75-15,10 0-260 16</inkml:trace>
+  <inkml:trace contextRef="#ctx0" brushRef="#br0" timeOffset="68230.78">15972 1666 522 0,'0'0'124'0,"0"0"-40"0,0 0-66 15,0 0-1-15,-88 55-1 16,73-23-8-16,8-2-8 16,5-1 5-16,2-10-5 15,0-2 0-15,0-8-2 16,8-6-6-16,8-3-28 16,-1 0 20-16,5-2-27 15,-5-16-7-15,-1 1 13 16,-6 2 35-16,-4 8 2 15,-4 2 18-15,0 5 15 16,0 0 6-16,3 0-37 16,1 9 2-16,3 5 1 0,-3-2 0 15,2-3 6 1,2-1-11-16,-2-6 1 0,-1-1 5 16,0-1-5-16,4 0 6 15,3-6 22-15,10-11-28 16,7-6 1-16,7-2-2 15,2 4-9-15,-2 7 8 16,-2 8-5-16,-5 6 6 16,-8 0 14-16,-2 13 3 15,-7 3-3-15,-5 5-4 16,-5-1-1-16,-2 2-3 16,-2-1-6-16,-14-1 3 15,1-3 4-15,2-4-5 16,7-5 3-16,3 1-5 15,3-5-6-15,0 3-6 0,0-3-8 16,13-1 20-16,11-3-5 16,9 0 10-16,6-4 0 15,7-16-2-15,10-8-3 16,4-6 3-16,-2-2-3 16,-10 1 0-16,-15 3 6 15,-15 11-6-15,-12 11 38 16,-3 6 17-16,-3 4-26 15,0 4-29-15,0 16-10 16,-9 6 10-16,3 3 3 16,6-1-3-16,0 0-4 15,10-2-29-15,20 1 7 0,14-1 3 16,12-5-39-16,8-5-70 16,2-7-350-16</inkml:trace>
+  <inkml:trace contextRef="#ctx0" brushRef="#br0" timeOffset="68650.83">17138 894 434 0,'-145'-132'59'15,"-31"5"21"-15,-35 9-44 16,-22 25-11-16,-11 40 23 15,-4 47 33-15,8 47-44 0,6 72 24 16,10 41-44-16,17 32-15 16,30 17-2-16,46 0 0 15,60-9 2-15,62-8-2 16,41-19-18-16,64-19 11 16,40-10-16-16,43-22 14 15,42-26-19-15,38-22 3 16,28-27 2-16,9-27-54 15,-7-14 11-15,-15-33 33 16,-26-24 33-16,-29-20 34 16,-32-12 2-16,-37-13-2 0,-35-19-19 15,-37-13-3 1,-35-10 22-16,-34-12 12 0,-12 5-37 16,-42 4-9-16,-26 16-2 15,-31 22-9-15,-30 25-17 16,-25 33-40-16,-17 31-50 15,-4 20-137-15</inkml:trace>
+  <inkml:trace contextRef="#ctx0" brushRef="#br0" timeOffset="72603.72">17946 4213 88 0,'0'0'40'0,"0"0"-19"16,0 0-17-16,0 0 4 16,0 0 16-16,0 0-2 0,18 9 39 15,-18-8-10-15,0 8-38 16,0 5 17-16,0 3-10 16,-9 8 45-16,-2 0-30 15,1 3-28-15,3-1 16 16,1 3-23-16,3 1 2 15,1-1 13-15,2 1-6 16,0-2-9-16,0 4 10 16,0 2-6-16,0 5 10 15,0 8-14-15,0 6 0 16,0 2 4-16,0 2-2 16,0 1-2-16,-4 6 0 15,-6 7 9-15,-1 7-13 0,0 0 4 16,1-3 0-16,4-1 0 15,3-3 8-15,3 3-8 16,0 2 1-16,0 1 12 16,3 2-13-16,9 2 4 15,3 1 1-15,-4 3 5 16,-1 3-4-16,-4 2-6 16,-2 5 0-16,-2 5 10 15,-2 0-10-15,0-1 0 16,0-7 0-16,0 1-5 15,0 0 10-15,0-1-5 16,0-2 0-16,0-3 7 0,0 2-12 16,1 2 5-1,7 2 0-15,0 9 3 0,0 2-3 16,0 3 0-16,-2 1-5 16,-2-6 15-16,3-1-11 15,-2 0 1-15,-1 2 0 16,-1-3-4-16,2 2 10 15,-2 3-6-15,3 0 3 16,0 11 12-16,-5 3-15 16,1 3 0-16,-2-2 0 15,0-2 2-15,0-5-2 16,1-1 0-16,2-5 1 16,2-3 13-16,1 0-14 15,1 0 0-15,4 6 5 16,-1 4-8-16,2 2 5 0,0 1-2 15,-3-2 5-15,3-4 9 16,-2 0-9-16,1-4-4 16,0-1 4-16,3 4 3 15,-3-3-7-15,0 13-1 16,0 5 0-16,-2 1 8 16,0 3-12-16,-2-8 4 15,-2-4 0-15,-1-2 0 16,1-5 0-16,-1-3 0 15,0 0-3-15,3 2 16 16,-1 7-13-16,0 1 0 16,1 1 2-16,-1 0-4 15,-2-8 2-15,2-5 0 0,-1 1-6 16,1-8 20-16,3-6-14 16,-3-4 0-16,0-6 2 15,1-3 3-15,2 0-1 16,-1 2-4-16,-1-4 0 15,1-1 16-15,3-6-16 16,-2-11 0-16,2-3 8 16,-1-4-24-16,-2-5 16 15,-2 1 0-15,0-8 1 16,1-9 10-16,-3-5-11 16,0-8 0-16,-1-6 8 0,0-5-12 15,-3-3 4 1,0-5 0-16,0 0 0 0,0 0 6 15,0 0-15-15,0 0 9 16,0 0 0-16,0 0-19 16,0 0 6-16,0 0 9 15,0 0-7-15,0 0 3 16,0 0-10-16,0-5-64 16,0-9-188-16</inkml:trace>
+  <inkml:trace contextRef="#ctx0" brushRef="#br0" timeOffset="97209.92">3595 6289 226 0,'0'0'121'16,"0"0"-77"-16,0 0 4 15,0 0 0-15,0 0 9 16,0 0-38-16,0 0-19 16,0 0 0-16,30 99 24 15,-18-43-14-15,-1-1 8 16,-1-7-11-16,-3-3-4 15,1-3-1-15,-5-5 5 16,4-2-4-16,-4-5-6 16,-3-4-6-16,3-6-47 15,5-11-10-15,-1-9-104 16,5 0-122-16</inkml:trace>
+  <inkml:trace contextRef="#ctx0" brushRef="#br0" timeOffset="97636.97">3889 6129 201 0,'0'0'126'16,"0"0"-70"-16,0 0-55 0,0 0 15 15,0 0 52-15,-28 96 24 16,10-42-49-16,-3 1-18 16,7 7-11-16,3 3 0 15,5 2-5-15,4-3 1 16,2-2-5-16,0-8 0 16,8-5-5-16,6-6-3 15,0-10-26-15,5-10-11 16,-2-13 12-16,2-10 10 15,2-4 18-15,-3-20 14 16,3-8-14-16,-6-4-7 16,-8 2 5-16,-4 2 4 15,-3 4 14-15,0 2 8 16,-10 7-17-16,-2 5-7 16,-6 5 0-16,0 9-10 0,-3 1-40 15,-1 21 1-15,8 4-71 16,1 0-83-16</inkml:trace>
+  <inkml:trace contextRef="#ctx0" brushRef="#br0" timeOffset="98914.4">13772 4138 51 0,'0'0'92'16,"0"0"-46"-16,0 0-3 16,-27 104 29-16,22-75-43 15,2-1 15-15,3-4 2 16,0 8-32-16,0 0 10 15,5 8-24-15,13 4-13 16,-3-1-118-16</inkml:trace>
+  <inkml:trace contextRef="#ctx0" brushRef="#br0" timeOffset="100105.75">13097 13587 129 0,'0'0'125'16,"0"0"11"-16,0 0-74 15,0 0-38-15,0 0 11 16,0 0-35-16,-68-7-5 15,26 31 5-15,-4 6 20 0,2 5-8 16,3 2 2 0,6 0-12-16,7-2 29 0,10 0-29 15,12-5-1-15,6-1-1 16,9 0-9-16,19-1 9 16,2 1 3-16,-2 1 5 15,-6-3-4-15,-9-3-4 16,-9-7 0-16,-4-2-2 15,0 3 11-15,-19 0-1 16,-5-3 12-16,-6-1-12 16,3-3 10-16,2-2-18 15,13-3 0-15,5-3-4 16,7-2-64-16,3-1-37 16,22 0-46-16,9-13-113 15</inkml:trace>
+  <inkml:trace contextRef="#ctx0" brushRef="#br0" timeOffset="100401.04">13224 13840 456 0,'0'0'58'0,"0"0"-56"16,-51 96 4-16,34-60 0 15,6 1-6-15,8-3 0 16,3-6-2-16,1-5 1 0,15-9 0 15,4-8 1 1,1-6 0-16,-1 0 15 0,2-17-13 16,-4-10 3-16,-6-4 19 15,-8-7-17-15,-4 2 54 16,-1 3 7-16,-23 6-44 16,-4 8-14-16,-5 7-10 15,5 6-4-15,5-1 4 16,10 4-87-16,13 0-10 15,1-1-141-15</inkml:trace>
+  <inkml:trace contextRef="#ctx0" brushRef="#br0" timeOffset="100675.6">13507 13733 526 0,'0'0'55'0,"0"0"-37"0,0 0-13 15,0 0-3-15,-83 104 7 16,75-73-8-16,3 2-1 16,5 2 0-16,0-3 9 15,0-14-21-15,11-10 1 16,6-8 11-16,2-12 11 16,4-20-9-16,-4-13 7 15,-4-6 9-15,-7-1-10 16,-8 2 6-16,0 2 6 15,-10 8-16-15,-12 6-8 16,-6 22-78-16,-5 12-27 0,-4 3-185 16</inkml:trace>
+  <inkml:trace contextRef="#ctx0" brushRef="#br0" timeOffset="109742.99">16421 15309 11 0,'0'0'73'16,"0"0"-41"-16,0 0 19 16,0 0 26-16,0 0 11 15,0 0-4-15,7-82-4 16,-7 82-22-16,0 0-18 0,0 7-40 16,-2 25 0-16,-9 17 26 15,-2 14-4-15,-3 0 22 16,0 3-29-16,2-3-12 15,3-1 11-15,3-8-11 16,5-6-3-16,3-9 1 16,0-8 3-16,0-5-4 15,13-9 0-15,3-5-20 16,8-8 9-16,6-4-43 16,3 0-24-16,3-8-53 15,-5-16-144-15</inkml:trace>
+  <inkml:trace contextRef="#ctx0" brushRef="#br0" timeOffset="110229.61">16603 15859 14 0,'0'0'65'0,"0"0"-59"0,0 0 37 16,0 0 15-16,0 0-21 15,41-80 15-15,-34 60-38 16,-3-1 36-16,-4 5 20 16,0 8-21-16,0 0 14 15,0 8-12-15,0 0-23 16,-10 5-5-16,-3 18 0 15,-5 8 3-15,4 3-8 0,5-3-8 16,5 0-13 0,4-5 3-16,0-2-8 0,0-5-3 15,12-6-45-15,9-11-17 16,8-2 11-16,9-12-44 16,7-22-111-16</inkml:trace>
+  <inkml:trace contextRef="#ctx0" brushRef="#br0" timeOffset="110621.56">16957 15474 279 0,'0'0'177'16,"0"0"-85"-16,0 0-57 15,0 0-23-15,-42 125 53 16,21-55-31-16,3 3-22 16,2-1-4-16,6-2-8 15,2-4-12-15,2-9 11 0,0-10-82 16,2-19-4-16,1-14-31 15,-3-14-14-15,0 0 132 16,0-14 37-16,-1-6-34 16,5 3 15-16,2 3 13 15,0 0 26-15,0 1-1 16,10-8-45-16,17-4 3 16,12-10-9-16,7-8-4 15,2-4-2-15,-2-9-13 16,-3-6-10-16,-5-3 15 15,-7 8 9-15,-7 13 12 16,-12 18 23-16,-6 19 15 0,-6 7 25 16,0 30-60-16,0 17 5 15,0 12 34-15,0 3-49 16,0-6 11-16,0-6-16 16,7-8-10-16,16-11-85 15,10-11-347-15</inkml:trace>
+  <inkml:trace contextRef="#ctx0" brushRef="#br0" timeOffset="111872.07">1870 16207 117 0,'0'0'120'0,"44"123"-43"16,-20-44-25-16,-8 3-40 16,2 1-11-16,-9-8 21 15,0-8-20-15,-3-20 10 16,-3-14-5-16,0-14 1 15,-2-15 4-15,-1-4-11 0,0 0 65 16,0-24 33 0,-13-17-41-16,-8-23-53 0,-4-24-4 15,1-13 6-15,7-5-4 16,-2-3-3-16,7 7 3 16,6 16-19-16,4 14-10 15,2 19 6-15,8 27 20 16,19 16-20-16,1 10 20 15,8 12 0-15,-2 18-9 16,-4 7-3-16,-10 2 12 16,-10 4 0-16,-7-3 20 15,-3 2-8-15,-3-3 1 16,-7-2-11-16,2-7 7 16,5-5-9-16,3-4-125 15,6-4-41-15,18-9-81 0</inkml:trace>
+  <inkml:trace contextRef="#ctx0" brushRef="#br0" timeOffset="112233.02">2348 16131 480 0,'0'0'114'0,"0"0"-90"15,0 0-24-15,0 0-2 16,-82 98 2-16,70-47 0 15,12-4 0-15,0-8-10 16,3-14 4-16,15-15-24 0,0-10 4 16,4-7 26-16,2-28 18 15,1-13 22-15,-5-13-22 16,-7-7 21-16,-5-2-38 16,-8-6 6-16,0 1-2 15,-17 3 1-15,-1 10 15 16,-1 16-10-16,4 22 27 15,9 18 30-15,3 6-32 16,-1 15-36-16,2 24-8 16,2 18 8-16,0 11 1 15,7-2-1-15,13-3-5 16,8-4 5-16,5-9-90 16,7-9-22-16,-1-14-61 0</inkml:trace>
+  <inkml:trace contextRef="#ctx0" brushRef="#br0" timeOffset="112371.65">2733 16168 565 0,'0'0'66'16,"0"0"-61"-16,0 0-4 16,0 0-1-16,0 0-112 15,0 0-357-15</inkml:trace>
+  <inkml:trace contextRef="#ctx0" brushRef="#br0" timeOffset="112876.4">3022 16054 492 0,'0'0'17'16,"0"0"2"-16,0 0-19 15,0 0 0-15,0 0 6 16,11 80 4-16,-11-80-10 16,0 0 30-16,0-11 70 15,-6-16-75-15,3-7-23 16,3 3 4-16,0 4-6 16,0 6 7-16,3 8-6 15,10 11-1-15,7 2 4 0,2 5-11 16,2 19-1-16,-6 5 8 15,-3 4 2-15,-9 4 3 16,-3-3 0-16,-3-4-5 16,0-10 0-16,0-12 0 15,1-8 15-15,-1 0-15 16,0-7 23-16,0-19-4 16,0-10-15-16,2-5-3 15,1-4 10-15,5 0-22 16,0 4 5-16,7 7 6 15,1 10-1-15,2 8 7 16,-1 8 21-16,5 5-6 0,2 3-21 16,3 0 5-1,0 1-4-15,-2 12-1 0,3 0 5 16,-1-1 2-16,0 0-10 16,-2 1 3-16,-5 2-63 15,1-2-40-15,-6-6-202 16</inkml:trace>
+  <inkml:trace contextRef="#ctx0" brushRef="#br0" timeOffset="113057.47">3501 15724 540 0,'0'0'174'16,"0"0"-108"-16,0 0-60 0,0 0-6 15,-10 84 25-15,17-36-2 16,8-3-19-16,1-3-2 15,1-7-4-15,4-7-73 16,-3-8-49-16,4-15 1 16,-3-5-155-16</inkml:trace>
+  <inkml:trace contextRef="#ctx0" brushRef="#br0" timeOffset="113267.2">3756 15739 282 0,'0'0'176'0,"0"0"-62"15,0 0-29-15,0 0-48 0,0 0-25 16,0 0 11 0,81 10-23-16,-75 4 0 0,-2-4 9 15,-2-6-6-15,-1-2 8 16,-1-2-10-16,0 0 8 16,0 0 29-16,3-6-35 15,5-8-3-15,2-1-79 16,11 3-30-16,0 2-52 15</inkml:trace>
+  <inkml:trace contextRef="#ctx0" brushRef="#br0" timeOffset="113605.86">4220 15552 448 0,'0'0'135'15,"0"0"-79"-15,0 0-9 0,0 0-18 16,-91 56-3-16,84-31-26 15,4-3 6-15,3-4-12 16,0-8 6-16,0-5-15 16,3-5-7-16,7 0-11 15,2 0 18-15,0 0 5 16,-1 0 10-16,2 0-1 16,-4 7 1-16,7 20-2 15,-4 12 2-15,2 8 13 16,5 12 25-16,-3 5-14 15,1 11 2-15,-5 11 7 16,-8 6-16-16,-4 3-5 0,-16-11-4 16,-9-18 2-16,-2-20-8 15,13-21 1-15,2-20-3 16,2-5 0-16,4-33-65 16,6-17-81-16</inkml:trace>
+  <inkml:trace contextRef="#ctx0" brushRef="#br0" timeOffset="113883.38">4620 14655 637 0,'0'0'26'0,"-52"116"-3"16,21 8 12-16,-2 35 19 16,13 13 15-16,7 0-36 15,13-11-13-15,0-23 23 16,25-19-38-16,14-18-5 16,13-6 0-16,11-8-15 15,16-2-86-15,-3-5-46 16,-4-19-218-16</inkml:trace>
+  <inkml:trace contextRef="#ctx0" brushRef="#br0" timeOffset="115382.9">5296 15005 333 0,'0'0'35'0,"0"0"21"16,12 99 9-16,-9-56-23 15,0-3-18-15,-3-3-9 16,0-7-3-16,0-12-9 15,0-9-1-15,1-8 6 16,-1-1-6-16,2 0 12 0,-2-9 5 16,0-19 10-1,0-10-16-15,0-11-11 0,0-5-2 16,0 2 0 0,0-5-38-16,-6-2 11 0,3 0 3 15,3 2-2-15,0 10 22 16,0 10-11-16,0 16 15 15,0 10 0-15,0 8-4 16,0 3-4-16,3 7 8 16,3 19-26-16,-5 14 23 15,-1 8-13-15,0 7 16 16,-8 6 28-16,-6-4-27 16,6-1 21-16,1-7-22 15,7-5 1-15,0-5-4 16,6-6 3-16,12-4 0 0,6-4 10 15,0-2-10-15,-2-7 24 16,-4-5-21-16,0-1 17 16,-9-2-13-16,-3-2-7 15,-5 2 5-15,-1 2-10 16,0 5 15-16,0 0-20 16,0 2 3-16,-3-3-46 15,0-3-27-15,3-7-74 16,0-4-81-16</inkml:trace>
+  <inkml:trace contextRef="#ctx0" brushRef="#br0" timeOffset="115631.08">5723 15044 546 0,'0'0'119'16,"0"0"-68"-16,0 0-45 15,-96 35-3-15,69-14-3 16,10 3 7-16,9 2-16 16,8-6 2-16,0-3-1 15,0-4 8-15,3-6-14 16,6-4 8-16,1-3-2 0,-1 0-3 16,-1 0 9-1,5-10-14-15,-1-6-74 0,-9 1-189 16</inkml:trace>
+  <inkml:trace contextRef="#ctx0" brushRef="#br0" timeOffset="116261.03">5326 14871 334 0,'0'0'167'0,"0"0"-101"0,0 0-47 16,0 0-17-16,-5 141 45 15,2-59 26-15,0 8-55 16,2 2 13-16,-2-10-19 15,0-15-6-15,3-22-6 16,0-20 0-16,0-13 0 16,0-10 2-16,0-2 6 15,0 0 1-15,6-21 22 16,10-24 9-16,5-20-19 16,-3-15-21-16,-3-4 0 0,-9-3-5 15,0 2-4 1,-6 4-9-16,0 9-14 0,0 22-4 15,3 18 21-15,-1 19-7 16,6 13 15-16,7 17 5 16,11 31-35-16,8 25 37 15,5 17 0-15,2 6 3 16,-3-1-7-16,-2-16 4 16,-5-21-6-16,-3-21 6 15,-7-17-2-15,-9-12 0 16,-7-4 2-16,-4-3 0 15,-1-1 20-15,0 0 28 0,-4-12 27 16,-17-14-37 0,-5-6-27-16,-12 1 25 0,-12 2-21 15,-8 7-13-15,-3 9-4 16,4 9-2-16,12 4-16 16,10 0-1-16,18 0-58 15,13 3-25-15,4-2-38 16,12-1-224-16</inkml:trace>
+  <inkml:trace contextRef="#ctx0" brushRef="#br0" timeOffset="116486.61">5984 14592 606 0,'0'0'15'0,"0"100"80"16,0-28-44-16,-5-2-16 16,-2 0-13-16,4-8-19 15,3-12 4-15,0-1-7 16,10-10-3-16,13-7-48 16,3-13-79-16,3-15-60 15</inkml:trace>
+  <inkml:trace contextRef="#ctx0" brushRef="#br0" timeOffset="116702.79">6202 14663 437 0,'0'0'126'0,"0"85"-90"15,0-18 14-15,0 2 11 16,0-7-31-16,-5-7-2 15,2-4 1-15,3-7-25 16,0-4 6-16,8-7-10 16,8 0-6-16,6-8-54 15,-2-8-106-15,-1-9-222 16</inkml:trace>
+  <inkml:trace contextRef="#ctx0" brushRef="#br0" timeOffset="118047.87">6995 15088 43 0,'0'0'111'0,"0"0"-26"15,0 0-10-15,0 0 26 16,0 0-46-16,0 0-9 15,35-33-28-15,-35 33 14 16,0 0-18-16,0 0-14 16,0 3-1-16,0 5-3 15,0-1 4-15,0-1 6 16,0-4-6-16,0-1 0 16,0 0 20-16,0-1-19 15,0 0 8-15,0 0-7 0,0 0 0 16,0 0 6-16,0 0-4 15,0-8-4-15,0-5 0 16,0-1-23-16,0 3 20 16,11 1-5-16,8 7 8 15,4 3 0-15,-2 10 9 16,-1 21-2-16,-1 5 27 16,-5 4-22-16,-4 2 28 15,-6-1-19-15,-4 0-1 16,0-4 15-16,-6-1-27 15,-10 4-6-15,-8 5-2 16,-4 7-48-16,-3-2-150 0</inkml:trace>
+  <inkml:trace contextRef="#ctx0" brushRef="#br0" timeOffset="122596.6">7814 14127 68 0,'0'0'2'16,"0"0"1"-16,0 0-3 16,0 0 3-16,0 0 3 15,0 0 19-15,0 0 16 16,0 0 21-16,78 73-5 16,-84-37-1-16,-6 3-19 15,2 4-33-15,1 4-4 16,4-2 2-16,2-3-2 15,3-4 0-15,0-7-6 16,0-5 6-16,0-7 3 0,0-4-1 16,3-5-4-1,0-3 2-15,-1-4-12 0,2-2-58 16,-2-1-14-16,-2 0-72 16</inkml:trace>
+  <inkml:trace contextRef="#ctx0" brushRef="#br0" timeOffset="123654.95">7773 14246 156 0,'0'0'156'0,"0"0"-41"16,0 0-62-16,0 0-30 15,22-87 30-15,-7 68-35 16,0 2 0-16,1 2-6 15,-1 3-2-15,-3 0-7 16,0 8-3-16,0-2 6 0,-6 5-14 16,-2 1 8-16,-2 0-1 15,-1 0-3-15,2 0 5 16,0 0-8-16,3 11 7 16,0 2-1-16,3 1-8 15,2 1 5-15,-2-2 0 16,-2 0-5-16,0-2-16 15,-4 3 8-15,-3 4 7 16,0 1-7-16,0 5 17 16,0 1 10-16,-4-4-10 15,-3 2 20-15,1-2-17 16,1 3 1-16,1 7-2 0,-4 4 2 16,-2 2 18-16,1 3-16 15,-2-2-4-15,-2-5 6 16,1-1 7-16,3-3-5 15,-1-6-6-15,2-2 6 16,2-5 1-16,3-9-7 16,0 0 6-16,3-4-10 15,0-3 9-15,0 0-15 16,0 0 6-16,8 0 0 16,10 0 28-16,9-16-13 15,4-2-6-15,3-8-9 16,5 1-20-16,-2-2-93 15,-4 1-59-15,-5 4-189 0</inkml:trace>
+  <inkml:trace contextRef="#ctx0" brushRef="#br0" timeOffset="123984.61">8281 14182 28 0,'0'0'549'16,"0"0"-466"-16,0 0-80 16,0 0 28-16,-56 113-6 15,45-71 20-15,5 0-31 16,6-3-13-16,0-2 4 16,3-3-5-16,12-7 0 0,0-7 2 15,-3-8-2-15,3-8-3 16,-2-4-43-16,1-9 46 15,4-25 18-15,-5-7-17 16,-1-4 1-16,-12-2 8 16,0 2-6-16,-10 0 13 15,-16 7-4-15,-8 5-10 16,0 13-6-16,-1 9-26 16,3 11-72-16,3 0-92 15</inkml:trace>
+  <inkml:trace contextRef="#ctx0" brushRef="#br0" timeOffset="124299.21">8495 14029 319 0,'0'0'136'0,"0"0"-64"15,100-35-55-15,-63 35 42 16,-7 0-19-16,-8 1-40 16,-10 18 27-16,-3 4-11 15,-6 10 14-15,-3 6 22 16,0 2-34-16,0 2 0 0,0-2-3 16,0-7-14-16,0-5 10 15,0-6-11-15,0-11 0 16,0-4-3-16,6-7-1 15,12-1-33-15,1-3-21 16,4-17-60-16,-1-4-188 16</inkml:trace>
+  <inkml:trace contextRef="#ctx0" brushRef="#br0" timeOffset="124562.52">9063 13926 328 0,'0'0'117'16,"0"0"-96"-16,0 0-9 16,0 0 85-16,0 0 8 15,0 0-62-15,2 100-3 16,-2-67-12-16,0 2-26 16,0-3 11-16,0 5-13 15,4-5 3-15,5-3-4 16,0-5 6-16,3-4-5 15,1-9 0-15,4-7-42 16,5-4-5-16,8-12-28 16,9-17-80-16,10-15-216 15</inkml:trace>
+  <inkml:trace contextRef="#ctx0" brushRef="#br0" timeOffset="124804.43">9699 13362 288 0,'0'0'64'16,"125"139"36"-16,-61-56-23 16,-16 1-18-16,-20-2-15 15,-13-3 14-15,-12-7-34 16,-3-2-12-16,0-4-1 15,-12-2-7-15,-7-6-8 16,-3-6-12-16,-4-10-130 0,-4-9-286 16</inkml:trace>
+  <inkml:trace contextRef="#ctx0" brushRef="#br0" timeOffset="170565">14570 4463 11 0,'0'0'30'0,"0"0"4"16,0 0 0-16,0 0-5 0,0 0 11 15,0 0-29 1,0 0 16-16,0 0-1 0,0-44 7 16,0 39 5-16,0 3-20 15,0 1 2-15,-2-2 11 16,1 3-19-16,-1-1-11 16,2 1-1-16,-1 0 0 15,1 0 0-15,0 0 5 16,0 0-5-16,0 0 0 15,0 0 4-15,0 0-7 16,0 0 3-16,0 0 0 16,0 0 8-16,0 0-7 15,0 0 16-15,0 0 12 16,0 0-7-16,0 0-5 0,0 0-17 16,0 0 0-16,-2 0-7 15,1 14 12-15,-1 0-5 16,1 1 2-16,-1 3 5 15,-1-2-4-15,-1 3-3 16,4-1-38-16,0 2-26 16,0-5-96-16,0-5-82 15</inkml:trace>
+  <inkml:trace contextRef="#ctx0" brushRef="#br0" timeOffset="171095.64">14597 5173 63 0,'0'0'75'0,"0"0"-14"16,0 0-32-16,0 0 47 16,52 86-10-16,-52-68 30 15,0-1-38-15,0 3-24 16,0-3 25-16,-6-1-28 15,2-3-13-15,-1 0 12 0,4-4-30 16,1-1 7-16,0-3-7 16,0 0 7-16,20-3 2 15,21-2-9-15,18 0-24 16,10-3-103 0,-5-14-257-16</inkml:trace>
+  <inkml:trace contextRef="#ctx0" brushRef="#br0" timeOffset="172154.01">14388 13501 9 0,'0'0'76'15,"0"0"-16"-15,0 0 28 16,0 0 7-16,0 0-2 16,0 0-8-16,-3 17-76 15,-11-6 11-15,-3 4 5 16,-3-1-23-16,1 3 28 0,-1-1-27 16,7 7 11-16,4 0-8 15,9 5 9-15,0 7-14 16,18 6 4-16,6 4-4 15,2 3 8-15,-4-3-9 16,-2-8 0-16,-6-2 2 16,-5-11 9-16,-8-2-11 15,-1-5 11-15,-3-2-4 16,-24 4 38-16,-7 2-31 16,-9-3-8-16,10 0-2 15,8-8 5-15,11-2-18 16,10-5-27-16,4-3-71 15,3 0-21-15,23-24-256 0</inkml:trace>
+  <inkml:trace contextRef="#ctx0" brushRef="#br0" timeOffset="172432.31">14721 13783 452 0,'0'0'164'0,"0"0"-114"16,0 0-32-16,0 0-25 15,0 0 11-15,-38 97-4 16,34-61 0-16,4-2 6 16,0-4-6-16,4-10 0 15,10-9 1-15,3-8-5 0,2-3 6 16,0-5-2 0,0-17 0-16,-5-8 13 0,-8-5-13 15,-6-7 4-15,0 2 2 16,-12-2 10-16,-12 12-16 15,2 9 0-15,3 8 0 16,6 12-50-16,7 1-49 16,6 0-235-16</inkml:trace>
+  <inkml:trace contextRef="#ctx0" brushRef="#br0" timeOffset="172694.77">14976 13845 443 0,'0'0'23'0,"0"0"24"0,13 82-12 16,-1-49-23-16,3-3 11 15,6-5-20-15,6-13-3 16,3-12 15-16,2 0-14 16,1-26 20-16,-1-17-16 15,-4-12-3-15,-7-5 7 16,-12 0-9-16,-9 10 0 15,-9 8-1-15,-24 8-44 16,-10 0-68-16,-7 1-30 16,-5 4 17-16,-3-2 35 15,0 5-29-15</inkml:trace>
+  <inkml:trace contextRef="#ctx0" brushRef="#br0" timeOffset="175184.87">4884 9611 5 0,'0'0'99'0,"0"0"-29"16,0 0 42-16,0 0-52 16,-31-82 22-16,27 78-8 15,2 3-30-15,1 1-3 16,1 0-41-16,0 29 3 16,0 18-3-16,0 13 37 15,0 4-1-15,1-1-20 16,5-4-15-16,-3-4-1 15,1-6 0-15,2-6 0 16,2-8-44-16,2-13-46 16,4-11-53-16,2-11-168 0</inkml:trace>
+  <inkml:trace contextRef="#ctx0" brushRef="#br0" timeOffset="175423.13">5108 9753 192 0,'0'0'230'0,"0"0"-170"16,0 0-41-16,-91 7 5 15,58 0 20-15,2 1 1 0,4-3-24 16,11 4 10 0,4 1-22-16,6 3-7 0,4 6-2 15,2-2 3-15,0 1-1 16,11 2 6-16,6-3-4 15,9 1-4-15,1-2-16 16,6-3-103-16,-1-3-112 16</inkml:trace>
+  <inkml:trace contextRef="#ctx0" brushRef="#br0" timeOffset="175709.94">5241 10073 178 0,'0'0'107'0,"0"0"-24"15,37-88 5-15,-27 53 15 16,-5 0-37-16,-2 2-6 16,-3 6-18-16,0 8-9 15,0 9 8-15,-3 8-21 16,-2 2-20-16,-6 10-8 15,-1 21 0-15,1 11 8 16,4 8 0-16,7-6-24 16,0-5-13-16,15-8-42 15,7-15-21-15,4-11-45 16,2-5-164-16</inkml:trace>
+  <inkml:trace contextRef="#ctx0" brushRef="#br0" timeOffset="176067.96">5463 9838 226 0,'0'0'157'0,"0"0"-71"16,0 0-55-16,0 0-29 16,0 0 90-16,6 97-43 15,-6-60-11-15,0-3-11 16,0-6-13-16,0-4 10 16,0-7-18-16,1-6-6 15,2-5 2-15,-1-2 0 16,1-4-4-16,0 0-4 15,0 0 6-15,5-11-4 0,3-11-11 16,6-3-28 0,2 1-12-16,-1 0-23 0,0 2 20 15,-2 8-18-15,-8 10 58 16,-4 4 15-16,-4 4 6 16,0 20 72-16,-14 8 37 15,-11 6-19-15,0 4-48 16,1 0-30-16,5-3-1 15,7 2-1-15,1 2-10 16,7 2-3-16,0 8 0 16,4 7-2-16,0 6-95 15,0-2-271-15</inkml:trace>
+  <inkml:trace contextRef="#ctx0" brushRef="#br0" timeOffset="176927.54">14292 14764 131 0,'0'0'121'0,"0"0"-20"0,0 0 0 15,0 0-6-15,0 0-84 16,0 0-11-16,-3 100 58 16,0-31-12-16,0 2-14 15,3 0-32-15,-1-5 0 16,1-8 0-16,0-8-2 15,0-18-23-15,0-13-59 16,10-14-36-16,14-5-32 16</inkml:trace>
+  <inkml:trace contextRef="#ctx0" brushRef="#br0" timeOffset="177135.59">14604 14842 263 0,'0'0'140'0,"0"0"-52"0,-95 4-71 16,50 13-1-16,2 3 11 16,7-3-11-16,12-2 34 15,14-1-42-15,8 2 6 16,2 5-14-16,5 0 2 16,23 7-11-16,8 2 6 15,4 7-77-15,0 2-56 16,-9-1-154-16</inkml:trace>
+  <inkml:trace contextRef="#ctx0" brushRef="#br0" timeOffset="177500.14">14642 15315 1 0,'0'0'79'0,"0"0"25"16,0 0-25-16,98-63-9 15,-67 20 3-15,-5-5 9 16,-7 1 23-16,-7 8-26 15,-6 6-40-15,-6 10 7 16,0 12-31-16,0 5-1 16,0 6-12-16,-3 0-2 15,-9 23 0-15,3 9-1 16,6 4-3-16,3-1-32 16,8-8-49-16,18-10-2 15,7-14 26-15,0-3 2 16,-2-3 43-16,-5-10 13 0,-10 6 3 15,-4 5 49-15,-9 2-6 16,-3 8-18-16,0 18 26 16,-6 14 23-16,-9 2-22 15,-3 4-40-15,0-3-6 16,3-1-2-16,2-2-4 16,4 0-31-16,7-5-34 15,2-5-51-15,0-11-219 16</inkml:trace>
+  <inkml:trace contextRef="#ctx0" brushRef="#br0" timeOffset="178062.71">14098 16151 583 0,'0'0'80'0,"0"0"-39"16,0 0-29-16,0 0-9 15,114-46 19-15,-35 29 28 16,12-2-49-16,9-3 5 15,-1 0-6-15,-12 2-17 16,-11 5-32-16,-19 9-117 16,-21 6-107-16,-24 0 10 15</inkml:trace>
+  <inkml:trace contextRef="#ctx0" brushRef="#br0" timeOffset="178237.7">14300 16198 148 0,'0'0'201'0,"-112"33"-62"0,91-24-50 15,15-2-74-15,6 2-15 16,18-5 0-16,28-3 14 16,26-1 67-16,25-2-79 15,18-20-2-15,10-8-7 16,-6-5-66-16,-11 0 41 16,-23 0-78-16,-28 5-69 15</inkml:trace>
+  <inkml:trace contextRef="#ctx0" brushRef="#br0" timeOffset="179091.92">4790 10878 279 0,'0'0'66'15,"0"0"-42"-15,0 0 27 16,128 18 29-16,-59-16-17 15,6-2-20-15,2 0-29 16,0 0 7-16,-3 0-20 0,-2 0 3 16,-7 0-8-16,-8 0-34 15,-15 0-44-15,-12-5-39 16,-22 1-164-16</inkml:trace>
+  <inkml:trace contextRef="#ctx0" brushRef="#br0" timeOffset="179285.83">4747 11130 317 0,'0'0'79'15,"0"0"-69"-15,0 0-9 16,106 43 110-16,-14-43-15 16,19-3-18-16,10-14-45 0,1-3-14 15,-6 1-15 1,-8-2-8-16,-10 2 1 0,-14 5-74 15,-14 1-48-15,-28 1-201 16</inkml:trace>
+  <inkml:trace contextRef="#ctx0" brushRef="#br0" timeOffset="193052.62">24845 7629 79 0,'0'0'151'16,"0"0"-79"-16,-27-80-3 16,18 55 5-16,2 2-30 15,1 3 41-15,1 9-16 16,4 8-31-16,1 3 4 16,0 23-42-16,1 23 0 15,11 21-1-15,3 9 1 16,-4 3 0-16,-5-1 0 15,1 1-4-15,0-8-29 16,2-10-57-16,3-16-52 0,0-22-114 16</inkml:trace>
+  <inkml:trace contextRef="#ctx0" brushRef="#br0" timeOffset="193344.8">25081 7696 417 0,'0'0'22'15,"-32"87"-8"-15,10-23-5 16,-1 2 9-16,10-5-18 16,9-4 3-16,4-7 27 0,0-7-27 15,8-10 0 1,6-12-3-16,4-13-3 0,4-8 3 15,7-8 19-15,-1-23-14 16,-4-7 10-16,-12-2-14 16,-12-4-1-16,-12 5 0 15,-33 10-22-15,-22 12 8 16,-12 9-112-16,-9 6-143 16</inkml:trace>
+  <inkml:trace contextRef="#ctx0" brushRef="#br0" timeOffset="203845.73">26395 722 138 0,'0'0'13'0,"-95"-53"15"16,32 28-4-16,-13-4-15 15,-9 1 59-15,-12 0-3 16,-11 3-23-16,-5 11 6 16,-2 14-38-16,-9 4-2 15,-8 39-5-15,-9 26 0 0,-7 19 5 16,7 25 4-16,16 12 14 15,14 22 10-15,11 20-31 16,10 15 44-16,10 11-14 16,22 4-34-16,31-3 31 15,27-4-32-15,52 4 0 16,42-10-8-16,39-11 16 16,34-10-9-16,21-28 1 15,14-18 0-15,12-30-5 16,6-32 6-16,8-37-1 15,10-26 0-15,4-56-15 0,3-38 15 16,-5-37 17 0,-12-24-10-16,-19-21-7 0,-18-7 2 15,-27-1-2-15,-26 7 11 16,-26 12-10-16,-26 8-2 16,-22 7 0-16,-23 0-47 15,-24 5 6-15,-17 10-16 16,-31 5 18-16,-36 15 22 15,-31 4 17-15,-32 2 1 16,-24 1 4-16,-16 5 0 16,-6 20 15-16,3 25-19 15,9 38-5-15,15 28-26 16,19 39-125-16,27 29-7 16</inkml:trace>
+  <inkml:trace contextRef="#ctx0" brushRef="#br0" timeOffset="204391.53">28063 377 331 0,'-133'-44'19'16,"-8"23"31"-16,-13 21-42 16,-12 30 11-16,-8 49-12 15,-10 37 12-15,2 37 34 16,6 26-37-16,18 23 10 15,30 12-11-15,42 11-6 16,49-1-8-16,37 0 11 16,51 9-10-16,43 6 3 15,30-3 3-15,36-27-12 16,32-35 4-16,26-39 0 16,19-41-6-16,5-28 16 0,1-35-10 15,-11-29 7 1,-11-17 23-16,-9-42-2 0,-16-27-11 15,-10-23-9-15,-11-20-16 16,-10-22 5-16,-12-18-27 16,-19-5 3-16,-21-4-34 15,-28-1 14-15,-31 1 6 16,-30-3-47-16,-24-6 73 16,-9 0-32-16,-38 10-9 15,-25 14 34-15,-31 16-6 16,-36 10-61-16,-30 13 47 15</inkml:trace>
+  <inkml:trace contextRef="#ctx0" brushRef="#br0" timeOffset="204863.06">27490 829 313 0,'0'0'64'15,"-112"37"-31"-15,40-6-20 16,-3 2 18-16,6-1-20 0,8 2 12 16,12-2-22-16,10-1 18 15,10 1-31-15,14-3 12 16,15-1-29-16,6-4-55 16,35-8-32-16,18-13-115 15</inkml:trace>
+  <inkml:trace contextRef="#ctx0" brushRef="#br0" timeOffset="205057.72">27553 1099 175 0,'0'0'156'16,"-118"72"-100"-16,34-16-6 16,-7 6-38-16,-1-5 17 0,4-7 28 15,6-7-22 1,10-5 1-16,13-5-36 0,20-5 0 15,21-8-3-15,18-3-18 16,34-11-94-16,41-6-21 16,28-4-142-16</inkml:trace>
+  <inkml:trace contextRef="#ctx0" brushRef="#br0" timeOffset="205237.71">27620 1563 376 0,'0'0'67'0,"-167"64"-42"0,75-26-5 16,-10 3-5 0,-3-1 29-16,4 3 40 0,16-4-57 15,27-10-13-15,29-6-14 16,29-7-13-16,29-4-43 16,47-10-46-16,33-2-71 15</inkml:trace>
+  <inkml:trace contextRef="#ctx0" brushRef="#br0" timeOffset="205412.31">27735 2019 201 0,'-85'35'152'0,"-9"-1"-68"16,-3 6-55-16,-3-4 27 0,0 5-30 16,4-2-13-1,18-7 3-15,25-8-16 0,25-6 0 16,28-4 0-16,12-5-101 15,40-6-30-15,20-3-89 16</inkml:trace>
+  <inkml:trace contextRef="#ctx0" brushRef="#br0" timeOffset="205533.1">27402 2384 22 0,'0'0'66'16,"-66"88"91"-16,0-32-63 16,-8-2-61-16,1-9 12 15,2-12-23-15,6-10 25 16,11-1-21-16,8-1-26 15,10 1-5-15,7-10-288 16</inkml:trace>
+  <inkml:trace contextRef="#ctx0" brushRef="#br0" timeOffset="-214533.96">19255 4032 118 0,'0'0'96'16,"0"0"-17"-16,0 0 10 15,0 0-21-15,0 0 16 16,0 0-15-16,0 0-23 16,-12-16 11-16,12 16-55 15,0 0 13-15,0 0-15 16,0 0-22-16,0 1 21 15,19 9-27-15,18 3 28 0,14-1 10 16,19 0-10 0,12-1-3-16,14-2 3 0,14-1-24 15,12 0 15-15,13-2-35 16,17-1 16-16,8-5 27 16,10 0-11-16,4 0 12 15,-2 0 0-15,5-5 2 16,1-3 3-16,-3 1-5 15,-6-3 0-15,-13 1 28 16,-16-1-22-16,-15 2 27 16,-16-1-31-16,-12 1 7 15,-10-2-4-15,-10 1-5 16,-5-2 0-16,-13-1 6 0,-11 1 2 16,-9 0-13-16,-18 4 5 15,-8 2 0-15,-8 3 5 16,-5 2-5-16,0 0 4 15,0 0-15-15,0 0 11 16,0 0 0-16,0 0-1 16,0 9-11-16,0 16-1 15,1 12 13-15,1 8 0 16,1 9-5-16,1 6 10 16,2 8-5-16,0 6 0 15,0-1 10-15,-3 2-14 16,0 3 4-16,0 4 0 15,0 3-2-15,0 4 2 16,0 10 0-16,-3 15 0 0,0 10 6 16,0 8-10-16,-9 4 4 15,0-4 0-15,3 2 5 16,4-4 7-16,2 1-12 16,0 4 4-16,11 12 8 15,6 7-14-15,0 4 2 16,1 3 0-16,-3-3 2 15,0-2 2-15,-1 0-4 16,-4 0 0-16,0 11 5 16,-2 4-12-16,-5 7 7 15,-2 1 0-15,-1-4-6 16,0-5 19-16,0-3-13 0,0 3 0 16,0 1 0-16,0 1-3 15,-1 0 3-15,-2-9 0 16,0-9-4-16,1-10 10 15,2-12 0-15,0 1-4 16,0-2-2-16,5-4 1 16,4-1-1-16,4-4 0 15,-1-4 2-15,2-5 2 16,1-1-4-16,-3-9 0 16,-2-2 5-16,-4-5-9 15,-5 0 4-15,-1 2 0 16,0 6-13-16,0 1 19 15,-9 1-6-15,-1-2 0 0,-3-5 7 16,-2-5-14 0,0 1 7-16,-4-7 0 0,0-4-2 15,-3 1 15-15,-2 0-13 16,-1 0 0-16,-2 1-2 16,6-2-9-16,3-1 11 15,9-1 0-15,6-9 0 16,3-5 7-16,0-1-7 15,0-5 0-15,8-2 7 16,2 2-13-16,4-5 6 16,-2-4 0-16,2-8-1 15,-1-8 4-15,0-3-3 16,-3-7 0-16,-1-5 12 16,0-6-18-16,0-2 6 0,-3-2 0 15,2 0-3-15,-1 4 8 16,-1 5-5-16,-2 3 0 15,-1 2 6-15,-1 0-12 16,-2 2 6-16,0-2 0 16,0-1-4-16,0-4 10 15,0 3-6-15,0 2 0 16,0 0 10-16,0 0-19 16,0 0 9-16,0-5 0 15,0-8-4-15,0-6 15 16,0 2-11-16,0-5 0 15,0 4 1-15,0 0-13 16,0 2 12-16,0 3 0 16,0 1-7-16,1-2 8 0,-1 1-2 15,0 1-2-15,0-3-2 16,0 2-9-16,0 0 14 16,0 0 0-16,0 2-7 15,0 4 7-15,0 2 0 16,0-3 0-16,0-3 6 15,0-4-19-15,0-5 13 16,0-5 0-16,0-1-15 16,0 3 21-16,0 3-6 15,0 4 0-15,0 1 9 16,0-2-11-16,0-2 2 0,0-3 0 16,0-4 1-16,0 0 10 15,0 0-11-15,0 0 1 16,0 0 9-16,0 0-4 15,0 0-6-15,0 0-6 16,0 0 4-16,0 0-21 16,0 0 23-16,-7 0 1 15,-3 0 8-15,-1 0-4 16,1 0-5-16,-2 0 0 16,1 3-7-16,-2 6 13 15,-2 4-12-15,0 0 4 16,3 1-11-16,6-2 2 15,2-7 5-15,2-3 5 16,2-2-9-16,0 0 16 16,0 0-6-16,0 1 0 0,0-1 11 15,-1 0-12-15,-2 0 1 16,-9 0-16-16,-11 0 16 16,-17 0 14-16,-19 0 6 15,-16 0-10-15,-13 0-6 16,-14 0 0-16,-13 2-4 15,-11 22 0-15,-17 8-1 16,-13 8 1-16,0-3 0 16,-3-7-2-16,4-10 2 15,3-7-12-15,-3-5-132 16,0-4 8-16,1-4 96 0,2 0-55 16,1 0 63-16,-1-1 31 15,0 0 1-15,6-1 16 16,8 2 15-16,10 0-3 15,10 0 12-15,5 0-34 16,2 0-6-16,7 0-57 16,12 0-108-16,20 0 69 15,33 0 96-15,34 0-10 16,12-7 7-16</inkml:trace>
+  <inkml:trace contextRef="#ctx0" brushRef="#br0" timeOffset="-211263.97">20196 3314 11 0,'0'0'19'15,"0"0"2"-15,0 0 14 16,0 0-12-16,0 0 18 15,0 0 1-15,0 0-26 16,-2-1 2-16,2 1-18 0,0 0 0 16,0 0 17-16,0 0-17 15,0 0 17-15,0 0 6 16,0 0-8-16,0 0 24 16,0 0-24-16,0 0-1 15,0 0 20-15,0 0-24 16,0 0 17-16,0 0-18 15,0 0-9-15,0 0-1 16,23 0 1-16,14-2 3 16,5-4 32-16,4 0-13 15,-6-1-19-15,-4 1 2 16,-4-2 6-16,-4 4-22 0,-4-1-29 16,-6-2-131-16</inkml:trace>
+  <inkml:trace contextRef="#ctx0" brushRef="#br0" timeOffset="-211039.48">20354 3261 76 0,'0'0'42'15,"0"0"53"-15,0 0-19 16,9 97-9-16,-6-73-28 15,2 0 11-15,-3 0-29 0,1 2-9 16,-1 2-2 0,-1 0 1-16,-1 0-22 0,0 1-4 15,0-2-111-15,0-7-136 16</inkml:trace>
+  <inkml:trace contextRef="#ctx0" brushRef="#br0" timeOffset="-210567.86">20563 3517 178 0,'0'0'134'0,"0"0"-86"15,0 0-10-15,0 0 36 16,0 0-30-16,0 0 22 16,0-71-45-16,0 71-18 15,0 7-6-15,0 14-21 16,0 7 24-16,0 4 6 16,0-4-6-16,6-5-2 15,1-6-30-15,3-5-17 16,1-8 46-16,0-4-24 0,2 0 14 15,-1-9 7 1,-1-12 12-16,2-3-6 0,-6 0 0 16,3 7 6-16,-2 3 35 15,-2 5-22-15,-1 5 12 16,-4 3 3-16,-1 1-28 16,0 0 0-16,0 0-6 15,2 0 4-15,4 0-15 16,1 0 11-16,8 0 0 15,-1 0-1-15,2 1-55 16,-2 2-17-16,2-3-92 16,-1 0-115-16</inkml:trace>
+  <inkml:trace contextRef="#ctx0" brushRef="#br0" timeOffset="-210391.75">20885 3205 117 0,'0'0'115'0,"0"0"21"16,0 0-44-16,0 0-63 15,0 0 3-15,0 0-27 16,27 129 48-16,-24-62-23 16,-1 3 7-16,-2-2-37 15,0-6 0-15,0-7-2 16,0-13-49-16,0-13-44 16,-2-17-101-16</inkml:trace>
+  <inkml:trace contextRef="#ctx0" brushRef="#br0" timeOffset="-210087.87">20954 3412 45 0,'0'0'56'15,"0"0"-20"-15,0 0-22 16,88-35 23-16,-70 27-11 16,-6 1-21-16,-5 3 46 15,-3 1-4-15,-4 0 37 16,0 3 10-16,0 0-77 15,0 10-9-15,0 16 6 16,0 5 4-16,0 1 9 16,0-1-25-16,0-4 0 15,0-6 1-15,0-6 5 16,2-7-8-16,4-6 0 0,3-2 5 16,3-10 20-16,-2-16-22 15,3-5-2-15,-2-3-1 16,-6-3-14-16,-2-2-23 15,-3 2-66-15,0 2-265 16</inkml:trace>
+  <inkml:trace contextRef="#ctx0" brushRef="#br0" timeOffset="-209897.72">21261 3374 113 0,'0'0'181'0,"0"0"-86"15,0 0-24-15,32 87 3 16,-28-74-53-16,-3-6 23 15,-1-4-25-15,2-3 13 16,1 0 60-16,4-7-3 0,6-16-27 16,4-5-62-16,4 0-5 15,0-1 3-15,4 6-62 16,4 8-63-16,-5 4-34 16</inkml:trace>
+  <inkml:trace contextRef="#ctx0" brushRef="#br0" timeOffset="-209188.11">20606 4645 409 0,'0'0'65'15,"0"0"-58"-15,0 0-5 16,102 2 67-16,-50-2-48 15,5 0 1-15,4 0-17 16,7 0 10-16,13 6-30 16,8-3-49-16,-3-3-292 0</inkml:trace>
+  <inkml:trace contextRef="#ctx0" brushRef="#br0" timeOffset="-208888.93">20749 6267 273 0,'0'0'79'0,"0"0"-76"15,96 0-3-15,-47 0 0 16,5 0-13-16,0-10-84 16,-2-5-145-16</inkml:trace>
+  <inkml:trace contextRef="#ctx0" brushRef="#br0" timeOffset="-208547.84">20627 8926 347 0,'0'0'309'0,"0"0"-221"16,0 0-77-16,0 0-22 15,0 0 7-15,0 0 4 16,55-11-8-16,-4-9 8 16,12 2-57-16,10-2-99 15,-2-4-138-15</inkml:trace>
+  <inkml:trace contextRef="#ctx0" brushRef="#br0" timeOffset="-208217.85">20706 11262 470 0,'0'0'98'0,"0"0"-98"0,0 0 18 16,0 0-18-16,0 0 15 15,115 3-15-15,-63-4-4 16,15-17-80-16,10-7-46 15,6-4-115-15</inkml:trace>
+  <inkml:trace contextRef="#ctx0" brushRef="#br0" timeOffset="-207995.67">20700 12444 350 0,'0'0'111'0,"-13"96"-31"15,20-48-74-15,32-1 12 16,16-9-15-16,20-14-3 16,26-17 0-16,26-7-1 15,22-3-24-15,9-24-225 16</inkml:trace>
+  <inkml:trace contextRef="#ctx0" brushRef="#br0" timeOffset="-196953.02">11611 3145 19 0,'0'0'69'15,"0"0"-12"-15,0 0 21 16,0 0 8-16,0 0-3 16,0 0-25-16,0-83-40 15,0 74 19-15,0 5-36 16,0-1 14-16,-1-4-9 16,-4-1-6-16,-1 1 0 0,-2-4 5 15,-3-2 4 1,-4 1-8-16,-10-3-1 0,-21-4 11 15,-19 1-28 1,-21-2 29-16,-13 5-12 0,-8 2 6 16,-8 3-5-16,0 2-1 15,-4 8 0-15,1 0 26 16,3 2-65-16,0 2 43 16,0 20-4-16,-2 11 10 15,0 6 0-15,-1 9-18 16,3 7 9-16,9 1-1 15,8 3 0-15,14 0-20 0,10-6 6 16,14-1-23 0,9-2 37-16,8 0 6 0,10 9-6 15,11 7 20-15,4 6-7 16,9 9-4-16,6 11-7 16,3 4-2-16,0 8 4 15,27-1-5-15,18-8 1 16,14-8 0-16,16-8 10 15,13-9-6-15,14-9-4 16,12-1 7-16,12-7 3 16,12-6-10-16,10-10 0 15,3-13 13-15,19-14-22 16,9-10 9-16,12-3 0 16,6-31-7-16,-5-10-14 15,-16-12 7-15,-19-4-27 0,-15-11 7 16,-14-11 34-16,-9-12 0 15,-5-12 7-15,-13-13-13 16,-17-1 22-16,-26-5-5 16,-28 2 4-16,-27 6-14 15,-12-5 40-15,-28 2-17 16,-14-2 17-16,-15 6 9 16,-10 13-46-16,-13 10 7 15,-16 21-11-15,-16 17-4 16,-19 19-11-16,-21 19-32 15,-20 17-43-15,-17 42 37 16,-11 32-143-16,-3 28-28 0</inkml:trace>
+  <inkml:trace contextRef="#ctx0" brushRef="#br0" timeOffset="-194439.94">22080 2978 17 0,'0'0'34'0,"-64"-84"14"16,14 40 28-16,-9 2 7 15,-3 3-40-15,-2 2-2 16,-5 1-41-16,-6 4 0 16,-10 1 16-16,-10 3-14 15,-14 6 1-15,-13 10 8 16,-13 9-1-16,-14 3 0 15,-11 6-10-15,-4 21 1 16,-4 10-4-16,-1 19 18 0,0 10-6 16,5 9 17-16,14 14-20 15,17 10 26-15,24 10-32 16,27 10-4-16,32 12-9 16,34 4 4-16,19 14 9 15,49 1-8-15,32-11 20 16,35-19-18-16,35-32 6 15,34-31 0-15,31-25 20 16,26-23-19-16,18-9 15 16,11-19-13-16,2-21 12 15,-13-10-21-15,-19-15 6 16,-24-19 0-16,-26-9 0 16,-30-7 4-16,-30-2-4 0,-33-2 1 15,-30-2 8 1,-27-5-4-16,-27-5-5 0,-17-3 0 15,-28 6 0-15,-38 10-38 16,-36 15-35-16,-31 20-76 16,-26 16 0-16</inkml:trace>
+  <inkml:trace contextRef="#ctx0" brushRef="#br0" timeOffset="-182845.72">27040 7678 59 0,'0'0'67'0,"0"0"15"16,0 0-4-16,0 0-30 16,0 0-8-16,0 0-11 15,0 0 28-15,1-44-17 16,4 35-24-16,8 1 14 16,9-2-25-16,15-1 3 15,7 4-9-15,-1 4 1 16,-6 3 0-16,-9 0-2 15,-9 0 1-15,-7 10 0 16,-7 3-2-16,-5 7-4 16,0 0-17-16,-13 5 22 0,-8-3 2 15,-3 2 23-15,4-6 1 16,6-4-10-16,5-4-11 16,6 0 3-16,3-3-11 15,0 4 5-15,2 1-6 16,20-3-25-16,12-6-41 15,7-3-88-15</inkml:trace>
+  <inkml:trace contextRef="#ctx0" brushRef="#br0" timeOffset="-182562.92">27554 7662 208 0,'0'0'88'0,"0"0"-34"0,0 0-46 15,-99 97-1-15,85-75 10 16,5 0-17-16,6-4 3 16,3-3 3-16,0-2-3 15,0-6-2-15,12-6-1 16,9-1 41-16,5-1-4 16,2-19-11-16,-3-2-19 15,-6 0 2-15,-8 0 8 16,-8-3 10-16,-3 2 7 15,0 4-34-15,-5 4-5 16,-8 6 4-16,-4 9-61 0,4 0-67 16,0 2-19-1</inkml:trace>
+  <inkml:trace contextRef="#ctx0" brushRef="#br0" timeOffset="-182296.61">27751 7559 206 0,'0'0'132'0,"0"0"-75"15,0 0-12-15,0 0-17 16,0 0 11-16,0 0 6 16,33 49-23-16,-33-25 0 0,-1 3 4 15,-7 0-10-15,3 0 1 16,2-4-7-16,3 2-10 15,0-5 7-15,0 0-7 16,0-4-5-16,2-2-20 16,10-5-63-16,6-9-57 15,3 0-264-15</inkml:trace>
+  <inkml:trace contextRef="#ctx0" brushRef="#br0" timeOffset="-182074.02">28129 7646 352 0,'0'0'69'0,"0"0"-62"0,0 0 28 15,0 0 30-15,-61 81-16 16,49-61-27-16,4-2-21 16,3 2 15-16,5-2-15 15,0-1 25-15,0-1-21 16,3-1 2-16,14 4-3 15,5-6-4-15,11-4-9 16,5-5-94-16,-1-4-200 16</inkml:trace>
+  <inkml:trace contextRef="#ctx0" brushRef="#br0" timeOffset="-181456.03">28672 7742 118 0,'0'0'66'0,"0"0"11"15,-41 98-32-15,25-70-33 16,2-7 4-16,3-6 9 16,3-6-12-16,5-5-1 15,2-4 33-15,1-5 85 16,0-22-36-16,6-16-92 0,19-13 20 16,8-9-7-1,6-4-14-15,2 7 3 0,-6 11-4 16,-13 21-7-16,-8 18 5 15,-11 11-9-15,-3 1 8 16,0 12-14-16,-21 23-9 16,-7 11 26-16,-2-1 0 15,5-4 12-15,8-9-9 16,9-4-1-16,8-5 0 16,0-6-2-16,12-2-1 15,18-2 0-15,9-5 2 16,9-2 9-16,1-4-10 15,-1-2-38-15,-1 0-68 16,-3-10-224-16</inkml:trace>
+  <inkml:trace contextRef="#ctx0" brushRef="#br0" timeOffset="-180986.64">29925 7116 410 0,'0'0'59'0,"0"0"-46"15,24 154-12-15,-11-39 14 16,-4 33 6-16,-7 36-9 0,-2 19-2 16,0 13 34-1,-3 0-8-15,-5-1-27 0,4-13-8 16,4-19 9-16,0-25-20 16,25-41-1-16,9-31-9 15,4-25 3-15,-2-32-66 16,-1-29-111-16</inkml:trace>
+  <inkml:trace contextRef="#ctx0" brushRef="#br0" timeOffset="-180552.67">30969 6833 442 0,'0'0'4'0,"0"0"-4"15,0 0 0-15,0 0 22 16,0 0 16-16,0 0-16 16,109 56-11-16,-63-55-11 15,-10-1-163-15</inkml:trace>
+  <inkml:trace contextRef="#ctx0" brushRef="#br0" timeOffset="-179915.06">31069 7150 131 0,'0'0'31'16,"-11"106"68"-16,9-51-71 15,2-6-21-15,0-6-7 16,0-10 0-16,6-8-38 16,4-10-54-16,5-14 21 15,5-1 71-15,3-14 39 16,7-16 0-16,6-9-8 15,3-6-24-15,2-3-7 16,-5 5-16-16,-10 11 16 16,-11 14 54-16,-8 6 65 15,-7 11-39-15,0 1-13 0,0 0-42 16,0 0-25 0,0 6-9-16,-1 9 9 0,-4 2 14 15,4-3-12-15,1-4-2 16,0-2-21-16,4-5-7 15,12-1 5-15,4-2 23 16,2 0 26-16,4 0-26 16,-3-3 8-16,-4-6-6 15,-2 4 13-15,-8 2-10 16,-1 3-5-16,-2 0-2 16,0 13-11-16,3 9 13 15,3 4 29-15,0-4-7 0,1-6-20 16,5-12 4-16,9-4-1 15,10-10-4-15,11-21 28 16,7-10-21-16,2-6-3 16,-7-5 10-16,-3-4-4 15,2-6-3-15,-6-2 2 16,-3 8-8-16,-12 19 1 16,-15 16 18-16,-9 18 34 15,-4 3-24-15,0 29-31 16,-1 26-19-16,-18 23 19 15,-6 13 8-15,-5 1 1 16,5-4-9-16,6-10-9 16,5-13-60-16,7-18-44 15,7-21-33-15,0-17-9 16,0-9-8-16</inkml:trace>
+  <inkml:trace contextRef="#ctx0" brushRef="#br0" timeOffset="-179808.12">32103 7377 217 0,'0'0'59'0,"0"0"-59"16,114 4-52-16,-64-1-163 15</inkml:trace>
+  <inkml:trace contextRef="#ctx0" brushRef="#br0" timeOffset="-178872.36">25718 8154 35 0,'0'0'44'0,"0"0"39"0,0 0 3 15,0 0-10-15,0 0-66 16,0 0 8-16,117-4 130 16,-19 4-72-16,16 0-41 15,16 0-7-15,5-3-26 16,-3 2 3-16,-17 0-5 16,-18-1-80-16,-25 2-17 15,-32-1-95-15,-31-2-76 16</inkml:trace>
+  <inkml:trace contextRef="#ctx0" brushRef="#br0" timeOffset="-177226.47">15000 3574 44 0,'0'0'28'16,"0"0"25"-16,0 0-43 15,0 0 4-15,0 0 21 16,0 0 26-16,20-40 14 16,-20 40-40-16,0 0-32 15,0 12-3-15,0 16 5 0,0 2 2 16,0 1-7 0,0-5-5-16,0-6-1 0,0-5-8 15,0-1-7-15,2-5-10 16,5 0-43-16,2-2-17 15</inkml:trace>
+  <inkml:trace contextRef="#ctx0" brushRef="#br0" timeOffset="-177055.72">15091 3298 164 0,'0'0'151'16,"0"0"-94"-16,0 0-25 16,0 0-32-16,0 0-238 15</inkml:trace>
+  <inkml:trace contextRef="#ctx0" brushRef="#br0" timeOffset="-175891.76">25433 7497 281 0,'0'0'153'0,"0"0"-104"15,0 0-40-15,0 0 59 16,0 0-3-16,1 93-28 15,-1-61-12-15,0 2-24 16,0-2 7-16,0-5-1 16,0 0-1-16,0-8-4 15,2-5-2-15,-1-4-33 16,1-9-38-16,1-1-90 16,3-9-121-16</inkml:trace>
+  <inkml:trace contextRef="#ctx0" brushRef="#br0" timeOffset="-175758.96">25373 7243 387 0,'0'0'0'0,"0"0"-28"16,0 0-51-16,9 114-179 15</inkml:trace>
+  <inkml:trace contextRef="#ctx0" brushRef="#br0" timeOffset="-175406.12">25606 7527 432 0,'0'0'103'0,"0"0"-66"0,0 0-33 16,0 0 31-16,-78 81-17 15,71-41-4-15,5-3-11 16,2-9-3-16,0-11 0 16,3-11-14-16,11-6 14 15,5-1 10-15,2-24-4 16,1-11-5-16,-2-14 7 16,-8-7-2-16,-1 3-12 15,-6 8 6-15,-1 14 0 16,-2 17 14-16,-2 9 30 15,2 6 10-15,-2 0-54 16,1 21-5-16,-1 11 5 0,0 12 8 16,0 3-5-16,0-1-6 15,0-2-51-15,0-7-71 16,5-12-142-16</inkml:trace>
+  <inkml:trace contextRef="#ctx0" brushRef="#br0" timeOffset="-174829.69">26053 7464 301 0,'0'0'77'0,"0"0"-21"15,-3 116-51-15,-4-82 12 0,0-10-12 16,4-8-5 0,3-9 0-16,0-7 12 0,0 0-7 15,0-17 80-15,13-10-74 16,2 0 12-16,1 2-10 16,-4 8-3-16,-4 5 18 15,-1 9-21-15,-3 3 11 16,6 6-18-16,2 18-9 15,5 8-4-15,3-3 13 16,-4-7-28-16,0-12 26 16,0-10-8-16,3 0 10 15,3-25 42-15,-1-4-25 16,-3-8 1-16,-7 1-11 16,-7 4-3-16,-4 9 3 15,0 5-7-15,0 13-2 0,0 3-2 16,0 2-38-16,-4 3-89 15,-1 13 31-15,4 6-59 16,1-5-6-16</inkml:trace>
+  <inkml:trace contextRef="#ctx0" brushRef="#br0" timeOffset="-174414.81">26477 7674 257 0,'0'0'130'16,"0"0"-25"-16,0 0-29 0,0 0 2 16,0 0-12-16,0 0-34 15,9-53-11-15,-21 56-18 16,-1 12 4-16,5 4-14 16,5-1 1-16,3-6-18 15,0-4 2-15,0-1-8 16,6-7 29-16,6 0-7 15,1 0-9-15,3-15-2 16,-3-7-36-16,-1 2-24 16,-3 3 35-16,1 7-35 15,-2 0 59-15,1 7-4 16,-1 0-29-16,1-3 30 16,2 0 10-16,-5-2 13 0,1 2 37 15,-2 1 39-15,-5 2-8 16,1 0-17-16,-1 3 6 15,0 0-10-15,0 0-18 16,0 0-13-16,0 0-16 16,0 0 0-16,0 0-7 15,-4 10-65-15,-6 0-158 16</inkml:trace>
+  <inkml:trace contextRef="#ctx0" brushRef="#br0" timeOffset="-173614.66">25974 6746 433 0,'0'0'58'15,"0"100"-35"-15,0 28-23 0,0 48 47 16,-1 52-23-16,-8 43-5 15,-2 25 51-15,-3 5-30 16,0-19-40-16,6-25 0 16,1-17 3-16,0-22 6 15,-1-29-9-15,2-34 0 16,3-36 6-16,1-36-5 16,2-34-1-16,0-22-55 15,0-20-26-15,0-7-115 16,8-36-106-16</inkml:trace>
+  <inkml:trace contextRef="#ctx0" brushRef="#br0" timeOffset="-173186.36">27223 7010 166 0,'-6'186'9'16,"-6"57"166"-16,-4 28-73 16,3-4-38-16,8-18-31 15,5-37-31-15,0-28 24 16,18-11 3-16,0-6-20 16,3-14 8-16,-2-10-14 15,-4-22 11-15,-3-18-3 16,-6-17-8-16,-5-17-3 0,-1-11-15 15,0-14-72 1,3-7-32-16,-1-8-10 0,-2-8 42 16,0-2-42-16</inkml:trace>
+  <inkml:trace contextRef="#ctx0" brushRef="#br0" timeOffset="-172122.22">25251 8630 136 0,'0'0'107'0,"0"0"-42"16,85-54-10-16,-43 29-21 15,8-4 4-15,4-1-5 16,9 3 5-16,11 4-19 15,14 8-12-15,17 7 3 16,20 0 27-16,26 3-27 16,31-5-9-16,34-4 22 15,39-5-13-15,39-7 13 16,30-3-11-16,22-4-12 16,3 1 6-16,-3-2-12 0,-12-4 1 15,-9-6-11 1,-10-2 13-16,-7-3 6 0,-7 3-18 15,-14 3 53-15,-15 3-36 16,-19 5-2-16,-29 0-7 16,-26 5-12-16,-34 4 31 15,-33 3-16-15,-38 5 4 16,-36 9-10-16,-29 2 10 16,-25 6 0-16,-5 1-86 15,-41 0-41-15,-27 0-63 16</inkml:trace>
+  <inkml:trace contextRef="#ctx0" brushRef="#br0" timeOffset="-170981.62">25371 10939 4 0,'0'0'109'0,"0"0"-23"16,-81 0-27-16,65 0 14 15,8 0-10-15,5 0 17 16,3 0-25-16,0 0-24 16,0 0 1-16,0 0-32 15,40 0 0-15,31-11 2 16,55-9 1-16,53-7 48 16,55-11-33-16,48-6-7 15,28-2-13-15,13 0 2 0,5-4-40 16,-3 0 37-1,5-4-16-15,7-2 19 0,9-1 45 16,11 0-21-16,1-1 5 16,-5 4-13-16,-14 5 24 15,-24 10-28-15,-31 12-11 16,-43 3-1-16,-41 9-12 16,-45 4-46-16,-49 5 35 15,-42 5-74-15,-44-2-27 16,-32-3-56-16,-57-5-46 15</inkml:trace>
+  <inkml:trace contextRef="#ctx0" brushRef="#br0" timeOffset="-170370.77">25230 8617 109 0,'0'0'17'16,"0"0"27"-16,-42-80 2 15,40 80 24-15,2 37-16 16,14 45-37-16,20 49-14 15,14 31 76-15,7 21-58 16,-1 9 0-16,-3-4-21 16,-14 0 4-16,-9-6-19 15,-11-3-34-15,-13-12 42 16,-4-22-4-16,0-21-37 0,0-27 13 16,5-19 30-1,14-26-46-15,17-26-181 0</inkml:trace>
+  <inkml:trace contextRef="#ctx0" brushRef="#br0" timeOffset="-169531.96">31932 7793 143 0,'0'90'17'0,"10"42"-1"15,-4 29 38-15,-6 26-13 16,0 7 18-16,-12 10-27 16,-2-5-24-16,7-17-7 15,4-2 15-15,3-17-16 16,0-11 0-16,0-10 0 16,12-24 2-16,0-14 0 15,0-6 14-15,0-11-6 0,1-9 15 16,-1-16-22-16,-1-21-2 15,-7-20 6-15,-4-12-7 16,2-3-18-16,-2 4-9 16,0 5-55-16,-2 7 38 15,-13 1-19-15,-1 1-34 16,5-6 42-16</inkml:trace>
+  <inkml:trace contextRef="#ctx0" brushRef="#br0" timeOffset="-145247.15">5703 2189 43 0,'0'0'24'0,"0"0"-21"15,0 0 2-15,0 0 4 16,0 0 10-16,0 0 28 16,-86-56 45-16,80 48-82 15,-3-2 17-15,-2 0-13 16,-5-1-13-16,-9-3 30 16,-10-3-17-16,-11-4 11 15,-9-2 51-15,-14 2-46 16,-19 4-11-16,-19 10-19 15,-26 7 12-15,-24 0-20 0,-14 17 8 16,-11 5-1 0,-3 7-11-16,7 12 13 0,-4 9-1 15,5 15 0-15,-4 17 5 16,5 20-19-16,6 25 7 16,15 27-3-16,28 13-3 15,33 1 6-15,37-11 7 16,32-27 0-16,25-24-5 15,19-16 1-15,34-11-9 16,24-4 2-16,28-3 11 16,23-9 0-16,24-1-4 15,21-8 2-15,14-13-18 16,11-16 15-16,14-25-22 16,9-7 27-16,7-39 5 0,-3-23-3 15,-10-23-1-15,-14-24-1 16,-11-21 52-16,-8-18 19 15,-15-6-28-15,-21-13-30 16,-34 2 11-16,-34 7-19 16,-41 6-5-16,-37 16 16 15,-21 14-15-15,-58 4 21 16,-42 12-22-16,-40 18-17 16,-40 26-16-16,-29 36-115 15,-32 33-34-15,-19 31-37 16</inkml:trace>
+  <inkml:trace contextRef="#ctx0" brushRef="#br0" timeOffset="-94314.54">5278 8218 95 0,'0'0'43'0,"0"0"3"16,0 0-14-16,-101 0 3 16,80 0-11-16,1 0-13 15,1 0 7-15,1 0-17 16,-3 11 3-16,-4 6-4 15,-5 12 8-15,-6 9-8 0,0 3 0 16,-4 5 1-16,3 1 1 16,1-1-2-16,6-1 0 15,5-1 5-15,13-4-3 16,12 1-3-16,0-3 1 16,30 0-9-16,15 1 9 15,11-3 0-15,8-7 0 16,6-9 2-16,-1-8 3 15,0-7-5-15,-4-5-15 16,-5 0 4-16,1-13-7 16,-3-8 14-16,-3-10 4 15,-5-5 24-15,-7 2 13 16,-10-5 17-16,-11 3-47 16,-2-2 31-16,-7-5-15 0,-7-3-13 15,-6-1-10-15,0 0 27 16,-6 5-14-16,-13 3-8 15,-10 9-5-15,-5 7-55 16,-8 14-17-16,-4 9-41 16,-3 2-47-16</inkml:trace>
+  <inkml:trace contextRef="#ctx0" brushRef="#br0" timeOffset="-93150.18">25043 7778 321 0,'0'0'112'0,"0"0"-47"15,0 0-24-15,0 0 23 0,0 0-54 16,0 0-7-16,0 0-3 15,20-8 1-15,-1 3-1 16,11 1 21-16,10-3-17 16,-1-2-4-16,-2-1-1 15,-4-1-23-15,-6-3-30 16,-6-3-86-16,-11-4-128 16</inkml:trace>
+  <inkml:trace contextRef="#ctx0" brushRef="#br0" timeOffset="-92759.22">25049 7706 26 0,'0'0'47'15,"0"0"17"-15,-65 101-42 0,48-65-2 16,1-7 0-16,5-2-9 16,-2-4-3-16,4 0 19 15,0-7-1-15,3 0-8 16,0-4 2-16,5-3-18 15,1-4 6-15,0 1-8 16,0-3 6-16,0-2-4 16,16-1 22-16,8 0 40 15,7 0-18-15,6 0-34 16,7 2 6-16,6 7-15 16,3 2-3-16,-10 5 1 15,-12 4-1-15,-10 3 1 16,-13 0-1-16,-8 5-7 0,0 1 7 15,-9 1 11-15,-17-2 13 16,-2-3 7-16,-6-3-11 16,-5-5-9-16,-1-4 9 15,-1-2-19-15,2-6-1 16,-1-5-21-16,2 0-71 16,2-1-72-16,3-23-152 15</inkml:trace>
+  <inkml:trace contextRef="#ctx0" brushRef="#br0" timeOffset="-92086.21">24705 7704 237 0,'0'0'21'0,"4"98"6"16,-2-37 34-16,-1 2-44 15,-1-4-16-15,0-1 16 16,0-3-8-16,0-6-7 16,0-6 7-16,2-9-3 15,2-12-4-15,-3-9-2 16,2-6 0-16,0-7-5 16,5 0-2-16,7-21-59 15,0-21 23-15,4-18 18 0,-5-12 3 16,-4-7 22-1,-1 4 1-15,-2 19 31 0,-3 21 8 16,-3 22 65-16,-1 13-43 16,0 16-60-16,0 19-2 15,0 14 3-15,-1 7 6 16,-9-1 7-16,-1-5-11 16,3-4-1-16,4-13-4 15,1-12 5-15,3-12-8 16,0-6 3-16,0-3 0 15,0 0 18-15,0-26-11 16,7-14 27-16,6-13-34 16,-1 4 8-16,-5 15-9 15,-4 17 2-15,-3 17 35 0,0 3-36 16,0 28-12-16,-6 8 12 16,-5 7 0-16,-2-1 2 15,5-9-9-15,2-7 7 16,3-10 0-16,3-7-7 15,0-7 7-15,0-2 0 16,0-3 0-16,0-17 1 16,0-18-2-16,0-21-33 15,0-8 2-15,8-10 17 16,-1 1-20-16,3 11 30 16,-2 17-1-16,-4 25 12 15,-2 20 14-15,-2 1-20 16,0 30-11-16,0 12 5 0,-2 8 4 15,-11 5-23-15,-5 2-91 16</inkml:trace>
+  <inkml:trace contextRef="#ctx0" brushRef="#br0" timeOffset="-71631.27">5274 8169 3 0,'0'0'17'16,"0"0"24"-16,0 0 17 16,0 0-7-16,0 0 1 15,0 0-46-15,0 0-2 16,0 0-4-16,-57-9 0 15,57 9-2-15,-3 0-18 16,-3 0 11-16,0 11 6 0,-5 4 6 16,-5 3-1-16,-3 0-1 15,-1 0-1-15,-5 2 10 16,1 0-1-16,-4-1 0 16,3-3 15-16,-3 0-18 15,0 1 8-15,6-6 17 16,4-1-12-16,6 2 0 15,3-1-18-15,3 3-1 16,2 2 0-16,2 4 6 16,2-1-13-16,0 3 7 15,0 3-9-15,6 4 7 16,6 4-12-16,-3-1 7 16,6-1 2-16,-2-1 1 15,2-1-7-15,5 1 6 0,-3 1-8 16,0 1 8-16,1-2-9 15,0-7 14-15,3-3-1 16,1-4-12-16,8-3 13 16,1 1-1-16,8 0-26 15,3-3 21-15,4-2-13 16,-1-6-6-16,1-3-10 16,2 0-10-16,1-1 9 15,0-12 25-15,-7-3 11 16,-5 2 4-16,-4-3-4 15,-1 0-3-15,-1-1-1 16,-1-5 4-16,0-2 0 16,1-5-5-16,0-4-4 0,2-4 9 15,-3-7 0-15,1 0 2 16,-7-1 7-16,-6-2 1 16,-9 4-10-16,-9 0 14 15,0 0 5-15,-6 1 12 16,-15 2-10-16,-1 1-17 15,-11 2 0-15,-3 5-1 16,-7 5 7-16,-8 6 23 16,-4 6-25-16,-3 5 15 15,-5 11-23-15,-1 0 0 16,3 7-44-16,0 14 1 16,5 5 3-16,7 6 5 15,3 2-14-15</inkml:trace>
+  <inkml:trace contextRef="#ctx0" brushRef="#br0" timeOffset="-65136.34">25282 7778 32 0,'0'0'34'15,"0"0"16"-15,0 0-2 16,0 0-15-16,0 0-16 16,0 0-14-16,0 0-6 15,-11-57-3-15,6 55-5 0,3 2 11 16,1 0 6 0,-1 0-1-16,2 0 4 0,0 0-9 15,0 0 0-15,0 0 7 16,-1 0-6-16,1 0 3 15,-3 0 10-15,-2 0 18 16,-2 0 23-16,-5-2-39 16,1-1 1-16,2-3 11 15,-2 2-3-15,2-4-4 16,-1 0-4-16,0-2-15 16,1-3 9-16,2 2-11 15,-1 2 0-15,-1 0 0 16,3 7 7-16,0-1-2 15,-3 3-5-15,-7 0 0 16,-5 3-12-16,-9 17 12 0,-2 7 0 16,-3 5 0-16,1 3 1 15,4 6-2-15,3 6 1 16,3 7 0-16,0 6 26 16,4 1-24-16,-1-5 5 15,7-6-7-15,7-7 6 16,4-3-9-16,3-4 3 15,0-2 0-15,9 2 19 16,6-5-7-16,-1-6-8 16,2-4 4-16,1-5-3 15,3-2 5-15,-2-5-6 16,5-3-3-16,3-4 16 0,2-2-16 16,6 0 2-16,2-6 4 15,3-14-4-15,-1-7-5 16,-1-2 2-16,-8-6 0 15,-6 2-8-15,-5-4 5 16,-6 3 3-16,-8-1-1 16,-4 1 1-16,0 3-5 15,-9 2 5-15,-14 0-18 16,-7 7 16-16,-6 6-49 16,-5 7-38-16,1 7-86 15</inkml:trace>
+  <inkml:trace contextRef="#ctx0" brushRef="#br0" timeOffset="-64500.69">24752 7624 195 0,'0'0'117'0,"0"0"-115"0,-6 128 2 16,2-38 31 0,0-3 31-16,-6 0-37 0,0-3-1 15,-2-10-19-15,3-8-2 16,2-12 0-16,4-13-7 15,1-13 0-15,-1-9 2 16,3-9 6-16,-1-7-5 16,-1-3-2-16,1-2 2 15,-1-28 20-15,2-18-23 16,0-18-39-16,0-14 32 16,2-7-12-16,1 1 10 15,-3 6-27-15,0 14 3 16,-6 22 25-16,-3 19 8 0,4 22 45 15,4 8-31 1,-4 41-14-16,1 24-2 0,0 26 2 16,1 7 14-16,3-4-10 15,0-16-4-15,0-21-1 16,0-23 1-16,1-16 8 16,2-13 13-16,-1-5-9 15,2-5-7-15,2-4 40 16,1-19 22-16,4-17-59 15,2-13-8-15,-4-14 6 16,-3-9-13-16,0-8 3 16,1 0-15-16,-1 3 5 0,-1 24-18 15,-2 20 23 1,-3 26 9-16,0 13-7 0,0 40-63 16,-6 18 41-16,-9 15-55 15,3-2-122-15</inkml:trace>
+  <inkml:trace contextRef="#ctx0" brushRef="#br0" timeOffset="-63518.41">24648 8837 210 0,'0'0'205'16,"0"0"-107"-16,0 0-83 15,0 0 26-15,0 0 19 16,0 0-19-16,-7-23-10 0,59 8-21 16,21-5-3-16,10 2 4 15,2-3-1-15,-7 3-18 16,-14 2 8-16,-18 5-20 15,-20 5 20-15,-17 5-9 16,-9 1-14-16,-26 4 7 16,-29 20-1-16,-26 5 14 15,-18 5-1-15,0-2 4 16,16-6 4-16,24-5 1 16,21-5 13-16,20-2-7 15,7-2-6-15,11-2-6 16,0-1 1-16,23-2-6 15,23-7-4-15,21 0 7 16,18-11-17-16,3-12 17 16,0-2-35-16,-12 2 19 0,-19 3 4 15,-18 6 13-15,-17 6-4 16,-13 5-83-16,-9 1-82 16,-3 2 1-16</inkml:trace>
+  <inkml:trace contextRef="#ctx0" brushRef="#br0" timeOffset="-61091.25">25889 10481 344 0,'0'0'99'15,"0"0"-44"-15,0 0-53 16,0 0 11-16,0 0 5 16,0 0-17-16,26-2 14 15,-5-4-11-15,-2 3-2 16,-6 2 0-16,-5 1-2 0,-4-2 0 16,-4 2-1-16,0 0 7 15,0 0-6-15,-9 0 6 16,-16 7 1-16,-6 5 10 15,-2-2-14-15,7-3 1 16,10-2 23-16,7-3-24 16,7-1-3-16,2 0 0 15,0 2-13-15,0 3-5 16,10-1 2-16,7 0-11 16,1-4-1-16,2-1-12 15,-7 0 23-15,-5 0 11 16,-6 0 6-16,-2 0 8 15,0 0-2-15,-11 4 23 0,-7-2 0 16,-3-1-28 0,3 1 24-16,8-1-10 0,5-1-11 15,5 0-3-15,0 0-1 16,0 0-10-16,9 0-15 16,10 0-7-16,5 0 32 15,-3 0-8-15,-3-3 1 16,-10 2 1-16,-7 1 7 15,-1 0-1-15,0 0 3 16,-8 0 2-16,-9 0 28 0,-3 0-25 16,-1 0-3-1,9 0 34-15,2 0-32 0,6 0 1 16,4 0-8 0,0 0 3-16,0 0-5 0,0 0 2 15,0 0-12-15,0 0 10 16,10 1-68-16,3 3 10 15,-1 2-184-15</inkml:trace>
+  <inkml:trace contextRef="#ctx0" brushRef="#br0" timeOffset="-59924.28">30956 9775 53 0,'0'0'54'0,"0"0"42"0,0 0-11 16,0 0-5-16,0 0-73 15,0 0 6-15,0 28 33 16,8 3 5-16,3 0-35 16,4 1-1-16,3-4 8 15,-1-2-21-15,2-5 4 16,-1-7-6-16,-5-7 0 15,3-6-1-15,0-1-25 16,0 0-2-16,-1-12 5 16,-4-9-37-16,-6-8-3 15,-5 0 42-15,0 2 21 16,-7 5 13-16,-7 8 69 16,-6 14-35-16,-10 0-20 0,-9 20-22 15,-5 12 31-15,0 6-25 16,7-3 4-16,7 0-10 15,6-6-5-15,7-2 0 16,4-5 0-16,4-1-5 16,5-5-51-16,4-5-91 15,0-8-180-15</inkml:trace>
+  <inkml:trace contextRef="#ctx0" brushRef="#br0" timeOffset="-56527.2">25737 8656 32 0,'0'0'35'0,"0"0"34"16,0 0 8-16,0 0 5 15,0 0-8-15,0 0 4 16,0 0-27-16,-16-34-2 16,16 34-43-16,0 0 2 15,0 0-8-15,0 0-26 16,0 14-118-16,0 6-91 16</inkml:trace>
+  <inkml:trace contextRef="#ctx0" brushRef="#br0" timeOffset="-56359.76">25804 9206 70 0,'0'0'49'0,"0"0"23"16,0 0-46-16,0 0-19 15,0 0-1-15,-13 93-6 16,13-81-126-16</inkml:trace>
+  <inkml:trace contextRef="#ctx0" brushRef="#br0" timeOffset="-56227.57">25798 9549 11 0,'0'0'52'0,"0"0"-36"0,0 0 18 15,0 0-12-15,0 0-21 16,-7 83-1-16,7-72-51 15</inkml:trace>
+  <inkml:trace contextRef="#ctx0" brushRef="#br0" timeOffset="-56062.05">25782 9868 20 0,'0'0'54'0,"0"0"15"16,0 0-6-16,0 0-5 0,0 0 2 15,0 0-27-15,-8 8-33 16,8-16-76-16,0-2-67 16,8-2 25-16</inkml:trace>
+  <inkml:trace contextRef="#ctx0" brushRef="#br0" timeOffset="-53218.48">31008 8090 154 0,'0'0'102'15,"0"0"-19"-15,0 0-8 16,0 0-19-16,0 0-10 0,0 0-24 16,0 0-18-16,0 0-4 15,0 0 0-15,0 0-6 16,0 10-52-16,0 17-135 15,0 6-92-15</inkml:trace>
+  <inkml:trace contextRef="#ctx0" brushRef="#br0" timeOffset="-53077.01">31014 8647 166 0,'0'0'81'0,"0"0"-52"0,0 0-22 15,0 0 17-15,0 0-24 16,-25 82-60-16</inkml:trace>
+  <inkml:trace contextRef="#ctx0" brushRef="#br0" timeOffset="-52942.54">30999 9003 87 0,'0'0'79'16,"0"0"5"-16,0 0-57 15,0 85-15-15,0-62-6 16,0 0-6-16,1-5-83 16,4-2-61-16</inkml:trace>
+  <inkml:trace contextRef="#ctx0" brushRef="#br0" timeOffset="-52822.21">31048 9244 6 0,'0'0'64'0,"0"0"-21"16,0 0-20-16,0 0 0 15,0 0-3-15,0 0 5 16,5 55-25-16,-5-52-65 16</inkml:trace>
+  <inkml:trace contextRef="#ctx0" brushRef="#br0" timeOffset="13158.75">25707 10683 131 0,'0'0'61'15,"0"0"-22"-15,0 0-38 16,0 0 8-16,0 0-9 15,0 0-11-15,0 0 7 16,-24 21 8-16,54-21 33 16,3 0-10-16,0 0-21 15,-5 0 5-15,-3 0-11 16,-5 0 1-16,-2 0 1 0,-8 0 4 16,-2 0-6-1,-7 0 0-15,-1 0 12 0,0 0 6 16,0 0 8-16,0 0-18 15,-7 0 6-15,-4 3-10 16,-1 0-3-16,2 0-1 16,3-3 11-16,4 0-6 15,1 0 6-15,2 0 9 16,0-9 5-16,0-2-21 16,3-1 3-16,12 2-7 15,0 1-5-15,4 1 5 16,1 0 0-16,-1-1-1 15,-4 0-5-15,-5 5-1 16,-7 1 7-16,-3 3 0 0,0 0 2 16,0-2-2-16,-3 2 0 15,-8-2 3-15,-2 0 0 16,1 2 0-16,-1-1-3 16,0 1 0-16,-5 0 2 15,3 0-2-15,3 0 0 16,5 0 3-16,3 0-4 15,4 0 8-15,0 0 3 16,0 0-8-16,0 0-2 16,5 0 0-16,10 0-34 15,-2 0 34-15,-2 0-1 16,-4 0-2-16,-5 0-25 16,-2 1 8-16,0 5 2 0,0 1 17 15,0-4-3 1,-6 4 8-16,-2-3 3 0,1 2-3 15,-2-5-4-15,-3 2 0 16,0-1 6-16,-1-2-6 16,1 0 0-16,1 0 0 15,4 0 27-15,1 0-20 16,3 0 8-16,1 0-9 16,1 0 2-16,1 0-4 15,0 0 8-15,0 0-6 16,0-6-6-16,9 0-45 15,3 1-63-15,-3-4-105 0</inkml:trace>
+  <inkml:trace contextRef="#ctx0" brushRef="#br0" timeOffset="15058.91">24181 10219 350 0,'0'0'25'0,"-5"83"7"15,-5-36-25-15,-2-6-14 16,5 2-11-16,1-2-48 0,6-7-102 16</inkml:trace>
+  <inkml:trace contextRef="#ctx0" brushRef="#br0" timeOffset="15369.24">24385 10060 349 0,'0'0'90'0,"0"0"-9"15,0 0-76-15,0 0 4 16,0 0-9-16,0 0 14 0,-58 90-8 16,58-48 20-1,21 5-5-15,-3 1-9 0,-2-2-2 16,-7-1-5-16,-6-6-5 15,-3-10 0-15,0-2 4 16,0 0-5-16,-12 1 1 16,-12 0 0-16,-7-1 10 15,-5-2-10-15,-1-5 0 16,1-10-27-16,8-6-41 16,8-4 3-16,13-7-8 15,7-21-47-15</inkml:trace>
+  <inkml:trace contextRef="#ctx0" brushRef="#br0" timeOffset="15748.87">23941 9649 496 0,'-172'27'22'15,"8"46"63"-15,16 29-33 16,19 25-1-16,29 21-9 15,31 8-22-15,38 4 1 16,32-6-21-16,59-13 5 16,29-11-5-16,26-13 0 15,12-14-9-15,6-26-49 0,13-22 15 16,6-31 31-16,-1-24 3 16,-3-28 18-16,-8-37-10 15,-15-21 5-15,-13-24-4 16,-14-18 6-16,-17-13-5 15,-15-12-1-15,-25-5 0 16,-23 5 0-16,-18 13 6 16,-40 19-4-16,-27 29-2 15,-25 30 0-15,-19 26-9 16,-5 31-6-16,-2 9-29 16,5 39-39-16,11 19 14 15,17 4-141-15</inkml:trace>
+  <inkml:trace contextRef="#ctx0" brushRef="#br0" timeOffset="33874.68">14476 17102 145 0,'0'0'111'0,"0"0"-1"0,0 0-54 15,0 0-28-15,0 0-19 16,0 0-9-16,0 0 0 15,-5 90 6-15,-2-30 1 16,0-7-1-16,4-3 5 16,3-6-9-16,0-5 14 15,0-8-16-15,0-4 0 16,0-7-6-16,4-7-22 16,5-13-37-16,1 0-92 15,7-20-94-15</inkml:trace>
+  <inkml:trace contextRef="#ctx0" brushRef="#br0" timeOffset="34169.36">14831 17035 238 0,'0'0'128'0,"0"0"-31"0,0 0-31 16,-87 121-16-16,53-75-36 15,3 0 20-15,7 0-29 16,9-2-2-16,11-2-1 15,4-3 3-15,0-9-5 16,16-9 0-16,5-8-17 16,6-11 17-16,3-2 4 15,-1-6-3-15,-2-17 20 16,-8 0-16-16,-8-6 9 0,-11 8 8 16,0-1 2-16,-11 6 8 15,-15 5-32 1,-7 7 5-16,-6 4-10 0,-3 0-44 15,5 3-67-15,7 9-6 16,5-1-180-16</inkml:trace>
+  <inkml:trace contextRef="#ctx0" brushRef="#br0" timeOffset="35047.54">14492 16588 87 0,'0'0'50'16,"0"0"60"-16,0 0-38 16,0 0 24-16,103 74-43 15,-59-67-12-15,9-6-15 16,4-1-20-16,-2 0-6 15,-12-5 0-15,-10-11-96 16,-12-2-12-16,-10-11-147 0</inkml:trace>
+  <inkml:trace contextRef="#ctx0" brushRef="#br0" timeOffset="35220.35">14695 16481 309 0,'0'0'30'0,"-4"89"50"16,4-31-59-16,0-1 1 16,0-5 10-16,7 1-30 15,3-6 3-15,-2-2-5 16,6-7-52-16,-4-10-129 0</inkml:trace>
+  <inkml:trace contextRef="#ctx0" brushRef="#br0" timeOffset="36808.8">13964 14440 35 0,'0'0'21'0,"0"0"37"15,0 0 41-15,0 0-86 16,-16 119 73-16,16-20-14 15,3 16-47-15,0 0 2 16,-3 11-24-16,0 12 5 16,-15 8-5-16,-5 16 0 15,1 3 30-15,2 4-20 0,-2 7-11 16,-6-1 15-16,2 5-15 16,-7-4-2-16,-1-8 0 15,-3-6 5-15,-2-12-5 16,-1-3 24-16,1-8-5 15,2-6 35-15,4-3-51 16,8-6 30-16,6-12-21 16,5-9-7-16,3-14-2 15,4-17-3-15,4-12 0 16,0-10-7-16,0-11 7 0,9-5 0 16,2-5-1-16,0-2 9 15,0-5-9-15,-1-2 1 16,0-5 0-16,1-6-8 15,5 1 8-15,2-2-6 16,8-7 6-16,6-1 0 16,11 0 14-16,7 0-14 15,8 0 0-15,6 0 9 16,8-1-6-16,7 1-3 16,12 0 0-16,12 0 8 15,19 0-11-15,18 0 3 16,19-5 0-16,16-1-2 15,12 5 2-15,13-5-7 16,9 6-4-16,6 0 1 16,3 9 4-16,7 9 6 0,-2 5 0 15,4 2 6-15,6-5-3 16,6 1-3-16,7-2 17 16,10-5-13-16,-3 1-4 15,-3-2 0-15,-8 2 0 16,-13 4 5-16,-9 1-2 15,-15-1-3-15,-7-1 12 16,-7-6-9-16,-6-1 5 16,-2 1-8-16,-1-6 0 15,-7-1-5-15,0-5 5 0,-14 0 0 16,-9 0-2-16,-10-13 1 16,-16-1-3-16,-8-5 0 15,-15-1 4-15,-12-4-7 16,-10-3 7-16,-11 1 0 15,-10 0 0-15,-12-1 12 16,-7 1-13-16,-11 0 1 16,-5-1 0-16,-4-2-4 15,2-1 9-15,0-6-2 16,3-1 4-16,-1-5 0 16,2-2-7-16,2-2 0 15,-3-6 2-15,1-2-8 16,0-5 7-16,-2-10-1 15,-1-8 3-15,0-9 1 16,3-7 1-16,0-5-5 0,3-1 0 16,1-9 2-16,0-5-2 15,4-3 0-15,2-9-2 16,6-3 13-16,5-6-7 16,3-2 4-16,4 2-7 15,3 3 18-15,-1 3-19 16,4 5 0-16,0-4-9 15,2 0 14-15,-2-1-5 16,0 0 0-16,0 2 4 16,-1 3-1-16,1 5-3 0,-1 9 0 15,-4 7 9 1,-3 7-1-16,-10 14-3 0,-7 6-5 16,-6 11 7-16,-6 12-10 15,-8 7 3-15,-6 5 0 16,-4 8-5-16,-3 4-36 15,0 2 14-15,0 8-28 16,1-2-35-16,0 5-3 16,-4-3-155-16</inkml:trace>
+  <inkml:trace contextRef="#ctx0" brushRef="#br0" timeOffset="37620.71">16005 14156 61 0,'0'0'27'16,"0"0"-21"-16,0 0 86 16,45 109-21-16,-27-29-10 15,-3 26-16-15,-2 21-8 16,-7 16 2-16,-6 13-24 16,-2 14-15-16,-14 4 31 0,0 6-25 15,1 8 8-15,3 0 8 16,4 0-14-16,1 2 12 15,3-2-9-15,2-9 10 16,2-14-12-16,0-19 2 16,0-28-11-16,0-20 0 15,0-25 8-15,0-23-17 16,0-21 4-16,0-18-61 16,2-11-29-16,23-27-56 15,14-30-4-15</inkml:trace>
+  <inkml:trace contextRef="#ctx0" brushRef="#br0" timeOffset="38115.39">18506 14505 7 0,'1'83'109'0,"4"45"-12"16,-5 53 5-16,-11 38-26 16,-17 27 24-16,-7 7-38 15,5-7-50-15,5-6 3 16,3-5-15-16,-2 5-8 0,-3-7 2 15,-8-7-22 1,-6-7 17-16,-4-17 2 0,1-17 7 16,3-21 2-16,11-31-2 15,10-39-24-15,8-32 7 16,10-25-29-16,2-26-37 16,0-11-32-16,21-29-80 15</inkml:trace>
+  <inkml:trace contextRef="#ctx0" brushRef="#br0" timeOffset="38535.28">19932 14733 166 0,'0'96'56'0,"-5"48"-1"16,-14 38-7-16,-15 25-29 15,-10 19 50-15,-3 6-19 16,3 7-33-16,12 2 1 16,6-1-18-16,7-17 2 0,8-19-11 15,5-25 7-15,2-20-9 16,-1-8 9-16,-3-2 2 16,-1-7 2-16,0-4 0 15,-5-15 1-15,2-14-6 16,-2-13 3-16,0-14-30 15,2-19-76-15,0-17-204 16</inkml:trace>
+  <inkml:trace contextRef="#ctx0" brushRef="#br0" timeOffset="43048.61">20914 15116 371 0,'0'0'24'0,"0"0"-24"16,137 0-19-16,-60-12-14 0,5-9 33 15,-2-3 0 1,-8 4-6-16,-13-3-32 0</inkml:trace>
+  <inkml:trace contextRef="#ctx0" brushRef="#br0" timeOffset="43325.73">20829 16126 298 0,'0'0'91'0,"0"0"-40"0,0 0-15 15,0 0 36-15,0 0-21 16,0 0-40-16,33-14-10 15,-7 13 9-15,10-1-10 16,12-2 1-16,8 1-1 16,12-1-5-16,3 1-92 15,-2 0-172-15</inkml:trace>
+  <inkml:trace contextRef="#ctx0" brushRef="#br0" timeOffset="43543.74">20970 16919 377 0,'0'0'70'0,"0"0"-61"15,0 0-6-15,0 0 26 16,0 0 2-16,120-14-31 15,-62-9-7-15,3 2-64 16,-10-2-169-16</inkml:trace>
+  <inkml:trace contextRef="#ctx0" brushRef="#br0" timeOffset="43715.21">20921 17423 327 0,'0'0'115'0,"0"0"-95"16,0 0-4-16,0 0 5 16,103 56 1-16,-22-56-3 15,20 0-19-15,13-18-153 16,9-7-125-16</inkml:trace>
+  <inkml:trace contextRef="#ctx0" brushRef="#br0" timeOffset="67844.92">13705 14325 10 0,'0'0'21'15,"0"0"23"-15,0 0-2 16,0 0-10-16,0 0-13 16,0 0 2-16,0 0 4 15,0 0-17-15,59 43 1 16,-45-38-7-16,0-1 2 16,0 1-2-16,-1-4-2 15,-2 0 0-15,-5-1 0 0,-3 0 5 16,-3 3-5-16,0-3 0 15,0 3 0-15,0 0 31 16,-2 0 11-16,-8 2-15 16,-1-2 11-16,0 3-6 15,3 0-7-15,2-4-16 16,4 0-1-16,2-2-4 16,0 0-4-16,0 3-2 15,0-2 0-15,3 1 1 16,7-1-11-16,0-1-36 15,0 0 11-15,-1 0 29 16,-3 0 1-16,-1-6 7 0,-2 1-3 16,-2-1 0-16,-1 3-8 15,0 2-29-15,0-1-2 16,0 2-60-16</inkml:trace>
+</inkml:ink>
+</file>
+
 <file path=ppt/ink/ink2.xml><?xml version="1.0" encoding="utf-8"?>
 <inkml:ink xmlns:inkml="http://www.w3.org/2003/InkML">
   <inkml:definitions>
@@ -3785,7 +4232,7 @@
   <inkml:trace contextRef="#ctx0" brushRef="#br0" timeOffset="-61414.23">24121 6367 10 0,'0'0'64'0,"0"0"-28"16,0 0-21-16,0 0-2 15,0 0-9-15,0 0 7 16,0 0-11-16,-15 6 8 16,-7 9 29-16,-3 0 6 0,-1 0-32 15,1 1-5 1,-1-3 16-16,1 0 11 0,-2-2-12 16,2 1 13-16,-2 1-15 15,5-1-4-15,4-2-1 16,9 0-7-16,4-5-3 15,1 0 1-15,4 2-4 16,0-3 1-16,0 6-1 16,0 1 12-16,0 4 6 15,10-1-2-15,5-1 6 16,3 2 1-16,-1-6-8 16,2 1-5-16,-1 1-2 15,0-2-9-15,6 1 2 16,-1-2-2-16,0-2-84 15,-2-3-178-15</inkml:trace>
   <inkml:trace contextRef="#ctx0" brushRef="#br0" timeOffset="-1777.04">25014 6234 114 0,'0'0'123'16,"0"0"-41"-16,0 0-27 15,0 0-9-15,0 0 10 16,0 0-10-16,0 0-12 16,0 0-23-16,7-59-6 15,-7 59-5-15,3 0-7 0,-2 0 0 16,2 4-16-16,3 8 23 16,2 2-1-16,-1 2-2 15,2 1-2-15,-1-3-1 16,-1 5 6-16,-2-1 0 15,-2-1-12-15,-2-3 10 16,-1 0-8-16,0 2 5 16,0 2 2-16,-4 6 3 15,-8 2 13-15,-5 3-13 16,2-1 2-16,-1-3 0 16,4-3 2-16,1-5-4 15,3-4 10-15,3-4-9 16,2-3 1-16,2-1 0 0,1-3-2 15,0-2 4 1,0 0 0-16,0 0 6 0,0 0-4 16,10-13 13-16,10-5-6 15,5-3-7-15,3-5-2 16,3 1 5-16,2-6-9 16,2-5 4-16,1-1-8 15,-1-3-2-15,4-2 6 16,-6 5 0-16,-9 4 2 15,-6 7 4-15,-11 8-6 16,-5 10 21-16,-2 7-1 16,0 1-6-16,0 0-12 0,-5 6-2 15,-11 12 0 1,-7 7 8-16,3 6-8 0,4 5 0 16,5 3 1-16,5 0-1 15,6-3-1-15,0 1-7 16,0-6-23-16,4-2-26 15,8-3-35-15,0-9-132 16</inkml:trace>
   <inkml:trace contextRef="#ctx0" brushRef="#br0" timeOffset="-1432.57">25472 6688 41 0,'0'0'104'16,"0"0"-12"-16,0 0-15 15,0 0-27-15,0 0 3 0,-33 94-25 16,25-72-17-16,1 1-11 16,2-2 0-16,4-3-43 15,1-8-120-15</inkml:trace>
-  <inkml:trace contextRef="#ctx0" brushRef="#br0" timeOffset="-965.79">25553 6438 97 0,'0'0'32'0,"0"0"-14"16,0 0 10-16,0 0 7 15,0 0-20-15,0 0-9 16,-32 41-6-16,32-32-2 16,0-2-2-16,0-2 3 15,0-3-7-15,7-2-13 16,4 0 21-16,3 0 13 15,0 0-13-15,-1-11 0 16,-4-1 12-16,-6 1 17 16,-3 0-2-16,0-3 35 0,0 4-40 15,0 0 12-15,-12 7-9 16,-5 3-17-16,-4 0-8 16,3 0-3-16,1 6 1 15,5 6 1-15,5-3-4 16,3 3-13-16,4-5-17 15,0-1 27-15,0-3-13 16,0-1 8-16,5-2 7 16,6 0 12-16,-1 0 11 15,1-2 23-15,-2-2-34 16,-5-1-6-16,-4 2-48 16</inkml:trace>
+  <inkml:trace contextRef="#ctx0" brushRef="#br0" timeOffset="-965.8">25553 6438 97 0,'0'0'32'0,"0"0"-14"16,0 0 10-16,0 0 7 15,0 0-20-15,0 0-9 16,-32 41-6-16,32-32-2 16,0-2-2-16,0-2 3 15,0-3-7-15,7-2-13 16,4 0 21-16,3 0 13 15,0 0-13-15,-1-11 0 16,-4-1 12-16,-6 1 17 16,-3 0-2-16,0-3 35 0,0 4-40 15,0 0 12-15,-12 7-9 16,-5 3-17-16,-4 0-8 16,3 0-3-16,1 6 1 15,5 6 1-15,5-3-4 16,3 3-13-16,4-5-17 15,0-1 27-15,0-3-13 16,0-1 8-16,5-2 7 16,6 0 12-16,-1 0 11 15,1-2 23-15,-2-2-34 16,-5-1-6-16,-4 2-48 16</inkml:trace>
   <inkml:trace contextRef="#ctx0" brushRef="#br0" timeOffset="-127.07">25461 6683 9 0,'0'0'97'16,"0"0"-43"-16,0 0-10 0,0 0 33 16,0 0 24-16,0 0-31 15,-2-3-14-15,2 3 1 16,0 0-26-16,-1 0-28 15,-5 0-3-15,-1 18 0 16,-2 9-3-16,-2 1 7 16,-4 2 0-16,3 0-4 15,-4-3 2-15,4 1-5 16,2-5 8-16,4 1-6 16,4-3 1-16,2-1-10 15,0-8 3-15,2 1-4 0,9-6-15 16,5-6 21-1,4-1-7-15,4 0 12 0,2-1 0 16,-1-6-8 0,-4-2-81-16,-8 5-67 0</inkml:trace>
   <inkml:trace contextRef="#ctx0" brushRef="#br0" timeOffset="8977.44">25524 5771 53 0,'0'0'107'0,"0"0"8"0,0 0-28 15,0 0-27-15,0 0-29 16,0 0 12-16,0 0-10 15,0 0 3-15,-5 0 23 16,5 0-38-16,0 0-18 16,0 0-3-16,0 0-19 15,9 4 18-15,6 7 0 16,9 2 2-16,6-3 8 16,3-4-8-16,3-3-1 15,4-3 12-15,0 0-12 16,-4 0 0-16,-6 0-6 15,-8 0-42-15,-10 0-72 16,-9-2-92-16</inkml:trace>
   <inkml:trace contextRef="#ctx0" brushRef="#br0" timeOffset="9376.14">25685 5797 17 0,'0'0'67'16,"0"0"-29"-16,0 0 0 16,0 0 18-16,0 0-21 15,0 0-20-15,-2 1 7 0,2-1-6 16,0 0 12-16,0 4-3 15,-1 6-25-15,-5 4 0 16,0 7 17-16,-4 6-9 16,4 1 2-16,-1 1-2 15,1-1 0-15,-1-1-1 16,1-2-2-16,2-2-5 16,-1-4 0-16,2-5 3 15,2-2-4-15,-1-5 1 16,2-3 0-16,0-2 2 15,-1-2 4-15,-1 0-6 16,-2 0 2-16,-1-7-2 16,2-6-182-16,0-3-43 0</inkml:trace>
@@ -3944,7 +4391,7 @@
   <inkml:trace contextRef="#ctx0" brushRef="#br0" timeOffset="15597.25">13678 12478 14 0,'0'0'93'16,"0"0"14"-16,0 0-63 15,0 0-40-15,0 0 7 16,0 0 16-16,-8 27 0 16,8-4 2-16,0 6 0 15,3 4-6-15,2 4-16 16,-2-5-7-16,-2-2 7 16,-1-7-6-16,0-3-1 15,0-4 0-15,0-6 4 16,0-2-4-16,0-7 0 15,0 1 0-15,0-2 7 0,10 0-6 16,6-8 3-16,3-14-4 16,-1-5-11-16,0-9 0 15,-5-7-24-15,0-2-2 16,-5 1 18-16,-3 12-11 16,-4 10 30-16,1 10 0 15,-1 9 31-15,-1 3 29 16,0 0-60-16,0 9 4 15,0 9 15-15,-4 7 13 16,-4 2-16-16,3 3-6 16,1 0-9-16,0-1 6 0,2-2-7 15,2-6 2 1,0-1-5-16,0-4-22 0,7-4-24 16,6 0-22-16,3-5-51 15</inkml:trace>
   <inkml:trace contextRef="#ctx0" brushRef="#br0" timeOffset="15903.99">13922 12762 76 0,'0'0'68'16,"0"0"-26"-16,0 0 22 15,0 0-7-15,0 0-33 16,0 0-9-16,48-1 1 15,-42 5-9-15,-3 6 19 0,-1 4 2 16,-2 1-6-16,0 2-4 16,0 0-2-16,-2 0-1 15,-6 1 9-15,0 2-18 16,3-3-4-16,2-4-2 16,3-4 2-16,0-3-2 15,0-1 1-15,0-3 1 16,11-2 5-16,7 0-7 15,4 0-11-15,3-11-17 16,1-7-75-16,-1-2-190 16</inkml:trace>
   <inkml:trace contextRef="#ctx0" brushRef="#br0" timeOffset="16720.91">15113 12457 84 0,'0'0'42'0,"0"0"29"16,0 0 5-16,3 90 2 15,-3-59-32-15,0 0-24 16,0 0-4-16,-8-4 8 16,0-4-17-16,-1-4 10 15,2-5-15-15,3-5 1 16,1-3-4-16,3-5 3 0,0-1 2 15,0 0 8-15,0-7 23 16,1-13-24-16,12-7-13 16,0-4 0-16,3-7 0 15,-2 0-9-15,1 3 4 16,-2 7-1-16,-1 7-15 16,-4 7 18-16,-2 5-3 15,-2 6 3-15,-4 3 3 16,2 0-9-16,-2 0-6 15,0 14 15-15,0 4 0 16,0 3 17-16,0 1-13 16,0 6-1-16,-3 6-3 15,1 3 3-15,2-2-6 0,0 2-21 16,0-7-1 0,0-3-31-16,3-5-82 0,7-11-36 15</inkml:trace>
-  <inkml:trace contextRef="#ctx0" brushRef="#br0" timeOffset="17085.81">15344 12746 57 0,'0'0'111'16,"0"0"-54"-16,0 0 22 16,0 0-5-16,0 0-23 15,0 0-13-15,51-2-25 16,-48 2-6-16,-2 0-7 15,1 0-1-15,-2 4 1 16,0 4 0-16,-2 3 12 0,-8 1-3 16,-2-1-9-16,3 3-6 15,3 0 0-15,4 0-2 16,1 5 1-16,1-1-8 16,0 4 3-16,0 1 11 15,0 3-15-15,0-2 15 16,0-4-11-16,0 2 5 15,0-4 6-15,0-1 2 16,0 0-1-16,-2-3 6 16,-5-1-2-16,3-2 17 0,-1-1-5 15,-1-4-11 1,2 4-5-16,-2-6-58 0,0-2-88 16,1-2-86-16</inkml:trace>
+  <inkml:trace contextRef="#ctx0" brushRef="#br0" timeOffset="17085.8">15344 12746 57 0,'0'0'111'16,"0"0"-54"-16,0 0 22 16,0 0-5-16,0 0-23 15,0 0-13-15,51-2-25 16,-48 2-6-16,-2 0-7 15,1 0-1-15,-2 4 1 16,0 4 0-16,-2 3 12 0,-8 1-3 16,-2-1-9-16,3 3-6 15,3 0 0-15,4 0-2 16,1 5 1-16,1-1-8 16,0 4 3-16,0 1 11 15,0 3-15-15,0-2 15 16,0-4-11-16,0 2 5 15,0-4 6-15,0-1 2 16,0 0-1-16,-2-3 6 16,-5-1-2-16,3-2 17 0,-1-1-5 15,-1-4-11 1,2 4-5-16,-2-6-58 0,0-2-88 16,1-2-86-16</inkml:trace>
   <inkml:trace contextRef="#ctx0" brushRef="#br0" timeOffset="18534.96">16821 12383 32 0,'0'0'66'16,"0"0"17"0,0 0-19-16,0 0 28 0,0 0-57 15,0 0-35-15,-4 2 0 16,4 19 16-16,0 2 12 15,7 2-25-15,3-5 6 16,3-2-9-16,-1-3 0 16,1-5 5-16,-1-5-3 15,3-5-1-15,0 0-1 16,4-3-6-16,-1-12 6 16,0-2-9-16,-4-5 7 15,-4 5-1-15,-4 5-3 0,-2 6 6 16,-2 5 4-1,-2 1-3-15,0 0-1 16,0 0-14-16,0 14 14 0,0 5 7 16,0 6-5-16,-8 5 8 15,-6 9 0-15,-2 3 2 16,-3 3 5-16,-1 1-4 16,3-6-11-16,0-3 4 15,5-7-4-15,3-5-2 16,3-8 0-16,3-3 1 15,-1-7-5-15,4 0-15 16,0-6-44-16,0-1-54 16,4 0-62-16</inkml:trace>
   <inkml:trace contextRef="#ctx0" brushRef="#br0" timeOffset="27150.43">16740 6257 5 0,'0'0'15'0,"0"0"-6"16,0 0 1-16,0 0 8 0,0 0-11 15,0 0-7-15,0 0 3 16,0 0-2-16,0-3-1 15,0 1 10-15,0-2-1 16,0 1-5-16,0-4-3 16,0 4 1-16,0 2 16 15,0-5-18-15,0 3 1 16,0-1 2-16,2 1-2 16,-1 0 1-16,1-1-1 15,-1 2 1-15,1-3 5 16,-2 1-7-16,0 1 7 15,0 3 8-15,0 0-2 0,0 0 5 16,2 0-12 0,-2 0-6-16,0 0 0 0,0 0 0 15,0 0-2-15,0 0-2 16,0 2 4-16,0 8 10 16,0 1 5-16,-7 0-4 15,3-1 0-15,0-1-4 16,2 3 0-16,2 1 4 15,0-3-8-15,0 2 4 16,0 0-5-16,0-1-2 16,0 2 3-16,0-2-3 15,3-1 4-15,4 3-1 16,1 1-3-16,3 0 4 16,-1 0-4-16,-3-1 0 15,1-2 0-15,-5-5 0 0,0 2 0 16,-1-2 0-16,-1 1 2 15,-1 0-2-15,2-2 0 16,-1-2 0-16,-1 0-2 16,3-2 4-16,-3-1-2 15,0 2 3-15,3-2-2 16,0 0-1-16,1 0 0 16,2 0-1-16,0 0-1 15,0-6-6-15,4-3-5 16,-3-4-6-16,2 0-13 0,-2-3 1 15,0 2-24 1,-2 1-16-16,-1 0 17 0</inkml:trace>
   <inkml:trace contextRef="#ctx0" brushRef="#br0" timeOffset="96237.86">21557 6647 25 0,'0'0'47'0,"0"0"18"15,0 0-9-15,0 0-14 0,0 0-6 16,0 0 1-16,0 0 5 16,0-1 53-16,0 1-65 15,0 0-22-15,0 0-8 16,0 0-5-16,0 0-4 16,0 10-1-16,0 11 10 15,-2 5 4-15,2 2 3 16,0 1-3-16,0 7 1 15,0 1-4-15,0 3 8 16,2 4-3-16,7-2 0 0,2-2-5 16,3-3 0-1,4-6 3-15,-2-5-4 0,2-6 4 16,-3-6-4-16,0-5 2 16,-1-6-1-16,3-3 6 15,1 0-1-15,5-12 1 16,2-9 1-16,0-7-4 15,-4-6 13-15,-4-1-10 16,-7-3 6-16,-8-2-11 16,-2 4-1-16,0-3-2 15,-15 4-5-15,-6 5-13 16,-1 11-14-16,0 7-34 16,-1 11-10-16,-3 1-24 15,1 1 50-15,2 13-46 16,4-2 1-16</inkml:trace>
@@ -3957,18 +4404,18 @@
   <inkml:trace contextRef="#ctx0" brushRef="#br0" timeOffset="159059.87">3852 16586 24 0,'0'0'190'16,"0"0"-138"-16,0 0-37 15,0 0 12-15,0 0 4 16,0 0 24-16,0 0-14 16,9 0-28-16,1-2 20 15,7-8-32-15,5-2 0 16,6 1-1-16,4 4 4 0,2 3-5 15,2-2 1 1,1 6-1-16,5-7-6 0,0 0 4 16,5 1 2-16,4 3-7 15,3 2-9-15,-2 1 15 16,-4 0-4-16,1 0 4 16,-9 0-2-16,-4 5 3 15,-3 4 1-15,-3-3 0 16,5-2-13-16,1-1 8 15,2-3-1-15,-1 0 6 16,2 0 0-16,1 0 0 16,-3-5 4-16,-2-2-4 15,-7 4 1-15,-6 1-3 16,-4-3 2-16,0 5 0 0,-1-3 0 16,2-1 2-16,2-3-2 15,0 1 0-15,1 1 5 16,2-4-5-16,-3 5 0 15,-2-1 2-15,1 3-4 16,-5 1 3-16,1 0-1 16,-4-1 0-16,3 1 1 15,1-1-1-15,4-2 0 16,3 1 0-16,0-1-1 16,-1 1 3-16,2-1-2 15,-3 2 0-15,0 0 3 16,1-1-6-16,-1-2 3 15,3 0 0-15,0 2 4 0,4-3-4 16,2-2 0 0,0-2 0-16,7-4 3 0,-1 4-3 15,1 0 0-15,-4 2-4 16,0 4 2-16,-5-2-9 16,-5 0 8-16,1 3 3 15,-2-3-9-15,-1 1 9 16,-3 1-1-16,3-1 1 15,-2 0-3-15,2 1 4 16,-2-1-2-16,-2 0-1 16,1 1 2-16,0 0 2 15,1-2-2-15,3-1 0 0,2 0 1 16,-1 3 2-16,-4-1-4 16,3 2 1-16,-5 1 0 15,1-1 2-15,-3-1-2 16,1 3 0-16,-4 0 0 15,0-2 2-15,-5 2 0 16,-2-1-2-16,-5 1-2 16,0 1 2-16,0 0-29 15,-12 0-101-15,-12 0 5 16</inkml:trace>
   <inkml:trace contextRef="#ctx0" brushRef="#br0" timeOffset="160350.37">3808 16870 53 0,'0'0'42'15,"0"0"-7"-15,0 0-11 16,0 0-12-16,0 0 6 16,0 0 6-16,30 36 26 15,-10-33-12-15,5-3-22 0,5 0 4 16,3 0 5 0,3 0-4-16,4 0-3 0,2-1-4 15,1 1-8-15,5-2 0 16,0 2-6-16,4-1 1 15,4-2-1-15,1 0 0 16,1-5 0-16,-5-2-1 16,-3 1 7-16,-4-1-6 15,-2-1 0-15,-2 3 1 16,-1 0-1-16,1-2 0 16,4 4 0-16,-1-1-3 15,10 1-1-15,-4 2-8 16,1-2 3-16,-1 2-35 15,-5-2 23-15,-1-1 12 0,0 0 5 16,-1-3 1-16,-2 0 4 16,-1-1-1-16,-7 0 2 15,-3-2-1-15,1 2 6 16,-1-5 9-16,7 1 2 16,1-4 7-16,0 3-18 15,-3 1-3-15,-6 4-4 16,-6 4 2-16,-5-2 1 15,-7 4-3-15,6-4 2 16,-5 2 4-16,-1 0-4 16,0 0 2-16,-3 1 10 0,0 3 6 15,0 0-6 1,5 1-14-16,2 1 2 0,-1 1-6 16,4 0 4-16,-5 0 0 15,-1 0 0-15,-4 0-5 16,0 0 5-16,1 0 0 15,-1 0 4-15,-1 0-4 16,5 0 2-16,-1 0-2 16,3 0 0-16,0 0 1 15,6 0 1-15,-3 0-2 16,4 1-1-16,0 1 1 16,0-1 0-16,1-1 1 15,3 0-2-15,-3 0 2 16,3 0 2-16,-5 0-3 15,0-3-8-15,-4-5 4 0,-3-1 4 16,2 1-5-16,2 4 3 16,0-2-7-16,2 3-7 15,-4 3 6-15,-4-1 5 16,-3 1-9-16,-5 0-14 16,1 0-14-16,-4 0-36 15,-1 0-64-15</inkml:trace>
   <inkml:trace contextRef="#ctx0" brushRef="#br0" timeOffset="161453.19">3309 16099 138 0,'0'0'48'0,"0"0"-45"0,0 0 26 15,0 0 23-15,0 0-42 16,0 0 30-16,25 17-5 15,-23-17-21-15,-2 2 0 16,0-2-1-16,1 0 21 16,-1 0-6-16,2 0 6 15,-2 0 9-15,0 0-25 16,0 0-6-16,0 0-12 16,1 0 1-16,2 0-7 15,0 0 6-15,1 0 0 16,1 0 5-16,1 0-5 15,0 0-3-15,3-2-11 0,0-8-6 16,-2 2 8-16,1-4-4 16,-4 1-11-16,-1-2-23 15,0 3 5-15,-3-1-3 16,0 4-37-16,0 6-62 16</inkml:trace>
-  <inkml:trace contextRef="#ctx0" brushRef="#br0" timeOffset="161674.98">3309 16099 144 0</inkml:trace>
+  <inkml:trace contextRef="#ctx0" brushRef="#br0" timeOffset="161674.97">3309 16099 144 0</inkml:trace>
   <inkml:trace contextRef="#ctx0" brushRef="#br0" timeOffset="161895.21">3309 16099 144 0,'-64'-13'87'0,"64"13"-87"0,0 0 0 0,0 0 0 0,0 9 1 15,8 2 29-15,0 3-21 16,7 3 20-16,-2-2-15 0,1 0-7 15,-1-2 8-15,-1-5-7 16,-3-1-6-16,-2-4 3 16,-4-1-1-16,0-2-2 15,-1 0 15-15,1 0 19 16,3-2 15-16,-3-12-13 16,6-3-6-16,-5-5-19 15,1 2-8-15,-1-6-8 16,-1 1 3-16,0 0-46 15,5 9-90-15,2 12-79 16,4 4 98-16</inkml:trace>
   <inkml:trace contextRef="#ctx0" brushRef="#br0" timeOffset="162490.22">3433 16497 39 0,'0'0'118'16,"0"0"-40"-16,0 0-8 15,0 0 0-15,0 0-37 16,0 0-11-16,-2-3-22 0,2 16-14 16,6 12 12-16,6 6 1 15,2-1 2-15,-1-1 7 16,-3-8-4-16,-2-3-4 15,-1-9 3-15,1-3 1 16,-4-5 3-16,-1-1 3 16,0 0 5-16,2 0 35 15,2-16 2-15,-1-9-42 16,0-3-7-16,3 1-3 16,-2 7-1-16,1 7-33 15,-1 9-24-15,1 4-59 16,-1 10-81-16</inkml:trace>
   <inkml:trace contextRef="#ctx0" brushRef="#br0" timeOffset="163020.99">3549 16862 53 0,'0'0'73'15,"0"0"-51"-15,0 0-9 16,0 0-2-16,0 0 41 16,0 0-14-16,5 19 2 15,2-8-22-15,0 1 22 16,1 1-4-16,1 1-4 15,4 2-14-15,-2 1-2 0,2 0-15 16,-4-4 15-16,-3-1-16 16,3-6 7-16,-2-3-1 15,-4-3-3-15,2 0 13 16,-1 0 22-16,2 0-7 16,2-6-9-16,2-6-10 15,1-8-3-15,2 1-9 16,-4-2-3-16,3 4-20 15,3 5-45-15,-5 5-53 16,-2 3-90-16</inkml:trace>
   <inkml:trace contextRef="#ctx0" brushRef="#br0" timeOffset="-155495.41">24391 4718 36 0,'0'0'59'0,"0"0"-16"16,0 0-17-16,0 0-1 15,0 0-13-15,0 0 9 16,0 0 1-16,0 0-9 16,-1 0 6-16,1 0-12 15,0 0-4-15,0 0 12 16,0 0-14-16,0 0 15 16,3 0-9-16,1-2-7 0,1 0 2 15,-4-1 1-15,1 3-3 16,-1 0 7-16,-1 0-6 15,0 0 1-15,0 0-2 16,0 0 3-16,0 0-7 16,3 0-5-16,3 6-1 15,-3 6 9-15,2 0-9 16,-4-1 6-16,-1 1 3 16,0 2-7-16,0-5 8 15,0 2 0-15,0-3-4 16,0-3 4-16,-1-2-5 15,1-1 5-15,0-2 14 16,0 0-11-16,0 0 17 16,0 0 3-16,0 0 26 15,1-14-23-15,11-6-26 16,6-3-9-16,3 2-2 0,-3-1 3 16,0 5-3-16,-8 4 20 15,-4 6-9-15,-2 1 23 16,-4 5-8-16,0 1-9 15,0 0-6-15,0 0-27 16,0 0 5-16,0 10 7 16,-5 7 15-16,-1-2 10 15,4 1-9-15,-1-1 5 16,3 4-6-16,0-2-4 0,0 0 3 16,0-2-14-1,0-1-37-15,5-4 6 0,4-3-37 16,4-3 21-1,-1-4-64-15</inkml:trace>
   <inkml:trace contextRef="#ctx0" brushRef="#br0" timeOffset="-155329.83">24612 4835 29 0,'0'0'59'16,"0"0"-59"-16,0 0 48 15,0 0-4-15,0 0-1 16,0 0-31-16,-7 57 0 15,5-44-12-15,1-4 4 16,1 1-4-16,0-4-19 16,0 0-41-16,0-5-19 0</inkml:trace>
-  <inkml:trace contextRef="#ctx0" brushRef="#br0" timeOffset="-154835.2">24627 4518 34 0,'0'0'66'0,"0"0"-52"16,0 0-5-16,0 0 31 15,0 0-22-15,0 0 26 16,40 27-25-16,-19-19-13 15,-1-1-5-15,0 0-2 16,1-4-17-16,-3-1-60 16,0-2-54-16</inkml:trace>
+  <inkml:trace contextRef="#ctx0" brushRef="#br0" timeOffset="-154835.21">24627 4518 34 0,'0'0'66'0,"0"0"-52"16,0 0-5-16,0 0 31 15,0 0-22-15,0 0 26 16,40 27-25-16,-19-19-13 15,-1-1-5-15,0 0-2 16,1-4-17-16,-3-1-60 16,0-2-54-16</inkml:trace>
   <inkml:trace contextRef="#ctx0" brushRef="#br0" timeOffset="-154661.41">24733 4659 17 0,'0'0'53'15,"0"0"-37"-15,0 0-14 16,0 0-2-16,0 0-2 16,0 0-79-16</inkml:trace>
-  <inkml:trace contextRef="#ctx0" brushRef="#br0" timeOffset="-153824.24">24487 5079 28 0,'0'0'25'15,"0"0"0"-15,0 0-6 16,0 0 62-16,-38 87-67 16,28-63 31-16,0-4-31 15,2-5 3-15,4-1-5 0,-1-4-11 16,2-5 7-16,0 0-8 15,3-5 3-15,0 0 3 16,0 0 2-16,0 0 33 16,0-10 0-16,15-12-40 15,3-3 2-15,2-10-3 16,0 3-22-16,-5 5-8 16,-1 7 22-16,-7 11 8 15,-4 9 6-15,0 0-6 16,-1 0-14-16,1 18 8 15,-2 5-1-15,-1 3 7 16,0-2-13-16,0-1-5 16,0-1-20-16,0-3-47 0,-6-4-36 15</inkml:trace>
+  <inkml:trace contextRef="#ctx0" brushRef="#br0" timeOffset="-153824.25">24487 5079 28 0,'0'0'25'15,"0"0"0"-15,0 0-6 16,0 0 62-16,-38 87-67 16,28-63 31-16,0-4-31 15,2-5 3-15,4-1-5 0,-1-4-11 16,2-5 7-16,0 0-8 15,3-5 3-15,0 0 3 16,0 0 2-16,0 0 33 16,0-10 0-16,15-12-40 15,3-3 2-15,2-10-3 16,0 3-22-16,-5 5-8 16,-1 7 22-16,-7 11 8 15,-4 9 6-15,0 0-6 16,-1 0-14-16,1 18 8 15,-2 5-1-15,-1 3 7 16,0-2-13-16,0-1-5 16,0-1-20-16,0-3-47 0,-6-4-36 15</inkml:trace>
   <inkml:trace contextRef="#ctx0" brushRef="#br0" timeOffset="-153409.81">24587 5332 43 0,'0'0'130'0,"0"0"-47"15,0 0-30-15,0 0-4 16,0 0-16-16,0 0-15 16,22-1-3-16,-20 1-15 15,-1 3 0-15,-1 8 0 16,0 4-10-16,0 3 10 15,0 3 13-15,0 0-8 16,-1 0-5-16,1-4 3 0,0-3 3 16,0-2-4-1,0-5-2-15,0-5 0 0,0-2-4 16,9 0-38-16,7-9-21 16,2-20-271-16</inkml:trace>
   <inkml:trace contextRef="#ctx0" brushRef="#br0" timeOffset="-153229.37">24679 5026 66 0,'0'0'57'15,"0"0"-42"-15,0 0 11 0,0 0 11 16,0 0-32-16,87 0-5 15,-66 0-12-15,-6 0-84 16</inkml:trace>
-  <inkml:trace contextRef="#ctx0" brushRef="#br0" timeOffset="-153048.14">24764 5114 72 0,'0'0'44'16,"0"0"7"-16,0 0-15 0,0 0-31 15,-20 91 3 1,17-73-8-16,3-6-91 0</inkml:trace>
+  <inkml:trace contextRef="#ctx0" brushRef="#br0" timeOffset="-153048.15">24764 5114 72 0,'0'0'44'16,"0"0"7"-16,0 0-15 0,0 0-31 15,-20 91 3 1,17-73-8-16,3-6-91 0</inkml:trace>
   <inkml:trace contextRef="#ctx0" brushRef="#br0" timeOffset="-152125.84">24445 5802 57 0,'0'0'147'15,"0"0"-141"-15,0 0-6 16,0 0 0-16,0 0 20 16,0 0-2-16,1 53-9 0,-8-36-5 15,0-1 9-15,1-2-7 16,1-1-3-16,2-3-3 16,2-7 0-16,1-3-2 15,0 0-48-15,7-1 48 16,11-16-53-16,3-5 38 15,-3 0 17-15,-5 1 36 16,-2 5 85-16,-5 7-70 16,-5 3-24-16,1 4 15 15,-2 2-2-15,0 0-40 16,0 0-8-16,0 6-17 16,0 8 25-16,0 1-1 0,0 3-55 15,0-5 17 1,0-1-57-16,0-2-75 0</inkml:trace>
   <inkml:trace contextRef="#ctx0" brushRef="#br0" timeOffset="-151858.31">24585 5942 23 0,'0'0'63'0,"0"0"-1"15,0 0-11-15,0 0-30 16,0 0-4-16,0 0-7 0,0 31 0 16,0-21-1-16,0 1-5 15,0 0 5-15,-3 0-5 16,-3 0 2-16,0 1 16 16,-1-2-6-16,0-2-6 15,2 1-8-15,1-3 1 16,-1-2-6-16,3-4-23 15,-1 0-124-15,3 0-3 16</inkml:trace>
   <inkml:trace contextRef="#ctx0" brushRef="#br0" timeOffset="-151534.48">24681 5631 78 0,'0'0'28'0,"0"0"-25"16,0 0-3-16,0 0 11 15,0 0-6-15,0 0-5 16,0 0 4-16,10-4 1 15,-10 6 35-15,0 5-23 16,0 1-9-16,0 3 9 0,0-2-17 16,0 0 38-16,6 2 1 15,8-6-25-15,2 1-8 16,1-4-6-16,2-2-58 16,-3 0-71-16</inkml:trace>
@@ -3982,13 +4429,13 @@
   <inkml:trace contextRef="#ctx0" brushRef="#br0" timeOffset="-107372.6">21858 13312 119 0,'0'0'133'0,"0"0"-133"16,0 0 3 0,0 0 17-16,0 0 64 0,-15 81-49 15,11-58-7-15,-2-1-10 16,3 0-5-16,-2-3 9 16,2-2-17-16,0-4-4 15,0 2 1-15,3-4-2 16,-3-1-54-16,0-4-118 15</inkml:trace>
   <inkml:trace contextRef="#ctx0" brushRef="#br0" timeOffset="-106384.2">21404 13968 93 0,'0'0'169'0,"0"0"-46"16,0 0-65-16,0 0-5 0,0 0-21 15,0 0-4-15,0 0-9 16,42-36-4-16,-33 36-13 16,-4 0-1-16,-2 0-1 15,-2 0-3-15,-1 0-1 16,0 0-3-16,0 0-2 15,0 11 7-15,-4 7-6 16,-14 7 8-16,1 0-6 16,1 1-3-16,5 1 8 15,7 3-2-15,4 2 0 0,0 7 1 16,1-3-27 0,10-1-17-16,0-3 22 0,0-6 6 15,-2-2 14-15,-3-5-1 16,-4-4 5-16,-1-3 3 15,-1-3-2-15,0-1 7 16,0 0 9-16,0-3 3 16,-7 4 23-16,-4-4-21 15,1 3-4-15,1-6-5 16,1 1-8-16,1-1-2 16,0-1-3-16,4-1-1 15,0 0-37-15,3 0-47 16,0 0-93-16</inkml:trace>
   <inkml:trace contextRef="#ctx0" brushRef="#br0" timeOffset="-106207.77">21618 14236 66 0,'0'0'71'0,"0"0"-71"16,0 0-94-16</inkml:trace>
-  <inkml:trace contextRef="#ctx0" brushRef="#br0" timeOffset="-103696.87">21651 14291 56 0,'0'0'62'16,"0"0"-14"-16,0 0 0 0,0 0-12 16,0 0 14-16,0 0 3 15,7 0-24-15,-7 0 9 16,2 0 1-16,-2 0-19 15,0 0-5-15,0 0-15 16,0 0 0-16,0 0-2 16,0 0-3-16,0 0 0 15,0 0 3-15,0 0-3 16,0 0 5-16,0 0 6 16,0 0-6-16,0 0 8 15,0 0-8-15,0 0 3 16,0 0 4-16,0 0-7 15,0 0 8-15,0 0-6 16,0-2 2-16,0-3-5 16,-2 1 1-16,1 0-34 0,-1-3-117 15</inkml:trace>
+  <inkml:trace contextRef="#ctx0" brushRef="#br0" timeOffset="-103696.88">21651 14291 56 0,'0'0'62'16,"0"0"-14"-16,0 0 0 0,0 0-12 16,0 0 14-16,0 0 3 15,7 0-24-15,-7 0 9 16,2 0 1-16,-2 0-19 15,0 0-5-15,0 0-15 16,0 0 0-16,0 0-2 16,0 0-3-16,0 0 0 15,0 0 3-15,0 0-3 16,0 0 5-16,0 0 6 16,0 0-6-16,0 0 8 15,0 0-8-15,0 0 3 16,0 0 4-16,0 0-7 15,0 0 8-15,0 0-6 16,0-2 2-16,0-3-5 16,-2 1 1-16,1 0-34 0,-1-3-117 15</inkml:trace>
   <inkml:trace contextRef="#ctx0" brushRef="#br0" timeOffset="-103344.68">21959 13940 109 0,'0'0'76'0,"0"0"-23"15,0 0-6-15,0 0-40 16,0 0-7-16,0 0 0 15,90-25-17-15,-84 19-34 16,-3 0-3-16,-3-1-77 0</inkml:trace>
   <inkml:trace contextRef="#ctx0" brushRef="#br0" timeOffset="-102911.49">21959 13940 49 0,'-80'108'42'0,"79"-102"2"16,-1 0-9-16,2-3-18 0,0-2-7 16,0-1 6-16,0 0 35 15,0 0 25-15,0 0-21 16,0 0-28-16,0 0-14 15,2 0-13-15,12 0 0 16,3 0-1-16,1 4-20 16,1 5 9-16,-6 5-12 15,4 3 9-15,-7 2 8 16,-2 1-9-16,-2 1 16 16,-5-3-1-16,-1 0 0 15,0-1-2-15,-7-4 6 16,-11-1 3-16,-6-3 36 15,0-2-5-15,0-1-10 16,5-4-3-16,-1-2-2 0,3 0 3 16,2 0-9-1,1 0-11-15,7-2 1 0,4-1-6 16,3-1-9-16,0-1-63 16,0 1-240-16</inkml:trace>
   <inkml:trace contextRef="#ctx0" brushRef="#br0" timeOffset="-100924.04">21455 15024 9 0,'0'0'92'0,"0"0"-19"16,0 0 4-16,0 0-7 0,0 0-20 16,0 0-13-16,-18-68-10 15,17 66-2-15,1 0-7 16,0 2 16-16,0 0-26 16,0 0-8-16,0 0-9 15,0 6 1-15,0 9 6 16,0 7 2-16,0 1 1 15,0 1 0-15,0-1 2 16,0-4-3-16,0-2 0 16,0-2 2-16,0-1-2 15,4-5 0-15,1-1-2 16,2-1-50-16,2-7-90 0</inkml:trace>
   <inkml:trace contextRef="#ctx0" brushRef="#br0" timeOffset="-100711.52">21661 15087 67 0,'0'0'96'0,"0"0"-96"0,0 0-2 16,0 0-62 0,0 0-32-16</inkml:trace>
   <inkml:trace contextRef="#ctx0" brushRef="#br0" timeOffset="-100125.77">21892 14864 179 0,'0'0'129'0,"0"0"-99"16,0 0-28-16,0 0 11 16,0 0 3-16,0 0 25 15,-17 23-8-15,9-10-24 16,2 2 2-16,0 2 4 16,3-1-12-16,0 2 5 15,3 2-8-15,0-1 2 16,0 4 2-16,0-3-3 0,9 1 1 15,0-4-1 1,0-4-1-16,3-4 0 0,0-4-1 16,1-4-4-16,5-1 3 15,3 0-23-15,0-3 4 16,1-12-14-16,-4-5 35 16,-7 1 20-16,-2 1-18 15,-4 3 1-15,-2 3 15 16,-1 8-4-16,-2 1 17 15,0 3-3-15,0 0-14 16,1 4-14-16,1 15-16 16,-1 5 16-16,1 3 10 15,-2 1-9-15,0-2 0 16,0 2 1-16,0 0 2 0,0-4-5 16,0-3 2-1,-5-5-2-15,-1-8 0 0,-2-3-74 16,-1-5-110-16</inkml:trace>
-  <inkml:trace contextRef="#ctx0" brushRef="#br0" timeOffset="-99257.62">21722 15034 6 0,'0'0'64'16,"0"0"-52"-16,0 0 30 15,0 0 9-15,0 0-19 16,0 0 27-16,0 0 28 16,0 0-7-16,0 0-19 15,0 0-16-15,0 0-28 0,0 0 1 16,0 0-17 0,0 0 3-16,0 0-8 0,0 0-1 15,-3 0 2-15,0 4-5 16,0 5 8-16,0 2 1 15,2-3-1-15,1-1 0 16,0-4-2-16,0 2-1 16,0-4-10-16,0-1-15 15,0 0 8-15,0 0 18 16,3 0 2-16,3 0 9 16,-3-7-7-16,0 2 8 15,1 3-10-15,-3 0 5 16,-1 1-1-16,0 1-2 0,0 0-2 15,0 0 0 1,0 0-2-16,0 0 5 0,0 0-3 16,0 0 2-16,0 0-2 15,0 0 19-15,0 0-7 16,0 0-2-16,0 0 12 16,0 0-10-16,0 0-4 15,0 0-8-15,0 0 3 16,0 0-6-16,0 0 3 15,0 0 0-15,0 0-2 16,0-4 7-16,0 0-9 16,0-5 4-16,2 2-41 15,-2-2 39-15,0 4-1 16,0 0 3-16,0-1 3 0,0 5-1 16,-3-2-2-1,-1 3 0-15,-2 0-3 0,1 0 3 16,1 0-6-16,1 0 6 15,1 6-4-15,1 1-2 16,1-3 6-16,0 1 0 16,0-2 2-16,0-2-7 15,0-1 5-15,0 0 0 16,0 0 5-16,0 0-4 16,0 0-2-16,0 0-11 15,0 0-58-15,0 0-65 16,4 0-70-16</inkml:trace>
+  <inkml:trace contextRef="#ctx0" brushRef="#br0" timeOffset="-99257.63">21722 15034 6 0,'0'0'64'16,"0"0"-52"-16,0 0 30 15,0 0 9-15,0 0-19 16,0 0 27-16,0 0 28 16,0 0-7-16,0 0-19 15,0 0-16-15,0 0-28 0,0 0 1 16,0 0-17 0,0 0 3-16,0 0-8 0,0 0-1 15,-3 0 2-15,0 4-5 16,0 5 8-16,0 2 1 15,2-3-1-15,1-1 0 16,0-4-2-16,0 2-1 16,0-4-10-16,0-1-15 15,0 0 8-15,0 0 18 16,3 0 2-16,3 0 9 16,-3-7-7-16,0 2 8 15,1 3-10-15,-3 0 5 16,-1 1-1-16,0 1-2 0,0 0-2 15,0 0 0 1,0 0-2-16,0 0 5 0,0 0-3 16,0 0 2-16,0 0-2 15,0 0 19-15,0 0-7 16,0 0-2-16,0 0 12 16,0 0-10-16,0 0-4 15,0 0-8-15,0 0 3 16,0 0-6-16,0 0 3 15,0 0 0-15,0 0-2 16,0-4 7-16,0 0-9 16,0-5 4-16,2 2-41 15,-2-2 39-15,0 4-1 16,0 0 3-16,0-1 3 0,0 5-1 16,-3-2-2-1,-1 3 0-15,-2 0-3 0,1 0 3 16,1 0-6-16,1 0 6 15,1 6-4-15,1 1-2 16,1-3 6-16,0 1 0 16,0-2 2-16,0-2-7 15,0-1 5-15,0 0 0 16,0 0 5-16,0 0-4 16,0 0-2-16,0 0-11 15,0 0-58-15,0 0-65 16,4 0-70-16</inkml:trace>
   <inkml:trace contextRef="#ctx0" brushRef="#br0" timeOffset="-97285.52">21268 14014 10 0,'0'0'44'16,"0"0"7"-16,0 0-11 15,0 0-17-15,0 0-9 16,0 0 11-16,0 0 22 16,0 0-2-16,0 0 9 15,0 0-13-15,0 0-12 16,0 0 9-16,0-5-6 15,0-3-19-15,10 1-13 16,-3 0-5-16,2 0 5 16,3-1 0-16,-1 4 5 15,0-3-3-15,1 3-2 16,0 1-9-16,2 3 9 16,-2 0 1-16,-2 0-1 0,0 0-2 15,1 4-3-15,-5 8 4 16,1 0-4-16,-4 3 5 15,-3 0-1-15,2 0 3 16,-2 3-1-16,0 0-1 16,0-2 2-16,-5 1-4 15,-5-2 5-15,1-1-3 16,0 0 0-16,-4-1 3 16,2 0-4-16,-2 1 1 15,2-2 0-15,2-3 1 16,0 2 0-16,2-3-1 15,1-2 0-15,4-2 4 0,1 1-5 16,1-3 1 0,0-2 0-16,0 2 12 0,0-2-2 15,0 0 10-15,0 0 5 16,5 0-24-16,6-12 1 16,-2 7-4-16,-1-3 4 15,-1 3-6-15,0 1 5 16,0 0-5-16,2 4-2 15,1 0 3-15,3 0 3 16,-2 0 0-16,-2 4-4 16,0 6 2-16,-3 2 0 15,1 4 2-15,-1 3-1 0,1-1 2 16,-2 1-2-16,0 1 1 16,-5-1 0-16,0-3-2 15,0 4 4-15,0-3-2 16,0-1 0-16,0-1 3 15,0 0-4-15,-5-1 1 16,-1-3 0-16,-4-3 1 16,-2 2 0-16,-1-3-1 15,-1 0 4-15,-2-3-3 16,1 2 5-16,-3-4-4 16,3-2 2-16,-1 0 6 15,0 0-2-15,2-3 3 16,-1-7 3-16,-2-3-11 15,4 0 4-15,1 0-7 16,2 7 0-16,3-1 2 0,4 4-1 16,2 2-2-16,1 1 1 15,0 0-30-15,0 0-6 16,0 0-26-16,0 0-48 16,0 0-72-16</inkml:trace>
   <inkml:trace contextRef="#ctx0" brushRef="#br0" timeOffset="-94407.15">21464 15673 29 0,'0'0'99'16,"0"0"-67"-16,0 0-10 0,0 0 46 16,0 0 8-16,0 0-42 15,0 0-23-15,-63 52 21 16,60-28 0-16,3 2-8 16,0-1-14-16,0-2 3 15,0-1-6-15,6-4-7 16,2-4 6-16,1-4-6 15,-2-4 0-15,-1-5-4 16,3-1 0-16,3 0 4 16,2 0 2-16,2-14 0 15,-1-5-4-15,-2-5-11 0,-4 0 0 16,-4-2 13 0,-5 1 0-16,0-1 2 0,0 4 1 15,-2 2-1-15,-5 3 1 16,-2 6-1-16,5 4 5 15,-1 0 3-15,2 3-2 16,-2 1-5-16,1-2-3 16,1 3 4-16,0 0-6 15,-1 0 2-15,4 2-3 16,0 0 2-16,0 0-50 16,0 0-71-16,0 0-21 15</inkml:trace>
   <inkml:trace contextRef="#ctx0" brushRef="#br0" timeOffset="-94144.18">21664 15724 78 0,'0'0'63'15,"0"0"24"-15,0 0 4 16,0 0-12-16,0 0-40 16,0 0-8-16,0-35 2 15,0 34-18-15,0 0-9 16,0 1-3-16,0 0-3 0,0 0 0 16,0 0-14-1,0 0-47-15,0 0-122 0</inkml:trace>
@@ -3998,23 +4445,23 @@
   <inkml:trace contextRef="#ctx0" brushRef="#br0" timeOffset="-90206.31">20972 15962 14 0,'-51'-4'21'0,"51"7"-13"16,0 8 40-16,0 0-32 15,0-2 14-15,0 3-13 16,0-1 8-16,0-1-3 15,0-2 14-15,2 2 2 16,-1-3-14-16,1 2 4 16,0-1-5-16,0-3-5 15,-1 1-9-15,2-2-3 16,3-2 5-16,2 0 5 16,5-2 3-16,5 0-1 15,5 0-4-15,3 0-8 16,1-10 8-16,-4 3-14 0,-2 0-1 15,-7 3-13 1,-5 2-20-16,-3 1-20 0,-2 1-36 16,-3 0-51-16</inkml:trace>
   <inkml:trace contextRef="#ctx0" brushRef="#br0" timeOffset="-87920.55">19860 12532 88 0,'0'0'55'16,"0"0"5"-16,0 0-2 16,0 0-12-16,0 0 2 15,0 0-19-15,-7-52 13 16,7 50 5-16,0 2-22 16,-2 0-9-16,-3 0-16 15,-5 2-9-15,-3 18 6 16,-5 12 3-16,3 7 1 0,2 7-1 15,7 6 2 1,3-7 2-16,3-4-1 0,0-7-3 16,0-5 3-16,4-3-3 15,8-4-1-15,6-6-41 16,6-5-46-16,3-9-143 16</inkml:trace>
   <inkml:trace contextRef="#ctx0" brushRef="#br0" timeOffset="-87594.88">20042 12753 53 0,'0'0'60'0,"0"0"-30"0,0 0 7 15,0 0-12-15,-11 88 1 16,11-78-16-16,0-3 5 15,10-4 5-15,-1-3-7 16,3 0 13-16,3 0 12 16,0-11-34-16,-2-11 16 15,-4 1-13-15,-4-4-1 16,-5-1 8-16,0 2 8 16,0 0-5-16,-11 5 1 15,2 7-18-15,-1 7 0 16,1 5-1-16,-1 0-22 15,-1 5-4-15,-1 9-44 0,4-2-36 16,5-3-31-16</inkml:trace>
-  <inkml:trace contextRef="#ctx0" brushRef="#br0" timeOffset="-87296.12">20257 12369 9 0,'0'0'158'0,"0"0"-136"0,0 0-10 16,0 0 44-16,0 0 17 15,0 0-32-15,0 81-3 16,0-54-7-16,0 1-13 15,0 6-4-15,0 0 3 16,0 2-15-16,0-1 0 16,2 3-2-16,4-8 0 15,1 0-21-15,3-5-59 16,-2-3-41-16,-1-8-28 16</inkml:trace>
+  <inkml:trace contextRef="#ctx0" brushRef="#br0" timeOffset="-87296.13">20257 12369 9 0,'0'0'158'0,"0"0"-136"0,0 0-10 16,0 0 44-16,0 0 17 15,0 0-32-15,0 81-3 16,0-54-7-16,0 1-13 15,0 6-4-15,0 0 3 16,0 2-15-16,0-1 0 16,2 3-2-16,4-8 0 15,1 0-21-15,3-5-59 16,-2-3-41-16,-1-8-28 16</inkml:trace>
   <inkml:trace contextRef="#ctx0" brushRef="#br0" timeOffset="-86712.38">20401 12738 26 0,'0'0'54'15,"0"0"-9"-15,0 0 15 16,0 0 3-16,11-94-13 15,-11 82 3-15,0 1 5 16,0 5-1-16,0 3-4 16,0 2-13-16,0 1-2 15,0 0-34-15,0 0-4 0,0 0 0 16,0 0-9 0,0 0 7-16,0 5 1 0,0 9 2 15,2 6-2-15,4 2 1 16,3 2 0-16,1-5-1 15,1-1-4-15,-2-3-9 16,-1-5-8-16,-2-3-4 16,-1-7 11-16,-1 0 7 15,3-3 8-15,1-11 7 16,-2-6-4-16,-1-4 3 16,-2-6-6-16,-2-2-2 15,1-1-3-15,-1 2 5 0,4 12 0 16,-2 3 0-1,1 8 2-15,-3 8-2 0,-1 0 0 16,0 1-1-16,2 13 1 16,1 6 0-16,2-3 5 15,-1-1 0-15,2 2-5 16,2 4 8-16,2 2 1 16,0 0-3-16,5 1 2 15,-4-2-5-15,-1-6-3 16,-4-2 0-16,-2-11 1 15,1-3-2-15,-2 2-25 16,2-3-32-16,-4 0-47 16,1-3-71-16</inkml:trace>
   <inkml:trace contextRef="#ctx0" brushRef="#br0" timeOffset="-86172.43">20658 12670 45 0,'0'0'47'0,"0"0"-11"16,0 0 17-16,0 0-27 15,0 0 53-15,0 0 23 16,11 3-49-16,-8-17-45 0,0-2-4 15,3 1-2 1,-2 1-3-16,-1 4 1 0,0 6 0 16,-1 4 0-16,2 0-7 15,2 14-7-15,3 9 10 16,0 2 4-16,-4 0 3 16,1-7-3-16,0-5 0 15,-3-4 1-15,2-7 1 16,-3-2-2-16,1 0 4 15,0-1 0-15,1-15 11 16,1-6-15-16,-2-6-3 16,0-4 2-16,-1 0-8 15,2 4 7-15,-1 8 2 0,1 10 0 16,1 5 5 0,1 5 3-16,0 0-5 0,2 4-1 15,0 7-2-15,0 1 6 16,-2 3-3-16,-2-4 0 15,3 4 0-15,-1-3-3 16,2 3 0-16,1 2 2 16,0-2-1-16,-2-1-2 15,1-5-25-15,-4-3-37 16,-1 1-45-16,0-4-76 16</inkml:trace>
   <inkml:trace contextRef="#ctx0" brushRef="#br0" timeOffset="-85675.46">20985 12562 4 0,'0'0'41'0,"0"0"50"16,0 0-42-16,0 0 18 15,0 0-6-15,0 0-34 16,11 59-7-16,-11-55-9 15,0-4-6-15,0 0 21 16,0 0 6-16,0 0 9 16,1-6-2-16,1-8-26 15,-1-1-11-15,2-2 3 16,2 3-5-16,1 1 0 16,1 6-9-16,-1 1 6 15,0 3 2-15,0 3 1 16,3 0-1-16,1 0 2 15,-1 0-1-15,0 9 0 0,-3-1-3 16,0 4 1-16,-3 2 2 16,-1 1 0-16,-1-2-1 15,-1 1 1-15,0-2-53 16,0-7-120-16</inkml:trace>
   <inkml:trace contextRef="#ctx0" brushRef="#br0" timeOffset="-85128.15">21373 12182 113 0,'0'0'72'16,"0"0"-16"-16,0 0 36 15,0 0-30-15,73 97-27 16,-61-67-9-16,-3 5 3 16,-3-1-12-16,-1 3 7 15,-4-2-11-15,-1-1-1 16,0-10-9-16,0-4-3 15,0-13 6-15,0-6-6 16,0 2 5-16,0-3 10 16,4 0 35-16,4-9 26 15,3-13-38-15,3-8-35 16,3-2-1-16,-1-9-2 0,-2-3-10 16,-1-1-6-16,-3 1-41 15,0 4-43-15,-6 8-43 16,-1 10-189-16</inkml:trace>
-  <inkml:trace contextRef="#ctx0" brushRef="#br0" timeOffset="-84722.62">21746 12444 75 0,'0'0'91'0,"0"0"-31"15,0 0 22-15,0 0 5 16,0 0-16-16,0 0-24 15,-12-59 14-15,12 59-36 16,0 0-25-16,-1 0-5 16,-3 4 0-16,3 10 5 15,-3 2 5-15,2 2-5 0,2 0 3 16,0-1 8 0,0 2-10-16,2-2 3 0,8 0-3 15,1-3 1-15,1-5-4 16,-1 0 2-16,3-4-49 15,1-3-14-15,1-2-75 16,2 0-14-16</inkml:trace>
+  <inkml:trace contextRef="#ctx0" brushRef="#br0" timeOffset="-84722.63">21746 12444 75 0,'0'0'91'0,"0"0"-31"15,0 0 22-15,0 0 5 16,0 0-16-16,0 0-24 15,-12-59 14-15,12 59-36 16,0 0-25-16,-1 0-5 16,-3 4 0-16,3 10 5 15,-3 2 5-15,2 2-5 0,2 0 3 16,0-1 8 0,0 2-10-16,2-2 3 0,8 0-3 15,1-3 1-15,1-5-4 16,-1 0 2-16,3-4-49 15,1-3-14-15,1-2-75 16,2 0-14-16</inkml:trace>
   <inkml:trace contextRef="#ctx0" brushRef="#br0" timeOffset="-84152.51">21942 12409 148 0,'0'0'159'0,"0"0"-68"16,0 0-46-16,0 0-30 15,0 0-8-15,0 0 0 16,-33 17-6-16,31-6 1 16,2 2 2-16,0 5 0 15,0-4 9-15,2 2-3 16,8-2-8-16,-2-5 3 15,1 0-3-15,1-4-4 16,0-5 0-16,4 0 2 16,1 0-15-16,0-8 21 15,0-5-6-15,-3 0 13 16,-5-1-9-16,0-1 12 0,-2 0-3 16,-2-6-2-16,0-3 9 15,-2-3-13-15,-1-3-3 16,2-5 0-16,-2 1-1 15,0-1-3-15,0 4 3 16,0 7 1-16,0 10 10 16,0 7 10-16,0 5 16 15,0 2-19-15,0 0-21 16,0 20-13-16,0 7 10 16,0 6 6-16,0 3 0 15,0 4-3-15,0 2 0 16,5-1 1-16,5 1 0 0,-1-5-1 15,-5-1-1 1,-1-10-34-16,-1-6-22 0,-2-9 20 16,0-10-20-16,0-1 7 15,0 0-4-15,0-2-41 16,-8-19 4-16,1-2-57 16,2-5 127-16,-2 1-6 15</inkml:trace>
   <inkml:trace contextRef="#ctx0" brushRef="#br0" timeOffset="-83851.7">22144 12393 4 0,'0'0'144'15,"0"0"-50"-15,0 0-40 16,0 0 12-16,0 87-30 15,4-79-13-15,-3-4-1 16,1-4 5-16,-2 0 4 16,0 0 28-16,3 0-11 15,-2-1 7-15,2-12-41 16,3-4-7-16,-6-1-5 16,0-3-2-16,0 0-1 15,0 3-21-15,0 6-14 16,0 3-9-16,0 7-13 15,-3 2-18-15,-1 0-66 0,4 0-42 16</inkml:trace>
-  <inkml:trace contextRef="#ctx0" brushRef="#br0" timeOffset="-83643.68">22144 12393 14 0,'20'-33'91'0,"-14"33"-2"16,0 9-19-16,1 0-3 16,0 2-9-16,0 0-14 15,0-3-16-15,-2 0 2 16,-1-2-13-16,-1-2-10 15,-1-2 4-15,-2-2 21 16,1 0 16-16,5 0 21 16,-2 0-18-16,4-9-20 15,1-1-28-15,0 2-2 16,-2 0 0-16,-1 3-1 0,-1 2-13 16,-2 1-46-16,0 1-59 15,-3-2-139-15</inkml:trace>
-  <inkml:trace contextRef="#ctx0" brushRef="#br0" timeOffset="-81058.18">23877 13082 17 0,'0'0'19'16,"0"0"11"-16,0 0 16 0,0 0-3 15,0 0-20-15,0 0-1 16,-9-17 22-16,4 14-13 16,2-1 1-16,0 3 0 15,2-1-19-15,-1 1 10 16,-1 1 12-16,3 0-6 16,0 0-22-16,0 0-7 15,5 0-1-15,11 0 1 16,3 0 1-16,3 1 7 15,0 5-8-15,0-5-7 16,0 1-55-16,-2-2 22 16,-4 0-43-16,-7 0-35 15,-6 0 77-15,-3 0 13 0,0 0-40 16</inkml:trace>
+  <inkml:trace contextRef="#ctx0" brushRef="#br0" timeOffset="-83643.69">22144 12393 14 0,'20'-33'91'0,"-14"33"-2"16,0 9-19-16,1 0-3 16,0 2-9-16,0 0-14 15,0-3-16-15,-2 0 2 16,-1-2-13-16,-1-2-10 15,-1-2 4-15,-2-2 21 16,1 0 16-16,5 0 21 16,-2 0-18-16,4-9-20 15,1-1-28-15,0 2-2 16,-2 0 0-16,-1 3-1 0,-1 2-13 16,-2 1-46-16,0 1-59 15,-3-2-139-15</inkml:trace>
+  <inkml:trace contextRef="#ctx0" brushRef="#br0" timeOffset="-81058.19">23877 13082 17 0,'0'0'19'16,"0"0"11"-16,0 0 16 0,0 0-3 15,0 0-20-15,0 0-1 16,-9-17 22-16,4 14-13 16,2-1 1-16,0 3 0 15,2-1-19-15,-1 1 10 16,-1 1 12-16,3 0-6 16,0 0-22-16,0 0-7 15,5 0-1-15,11 0 1 16,3 0 1-16,3 1 7 15,0 5-8-15,0-5-7 16,0 1-55-16,-2-2 22 16,-4 0-43-16,-7 0-35 15,-6 0 77-15,-3 0 13 0,0 0-40 16</inkml:trace>
   <inkml:trace contextRef="#ctx0" brushRef="#br0" timeOffset="-80583.96">23868 13082 84 0,'0'0'11'16,"0"0"-8"-16,0 0 24 15,0 0 21-15,0 0 2 0,0 0 2 16,-2 1 4-1,1 5-19-15,-1 5-27 0,-1 4 10 16,2 5 8-16,-1 4-13 16,2 1-3-16,-1 0 2 15,-1-1-11-15,2-3 5 16,-3 0-5-16,2-3-1 16,-1-2 4-16,1 0-1 15,-1-1-1-15,2 4 0 16,-1-1-3-16,-2-1 9 15,1 0 2-15,-1-3-3 16,0-4 3-16,2-2-10 16,-1-5 2-16,2-3 5 15,0 0-7-15,0 0 22 16,0 0 5-16,0 0-10 0,0 0 6 16,0 0-15-16,0 0-6 15,0 0-4-15,8 0 0 16,4 0-16-16,4 0-22 15,-1 0-13-15,3 4-11 16,3 8-16-16,-3-4-71 16,0-3-90-16</inkml:trace>
   <inkml:trace contextRef="#ctx0" brushRef="#br0" timeOffset="-80217.54">24235 13200 205 0,'0'0'103'0,"0"0"-47"16,0 0 23-16,0 0-21 0,0 0-11 16,0 0-19-16,10-6-28 15,-1 1-1-15,-2 1 0 16,4 1-12-16,2 0-21 15,-1 2-31-15,2-2-18 16,-1-1-14-16,-2 1-40 16</inkml:trace>
   <inkml:trace contextRef="#ctx0" brushRef="#br0" timeOffset="-79782.4">24235 13200 53 0,'32'2'89'0,"-42"5"-7"15,-2 0-30-15,2-1-1 0,1-1-12 16,0-2-5-16,3 1 7 16,0-3-10-16,-2 3-18 15,0-2-4-15,0 3-8 16,0-3 2-16,4 1 0 16,1-3-1-16,3 0-2 15,0 3 0-15,0 1-5 16,0 3-1-16,1 2-4 15,12 0-11-15,1 1 6 16,0-2-14-16,-2-1 22 16,-2 1-7-16,-2-2-14 15,-5-1 18-15,-2-3-8 0,-1 1 15 16,0 1 3 0,0-1 1-16,-1 3 5 0,-8-1 6 15,-3-2 8-15,4 1-4 16,2-1 5-16,3-3-7 15,0 0 1-15,0 2-14 16,2-2 12-16,-1 0 6 16,1 0-3-16,-3 0 0 15,2 0-11-15,-2-5-5 16,4-5-12-16,0-1-39 16,0 2-53-16,0 0-85 15</inkml:trace>
   <inkml:trace contextRef="#ctx0" brushRef="#br0" timeOffset="-79489.41">24440 13280 199 0,'0'0'70'15,"0"0"-30"-15,0 0 53 0,0 0-15 16,0 0-22-16,0 0-29 16,-13-3-14-16,13 3 14 15,0 0-10-15,0 0-17 16,0 0-5-16,0-2-102 15,0 0-80-15</inkml:trace>
   <inkml:trace contextRef="#ctx0" brushRef="#br0" timeOffset="-79150.47">24564 13168 235 0,'0'0'107'0,"0"0"-59"15,0 0-16-15,0 0-15 16,0 0 37-16,0 0-9 15,-14 72-16-15,11-54-14 16,3-2 4-16,-2-2-16 16,2-4 2-16,0 1-4 15,-2-2 3-15,2-4-3 16,0 2-1-16,0-1-15 0,0-3-37 16,0-2-49-16,0-1-78 15</inkml:trace>
   <inkml:trace contextRef="#ctx0" brushRef="#br0" timeOffset="-77756.2">24939 13188 55 0,'0'0'100'15,"0"0"2"-15,0 0-36 16,0 0-6-16,0 0 7 16,0 0-28-16,33-27-37 0,-20 27-2 15,5 0 8-15,-4 0-7 16,-1 0 0-16,-4 0-1 16,0 7 0-16,-2-1 0 15,-1 2-3-15,-3 2 1 16,-3 2 2-16,0-2-7 15,0-1 5-15,0 2 2 16,-7-4 5-16,-5 2-1 16,4-4-2-16,1 1 1 15,-2-3-3-15,6-2 2 16,0 2 0-16,2-3-2 16,-1 5-5-16,2-1-1 15,0 2-5-15,0 2 11 0,0 2 0 16,0-3 0-1,0 1-1-15,0-3 1 0,2 1 0 16,-1-3-2-16,1-1 4 16,-1-1-2-16,-1-1 0 15,0 0-8-15,0 0 2 16,0 0-1-16,0 0 1 16,0 0 5-16,0 0-16 15,0 0-64-15,0-6-8 16,-1-2-54-16</inkml:trace>
-  <inkml:trace contextRef="#ctx0" brushRef="#br0" timeOffset="-77427.37">25169 13225 206 0,'0'0'96'0,"0"0"-42"15,0 0 37-15,0 0-36 16,0 0-19-16,0 0-18 16,4 0-16-16,-2 0-1 15,-1 0-1-15,2 0-66 16,-3 0-100-16</inkml:trace>
+  <inkml:trace contextRef="#ctx0" brushRef="#br0" timeOffset="-77427.38">25169 13225 206 0,'0'0'96'0,"0"0"-42"15,0 0 37-15,0 0-36 16,0 0-19-16,0 0-18 16,4 0-16-16,-2 0-1 15,-1 0-1-15,2 0-66 16,-3 0-100-16</inkml:trace>
   <inkml:trace contextRef="#ctx0" brushRef="#br0" timeOffset="-76910.11">25407 13083 194 0,'0'0'44'0,"0"0"-25"16,0 0 64-16,0 0-7 15,0 0-33-15,0 0-26 16,12-18-11-16,-12 18 12 16,0 0-3-16,0 0-11 15,-9 1 3-15,-4 10-1 16,-3-2-2-16,2 1 0 15,1 4-4-15,-1-1 4 0,1 3-4 16,4-1 1-16,3 0-1 16,1 1 0-16,2 3 0 15,2-5 0-15,1 0 1 16,0-1-3-16,0-4 0 16,7 2-2-16,4-1-3 15,1-2-2-15,-6-1 9 16,-3-4 0-16,-3-1 2 15,0 0-5-15,0 2 1 16,0-2 2-16,0 3 5 16,-2-1-3-16,-2 0-1 15,-4 1-1-15,4-1-1 0,1 0-27 16,0-3-36-16,0 1-24 16,0-2-30-16</inkml:trace>
   <inkml:trace contextRef="#ctx0" brushRef="#br0" timeOffset="-75933.63">25891 13043 13 0,'0'0'115'16,"0"0"-54"-16,0 0 30 16,0 0 6-16,0 0-27 15,0 0-3-15,0-8-25 16,0 8-5-16,0 0-17 16,0 0-20-16,-3 12 0 15,-1 3-7-15,0 6 7 16,1 4 3-16,3-1 2 0,0-5-5 15,-1-1 1-15,1-3-1 16,-3-2 0-16,1-3 0 16,2-3-40-16,-1-2-13 15,1-2-54-15,0-3-122 16</inkml:trace>
   <inkml:trace contextRef="#ctx0" brushRef="#br0" timeOffset="-75761.47">25934 13198 64 0,'0'0'125'0,"0"0"-64"0,0 0 3 16,0 0-13-16,0 0-51 15,0 0-114-15,9-29-132 16</inkml:trace>
@@ -4022,16 +4469,16 @@
   <inkml:trace contextRef="#ctx0" brushRef="#br0" timeOffset="-74559.45">26556 13062 113 0,'0'0'48'0,"0"0"-41"15,0 0 72-15,0 0-12 16,0 0-23-16,0 0-13 16,0 0-10-16,-31 84 6 15,31-69-5-15,0-1-15 16,0-1 1-16,0-3 0 15,3-3-4-15,3-1 4 16,0-5-2-16,0 1-4 16,1-2 5-16,1 0 4 0,2 0 7 15,-1-5-11-15,0-7-5 16,0-3 6-16,-2-2-8 16,-1-1 1-16,-3-1 2 15,-1 0-2-15,-2 3 1 16,0 2-2-16,0 4-2 15,-5 5 1-15,-4-1-3 16,-4 6-19-16,-1 0-10 16,1 0-40-16,3 0-48 15,4 0-4-15,1 4-41 16</inkml:trace>
   <inkml:trace contextRef="#ctx0" brushRef="#br0" timeOffset="-74404.92">26556 13062 118 0</inkml:trace>
   <inkml:trace contextRef="#ctx0" brushRef="#br0" timeOffset="-74313.99">26556 13062 118 0,'60'60'44'0,"-60"-63"-26"0,0-1 39 0,0 1-31 0,0 3-1 0,0 0 23 16,0 0-26-16,0 0-22 16,0 0 0-16,0 0-27 0,0 0-73 15,1 0-26-15</inkml:trace>
-  <inkml:trace contextRef="#ctx0" brushRef="#br0" timeOffset="-73967.12">26707 13043 66 0,'0'0'2'16,"0"0"23"-16,0 0 58 16,0 0-31-16,0 0-14 15,0 0 1-15,15 10-11 16,-14 2 2-16,-1 1-8 15,0-1 3-15,0 1-5 0,0-4-13 16,0 2 3-16,-1-2-3 16,-2-4-3-16,0-1 10 15,2 2-10-15,-1-3 0 16,-1 0 11-16,3-1-5 16,0 2-6-16,0-2-2 15,0 1 2-15,0 1-4 16,0 3 0-16,9-3 0 15,1 2-36-15,2-3-13 16,3-3-49-16,-1 0-39 16</inkml:trace>
-  <inkml:trace contextRef="#ctx0" brushRef="#br0" timeOffset="-73358.32">26677 13134 9 0,'0'0'7'0,"0"0"76"15,0 0 60-15,0 0-49 16,0 0-29-16,0 0 0 16,-3 0-7-16,3 0-33 15,0 0-12-15,0 0-8 16,0 0-5-16,0 0-46 15,0 0-67-15,0 0-123 0</inkml:trace>
-  <inkml:trace contextRef="#ctx0" brushRef="#br0" timeOffset="-72747.68">26757 12854 204 0,'0'0'14'15,"0"0"-1"-15,0 0 10 16,0 0 8-16,0 0-14 16,0 0-13-16,0 0-1 15,72 13 3-15,-59-11-2 16,-2-2 11-16,-5 2-3 16,2-2 2-16,-1 1-4 15,-1 0-9-15,0-1 5 16,0 2-6-16,-3 1 1 0,0-1 15 15,1 4-9-15,-4 5-6 16,0 6 56-16,0 7-24 16,0 4 3-16,0 6-15 15,0 1-9-15,-4 2 6 16,2 0-17-16,1 1 1 16,1-5-1-16,0-1 2 15,-2 1-2-15,1-10-1 16,-2-1 0-16,0-4 0 15,1-4 1-15,-1-3-1 16,-1 1 0-16,1-5 1 16,-1 0-1-16,1-4 0 15,3-3-6-15,-2 2 0 0,2-2 2 16,0 0 4-16,-1 0 0 16,-2 0-6-16,0 0-16 15,-2 0-29-15,3 0-41 16,-2 0-54-16,-2 0-79 15</inkml:trace>
-  <inkml:trace contextRef="#ctx0" brushRef="#br0" timeOffset="-71292.15">23125 13204 109 0,'0'0'76'0,"0"0"10"16,0 0 7-16,0 0-49 0,0 0 6 15,0 0-34-15,12-13 2 16,-12 13-9-16,1 0-9 16,2 1-7-16,3 15 7 15,-2 4 0 1,-1 2 6-16,-1 1-5 0,-2-3-1 15,0-2 1-15,0 1-1 16,0-3 1-16,0-3-1 16,0-4 2-16,0-4 0 15,0-4-2-15,0-1 1 16,0 0 7-16,0 0-3 16,0 0 13-16,0-10 9 15,0-7-25-15,8-3-3 16,1-4 1-16,1 1 0 0,-3-4 0 15,2 1-6 1,0-3 1-16,-1 0-10 0,-2 6-5 16,0 3 18-16,-3 6-2 15,-3 11 4-15,0 2 16 16,0 1 5-16,0 0-19 16,0 1-2-16,1 18-12 15,1 3 11-15,-1 5 2 16,3-2 2-16,-1-2-3 15,0-2 1-15,2-5-1 16,1-1 0-16,-1-4 0 16,3-4-1-16,0-1 0 0,-2-4-17 15,4-2-21 1,-1 0-42-16,-1 0-42 0,-2 0-109 16</inkml:trace>
+  <inkml:trace contextRef="#ctx0" brushRef="#br0" timeOffset="-73967.13">26707 13043 66 0,'0'0'2'16,"0"0"23"-16,0 0 58 16,0 0-31-16,0 0-14 15,0 0 1-15,15 10-11 16,-14 2 2-16,-1 1-8 15,0-1 3-15,0 1-5 0,0-4-13 16,0 2 3-16,-1-2-3 16,-2-4-3-16,0-1 10 15,2 2-10-15,-1-3 0 16,-1 0 11-16,3-1-5 16,0 2-6-16,0-2-2 15,0 1 2-15,0 1-4 16,0 3 0-16,9-3 0 15,1 2-36-15,2-3-13 16,3-3-49-16,-1 0-39 16</inkml:trace>
+  <inkml:trace contextRef="#ctx0" brushRef="#br0" timeOffset="-73358.33">26677 13134 9 0,'0'0'7'0,"0"0"76"15,0 0 60-15,0 0-49 16,0 0-29-16,0 0 0 16,-3 0-7-16,3 0-33 15,0 0-12-15,0 0-8 16,0 0-5-16,0 0-46 15,0 0-67-15,0 0-123 0</inkml:trace>
+  <inkml:trace contextRef="#ctx0" brushRef="#br0" timeOffset="-72747.69">26757 12854 204 0,'0'0'14'15,"0"0"-1"-15,0 0 10 16,0 0 8-16,0 0-14 16,0 0-13-16,0 0-1 15,72 13 3-15,-59-11-2 16,-2-2 11-16,-5 2-3 16,2-2 2-16,-1 1-4 15,-1 0-9-15,0-1 5 16,0 2-6-16,-3 1 1 0,0-1 15 15,1 4-9-15,-4 5-6 16,0 6 56-16,0 7-24 16,0 4 3-16,0 6-15 15,0 1-9-15,-4 2 6 16,2 0-17-16,1 1 1 16,1-5-1-16,0-1 2 15,-2 1-2-15,1-10-1 16,-2-1 0-16,0-4 0 15,1-4 1-15,-1-3-1 16,-1 1 0-16,1-5 1 16,-1 0-1-16,1-4 0 15,3-3-6-15,-2 2 0 0,2-2 2 16,0 0 4-16,-1 0 0 16,-2 0-6-16,0 0-16 15,-2 0-29-15,3 0-41 16,-2 0-54-16,-2 0-79 15</inkml:trace>
+  <inkml:trace contextRef="#ctx0" brushRef="#br0" timeOffset="-71292.16">23125 13204 109 0,'0'0'76'0,"0"0"10"16,0 0 7-16,0 0-49 0,0 0 6 15,0 0-34-15,12-13 2 16,-12 13-9-16,1 0-9 16,2 1-7-16,3 15 7 15,-2 4 0 1,-1 2 6-16,-1 1-5 0,-2-3-1 15,0-2 1-15,0 1-1 16,0-3 1-16,0-3-1 16,0-4 2-16,0-4 0 15,0-4-2-15,0-1 1 16,0 0 7-16,0 0-3 16,0 0 13-16,0-10 9 15,0-7-25-15,8-3-3 16,1-4 1-16,1 1 0 0,-3-4 0 15,2 1-6 1,0-3 1-16,-1 0-10 0,-2 6-5 16,0 3 18-16,-3 6-2 15,-3 11 4-15,0 2 16 16,0 1 5-16,0 0-19 16,0 1-2-16,1 18-12 15,1 3 11-15,-1 5 2 16,3-2 2-16,-1-2-3 15,0-2 1-15,2-5-1 16,1-1 0-16,-1-4 0 16,3-4-1-16,0-1 0 0,-2-4-17 15,4-2-21 1,-1 0-42-16,-1 0-42 0,-2 0-109 16</inkml:trace>
   <inkml:trace contextRef="#ctx0" brushRef="#br0" timeOffset="-70383.95">23414 13295 69 0,'0'0'81'16,"0"0"-3"-16,0 0 43 15,0 0-35-15,0 0-41 16,0 0-1-16,-1 0-10 16,1 0-22-16,0 0-1 15,0 0-7-15,-2 0-2 16,2 0-1-16,0 0-1 0,0 0 0 15,0 0 0-15,0 0-1 16,0 0 1-16,0 0-1 16,0 0 1-16,0 0 0 15,0 0 0-15,0 0 0 16,0 0-1-16,0 0 4 16,0 0-2-16,0 0 0 15,0 0-1-15,0 0 5 16,0 0-4-16,0 0 0 15,0 0 4-15,0 0-4 16,0 0-1-16,0 0 0 16,0 0 4-16,0 0-7 0,0 0 3 15,0 0-1-15,0 0-3 16,0 0 0-16,0 0 2 16,0 0-4-16,0 6 2 15,0 0 4-15,-1-2 0 16,1 3 0-16,0-4-2 15,0-1 4-15,-2 4-2 16,2-1 2-16,0 1 0 16,0 4-4-16,0-6 0 15,0 4 2-15,0-6 0 16,0 0-31-16,0-2-15 16,0 0-8-16,0 0-21 15,0 0 24-15,0-7-72 16,0-6-80-16</inkml:trace>
   <inkml:trace contextRef="#ctx0" brushRef="#br0" timeOffset="-69739.26">23328 12882 17 0,'0'0'65'0,"0"0"0"15,0 0 6-15,0 0-10 16,0 0-20-16,0 0-23 15,-2-2 1-15,2 2 1 16,0 0-8-16,0 0-3 16,6 0-3-16,6 0 23 15,3 2 0-15,0 0-18 0,-2 1-8 16,-1-1 7-16,-1 0-9 16,-1-2-1-16,0 2 1 15,1-2-1-15,-3 2-8 16,0-2-35-16,-3 0-47 15,-4 0-70-15</inkml:trace>
   <inkml:trace contextRef="#ctx0" brushRef="#br0" timeOffset="-69453.79">23408 12928 110 0,'0'0'63'0,"0"0"-28"16,0 0 17-16,0 0-7 15,0 0-16-15,0 0 34 16,-6 38-39-16,6-25 0 16,0 1-2-16,0 2-14 15,0-2 6-15,0-2-9 16,0 0-3-16,0-4 4 15,0 1-6-15,0-1 0 16,0 0 0-16,0 4-8 16,0-1-58-16,2-2-95 0</inkml:trace>
   <inkml:trace contextRef="#ctx0" brushRef="#br0" timeOffset="-68156.99">24002 13661 23 0,'0'0'57'16,"0"0"-31"-16,0 0 4 0,0 0 19 15,0 0 7-15,0 0-8 16,0 0-9-16,0 0-5 16,0-2-6-16,0 2-12 15,0 0-6-15,0 0 4 16,0-1 3-16,-3 1 6 15,-8-1-19-15,1-1-4 16,1 2 2-16,2 0 1 16,2 0-2-16,-1 0-1 15,-1 0 1-15,-1 0-2 16,2 0 1-16,0 0 0 16,3 0-1-16,2 0 2 15,1 0-1-15,0 0 0 16,0 0 3-16,0 0-4 0,0 0 1 15,-3 0-2-15,1 0 1 16,-3 0-4-16,0 0 5 16,4 0 0-16,-2 0 2 15,1 0-4-15,-1 3 2 16,0 4 0-16,0 3 9 16,0 1-6-16,0 0 4 15,3 3 3-15,-4 1-4 16,4 0 6-16,0 2-2 15,0 0 0-15,0 3 10 16,0-5-14-16,0 0 1 16,0-3-7-16,0-2 2 0,0 4 2 15,0-1-4 1,0 1 0-16,0-1 1 0,0-2 0 16,0-1-1-16,0-6 1 15,0-1 1-15,0-2-1 16,0-1 1-16,0 0 0 15,0 0 15-15,0 0-8 16,0 0 6-16,0 0-7 16,0 0-6-16,0 0-1 15,0 0-1-15,10 0-7 16,4 0 7-16,3 0-21 16,3-4-61-16,-4-7-133 15</inkml:trace>
   <inkml:trace contextRef="#ctx0" brushRef="#br0" timeOffset="-67100.88">26859 13706 199 0,'0'0'89'0,"0"0"-81"16,0 0 2-16,0 0 40 16,0 0-11-16,0 0 7 15,-1 0 1-15,1 0-29 16,0 0-16-16,0 0-2 0,3 1 0 15,4 5 5-15,2-5-3 16,-5 1 3-16,1-2-1 16,1 0-4-16,4 0 16 15,-1 0-12-15,-1 0-3 16,-4 0 8-16,-1 0 4 16,-3 0 10-16,0 0-5 15,0 0-15-15,0 0-3 16,0 3-1-16,0 5-7 15,0 8 8-15,0 2 5 16,0 6 3-16,-4 1 0 16,2-1-8-16,1 5 7 15,-1-1-7-15,2-3 0 0,0 0 6 16,0-8-6-16,0-5 0 16,0-2 0-16,0-6 2 15,2-1-4-15,-2-2-23 16,0 1-21-16,0-2 1 15,0 2-41-15,0 1-61 16,0-1-52-16</inkml:trace>
-  <inkml:trace contextRef="#ctx0" brushRef="#br0" timeOffset="-66130.67">23104 13691 57 0,'0'0'113'0,"0"0"-53"0,0 0 30 16,0 0-8-1,0 0-31-15,0 0-51 0,16-8 0 16,-5 29 0-16,-4 5 16 16,2 1-5-16,-6-1 3 15,0-3-13-15,-3-2 2 16,0-5-3-16,1-5 1 15,-1-4 2-15,0-5-3 16,0-2 1-16,2 0 1 16,1 0 1-16,0 0-6 15,5 0-1-15,2-15-10 16,2-3 3-16,-2-2 10 16,1 2-21-16,-5 2 22 15,-2 8 0-15,-2 1 1 0,-2 5 3 16,0 1 0-16,0 1 14 15,0 0-18-15,0 0-11 16,0 0 8-16,0 0-5 16,0 6 8-16,0 1 4 15,0 2-1-15,0 0 1 16,0 2-3-16,0 4-1 16,0 0 0-16,4 3-50 15,1 2-19-15,0-4-58 16,1-2-40-16</inkml:trace>
+  <inkml:trace contextRef="#ctx0" brushRef="#br0" timeOffset="-66130.68">23104 13691 57 0,'0'0'113'0,"0"0"-53"0,0 0 30 16,0 0-8-1,0 0-31-15,0 0-51 0,16-8 0 16,-5 29 0-16,-4 5 16 16,2 1-5-16,-6-1 3 15,0-3-13-15,-3-2 2 16,0-5-3-16,1-5 1 15,-1-4 2-15,0-5-3 16,0-2 1-16,2 0 1 16,1 0 1-16,0 0-6 15,5 0-1-15,2-15-10 16,2-3 3-16,-2-2 10 16,1 2-21-16,-5 2 22 15,-2 8 0-15,-2 1 1 0,-2 5 3 16,0 1 0-16,0 1 14 15,0 0-18-15,0 0-11 16,0 0 8-16,0 0-5 16,0 6 8-16,0 1 4 15,0 2-1-15,0 0 1 16,0 2-3-16,0 4-1 16,0 0 0-16,4 3-50 15,1 2-19-15,0-4-58 16,1-2-40-16</inkml:trace>
   <inkml:trace contextRef="#ctx0" brushRef="#br0" timeOffset="-65799.52">23341 13886 131 0,'0'0'43'0,"0"0"-31"15,0 0 85-15,0 0 2 16,0 0-73-16,0 0-11 16,8-2-9-16,-7 2-5 15,-1 0 10-15,0 2 2 16,0 8-11-16,0 2 7 16,0-1 5-16,0 2 12 15,-5-2-7-15,1-1-7 16,2-3 4-16,2 1-16 15,0-5 3-15,0 1 0 0,0-1-2 16,5-3 5-16,9 0-6 16,3 0 0-16,1 0-40 15,-3-8-61-15,1-4 10 16,0-3-117-16</inkml:trace>
   <inkml:trace contextRef="#ctx0" brushRef="#br0" timeOffset="-65448.64">23423 13538 159 0,'0'0'59'16,"0"0"-53"-16,0 0 20 16,0 0 13-16,0 0-2 15,0 0 25-15,24 0-27 16,-12 0-8-16,-2 0-8 0,1 0-16 15,-1 0-1-15,1 0-2 16,-2 0-25-16,1 0-28 16,-3 0-69-16,-2 0-54 15</inkml:trace>
   <inkml:trace contextRef="#ctx0" brushRef="#br0" timeOffset="-65268.94">23423 13538 19 0,'36'109'41'0,"-36"-101"30"15,0-4-7-15,0 2-24 0,0-2-4 16,0-1-14-16,0 0-9 16,0-1-13-16,6 0-11 15,3-2-129-15</inkml:trace>
@@ -4177,7 +4624,7 @@
   <inkml:trace contextRef="#ctx0" brushRef="#br0">6105 9492 17 0,'0'0'47'16,"0"0"-2"-16,0 0 19 16,0 0-9-16,0 0-20 15,0 0 34-15,0 0-26 16,-3 30-3-16,3-30-6 0,0 0-8 15,0 0 10-15,0 0 2 16,0 0 0-16,0-14 2 16,0-10-35-16,0-5-6 15,4-10 1-15,9-3-11 16,-2-6 4-16,5-3-9 16,-5-2-12-16,-5-3 8 15,-3-4-10-15,-3 0 4 16,0 4 22-16,-11 4 4 15,-6 8 2-15,-2 10 2 16,3 9 23-16,6 11-15 16,2 8 13-16,8 6 3 15,0 0-27-15,0 20-1 16,0 29-3-16,0 23 3 16,0 12 15-16,3 7 6 0,6 2-20 15,-3-3 2-15,2 6-3 16,2 2 4-16,-1 2-6 15,2-4 2-15,-1-8 0 16,-3-11-2-16,-2-12-9 16,-2-13-37-16,0-10 35 15,-3-17-21-15,0-9-3 16,0-10-26-16,0-6-50 16,0-13-23-16</inkml:trace>
   <inkml:trace contextRef="#ctx0" brushRef="#br0" timeOffset="151.46">5948 9600 178 0,'0'0'77'0,"0"0"30"0,0 0-28 15,0 0 7-15,0 0-54 16,0 0-14-16,80-76-3 16,-27 58-15-16,12-3-2 15,-6 3-110-15,-10 0-296 16</inkml:trace>
   <inkml:trace contextRef="#ctx0" brushRef="#br0" timeOffset="518.88">6442 9439 245 0,'0'0'107'0,"0"0"-38"15,0 0-11-15,-25-99 33 16,8 85-38-16,-1 2-14 16,3 8-1-16,-1 4-15 15,2 0-21-15,3 4 12 16,3 18-14-16,5 9-8 0,3 5 8 15,0 5 7-15,11-1 9 16,6-3 1-16,1-7-15 16,3-3 5-16,0-7-7 15,6-3 3-15,-2-6-3 16,-1-4-27-16,0-7-25 16,1 0-17-16,-1-9-41 15,-3-14-57-15</inkml:trace>
-  <inkml:trace contextRef="#ctx0" brushRef="#br0" timeOffset="1093.64">6667 9392 264 0,'0'0'121'0,"0"0"-43"0,0 0 4 15,0 0-34-15,0 0-11 16,0 0-11-16,-70 40-16 15,64-15-1-15,3 0-9 16,3 1 3-16,0-5-4 16,0-3 4-16,3-7-2 15,3-2-1-15,0-6-10 16,0-3 10-16,1 0-14 16,1-6 14-16,1-11 7 15,-2-5-5-15,-1-2 4 0,-4 1 0 16,-2 3-4-1,0 7 0-15,0 7-2 0,4 6 0 16,4 0-1-16,3 16-16 16,3 3 17-16,1 1 0 15,-3-4 1-15,0-4-1 16,4-5 0-16,-2-3 0 16,-1-4 6-16,-1 0-5 15,4-5 5-15,1-21 4 16,1-9-9-16,-2-7 4 15,-3-8-5-15,-2-4 1 16,-3-7 3-16,-4-2-3 16,2 1-1-16,-3 13 0 0,-2 13 2 15,-1 18 22 1,0 12 18-16,0 6 0 0,0 7-42 16,0 28-26-16,0 11 26 15,0 12 1-15,0 3 2 16,2 2 0-16,4-3-3 15,3-6-4-15,1-8 4 16,-2-10-62-16,1-7-12 16,-3-12-41-16,-1-12-71 15,-3-5-88-15</inkml:trace>
+  <inkml:trace contextRef="#ctx0" brushRef="#br0" timeOffset="1093.63">6667 9392 264 0,'0'0'121'0,"0"0"-43"0,0 0 4 15,0 0-34-15,0 0-11 16,0 0-11-16,-70 40-16 15,64-15-1-15,3 0-9 16,3 1 3-16,0-5-4 16,0-3 4-16,3-7-2 15,3-2-1-15,0-6-10 16,0-3 10-16,1 0-14 16,1-6 14-16,1-11 7 15,-2-5-5-15,-1-2 4 0,-4 1 0 16,-2 3-4-1,0 7 0-15,0 7-2 0,4 6 0 16,4 0-1-16,3 16-16 16,3 3 17-16,1 1 0 15,-3-4 1-15,0-4-1 16,4-5 0-16,-2-3 0 16,-1-4 6-16,-1 0-5 15,4-5 5-15,1-21 4 16,1-9-9-16,-2-7 4 15,-3-8-5-15,-2-4 1 16,-3-7 3-16,-4-2-3 16,2 1-1-16,-3 13 0 0,-2 13 2 15,-1 18 22 1,0 12 18-16,0 6 0 0,0 7-42 16,0 28-26-16,0 11 26 15,0 12 1-15,0 3 2 16,2 2 0-16,4-3-3 15,3-6-4-15,1-8 4 16,-2-10-62-16,1-7-12 16,-3-12-41-16,-1-12-71 15,-3-5-88-15</inkml:trace>
   <inkml:trace contextRef="#ctx0" brushRef="#br0" timeOffset="1244.98">6859 9289 198 0,'0'0'101'0,"0"0"42"16,0 0-72-16,0 0-16 16,0 0-50-16,0 0 4 15,74-61-9-15,-54 55-3 16,0 4-70-16,-1 2-107 16</inkml:trace>
   <inkml:trace contextRef="#ctx0" brushRef="#br0" timeOffset="1739.7">7134 9389 268 0,'0'0'83'0,"0"0"5"0,0 0-21 16,6-84 12-16,-6 61-11 15,0-1-29-15,0 6 16 16,-2 5-5-16,-1 6-8 16,2 7 1-16,1 0-33 15,0 0-10-15,0 13-18 16,0 9 7-16,4 8 11 16,4-1 0-16,0 4 5 15,2-5-4-15,-1-3-1 16,0-5-1-16,-3-12-13 15,1-4-12-15,1-4 26 0,1 0-3 16,4-10 3-16,-1-14-1 16,6-9 1-16,-5-4-4 15,-5-4 3-15,-2 1-22 16,4 7 10-16,-4 8-1 16,-1 11 10-16,-2 10 3 15,4 4 1-15,3 0-14 16,1 17 11-16,7 1 4 15,-9 4-1-15,-2-2 9 16,-2 4-9-16,2-2 4 16,-1 0-4-16,2-1-3 15,-1-4-33-15,3-3-54 16,1-3-51-16,0-9-99 0</inkml:trace>
   <inkml:trace contextRef="#ctx0" brushRef="#br0" timeOffset="2019.95">7583 9200 159 0,'0'0'141'0,"0"0"-52"16,0 0-24-16,10 82 27 16,-10-62-31-16,0-1-24 15,0-7-12-15,0-5-6 16,0-2-7-16,0-5 30 0,0 0 32 15,0 0 6-15,-4-17-10 16,-2-9-63-16,3-2-7 16,0-3 0-16,3 2-2 15,0 5-23-15,6 8-8 16,10 6-43-16,4 7 7 16,2 3-56-16,-1 0-52 15,-3 13-109-15</inkml:trace>
@@ -4199,7 +4646,7 @@
   <inkml:trace contextRef="#ctx0" brushRef="#br0" timeOffset="53748.7">6511 11551 148 0,'0'0'96'0,"0"0"-12"16,0 0-25-16,0 0 29 15,-89-71-77-15,73 71 30 16,5 0-33-16,-2 11-8 0,3 9-3 15,-1 3 0-15,4 3 3 16,2-3-1 0,4-1 1-16,1-2-1 0,0-5 0 15,0-1 1-15,3-3-13 16,10-2-2-16,2-1-16 16,6-6 17-16,-1-2 13 15,-1 0-59-15,0-2 40 16,-4-12-35-16,0-1 33 15,-6-8 4-15,0-2 18 16,-6-4 4-16,-1-1 4 16,-2-2-5-16,0-6 13 15,-8 2 38-15,-1-3-8 0,-4 7-28 16,2 7-10 0,4 10 17-16,2 7 8 0,2 6-20 15,3 2-13-15,0 9-10 16,0 14-4-16,3 5 13 15,3 3 2-15,2-1 0 16,-2-6 0-16,1 3-1 16,-1-2 4-16,3 0 1 15,0-4-1-15,1-1 5 16,-2-6-6-16,-1-7 4 16,-2-1 0-16,-2-5-7 15,4-1 16-15,-2 0-14 16,-1 0 14-16,2-7-5 15,-1-8-8-15,2-1 10 16,-3-1-13-16,-1 1 0 0,-3 1 2 16,0 2-2-16,0 2-3 15,0 2 2-15,0 1 2 16,0 3 10-16,0 2-10 16,0 3 9-16,0 0 1 15,0 0-11-15,0 0-19 16,0 11 0-16,0 6 19 15,2 4 3-15,7-2-2 16,4-1 0-16,-1 3-2 16,5-4 6-16,-1 6-9 15,2-8 4-15,-3-3-76 16,0-7 19-16,-2-5-40 0,-2-1 1 16</inkml:trace>
   <inkml:trace contextRef="#ctx0" brushRef="#br0" timeOffset="54010.52">6700 11602 36 0,'0'0'31'0,"0"0"27"16,0 0 9-16,0 0 81 0,0 0-42 15,0 0-20-15,0 0-22 16,22-49-44-16,-10 25-1 16,0 1-16-16,-1 3 0 15,2 5-6-15,-4 2 0 16,6 4-17-16,-3 4-28 16,0 5-73-16,-2 0-114 15</inkml:trace>
   <inkml:trace contextRef="#ctx0" brushRef="#br0" timeOffset="54894.2">7668 11273 78 0,'0'0'65'0,"0"0"-34"16,0 0-13-16,0 0 29 15,0 0 39-15,0 0-59 16,-16 53 12-16,16-53 37 16,0 0-8-16,0 0-11 15,0-9-21-15,0-15-36 16,0-7-6-16,0-9-10 16,4-3 16-16,2-4-5 15,0 0 3-15,-1 3-4 16,-1 10 6-16,1 9-32 15,-5 16 32-15,1 5 25 16,3 4-25-16,4 9-13 0,4 20-9 16,3 8 22-16,0 9 0 15,-2-1 3-15,1 0-4 16,-1-6 1-16,-4-8 0 16,5-5 0-16,-4-9-2 15,-4-9-8-15,-2-4-12 16,-2-4 6-16,-2 0 16 15,0-1 31-15,0-13 23 16,-2-3-28-16,-10-4-18 16,-4 2 30-16,1 3-38 15,0 3-5-15,0 5 0 0,5 5-6 16,-1 3-56 0,1 0-33-16,3 0-19 0,5 10-31 15,2-1 23-15</inkml:trace>
-  <inkml:trace contextRef="#ctx0" brushRef="#br0" timeOffset="55503.22">7874 11198 6 0,'0'0'6'0,"0"0"0"16,0 0 29-16,0 0-7 15,0 0-9-15,0 0 9 0,27 35 3 16,-21-35 7-16,-2-7 51 16,1-5-5-16,-1 1-20 15,-2 2 5-15,-1 5 3 16,-1 1-8-16,0 3-45 16,2 0-12-16,5 0-7 15,2 18-16-15,6 12 16 16,3 10 1-16,1 4 2 15,-5 12 0-15,-7 3-3 16,-5 4-3-16,-2 0-4 16,0-8 7-16,-6-6 10 0,-6-14-10 15,0-12-28 1,3-15 28-16,6-8-20 0,-2 0 20 16,1-7 36-16,-2-18-35 15,3-12-2-15,3-6-12 16,0-6-3-16,6-1 15 15,12 2-5-15,6 2-2 16,1 4 5-16,2 3 6 16,-1 2-6-16,0 2-1 15,3-1 4-15,-7 4-7 16,0 0 9-16,-11 3-2 16,-4 5 13-16,-7 4-4 15,0 6 17-15,0 5-24 16,0 6 29-16,-3 3-31 0,-7 3 5 15,-5 24-10 1,0 6 5-16,7 7-10 0,7 5 10 16,1-2 0-16,0-6-2 15,9-7-12-15,5-6-83 16,3-7 1-16,0-10-22 16,-1-5-113-16</inkml:trace>
+  <inkml:trace contextRef="#ctx0" brushRef="#br0" timeOffset="55503.21">7874 11198 6 0,'0'0'6'0,"0"0"0"16,0 0 29-16,0 0-7 15,0 0-9-15,0 0 9 0,27 35 3 16,-21-35 7-16,-2-7 51 16,1-5-5-16,-1 1-20 15,-2 2 5-15,-1 5 3 16,-1 1-8-16,0 3-45 16,2 0-12-16,5 0-7 15,2 18-16-15,6 12 16 16,3 10 1-16,1 4 2 15,-5 12 0-15,-7 3-3 16,-5 4-3-16,-2 0-4 16,0-8 7-16,-6-6 10 0,-6-14-10 15,0-12-28 1,3-15 28-16,6-8-20 0,-2 0 20 16,1-7 36-16,-2-18-35 15,3-12-2-15,3-6-12 16,0-6-3-16,6-1 15 15,12 2-5-15,6 2-2 16,1 4 5-16,2 3 6 16,-1 2-6-16,0 2-1 15,3-1 4-15,-7 4-7 16,0 0 9-16,-11 3-2 16,-4 5 13-16,-7 4-4 15,0 6 17-15,0 5-24 16,0 6 29-16,-3 3-31 0,-7 3 5 15,-5 24-10 1,0 6 5-16,7 7-10 0,7 5 10 16,1-2 0-16,0-6-2 15,9-7-12-15,5-6-83 16,3-7 1-16,0-10-22 16,-1-5-113-16</inkml:trace>
   <inkml:trace contextRef="#ctx0" brushRef="#br0" timeOffset="56899.41">6455 12330 6 0,'0'0'64'16,"0"0"2"-16,0 0-22 16,0 0-2-16,0 0 2 15,0 0-2-15,0 0 14 16,0 0-4-16,0 0-2 15,0 0-13-15,0 0-14 16,0 0 13-16,0 0-29 16,0 0-7-16,0 0-3 15,0 0 3-15,0 0 1 16,-4 3 11-16,1 0-1 0,-5 4 12 16,-1 3-21-16,0 1 5 15,-1 2-4-15,4-1 1 16,3-1-6-16,0-2 2 15,3 3-9-15,0-1 8 16,0-2-3-16,0 1-1 16,0-2 5-16,0-3 0 15,12 1-2-15,1-5-3 16,4-1-1-16,4 0-23 16,-2 0-39-16,2-3 6 15,-5-3-75-15,-7 3-94 16</inkml:trace>
   <inkml:trace contextRef="#ctx0" brushRef="#br0" timeOffset="57845.06">8019 11998 230 0,'0'0'126'0,"0"0"-126"16,0 0 0-16,0 0 15 15,0 0 43-15,0 0-27 16,27 98-12-16,-23-82-11 16,0-3 10-16,-2-3-14 0,-2-4 1 15,0-3 3 1,0-3-6-16,0 0 8 0,0 0 16 15,1-9 28 1,1-9-52-16,-1-5-2 0,1 0 0 16,-2 3 9-16,3 5-9 15,-3 4 0-15,3 8 0 16,0 2-5-16,0 1 0 16,2 0 3-16,2 0 2 15,0 0-6-15,2 7 9 16,2 6-3-16,1 1 0 15,-2 6 0-15,-1-4 4 16,0 2-4-16,-6-3-6 16,0-4-33-16,-3 1-61 15,0-7-49-15</inkml:trace>
   <inkml:trace contextRef="#ctx0" brushRef="#br0" timeOffset="58990.53">4838 12512 54 0,'0'0'138'16,"0"0"-101"-16,0 0-10 16,0 0 45-16,0 0-25 15,0 0-30-15,9 2-6 16,-6 6 1-16,1 3 16 16,1 0-19-16,-1 2-5 15,2 0 14-15,-1 1-14 16,1-2-3-16,-2-3 0 15,-1-2 2-15,2-3-1 0,-4-1-2 16,1-3 0-16,-1 0 6 16,-1 0-6-16,0 0 9 15,2 0 6-15,2-7-3 16,2-14 21-16,6-8-33 16,0-3 0-16,6 3-2 15,-6 5 2-15,-3 11 0 16,-2 10 9-16,-4 3-7 15,3 0-4-15,6 0-7 16,6 14 4-16,3 11 1 16,-2 2 0-16,-4 2 4 15,2 2 0-15,-3 1-7 16,-3 3-52-16,0-5-140 0</inkml:trace>
@@ -4211,12 +4658,12 @@
   <inkml:trace contextRef="#ctx0" brushRef="#br0" timeOffset="66532.28">6979 13188 283 0,'0'0'150'16,"0"0"-104"-16,0 0-7 15,0 0 30-15,0 0-29 16,0 0-26-16,34 7 7 16,-16-7-14-16,-3 0-5 15,3 0-2-15,0 0-2 0,-6-1-149 16</inkml:trace>
   <inkml:trace contextRef="#ctx0" brushRef="#br0" timeOffset="67046.22">8156 12617 382 0,'0'0'184'16,"0"0"-150"-16,0 0-34 16,0 0-8-16,0 0 8 15,94-24 1-15,-51 15-1 16,5-1 0-16,0 3-78 15,-2-3-99-15</inkml:trace>
   <inkml:trace contextRef="#ctx0" brushRef="#br0" timeOffset="67851.45">10666 11976 251 0,'0'0'99'0,"0"0"-86"16,0 0 9-16,99 0-20 16,-76 0-2-16,2 0-3 0,-6 4-72 15,-11 5-64-15</inkml:trace>
-  <inkml:trace contextRef="#ctx0" brushRef="#br0" timeOffset="68593.49">5869 14269 120 0,'0'0'98'16,"0"0"-65"-16,0 0-7 15,0 0 6-15,0 0-13 16,88 7-8-16,-54-7 1 16,11 0-12-16,7-5-5 15,5-8-154-15</inkml:trace>
+  <inkml:trace contextRef="#ctx0" brushRef="#br0" timeOffset="68593.48">5869 14269 120 0,'0'0'98'16,"0"0"-65"-16,0 0-7 15,0 0 6-15,0 0-13 16,88 7-8-16,-54-7 1 16,11 0-12-16,7-5-5 15,5-8-154-15</inkml:trace>
   <inkml:trace contextRef="#ctx0" brushRef="#br0" timeOffset="68940.32">7328 13968 305 0,'0'0'21'16,"0"0"-21"-16,0 0-12 15,113-56-10-15,-69 33-65 16,6-1-90-16</inkml:trace>
   <inkml:trace contextRef="#ctx0" brushRef="#br0" timeOffset="69335.67">8541 13460 120 0,'0'0'103'0,"0"0"18"16,0 0-37-16,0 0 14 15,0 0-11-15,0 0-75 16,-28-17-12-16,36 16-3 15,18-2 3-15,14-1 20 16,18-2-20-16,8-4-7 16,3-4-136-16,-4-6-349 0</inkml:trace>
   <inkml:trace contextRef="#ctx0" brushRef="#br0" timeOffset="69920.16">11007 12722 300 0,'0'0'236'15,"0"0"-175"-15,0 0-50 16,0 0 1-16,0 0-5 16,0 0-6-16,87-13-1 15,-53 9 0-15,5 0 1 16,-4 0-2-16,0-2-76 15,-11 6-141-15</inkml:trace>
   <inkml:trace contextRef="#ctx0" brushRef="#br0" timeOffset="70574.78">6336 15165 167 0,'0'0'81'0,"0"0"-54"15,0 0 3-15,82-15 20 16,-58 6-40-16,-2-1 0 15,3 0-8-15,5-4-2 16,6-5-73-16,3 1-200 16</inkml:trace>
-  <inkml:trace contextRef="#ctx0" brushRef="#br0" timeOffset="70910.24">7640 14886 311 0,'0'0'110'0,"0"0"-95"0,0 0 4 16,0 0 2-16,0 0-19 16,0 0-2-16,91-29 3 15,-58 18-3-15,1-2-7 16,-1-5-135-16</inkml:trace>
+  <inkml:trace contextRef="#ctx0" brushRef="#br0" timeOffset="70910.23">7640 14886 311 0,'0'0'110'0,"0"0"-95"0,0 0 4 16,0 0 2-16,0 0-19 16,0 0-2-16,91-29 3 15,-58 18-3-15,1-2-7 16,-1-5-135-16</inkml:trace>
   <inkml:trace contextRef="#ctx0" brushRef="#br0" timeOffset="71172.52">8893 14463 558 0,'0'0'16'0,"0"0"-16"16,0 0-68-16,0 0 68 15,79-30 0-15,-58 20 0 16,-3-2-41-16,-5 5-36 15,-5-3-189-15</inkml:trace>
   <inkml:trace contextRef="#ctx0" brushRef="#br0" timeOffset="71727.64">6742 16246 347 0,'0'0'63'0,"0"0"-63"16,0 0 0-16,0 0 16 15,0 0 0-15,0 0 9 16,76 4-4-16,-45-7-13 16,5-4 1-16,4-6-9 15,4-2-116-15,2-6-251 16</inkml:trace>
   <inkml:trace contextRef="#ctx0" brushRef="#br0" timeOffset="71983.31">7874 15984 76 0,'0'0'475'16,"0"0"-461"-16,0 0-14 16,0 0-24-16,0 0 21 0,0 0 1 15,40-71-100-15,-29 49-121 16</inkml:trace>
@@ -4243,7 +4690,7 @@
   <inkml:trace contextRef="#ctx0" brushRef="#br0" timeOffset="85452.34">5851 10920 28 0,'-12'2'116'0,"12"-8"-22"0,0-2-28 0,6 3 0 0,3 0-44 15,0 0-10-15,1 1-10 16,-1-2-2-16,2 1-2 0,2-2-116 16</inkml:trace>
   <inkml:trace contextRef="#ctx0" brushRef="#br0" timeOffset="85721.9">6088 10881 13 0,'0'0'92'16,"0"0"2"-16,0 0-5 16,0 0 6-16,0 0-56 15,0 0 9-15,21 15 9 16,-21-12-31-16,0 6 11 0,0 5-4 16,0 0-24-1,0 1-5-15,3-2 5 0,1-2-9 16,-1-4 3-16,2-1-1 15,1-5 3-15,9-1 4 16,0 0-9-16,4-1-63 16,5-18 29-16,2-3-130 15,-4-3-110-15</inkml:trace>
   <inkml:trace contextRef="#ctx0" brushRef="#br0" timeOffset="86523.67">7218 10489 41 0,'0'0'33'0,"0"0"-7"15,0 0 17-15,0 0 8 16,0 0 49-16,0 0-2 15,0 0-44-15,37-2-35 16,-34-15-14-16,-3-3 27 16,0-5-14-16,0-4-4 15,0-6-4-15,-2 0-10 16,-11-4 3-16,-4-1-3 16,-3 6 4-16,2 7-4 15,6 12 16-15,6 8 5 0,3 7-17 16,0 5-4-16,0 24-6 15,3 9 6-15,0 7 4 16,0-1 6-16,0-1-7 16,7-3-3-16,2-2 8 15,2-3-3-15,-1-3-5 16,-2-2 0-16,-1-1-7 16,-2-2-46-16,0-9-18 15,-3-1-38-15,-2-7-108 16</inkml:trace>
-  <inkml:trace contextRef="#ctx0" brushRef="#br0" timeOffset="86706.91">7207 10569 248 0,'0'0'96'15,"0"0"-42"-15,0 0 16 16,0 0 14-16,0 0-42 15,0 0-42-15,102-83-5 16,-77 67-70-16,5 1-54 16,-5 3-81-16</inkml:trace>
+  <inkml:trace contextRef="#ctx0" brushRef="#br0" timeOffset="86706.9">7207 10569 248 0,'0'0'96'15,"0"0"-42"-15,0 0 16 16,0 0 14-16,0 0-42 15,0 0-42-15,102-83-5 16,-77 67-70-16,5 1-54 16,-5 3-81-16</inkml:trace>
   <inkml:trace contextRef="#ctx0" brushRef="#br0" timeOffset="87084.75">7492 10440 9 0,'0'0'66'0,"0"0"-9"16,0 0 10-16,0 0-6 15,0 0 5-15,0 0-5 16,73 41-46-16,-65-33 42 16,-5-1-37-16,-2-2 9 15,-1 2-11-15,0-2-10 16,0 3 4-16,0-1-6 16,-4 1 7-16,-4 2-6 15,1-1 0-15,2 1-7 16,5-2-2-16,0 5-14 15,0 0 4-15,0 0 4 16,9 0 8-16,3 4 4 16,-1-1-4-16,-1 2 0 15,-1-2 2-15,0-4-2 0,1 0 0 16,-1-2 0-16,-1 0 0 16,-2-5 5-16,-3 1 3 15,-3-3 17-15,0 0-7 16,0 2-8-16,0 2 15 15,-3 1 4-15,-8 1-21 16,-3 0-8-16,-3-3-5 16,-2 0-107-16,-1-6-176 15</inkml:trace>
   <inkml:trace contextRef="#ctx0" brushRef="#br0" timeOffset="88307.13">9670 9206 148 0,'0'0'110'16,"0"0"-85"-16,0 0-1 16,0 0 11-16,0 0-33 15,0 0 39-15,35 61 13 16,-13-35-31-16,8-2 1 15,-3-1-11-15,-3-6-13 16,0-6 7-16,-4-5-6 16,-3-6 1-16,2 0-2 0,-4 0-43 15,-3-16-29-15,-3-3-53 16,-4-4 34-16,-5-3 60 16,0 3 31-16,0 1 33 15,0 5 16-15,-3 7 7 16,-2 6 19-16,4 4 23 15,-4 0-74-15,2 23-19 16,0 5 8-16,0 6 2 16,1 4 10-16,2 0 4 15,0 3 12-15,0-1-22 16,0-2-10-16,0-3-1 16,0 0-8-16,0-5 0 0,2-2 2 15,-2-7-2 1,1-3-14-16,-1-5-34 0,3-6-40 15,-1-5-33-15,-2-2-134 16</inkml:trace>
   <inkml:trace contextRef="#ctx0" brushRef="#br0" timeOffset="113461.42">17014 10426 14 0,'0'0'62'0,"0"0"6"0,0 0-17 16,0 0-14-16,0 0-5 15,0 0 3-15,0 0 2 16,0 0-14-16,-3 2 7 15,3-4 3-15,3-14-18 16,10-8-15-16,-1-4-2 16,1-5 2-16,-2-8 1 15,-5-4 3-15,-3-6-8 16,-3 0 3-16,0 1 1 16,0 0-2-16,0-1 8 15,-2 2-8-15,-4 5 4 16,0 12 6-16,0 11 36 15,3 13-3-15,2 8-12 16,-2 0-11-16,2 8-18 0,1 28-16 16,0 16 16-16,0 10 10 15,0 9-1-15,4 11-8 16,6 4 6-16,2 9 4 16,0-4-5-16,-1-3-6 15,-4-2 0-15,2-4 2 16,-3-6-5-16,0-9-37 15,2-12 8-15,-2-10-9 16,-1-10-54-16,0-11 34 16,-4-16-91-16,-1-8-4 15</inkml:trace>
@@ -4275,13 +4722,13 @@
   <inkml:trace contextRef="#ctx0" brushRef="#br0" timeOffset="127583.62">23774 6985 200 0,'0'0'89'16,"0"0"-67"-16,0 0 0 16,0 0 28-16,0 0 30 15,0 0-29-15,-26 0-51 16,26 0-3-16,0 1 3 15,0-1 2-15,0 2 0 16,0 5-2-16,11 0-19 0,2 1-85 16,-4-3-187-1</inkml:trace>
   <inkml:trace contextRef="#ctx0" brushRef="#br0" timeOffset="131903.56">23040 8454 69 0,'0'0'48'0,"0"0"-22"15,0 0 12 1,0 0 12-16,0 0-20 0,0 0-27 15,0 0-3-15,0 0 0 16,-5 8 19-16,-5 5-4 16,-4 4 10-16,1-1-1 15,0 2-8-15,0-1-13 16,3-3-3-16,1-1 13 16,2-2-16-16,1-3 6 15,1-4-1-15,4-1-2 16,1-3 7-16,0 0-7 15,0 0 9-15,0 0-5 16,0 0 27-16,0-4-3 16,7-11-22-16,5 1-2 15,1-2-4-15,0 2 0 0,0 0 0 16,-3 1 0-16,1 2-3 16,-4 3-9-16,1 3 9 15,-4 0 1-15,1 4-1 16,-1 1 3-16,1 0-5 15,-1 0-5-15,2 3 0 16,1 13 10-16,3 3 1 16,1 3 2-16,0-1-2 15,2-1 1-15,-1-1 1 16,-1-3-2-16,-1-2 0 16,0-3-1-16,3-1-27 15,-3-4-63-15,3-3-35 0,-1-3 0 16</inkml:trace>
   <inkml:trace contextRef="#ctx0" brushRef="#br0" timeOffset="137313.57">10003 8904 29 0,'0'0'1'0,"0"0"32"15,0 0 11-15,0 0-16 16,0 0-28-16,0 0 0 16,0 0 10-16,-18-16 8 15,15 13-5-15,-1 2-13 16,-2-3-20-16,-2 2 20 16,1 1 16-16,-2 1-14 0,-5 0 15 15,-2 0-15-15,1 0-2 16,-3 0-4-16,2 0 4 15,-2 7 4-15,0-3-4 16,3 2-13-16,-1-2-1 16,1 2 8-16,-5 7-22 15,-2-1 28-15,-1 3-6 16,-2 3-28-16,-3 0 6 16,-2 3 26-16,-4 0 4 15,-1 0 4-15,4 1 33 16,6-1-34-16,4-2-2 15,4 1-1-15,0 2-2 16,3 3-5-16,2 2 4 16,8 1 1-16,4 5 5 0,0 6-4 15,1 7 4-15,12 7 27 16,-2 0-9-16,7-2-4 16,-3-2-1-16,4-2-18 15,4-2 7-15,7 2-4 16,5 3 0-16,2 3 19 15,4-1-19-15,-2-3 4 16,-1-5-2-16,0-1-3 16,-1-8-2-16,0-5 0 15,2-9-5-15,1-5-2 16,1-6 5-16,-1-6-23 16,2-4 19-16,-2-1-4 15,-1-19 4-15,1-5-9 0,-4-5 5 16,-2-4 4-16,-6-5 2 15,-4-3 4-15,-4-2 0 16,-5-6 3-16,-6 0 3 16,-5-6-6-16,-4-4-8 15,0-6 8-15,-6-4 11 16,-13-2-7-16,-4 1 6 16,-5 0-5-16,-9 5 2 15,1 0-7-15,-6 5 13 16,-5 11-13-16,-3 10 16 15,-2 13-16-15,-3 10-57 16,2 10-40-16</inkml:trace>
-  <inkml:trace contextRef="#ctx0" brushRef="#br0" timeOffset="141760.38">17346 9254 208 0,'0'0'148'0,"0"0"-102"0,0 0-26 16,0 0 18-16,0 0 17 15,0 0 2-15,0 0-34 16,0-34-18-16,0 34-5 15,0 0-11-15,0 4-2 16,4 12 5-16,7 7 8 16,3 2 0-16,2 1 2 15,-2 3-4-15,2-4-4 16,-3-1-2-16,-2-6 3 16,2-2-9-16,-2-6 10 15,2-6-18-15,2-4-20 16,7-5 29-16,5-28 13 15,6-11 5-15,3-11 11 0,3-8 2 16,2-3-2 0,-2-3-6-16,-4 4-2 0,-9 14 3 15,-10 16-10-15,-8 14 11 16,-8 14-12-16,0 7-35 16,-15 0-126-16,-7 6-109 15</inkml:trace>
+  <inkml:trace contextRef="#ctx0" brushRef="#br0" timeOffset="141760.37">17346 9254 208 0,'0'0'148'0,"0"0"-102"0,0 0-26 16,0 0 18-16,0 0 17 15,0 0 2-15,0 0-34 16,0-34-18-16,0 34-5 15,0 0-11-15,0 4-2 16,4 12 5-16,7 7 8 16,3 2 0-16,2 1 2 15,-2 3-4-15,2-4-4 16,-3-1-2-16,-2-6 3 16,2-2-9-16,-2-6 10 15,2-6-18-15,2-4-20 16,7-5 29-16,5-28 13 15,6-11 5-15,3-11 11 0,3-8 2 16,2-3-2 0,-2-3-6-16,-4 4-2 0,-9 14 3 15,-10 16-10-15,-8 14 11 16,-8 14-12-16,0 7-35 16,-15 0-126-16,-7 6-109 15</inkml:trace>
   <inkml:trace contextRef="#ctx0" brushRef="#br0" timeOffset="142084.09">17607 9127 228 0,'0'0'11'16,"0"0"-11"-16,0 0 4 16,0 0 20-16,0 0 17 15,0 0-23-15,44 63-6 16,-31-63-12-16,4 0 12 16,6-5 51-16,9-19-42 15,5-10 6-15,2-7-21 16,1-5 1-16,-3-2-2 15,-1-1-4-15,0 6-2 16,2 1-24-16,-3 9-77 0,-4 10-49 16,-5 9-43-16</inkml:trace>
   <inkml:trace contextRef="#ctx0" brushRef="#br0" timeOffset="145007.26">17581 10791 16 0,'0'0'85'0,"0"0"-52"15,0 0-16-15,0 0 43 16,0 0 23-16,0 0-30 16,0 0-24-16,-21 9-4 15,21-9-17-15,0 0 2 0,0 0-7 16,0 0 4 0,11 0 14-16,11 0-10 0,9 0-3 15,10-6-1-15,6-2-5 16,7 1 1-16,7-4-3 15,1-3-3-15,6-4-3 16,2-4-40-16,6 1-4 16,-5-1-18-16,-5 3 14 15,-11 4 20-15,-13 2-8 16,-12 3-19-16,-11 7 43 16,-14 3 13-16,-5 0-79 15</inkml:trace>
-  <inkml:trace contextRef="#ctx0" brushRef="#br0" timeOffset="145367.82">17528 10975 294 0,'0'0'64'0,"0"0"-51"16,0 0 4-16,88-42 28 0,-32 21 16 16,14 1-20-16,10-3-22 15,3 4-7-15,1 0-11 16,-3 2 0-16,-6-1-1 15,-5 1-2-15,-6-1-11 16,-12-2-9-16,-4 3-2 16,-9 3 10-16,-5 1-20 15,-7 3-41-15,-10 4 46 16,-10 5-64-16,-7 1-85 16</inkml:trace>
+  <inkml:trace contextRef="#ctx0" brushRef="#br0" timeOffset="145367.81">17528 10975 294 0,'0'0'64'0,"0"0"-51"16,0 0 4-16,88-42 28 0,-32 21 16 16,14 1-20-16,10-3-22 15,3 4-7-15,1 0-11 16,-3 2 0-16,-6-1-1 15,-5 1-2-15,-6-1-11 16,-12-2-9-16,-4 3-2 16,-9 3 10-16,-5 1-20 15,-7 3-41-15,-10 4 46 16,-10 5-64-16,-7 1-85 16</inkml:trace>
   <inkml:trace contextRef="#ctx0" brushRef="#br0" timeOffset="146568.15">17700 11167 55 0,'0'0'79'15,"0"0"-20"-15,0 0-19 16,0 0-6-16,0 89 33 16,0-69-38-16,0-2-9 15,0-1-14-15,0-3-5 16,0-5 3-16,0-4-4 16,0-2 0-16,0-1 6 15,0-2-6-15,0 0 10 16,0 0 6-16,0-2 8 15,0-12-18-15,-2-5-6 16,2-3 0-16,0-1-4 16,0 0 4-16,0-1-5 0,-3 0 3 15,2 5 2-15,1 3 3 16,0 5-3-16,0 6 0 16,0 2 21-16,0 3-7 15,0 0-14-15,0 4-5 16,7 11 2-16,4 3 2 15,0 0 1-15,-1 2-1 16,-1-5 0-16,-2-1-5 16,3-1-14-16,-2-3-2 15,-2-3-2-15,0-2 8 0,-1-5-8 16,2 0 19 0,-1 0 0-16,3-9 2 0,0-8 3 15,-2-2 2-15,1 1 0 16,-2-1 12-16,-3 2-3 15,0 2 10-15,0 7 6 16,-3 2-8-16,0 3 10 16,0 3 4-16,0 0-24 15,0 0-9-15,0 0 0 16,1 0-12-16,3 3 9 16,-1 5 6-16,2 0-3 15,-2 2 0-15,2-5-3 16,-4 4-7-16,2 0-33 15,-1-3-2-15,-1 3-18 16,2-2-27-16,-3-5-36 0</inkml:trace>
   <inkml:trace contextRef="#ctx0" brushRef="#br0" timeOffset="146928.41">17916 11008 180 0,'0'0'106'0,"0"0"-98"16,0 0-8-1,0 0 0-15,0 0 62 0,0 0-30 16,3 56-10-16,-3-33 3 15,0 0-11-15,0 0 2 16,0 1-1-16,2-5-9 16,-2-1 13-16,3-5-13 15,-2-3-1-15,2-5 4 16,-1-1-8-16,-1-2 1 16,4-2 4-16,0 0-5 15,5 0 15-15,3 0-12 16,3-10-4-16,3-5-27 15,0-2-48-15,-3-3-135 0</inkml:trace>
-  <inkml:trace contextRef="#ctx0" brushRef="#br0" timeOffset="148165.42">18447 10942 67 0,'0'0'55'16,"0"0"-4"-16,0 0 6 15,0 0-7-15,0 0-15 16,-91 18-1-16,74 0-13 16,2 2-7-16,4 6-13 15,2-3 4-15,5 3 0 16,4-3-4-16,0-2 5 15,0-3-6-15,0-4 0 16,0-5 1-16,4-3-1 0,2-6-2 16,0 0-3-16,3 0 5 15,0-12 1-15,1-5-1 16,-1-1-9-16,-1-3 8 16,-3 0 1-16,-1 4 1 15,-1 0 5-15,-3 5 7 16,1 2 17-16,-1-1-9 15,0 5-11-15,0 1 9 16,0-1-7-16,0-1-5 16,0 2-1-16,0 4-4 15,2-1-3-15,-2 2 1 16,1 0-11-16,4 11 0 0,-1 6 2 16,2 3 9-1,4-3 1-15,-2-1 1 0,0-5-4 16,-2-3 1-16,0-3-15 15,-2-3 11-15,2-2-16 16,1 0 20-16,4-5-8 16,2-13 6-16,-2-5-4 15,-2-2-6-15,-1 0 9 16,-1-1 2-16,-4 0-1 16,-3 1 3-16,0 4 4 15,0 1-4-15,0 8-4 16,-5 5 4-16,2 4 4 15,1 3 21-15,2 0-17 0,-1 0-8 16,-1 3-11 0,1 11 11-16,-2 1 2 0,3 2-2 15,0-3 1-15,0 2 0 16,0-3 0-16,0-3-1 16,0 1 0-16,6-6 0 15,0-1-1-15,2 0-13 16,-2-4-16-16,2 0 5 15,-2-4-1-15,0-5 16 16,-3-5 0-16,-1-2 6 16,-2-2 4-16,0 2 3 15,0-4 8-15,0 1 22 0,-3 1-15 16,-6-1-13-16,-1-1 0 16,-1 2 1-16,0 3-8 15,1 2 2-15,3 3 0 16,2 6-1-16,2 1 1 15,2 3 2-15,1 0-2 16,0 0-12-16,0 7-2 16,0 7 14-16,0 4 7 15,0-2 13-15,0-4-10 16,0 3-1-16,0 0 10 16,1 4-7-16,1 3 17 15,-1-1-15-15,1 1-2 16,1-5 8-16,0-1-17 0,0-3 1 15,0-2-1 1,1-4-1-16,-1-1 0 0,0-3-2 16,0-3-7-16,0 0-4 15,2 0-7-15,1 0 6 16,0 0-6-16,-1 0-4 16,0 0-5-16,-4 0 10 15,4 3-34-15,-2 1-22 16,-2 3-6-16,1-1-42 15</inkml:trace>
+  <inkml:trace contextRef="#ctx0" brushRef="#br0" timeOffset="148165.41">18447 10942 67 0,'0'0'55'16,"0"0"-4"-16,0 0 6 15,0 0-7-15,0 0-15 16,-91 18-1-16,74 0-13 16,2 2-7-16,4 6-13 15,2-3 4-15,5 3 0 16,4-3-4-16,0-2 5 15,0-3-6-15,0-4 0 16,0-5 1-16,4-3-1 0,2-6-2 16,0 0-3-16,3 0 5 15,0-12 1-15,1-5-1 16,-1-1-9-16,-1-3 8 16,-3 0 1-16,-1 4 1 15,-1 0 5-15,-3 5 7 16,1 2 17-16,-1-1-9 15,0 5-11-15,0 1 9 16,0-1-7-16,0-1-5 16,0 2-1-16,0 4-4 15,2-1-3-15,-2 2 1 16,1 0-11-16,4 11 0 0,-1 6 2 16,2 3 9-1,4-3 1-15,-2-1 1 0,0-5-4 16,-2-3 1-16,0-3-15 15,-2-3 11-15,2-2-16 16,1 0 20-16,4-5-8 16,2-13 6-16,-2-5-4 15,-2-2-6-15,-1 0 9 16,-1-1 2-16,-4 0-1 16,-3 1 3-16,0 4 4 15,0 1-4-15,0 8-4 16,-5 5 4-16,2 4 4 15,1 3 21-15,2 0-17 0,-1 0-8 16,-1 3-11 0,1 11 11-16,-2 1 2 0,3 2-2 15,0-3 1-15,0 2 0 16,0-3 0-16,0-3-1 16,0 1 0-16,6-6 0 15,0-1-1-15,2 0-13 16,-2-4-16-16,2 0 5 15,-2-4-1-15,0-5 16 16,-3-5 0-16,-1-2 6 16,-2-2 4-16,0 2 3 15,0-4 8-15,0 1 22 0,-3 1-15 16,-6-1-13-16,-1-1 0 16,-1 2 1-16,0 3-8 15,1 2 2-15,3 3 0 16,2 6-1-16,2 1 1 15,2 3 2-15,1 0-2 16,0 0-12-16,0 7-2 16,0 7 14-16,0 4 7 15,0-2 13-15,0-4-10 16,0 3-1-16,0 0 10 16,1 4-7-16,1 3 17 15,-1-1-15-15,1 1-2 16,1-5 8-16,0-1-17 0,0-3 1 15,0-2-1 1,1-4-1-16,-1-1 0 0,0-3-2 16,0-3-7-16,0 0-4 15,2 0-7-15,1 0 6 16,0 0-6-16,-1 0-4 16,0 0-5-16,-4 0 10 15,4 3-34-15,-2 1-22 16,-2 3-6-16,1-1-42 15</inkml:trace>
   <inkml:trace contextRef="#ctx0" brushRef="#br0" timeOffset="148864.07">18668 10898 179 0,'0'0'50'16,"0"0"-38"-16,0 0 47 15,0 0-9-15,0 0-10 0,0 0-28 16,-43 30 1 0,40-23-4-16,1-2-7 0,1 4-2 15,1 6 0-15,0 3-2 16,0 5 2-16,3-3 6 16,6 2 0-16,0-5 1 15,1-5-4-15,-1-3-3 16,0-9 0-16,0 0 0 15,0 0 1-15,0-17-1 16,-3-3-2-16,-1-3 2 16,-4-4 1-16,-1-3 15 15,0 4 4-15,0 3 12 0,0 6 1 16,0 8-7-16,0 8 0 16,0 1 3-16,0 0-29 15,4 14-11-15,2 13 11 16,-3 5 13-16,2 8 2 15,-4 3-14-15,-1 6 3 16,0 3 2-16,0 3-3 16,0-1-2-16,-3-5 4 15,-3-8 1-15,0-10-8 16,2-12 3-16,3-6-1 16,-1-9 1-16,-1-4 2 15,-1 0 4-15,-1 0 38 16,-3-4-22-16,-2-10-11 15,3-7-12-15,2-4 2 16,4-7-5-16,1-1-18 0,0-4-12 16,4 0-9-16,8 1-14 15,5 3-30-15,-1 1-60 16,-1 2-82-16</inkml:trace>
   <inkml:trace contextRef="#ctx0" brushRef="#br0" timeOffset="149163.24">18775 10883 289 0,'0'0'35'16,"0"0"-29"-16,0 0 6 0,0 0 33 16,-10 95-22-16,10-75-17 15,2-1-5-15,6-6 6 16,0-6-7-16,-2-3-7 15,0-4 5-15,0 0 2 16,3-5 33-16,-2-13-8 16,-1-4-10-16,1-1-7 15,-3-1 9-15,-4 1 5 16,0 5-11-16,0 6-11 16,0 7-6-16,0 2 2 15,-6 3-33-15,1 0-59 16,-2 0-27-16,1 3-98 15</inkml:trace>
   <inkml:trace contextRef="#ctx0" brushRef="#br0" timeOffset="149439.24">18922 10919 75 0,'0'0'59'0,"0"0"-14"15,0 0-4-15,0 0 16 16,0 0-13-16,0 0-32 16,16 68 10-16,-16-66-13 15,0 0 15-15,0-2 23 0,0 0-10 16,0 0 19 0,0 0-3-16,0-12-41 0,0-3 3 15,0-2-13-15,0 0-2 16,0 5-10-16,3-1-62 15,2 4 2-15,-1 2-55 16,1 1-94-16</inkml:trace>
@@ -4309,7 +4756,7 @@
   <inkml:trace contextRef="#ctx0" brushRef="#br0" timeOffset="208273.24">28433 8589 323 0,'0'0'73'0,"0"0"-73"15,0 0-5-15,0 0 5 16,0 0 6-16,0 0 3 16,-7 62-6-16,7-44-2 15,0-4 3-15,0-2-3 16,4-1 1-16,4-7-2 0,2-3 2 16,-1-1 0-1,2 0 3-15,3 0-3 0,0-10 4 16,0-9-5-16,-1 1 3 15,-4-2 4-15,-2-2 26 16,-6 3 6-16,-1 1 9 16,0 0-2-16,-3 2-11 15,-10 2-30-15,1 1-6 16,-4 6-1-16,1-2-2 16,0 7-32-16,0 2-34 15,3 0-63-15,3 0-218 16</inkml:trace>
   <inkml:trace contextRef="#ctx0" brushRef="#br0" timeOffset="208867.44">28129 8556 78 0,'0'0'157'16,"0"0"-87"-16,0 0-37 16,0 0 12-16,0 0-18 15,0 0 9-15,3-5-28 16,-3 5-6-16,0 2-2 15,0 10 2-15,0 5 6 16,0 4 4-16,-5 0-12 16,-1 2 3-16,-1-3-3 15,1 0-2-15,-1-3-36 16,5 1-66-16,2-4-127 16</inkml:trace>
   <inkml:trace contextRef="#ctx0" brushRef="#br0" timeOffset="209616.51">29425 8401 124 0,'0'0'74'16,"0"0"-8"-16,0 0-7 15,0 0-10-15,0 0-7 16,0 0-42-16,-4-4 6 16,-5 15-6-16,-3 3 6 15,-2 1 5-15,4-1-3 16,1 2-7-16,-1-1 5 15,2 0-6-15,2 2 0 16,1 0 4-16,5-1-1 0,0 0-3 16,3-2 2-1,13 1 20-15,3-3-2 0,-6 0-16 16,-1-6 0-16,-7-2-1 16,-4-3-2-16,-1 4 5 15,0-4 4-15,0 2-6 16,0-2 7-16,0 4-3 15,-4 3-2-15,-10 0-6 16,2-2-7-16,-2 0-4 16,2 0-13-16,4-1-15 15,0 1-30-15,3-5-34 16,0-1-28-16,5 0-17 0</inkml:trace>
-  <inkml:trace contextRef="#ctx0" brushRef="#br0" timeOffset="209937.32">29624 8536 172 0,'0'0'146'0,"0"0"-131"16,0 0-14-16,0 0 36 15,0 0 27-15,-7 84-38 16,7-60-21-16,0 1-1 15,11-5 5-15,8-3-8 16,1-4-1-16,4-10 0 16,1 0-7-16,0-3 3 0,-3 0-10 15,-3-7 11 1,-6-9 3-16,-3-8 6 0,-3-3 9 16,-6-4 11-16,-1 4-11 15,0 8 20-15,-9 5-35 16,-12 8-20-16,-4 6-18 15,-3 0-16-15,5 0-19 16,5 7-128-16</inkml:trace>
+  <inkml:trace contextRef="#ctx0" brushRef="#br0" timeOffset="209937.31">29624 8536 172 0,'0'0'146'0,"0"0"-131"16,0 0-14-16,0 0 36 15,0 0 27-15,-7 84-38 16,7-60-21-16,0 1-1 15,11-5 5-15,8-3-8 16,1-4-1-16,4-10 0 16,1 0-7-16,0-3 3 0,-3 0-10 15,-3-7 11 1,-6-9 3-16,-3-8 6 0,-3-3 9 16,-6-4 11-16,-1 4-11 15,0 8 20-15,-9 5-35 16,-12 8-20-16,-4 6-18 15,-3 0-16-15,5 0-19 16,5 7-128-16</inkml:trace>
   <inkml:trace contextRef="#ctx0" brushRef="#br0" timeOffset="210935.91">30935 8252 14 0,'0'0'50'0,"0"0"3"0,0 0 3 16,0 0 0-16,0 0-16 16,0 0-10-16,0 0-6 15,0 0-17-15,0 0 0 16,-1 0 1-16,-1 0 4 15,1 0-12-15,-5 0 2 16,-3 0-2-16,-5 0 9 16,1 5-9-16,2 5 0 15,1 0 0-15,2 0 4 16,1 2-4-16,2 0 0 16,2 1 2-16,2-2 1 15,1 2-3-15,0-2 2 0,0 2-2 16,7 0 3-16,-1-1-2 15,-1-1-1-15,-2 0 0 16,0-5-1-16,-3 3 1 16,0-5 0-16,0 0-1 15,0 1 3-15,0-1 9 16,-9-1 17-16,-5 4-15 16,1-1-3-16,3-4-3 15,2 1-6-15,-1 2-1 16,2-1 0-16,1-2-43 15,1 2-25-15,4-4-29 16,1 0-34-16</inkml:trace>
   <inkml:trace contextRef="#ctx0" brushRef="#br0" timeOffset="211298.04">31045 8365 132 0,'0'0'54'15,"0"0"-14"-15,0 0-31 16,0 0-2-16,0 0 15 16,-31 79-5-16,31-66-12 15,0-5 14-15,0-1-6 0,6 0-5 16,4-4-3-16,2-3 0 15,2 0-2-15,2 0-3 16,1-1-7-16,-1-12-4 16,-4-1 7-16,-5-2 4 15,-4-2 33-15,-3-2-21 16,0 1 8-16,-1 0-14 16,-15-1-2-16,-5 6-4 15,0 6-14-15,-6 2 0 16,0 6-50-16,0 0-23 15,2 0-29-15</inkml:trace>
   <inkml:trace contextRef="#ctx0" brushRef="#br0" timeOffset="-206381.88">26637 728 80 0,'0'0'104'0,"0"0"-55"16,0 0-1-16,0 0-30 15,0 0-18-15,0 0-6 16,0 0 6-16,0 93 12 15,0-55 0-15,-3 2-9 16,0-4 2-16,3 1-3 16,0-4-2-16,0-5 1 15,0-2-1-15,0-1-36 0,4-7-56 16,4-5-54 0</inkml:trace>
@@ -4325,7 +4772,7 @@
   <inkml:trace contextRef="#ctx0" brushRef="#br0" timeOffset="-201266.93">28949 1355 109 0,'0'0'91'0,"0"0"-14"16,0 0-24-16,0 0-11 15,0 0-37-15,0 0-5 16,0 14-14-16,-4 19 14 16,-2 12 33-16,-3 0-8 0,1 1-6 15,2-4-11 1,0-8-7-16,2 0 3 0,0-6-3 15,2-2 1-15,1-8 0 16,-1-3-2-16,1-5-8 16,1-6-20-16,0-2-43 15,-2-2-43-15,2 0-18 16</inkml:trace>
   <inkml:trace contextRef="#ctx0" brushRef="#br0" timeOffset="-201108.4">28852 1594 103 0,'0'0'122'0,"0"0"-73"16,0 0-2-16,0 0-15 15,0 0-4-15,0 0-12 0,50-2-7 16,-24 2-5 0,3 0-4-16,-1 0-83 0,-1 0-143 15</inkml:trace>
   <inkml:trace contextRef="#ctx0" brushRef="#br0" timeOffset="-200628.68">28663 2019 138 0,'0'0'137'0,"0"0"-88"0,0 0-37 15,0 0-12-15,0 0 8 16,0 0 30-16,1 31-10 15,-7-10-17-15,-1 2-5 16,1 1-4-16,1 0 9 16,-1-2-11-16,2-1 1 15,-2-1-3-15,2-1-36 16,1-5-94-16,3-6 13 16</inkml:trace>
-  <inkml:trace contextRef="#ctx0" brushRef="#br0" timeOffset="-200173.24">29015 2022 175 0,'0'0'153'0,"0"0"-139"15,0 0-7-15,0 0-7 16,0 0 34-16,0 0 13 16,-55 77-24-16,44-60-8 15,-1-1-3-15,2 1 3 16,2 4-7-16,-1-2 8 16,1 6-11-16,3-4-4 15,1 0 3-15,2-2-2 0,2-6-4 16,0-1-2-1,0-6-40-15,0-2-13 0,9-4-28 16,7 0-69-16,0 0 45 16</inkml:trace>
+  <inkml:trace contextRef="#ctx0" brushRef="#br0" timeOffset="-200173.25">29015 2022 175 0,'0'0'153'0,"0"0"-139"15,0 0-7-15,0 0-7 16,0 0 34-16,0 0 13 16,-55 77-24-16,44-60-8 15,-1-1-3-15,2 1 3 16,2 4-7-16,-1-2 8 16,1 6-11-16,3-4-4 15,1 0 3-15,2-2-2 0,2-6-4 16,0-1-2-1,0-6-40-15,0-2-13 0,9-4-28 16,7 0-69-16,0 0 45 16</inkml:trace>
   <inkml:trace contextRef="#ctx0" brushRef="#br0" timeOffset="-199999.3">28961 2155 134 0,'0'0'114'0,"0"0"-94"15,0 0-19-15,0 0 35 16,0 0 15-16,0 0 1 16,-1 0-28-16,9 0-13 15,9 0-6-15,5 0-5 16,5 0-48-16,-2 0-77 0,-5 0-61 16</inkml:trace>
   <inkml:trace contextRef="#ctx0" brushRef="#br0" timeOffset="-199722.45">28902 2130 9 0,'0'0'130'0,"0"0"-74"15,0 0-38-15,0 0 13 16,0 0 27-16,0 0-1 0,-8-2-16 15,8 2-24-15,0 0-8 16,0 0-9-16,0 0 0 16,0 0 6-16,2 4 20 15,14 3-10-15,8-1-5 16,3-3-4-16,7-3-7 16,2 0-6-16,-2 0-34 15,-3 0-59-15,-11-12-174 16</inkml:trace>
   <inkml:trace contextRef="#ctx0" brushRef="#br0" timeOffset="-194501.09">30710 9496 34 0,'0'0'26'16,"0"0"-8"-16,0 0-17 15,0 0-1-15,0 0-9 16,0 0 9-16,0 0 5 15,0 0 37-15,-61 35 11 0,61-35 8 16,0 0-6-16,0 2-35 16,0-2-9-16,3 2-7 15,11-2 5-15,13 0-1 16,14 0 9-16,12 0 18 16,13 0-6-16,9-4-5 15,7-2-4-15,1-3-17 16,-4 1 1-16,-3-2-4 15,-10 0-7-15,-11 0 5 16,-12 0 0-16,-7 2-10 0,-7 3 10 16,-7 0-21-1,-7-1-14-15,-6 5-33 0,-6 1-15 16,-3 0-14 0,0 0-32-16</inkml:trace>
@@ -4339,25 +4786,25 @@
   <inkml:trace contextRef="#ctx0" brushRef="#br0" timeOffset="-181143.18">23289 610 44 0,'0'0'57'0,"0"0"3"15,22-83-4-15,-22 51 14 16,-3 0 21-16,-22-3-27 16,-19 4-31-16,-17 3-5 15,-18 3-16-15,-16 7-11 16,-15 4-1-16,-10 7 4 16,-10 2-5-16,-4 4 11 0,-9 1-5 15,2 0-5 1,6 9-18-16,11 12 17 0,22 17-3 15,19 3-7-15,10 6 11 16,6 10 6-16,1 5-3 16,6 3-3-16,13 5 2 15,14 1-7-15,15 4 4 16,18 0 1-16,0 1-2 16,31 2 5-16,15-4-6 15,16-2-4-15,12-13-28 16,16-6 13-16,14-14 13 15,10-18 9-15,8-11-2 16,3-10 2-16,5-21-2 16,1-18-4-16,2-10 3 15,-3 0 3-15,-11-3 6 0,-13-3-3 16,-15-3 5-16,-12-3-7 16,-11-2 10-16,-12 1-3 15,-10-3-6-15,-16 3 5 16,-13 1-4-16,-13 1 0 15,-4 3 4-15,-4 3-7 16,-18 2-13-16,-7 5-31 16,-10 3-13-16,-6 8 21 15,-4 8-103-15,-3 10-41 16</inkml:trace>
   <inkml:trace contextRef="#ctx0" brushRef="#br0" timeOffset="-82487.27">30917 9690 26 0,'0'0'25'16,"0"0"-10"-16,-3 102-6 15,1-73-5-15,-1-1-2 0,2-3 2 16,-3-6-4-16,4-4 0 15,0 1 0-15,0 0 4 16,5 1-2-16,8 0-2 16,4-4 0-16,1 3-5 15,2-2 5-15,-1 5 0 16,4 2-56-16,-1 0 45 16,2 1-8-16,0 0 19 15</inkml:trace>
   <inkml:trace contextRef="#ctx0" brushRef="#br0" timeOffset="-81781.92">31653 9683 9 0,'0'0'8'0,"0"0"3"16,0 0-7-16,0 0 12 0,-82-76-7 15,56 62-7-15,0 1-1 16,-2 0 0-16,-3 1 0 16,1-1 0-16,2 2-1 15,-1 1 0-15,4 0-1 16,1 0 1-16,1 3-2 16,1 1 1-16,-1 3-10 15,-3 3 5-15,1 0-2 16,-3 0 8-16,0 0-3 15,-2 2 3-15,2 5 0 16,2-2 0-16,2 2 0 16,2 2-1-16,5 0 1 15,2 0 0-15,2 1 2 0,-4 3 0 16,2 3 7-16,-1 6 4 16,2 3 3-16,0-1 4 15,3 4-12-15,2 4-3 16,1 0 13-16,3 2-6 15,5 0-12-15,0 1 12 16,0-1-9-16,0-1-2 16,5 2-1-16,0-1 0 15,3-1 0-15,-1 3 3 16,1-5 0-16,2-2 0 16,2 3-3-16,3-2-12 15,7 1 12-15,1-1 0 0,4-6 0 16,-1-1-13-16,4-9-11 15,3-1 18-15,1-8 1 16,4 2-13-16,1-2 14 16,-1-4-33-16,3-1 18 15</inkml:trace>
-  <inkml:trace contextRef="#ctx0" brushRef="#br0" timeOffset="-80619.35">31743 9957 42 0,'0'0'19'0,"0"0"-11"0,-8-103 1 16,-1 70-6-16,-3-1 8 16,-4 0-3-16,0 2-7 15,-1 0 1-15,0 0-1 16,-2 7-1-16,-3 0 2 15,-1 2-2-15,-1 3 3 16,0 0-3-16,0 4 1 16,1 1-1-16,0 4 0 15,-1 3 0-15,-3-1-1 16,1 5-16-16,-1 1-8 16,3 1 13-16,-2 2-4 0,1 0 14 15,-2 0 1-15,-1 3 1 16,-2 10-1-16,-1 0 3 15,1-2-2-15,3 8 0 16,4-1-3-16,3 7 1 16,4 1 4-16,2 2 0 15,3 3 12-15,0-1-13 16,2-1-1-16,-1-2 4 16,2 0-3-16,0-2 0 15,2-1-1-15,5 2 3 16,-1 1-1-16,2 1 11 15,0 0 3-15,0 1-7 16,0 0 4-16,0-2 5 16,2-2-14-16,4-2 0 15,3 2 14-15,4-2-8 0,4-1-4 16,3-1 12-16,7 0-15 16,5 1 2-16,3-5-3 15,7-4-2-15,6-2 0 16,2-9-10-16,0 1 7 15,-1-3-51-15,-2 0 1 16,-5 0-27-16,-4 0 79 16,-5 0 1-16,-5 0 31 15,-4-11-27-15,-1 0 17 16,-3-6 12-16,4-1 1 16,1-3 17-16,4-4-33 15,-5-2-13-15,0-1 1 0,-4 0-12 16,-3-2-5-16,-2-2 11 15,-8-4 0-15,-2 1 11 16,-5-3-10-16,0 2 2 16,0-1 1-16,-14 0 7 15,-4-3 5-15,-4 6-10 16,1-3 8-16,-1 5-9 16,0 2-5-16,-1 1 0 15,-4 4-1-15,-1 1 1 16,-1 5-1-16,-2 1-4 15,1 0-3-15,-1 7 3 16,-2-1-1-16,-3 3-25 16,-2 3-24-16,0-1 8 0,-1 3 35 15,3-3 12-15,-1 4 0 16,-1 1 3-16,3-1-3 16,2 3 2-16,4-2-1 15,-1 0 0-15,3 2 0 16,0 0-1-16,4 4 3 15,3 14-5-15,-1 11 2 16,4 13 0-16,-2 10 14 16,2 8-9-16,1 3-5 15,1-2-1-15,2-1 1 16,5-1 3-16,7-3-3 16,1-3-10-16,0 0 10 15,3-6-2-15,6-3 2 16,3-1 2-16,0-5-1 0,4-1 1 15,2-7-2-15,7-4 0 16,5-2 8-16,3-3-7 16,5-5-2-16,3-7-9 15,2-5-10-15,5-4-22 16,1 0 11-16,4-2 17 16,2-12 14-16</inkml:trace>
+  <inkml:trace contextRef="#ctx0" brushRef="#br0" timeOffset="-80619.36">31743 9957 42 0,'0'0'19'0,"0"0"-11"0,-8-103 1 16,-1 70-6-16,-3-1 8 16,-4 0-3-16,0 2-7 15,-1 0 1-15,0 0-1 16,-2 7-1-16,-3 0 2 15,-1 2-2-15,-1 3 3 16,0 0-3-16,0 4 1 16,1 1-1-16,0 4 0 15,-1 3 0-15,-3-1-1 16,1 5-16-16,-1 1-8 16,3 1 13-16,-2 2-4 0,1 0 14 15,-2 0 1-15,-1 3 1 16,-2 10-1-16,-1 0 3 15,1-2-2-15,3 8 0 16,4-1-3-16,3 7 1 16,4 1 4-16,2 2 0 15,3 3 12-15,0-1-13 16,2-1-1-16,-1-2 4 16,2 0-3-16,0-2 0 15,2-1-1-15,5 2 3 16,-1 1-1-16,2 1 11 15,0 0 3-15,0 1-7 16,0 0 4-16,0-2 5 16,2-2-14-16,4-2 0 15,3 2 14-15,4-2-8 0,4-1-4 16,3-1 12-16,7 0-15 16,5 1 2-16,3-5-3 15,7-4-2-15,6-2 0 16,2-9-10-16,0 1 7 15,-1-3-51-15,-2 0 1 16,-5 0-27-16,-4 0 79 16,-5 0 1-16,-5 0 31 15,-4-11-27-15,-1 0 17 16,-3-6 12-16,4-1 1 16,1-3 17-16,4-4-33 15,-5-2-13-15,0-1 1 0,-4 0-12 16,-3-2-5-16,-2-2 11 15,-8-4 0-15,-2 1 11 16,-5-3-10-16,0 2 2 16,0-1 1-16,-14 0 7 15,-4-3 5-15,-4 6-10 16,1-3 8-16,-1 5-9 16,0 2-5-16,-1 1 0 15,-4 4-1-15,-1 1 1 16,-1 5-1-16,-2 1-4 15,1 0-3-15,-1 7 3 16,-2-1-1-16,-3 3-25 16,-2 3-24-16,0-1 8 0,-1 3 35 15,3-3 12-15,-1 4 0 16,-1 1 3-16,3-1-3 16,2 3 2-16,4-2-1 15,-1 0 0-15,3 2 0 16,0 0-1-16,4 4 3 15,3 14-5-15,-1 11 2 16,4 13 0-16,-2 10 14 16,2 8-9-16,1 3-5 15,1-2-1-15,2-1 1 16,5-1 3-16,7-3-3 16,1-3-10-16,0 0 10 15,3-6-2-15,6-3 2 16,3-1 2-16,0-5-1 0,4-1 1 15,2-7-2-15,7-4 0 16,5-2 8-16,3-3-7 16,5-5-2-16,3-7-9 15,2-5-10-15,5-4-22 16,1 0 11-16,4-2 17 16,2-12 14-16</inkml:trace>
   <inkml:trace contextRef="#ctx0" brushRef="#br0" timeOffset="-80334.44">31735 9846 10 0,'0'0'32'0,"-3"-83"32"16,-12 44-26-16,-4-1-6 15,-1 3-20-15,-5 1-2 16,-4 3 11-16,-1-1-4 15,-2 3-14-15,-1 5-5 16,0 4 2-16,-6 6 0 16,0 6 0-16,-6 6-9 15,-2 4-3-15,2 0-18 16,1 0-8-16,6 0 20 16,7 5-3-16,5 6-9 15,3 5-6-15,5 7 24 0,-3 6-13 16,1 3 19-16</inkml:trace>
   <inkml:trace contextRef="#ctx0" brushRef="#br0" timeOffset="-39853.15">17336 13002 51 0,'0'0'38'16,"0"0"-33"-16,0 0 42 16,0 0 60-16,0 0-24 15,0 0-42-15,0 0-5 16,0 0 1-16,-2 0-21 16,2 0 22-16,0 0 7 15,0 0-35-15,-1-10-5 16,-1-3-5-16,2-1 0 0,0-7-4 15,0-3-11-15,0-9-16 16,0-2 15-16,0-5 16 16,0 3-5-16,0 1-1 15,-4 5 6-15,-11 6-1 16,-2 2 2-16,1 6 5 16,4 7 21-16,2 4-4 15,5 4-7-15,2 2-12 16,3 0-4-16,0 7-5 15,0 21-10-15,2 17 15 16,6 12 0-16,3 3 0 16,-3 1 0-16,2-3 0 0,2-6 2 15,-3-5-4 1,3-4-9-16,-2 2-3 0,-2-5-27 16,-2-3-79-16,-3-8-7 15,-3-12-84-15</inkml:trace>
   <inkml:trace contextRef="#ctx0" brushRef="#br0" timeOffset="-39679.09">17160 13155 64 0,'0'0'115'0,"0"0"-84"15,0 0 3-15,0 0 54 0,0 0-22 16,91-37-44-1,-57 24-19-15,1-2-3 0,-4 3-83 16,-4-1-60-16</inkml:trace>
   <inkml:trace contextRef="#ctx0" brushRef="#br0" timeOffset="-39463.53">17554 13054 98 0,'0'0'101'0,"0"0"-19"16,0 0-48-1,25 97 15-15,-20-73 0 0,-2-1-22 16,0 0-19-16,0-4 2 16,-2 1-7-16,1-6-2 15,-1 0-2-15,2-7-73 16,0-1-105-16</inkml:trace>
-  <inkml:trace contextRef="#ctx0" brushRef="#br0" timeOffset="-38703.38">18889 12497 41 0,'0'0'90'16,"0"0"-15"-16,2-88-42 16,-2 57 21-16,-15-1 3 15,-5 2 21-15,4 4-23 16,-1 9-19-16,8 8 4 15,6 5 0-15,2 4-11 16,1 0-29-16,-2 6-5 16,2 24-4-16,0 15 9 15,0 5 3-15,0 3 2 16,6 3-5-16,7-3 5 0,-2 5-4 16,0-3-1-16,-5 2-33 15,-2 0-34-15,-4-8-15 16,0-3-89-16,0-11-67 15</inkml:trace>
+  <inkml:trace contextRef="#ctx0" brushRef="#br0" timeOffset="-38703.39">18889 12497 41 0,'0'0'90'16,"0"0"-15"-16,2-88-42 16,-2 57 21-16,-15-1 3 15,-5 2 21-15,4 4-23 16,-1 9-19-16,8 8 4 15,6 5 0-15,2 4-11 16,1 0-29-16,-2 6-5 16,2 24-4-16,0 15 9 15,0 5 3-15,0 3 2 16,6 3-5-16,7-3 5 0,-2 5-4 16,0-3-1-16,-5 2-33 15,-2 0-34-15,-4-8-15 16,0-3-89-16,0-11-67 15</inkml:trace>
   <inkml:trace contextRef="#ctx0" brushRef="#br0" timeOffset="-38533.46">18736 12732 60 0,'0'0'225'0,"0"0"-224"0,0 0 46 15,0 0 60-15,0 0-56 16,111 11-22-16,-75-10-29 16,-1-1-38-16,-6 0-177 15</inkml:trace>
-  <inkml:trace contextRef="#ctx0" brushRef="#br0" timeOffset="-38193.91">19211 12914 333 0,'0'0'146'0,"0"0"-143"0,0 0 0 16,0 0 36-16,0 0-7 15,0 0-9-15,8 40 22 16,-8-21-26-16,-9 4 9 16,0-5-6-16,3 2-21 15,3-3 9-15,1-3-10 16,2 0 4-16,0-1-4 16,0-2 0-16,0-2 0 15,10-1-1-15,4-5-4 0,4-3-33 16,8 0-26-1,7-15-48-15,5-14-201 0</inkml:trace>
+  <inkml:trace contextRef="#ctx0" brushRef="#br0" timeOffset="-38193.92">19211 12914 333 0,'0'0'146'0,"0"0"-143"0,0 0 0 16,0 0 36-16,0 0-7 15,0 0-9-15,8 40 22 16,-8-21-26-16,-9 4 9 16,0-5-6-16,3 2-21 15,3-3 9-15,1-3-10 16,2 0 4-16,0-1-4 16,0-2 0-16,0-2 0 15,10-1-1-15,4-5-4 0,4-3-33 16,8 0-26-1,7-15-48-15,5-14-201 0</inkml:trace>
   <inkml:trace contextRef="#ctx0" brushRef="#br0" timeOffset="-37601.97">20381 12323 35 0,'0'0'44'16,"0"0"6"-16,0 0 13 15,42-97 16-15,-36 72-6 16,-5 3-8-16,-1 1 11 0,0 0-43 15,0 1-13 1,0-3 8-16,-1 0-14 0,-4 0-7 16,1-4 9-16,-2 2-16 15,1 4 0-15,1 1 0 16,0 8 4-16,4 5 0 16,-2 6 3-16,2 1 3 15,0 0-10-15,0 0-13 16,0 17-2-16,0 7 15 15,0 12 0-15,6 6 17 16,-2 2-9-16,1 5-3 16,-2-3 16-16,-2-1-21 0,1 2 9 15,-2 0-3 1,0-1-5-16,0-2-2 0,0-4-20 16,0-4-49-16,0-9-59 15,4-12-74-15</inkml:trace>
-  <inkml:trace contextRef="#ctx0" brushRef="#br0" timeOffset="-37404.84">20324 12389 353 0,'0'0'94'16,"0"0"-47"-16,0 0 42 15,0 0-8-15,0 0-53 0,0 0-27 16,55-30-1-16,-26 18-3 16,2 0-104-16,3-3-144 15</inkml:trace>
+  <inkml:trace contextRef="#ctx0" brushRef="#br0" timeOffset="-37404.85">20324 12389 353 0,'0'0'94'16,"0"0"-47"-16,0 0 42 15,0 0-8-15,0 0-53 0,0 0-27 16,55-30-1-16,-26 18-3 16,2 0-104-16,3-3-144 15</inkml:trace>
   <inkml:trace contextRef="#ctx0" brushRef="#br0" timeOffset="-37000.2">20873 12462 204 0,'0'0'139'0,"0"0"-82"0,0 0-1 16,0 0 73-16,0 0-35 16,0 0-59-16,11 0-15 15,-11 3-9-15,-2 7-8 16,-13 5 27-16,-7 2-16 15,0 4-12-15,-2-3 5 16,4 4-7-16,4 0 1 16,7-1-2-16,9-2-19 15,0 1 2-15,0-3-1 16,3 0 7-16,5 0 11 16,2 1-14-16,-3 2 14 15,-1-1 0-15,0-1-7 16,-3-1 8-16,-3-3 0 0,2-3 0 15,-2-1 8 1,0 0 1-16,0-3 0 0,-9 0-3 16,-2-1-6-16,-2-3 0 15,1 0-34-15,1-3-46 16,-2 0-28-16,-2 0-87 16</inkml:trace>
   <inkml:trace contextRef="#ctx0" brushRef="#br0" timeOffset="-36177.49">20761 12474 67 0,'0'0'87'15,"0"0"-68"-15,0 0 31 16,0 0 79-16,0 0-38 16,0 0-59-16,0-30-6 15,0 30 8-15,0-1 5 16,0-1-18-16,7-3-5 15,0 1-12-15,3 1-4 0,-1 0 5 16,-1 0-3-16,2 3-4 16,-2 0 2-16,1 0-2 15,2 0 0-15,0 5 0 16,0 2 2-16,-1 2-1 16,-3 2-3-16,-2-2-9 15,-4 2-38-15,-1-1 50 16,0 2 1-16,0-1 1 15,-3 3 0-15,-9 0-2 16,-4 0 2-16,-1 0 0 16,-3-1 14-16,-1-2-5 0,4-1 6 15,-2-3-5-15,4 2-2 16,0-4-3-16,1 1-5 16,3-2 4-16,2-1-3 15,1-2-1-15,4 1 11 16,1-2-12-16,3 0 1 15,0 0-2-15,0 0-3 16,0 2 1-16,0 0 3 16,7-1 0-16,7 1 15 15,0-1-13-15,0 2 2 16,-1 4 0-16,-1 2-4 16,-2 3 0-16,0 5 0 15,-1 1 0-15,-3 2 0 16,-3 3 0-16,-2-4 0 0,-1 0 4 15,0 0-4-15,0-1 0 16,0-3 2-16,-9 1-1 16,2-1 5-16,-3-4-6 15,3-2 4-15,0-4 1 16,-1-3 2-16,-2-1 7 16,0-1-3-16,-1 0-7 15,-1 0 2-15,3 0-6 16,0-5-15-16,1-2-21 15,0 0-37-15,3 0-19 16,4 3-70-16,1-1-71 16</inkml:trace>
-  <inkml:trace contextRef="#ctx0" brushRef="#br0" timeOffset="-33618.45">19468 12505 159 0,'0'0'57'16,"0"0"-37"-16,0 0 44 15,0 0 7-15,0 0-18 0,0 0-24 16,-2 0-16-1,2 0 9-15,8 0-19 0,8 0-2 16,2 0 10-16,6-3-8 16,1-2-1-16,2-7-2 15,-1 1-14-15,-7-1-24 16,-1 0-35-16,-7 3-88 16,-7-2-41-16</inkml:trace>
+  <inkml:trace contextRef="#ctx0" brushRef="#br0" timeOffset="-33618.46">19468 12505 159 0,'0'0'57'16,"0"0"-37"-16,0 0 44 15,0 0 7-15,0 0-18 0,0 0-24 16,-2 0-16-1,2 0 9-15,8 0-19 0,8 0-2 16,2 0 10-16,6-3-8 16,1-2-1-16,2-7-2 15,-1 1-14-15,-7-1-24 16,-1 0-35-16,-7 3-88 16,-7-2-41-16</inkml:trace>
   <inkml:trace contextRef="#ctx0" brushRef="#br0" timeOffset="-33356.53">19526 12335 147 0,'0'0'83'0,"0"0"-30"16,0 0-11-16,0 0-12 15,0 0 28-15,0 0-3 16,0 88-21-16,8-56-12 16,2 0-10-16,-3-4-12 15,1 1 9-15,-2-3-8 16,-3-3-1-16,-3-4-20 16,0-1-32-16,0-4-64 15,0-4-114-15</inkml:trace>
   <inkml:trace contextRef="#ctx0" brushRef="#br0" timeOffset="-32712.36">17996 12762 344 0,'0'0'35'16,"0"0"-35"-16,0 0-5 16,0 0 5-16,0 0 0 15,0 0 2-15,35 13 25 0,-15-13-10 16,5 0 22-16,0 0-28 16,5-4-11-16,-2-8 0 15,-3 1-70-15,-6-1-35 16,-9 1-18-16</inkml:trace>
   <inkml:trace contextRef="#ctx0" brushRef="#br0" timeOffset="-32464.32">18054 12603 242 0,'0'0'94'0,"0"0"-94"0,0 0 36 15,0 0 27-15,0 0-11 16,-3 93-26-16,1-64-7 16,2 2-2-16,0 2-8 15,0 0-7-15,0 2 6 16,0-3-7-16,0 0-2 16,3-2-1-16,0-4-52 15,-1-6-11-15,-1-5-99 16,2-5-94-16</inkml:trace>
   <inkml:trace contextRef="#ctx0" brushRef="#br0" timeOffset="-31646.11">17934 12723 205 0,'0'0'97'0,"0"0"-86"15,0 0 6-15,0 0 13 16,0 0-15-16,0 0-15 0,-10 4 4 15,7 5 0-15,1-3-3 16,1-4 3-16,-1 2-1 16,2-1-3-16,0-1 0 15,-1 0 1-15,-1-1 2 16,1-1-2-16,1 0 5 16,0 0-2-16,0 0 3 15,0 0-7-15,0 0-4 16,0 0 4-16,0 0 7 15,10 0-6-15,14-3 17 16,4-6-17-16,2 3 5 16,1 0-6-16,-1 2-52 15,0 1-37-15,-7 3-23 0</inkml:trace>
   <inkml:trace contextRef="#ctx0" brushRef="#br0" timeOffset="-28842.4">16756 12997 16 0,'0'0'25'16,"0"0"9"-16,0 0 42 15,0 0-9-15,0 0-25 16,0 0 3-16,0 0 18 16,-6-47-36-16,6 34 0 15,0-1-15-15,7-2 4 16,4 0 0-16,0 3-8 16,-2-1 11-16,2 2-11 0,1 2-6 15,0 5-2-15,2 0 3 16,5 2-4-16,0 3 1 15,0 0-2-15,-1 0-2 16,-2 3 0-16,-2 10 3 16,-5 1 0-16,0 7-11 15,-8 5 5-15,-1 2-1 16,0 3 8-16,-3 4 12 16,-10-1-12-16,-2 0 0 15,-1 1 0-15,-1-1 7 16,-1-2-7-16,3 1 6 15,1-7-3-15,1-4 8 16,3-4 2-16,4-2-6 16,2-3 4-16,2-2-8 15,1-1 7-15,1-5-4 0,-2 1-5 16,2-2 9-16,0 0-7 16,0 4 5-16,0-1 0 15,0 1 7-15,6-2 0 16,3-3-10-16,3 1 6 15,0-4 8-15,6 0-7 16,0 0-3-16,6 0 5 16,4-4-11-16,0-6 1 15,1 1-4-15,-3-1 4 16,-6 4-7-16,-4 2 3 16,-7 1-9-16,-2 3-29 15,-2 0-56-15,-3 0-67 16,-2 0-180-16</inkml:trace>
-  <inkml:trace contextRef="#ctx0" brushRef="#br0" timeOffset="-27140.96">18392 12462 98 0,'0'0'68'15,"0"0"-41"-15,0 0 38 16,0 0-10-16,0 0-10 15,0 0-20-15,52-60 1 16,-46 56 0-16,1 0-12 16,1 3 3-16,1 1-16 15,2 0-1-15,-1 0-5 0,1 9-4 16,-4 6 6-16,1 4 3 16,-3 2 2-16,-3-1-2 15,-2 0-3-15,0 0 2 16,-6 3 1-16,-10-1-1 15,-5 3 1-15,1-3-1 16,4-4-8-16,4-3 4 16,2-4-7-16,5-4-5 15,2 0 4-15,3-2 2 16,0-3-2-16,0 0-2 16,0-2 14-16,8 0 1 15,8 0 0-15,5 0 3 0,1 0 10 16,7 6-9-16,-1 1 0 15,-1 5 1-15,-4 3-3 16,-4 1-4-16,-6 4 0 16,-7-1 0-16,-3-3 2 15,-3 1 0-15,0 0 0 16,-5-3 20-16,-11 2 14 16,-4-1-16-16,0-1-6 15,-1-3-9-15,1-2 14 16,1-1-9-16,2-2 5 15,1-3-12-15,7 0 3 16,2-3 3-16,0 0-6 16,3 0-1-16,3-10-14 0,1-5-62 15,0-5-84 1,0 3-68-16</inkml:trace>
+  <inkml:trace contextRef="#ctx0" brushRef="#br0" timeOffset="-27140.97">18392 12462 98 0,'0'0'68'15,"0"0"-41"-15,0 0 38 16,0 0-10-16,0 0-10 15,0 0-20-15,52-60 1 16,-46 56 0-16,1 0-12 16,1 3 3-16,1 1-16 15,2 0-1-15,-1 0-5 0,1 9-4 16,-4 6 6-16,1 4 3 16,-3 2 2-16,-3-1-2 15,-2 0-3-15,0 0 2 16,-6 3 1-16,-10-1-1 15,-5 3 1-15,1-3-1 16,4-4-8-16,4-3 4 16,2-4-7-16,5-4-5 15,2 0 4-15,3-2 2 16,0-3-2-16,0 0-2 16,0-2 14-16,8 0 1 15,8 0 0-15,5 0 3 0,1 0 10 16,7 6-9-16,-1 1 0 15,-1 5 1-15,-4 3-3 16,-4 1-4-16,-6 4 0 16,-7-1 0-16,-3-3 2 15,-3 1 0-15,0 0 0 16,-5-3 20-16,-11 2 14 16,-4-1-16-16,0-1-6 15,-1-3-9-15,1-2 14 16,1-1-9-16,2-2 5 15,1-3-12-15,7 0 3 16,2-3 3-16,0 0-6 16,3 0-1-16,3-10-14 0,1-5-62 15,0-5-84 1,0 3-68-16</inkml:trace>
   <inkml:trace contextRef="#ctx0" brushRef="#br0" timeOffset="-25865.31">19723 12233 70 0,'0'0'50'0,"0"0"-22"16,0 0 9-16,-7 90 23 15,7-63-9-15,0-2-14 16,0 0-27-16,0-6 0 15,0-3-4-15,1-3-6 16,4-2 5-16,2-8-3 0,0-1-2 16,4-2 0-1,5 0-1-15,-2-5-14 0,-1-8 8 16,-4-1 7-16,-4-1 8 16,-1 0-4-16,-4-1 7 15,0-4 12-15,0 2-4 16,0-3-1-16,0-1-14 15,-1-1 3-15,-5 3 6 16,-2 1-8-16,-1 4 3 16,3 3 7-16,2 3-7 15,-2 5 1-15,3 1-9 16,-2 3 3-16,-3 0-6 16,0 0-59-16,-3 0-257 15</inkml:trace>
   <inkml:trace contextRef="#ctx0" brushRef="#br0" timeOffset="-25652.04">19918 12262 415 0,'0'0'104'0,"0"0"-104"16,0 0-5-16,0 0-13 16,0 0-20-16,0 0-99 0,0-30-160 15</inkml:trace>
   <inkml:trace contextRef="#ctx0" brushRef="#br0" timeOffset="-25392.85">19962 12138 269 0,'0'0'116'0,"0"0"-109"16,0 0 41-16,0 0 31 0,24 98 3 15,-17-70-39 1,1-2-22-16,-1 1-7 0,0-1-6 15,1-5-8-15,0 0 5 16,0-4-3-16,-2-3-4 16,-1-1-34-16,-4-2-52 15,-1-3-48-15,0-2-173 16</inkml:trace>
@@ -4366,13 +4813,13 @@
   <inkml:trace contextRef="#ctx0" brushRef="#br0" timeOffset="-22535.37">16848 13679 147 0,'0'0'88'0,"0"0"-68"16,0 0 19-16,0 0 23 15,0 0 1-15,0 0-16 16,79 3-20-16,-49-8-20 15,-4-3 7-15,0-2-14 16,0 1-3-16,-4 0-46 16,0-2-87-16,-2 1-116 15</inkml:trace>
   <inkml:trace contextRef="#ctx0" brushRef="#br0" timeOffset="-21790.25">18468 13108 241 0,'0'0'46'0,"0"0"-28"16,0 0-11-16,0 0 62 15,0 0-29-15,86 4-22 16,-60-4 4-16,0 0-1 15,-3-3-14-15,0-3-7 16,-5 1-3-16,-2 0-74 16,-8 1-162-16</inkml:trace>
   <inkml:trace contextRef="#ctx0" brushRef="#br0" timeOffset="-21603.22">18531 13237 308 0,'0'0'99'15,"0"0"-83"-15,0 0 20 16,0 0-8-16,0 0-12 16,97-15-16-16,-75 11-15 15,-4-3-154-15</inkml:trace>
-  <inkml:trace contextRef="#ctx0" brushRef="#br0" timeOffset="-20824.06">19869 12794 150 0,'0'0'107'16,"0"0"-91"-16,0 0 41 15,0 0 39-15,0 0-40 16,100-48-12-16,-74 43-32 16,0-4-2-16,0 5-2 15,-1-1-8-15,-5 1-1 16,-1 3-19-16,-7 1-69 15,-3 0-61-15</inkml:trace>
+  <inkml:trace contextRef="#ctx0" brushRef="#br0" timeOffset="-20824.07">19869 12794 150 0,'0'0'107'16,"0"0"-91"-16,0 0 41 15,0 0 39-15,0 0-40 16,100-48-12-16,-74 43-32 16,0-4-2-16,0 5-2 15,-1-1-8-15,-5 1-1 16,-1 3-19-16,-7 1-69 15,-3 0-61-15</inkml:trace>
   <inkml:trace contextRef="#ctx0" brushRef="#br0" timeOffset="-20615.05">19835 12898 238 0,'0'0'118'0,"0"0"-68"16,0 0 2-16,0 0 3 16,0 0-15-16,0 0-30 15,107-51-3-15,-76 43-14 16,4 1-8-16,-2 3-19 16,-5 1-46-16,-8 2-128 15</inkml:trace>
   <inkml:trace contextRef="#ctx0" brushRef="#br0" timeOffset="-19769.01">16994 13840 0 0,'0'0'164'0,"0"0"-109"15,0 0-14-15,0 0 33 16,0 0 16-16,93 5-14 16,-51 13-47-16,8 10 9 15,10 6 15-15,2 1-24 0,4 3-4 16,-3-4-14-16,-5-2 0 15,-8-5-7-15,-7-9-4 16,-12-4 6-16,-7-4-6 16,-8-4-29-16,-1-3-20 15,-4-2-61-15,-7-1-103 16</inkml:trace>
-  <inkml:trace contextRef="#ctx0" brushRef="#br0" timeOffset="-19377.28">17616 14025 276 0,'0'0'80'16,"0"0"-36"-16,0 0 24 15,0 0 12-15,0 0-70 16,0 0-5-16,21-18-5 16,-3 23 9-16,0 4-5 0,-3-1 2 15,-2 3-6-15,-4-1 0 16,-1-1-1-16,-3 2 1 15,-5-1-6-15,0 6 5 16,0-1 1-16,-13-1 9 16,1-3-6-16,1-2 1 15,2-1-4-15,-4-2-54 16,-1 1-65-16,2-4-226 16</inkml:trace>
-  <inkml:trace contextRef="#ctx0" brushRef="#br0" timeOffset="-18808.08">18689 13262 163 0,'0'0'87'0,"0"0"-58"15,0 0 11-15,0 0-13 16,0 0 8-16,0 0 13 16,-27 118 3-16,20-68-13 0,-2 4-1 15,1 3-12-15,-2 0-12 16,1-4-7-16,-1-3-5 16,1-7-1-16,-1-9 0 15,2-2-3-15,0-5-34 16,1-6-11-16,-1-3-18 15,0-6-36-15,3-6-23 16,0-6-77-16</inkml:trace>
+  <inkml:trace contextRef="#ctx0" brushRef="#br0" timeOffset="-19377.29">17616 14025 276 0,'0'0'80'16,"0"0"-36"-16,0 0 24 15,0 0 12-15,0 0-70 16,0 0-5-16,21-18-5 16,-3 23 9-16,0 4-5 0,-3-1 2 15,-2 3-6-15,-4-1 0 16,-1-1-1-16,-3 2 1 15,-5-1-6-15,0 6 5 16,0-1 1-16,-13-1 9 16,1-3-6-16,1-2 1 15,2-1-4-15,-4-2-54 16,-1 1-65-16,2-4-226 16</inkml:trace>
+  <inkml:trace contextRef="#ctx0" brushRef="#br0" timeOffset="-18808.09">18689 13262 163 0,'0'0'87'0,"0"0"-58"15,0 0 11-15,0 0-13 16,0 0 8-16,0 0 13 16,-27 118 3-16,20-68-13 0,-2 4-1 15,1 3-12-15,-2 0-12 16,1-4-7-16,-1-3-5 16,1-7-1-16,-1-9 0 15,2-2-3-15,0-5-34 16,1-6-11-16,-1-3-18 15,0-6-36-15,3-6-23 16,0-6-77-16</inkml:trace>
   <inkml:trace contextRef="#ctx0" brushRef="#br0" timeOffset="-18560.54">18506 13750 84 0,'0'0'57'0,"0"0"-44"15,0 0 11-15,0 0 47 0,0 0-15 16,0 0 17-16,-2 48-32 16,5-30-13-16,5-4 8 15,-1-3-19-15,3-5 1 16,1-2-8-16,5-4 25 16,1 0-4-16,5-6-11 15,-1-9-16-15,0-2-2 16,-2-1 3-16,-1-4-5 15,2 2-23-15,-3-3-72 16,2 0-104-16</inkml:trace>
-  <inkml:trace contextRef="#ctx0" brushRef="#br0" timeOffset="-17945.49">20044 12995 118 0,'0'0'120'0,"0"0"-109"15,0 0-9-15,0 0 35 16,0 0 65-16,-12 85-25 15,5-40-42-15,-3-1 2 16,-3 5 5-16,-2-6-15 16,-3 1-10-16,3 1-3 15,-4-2-12-15,1-1 1 16,0-4-3-16,3-7-5 16,2-5-33-16,5-6 16 15,-1-6-32-15,1-3-9 16,-2-7-49-16,1 0 6 0,-1-4 19 15,3 0-26-15</inkml:trace>
+  <inkml:trace contextRef="#ctx0" brushRef="#br0" timeOffset="-17945.5">20044 12995 118 0,'0'0'120'0,"0"0"-109"15,0 0-9-15,0 0 35 16,0 0 65-16,-12 85-25 15,5-40-42-15,-3-1 2 16,-3 5 5-16,-2-6-15 16,-3 1-10-16,3 1-3 15,-4-2-12-15,1-1 1 16,0-4-3-16,3-7-5 16,2-5-33-16,5-6 16 15,-1-6-32-15,1-3-9 16,-2-7-49-16,1 0 6 0,-1-4 19 15,3 0-26-15</inkml:trace>
   <inkml:trace contextRef="#ctx0" brushRef="#br0" timeOffset="-17771.32">19802 13583 10 0,'0'0'38'0,"0"0"26"15,0 0 13-15,0 0-11 16,0 0-1-16,0 0-2 16,0-6-31-16,0 6-10 15,0 0 3-15,0 0-2 16,2-1 6-16,8 0 17 15,5-3 0-15,3-3-20 16,1-2-19-16,-1 0 0 0,-1-2-7 16,-4 2-8-1,-7-3-112-15,-6 0-236 0</inkml:trace>
   <inkml:trace contextRef="#ctx0" brushRef="#br0" timeOffset="-17060.2">18359 14342 205 0,'0'0'123'15,"0"0"-29"-15,0 0-23 16,0 0 10-16,0 0-35 16,0 0-43-16,-25 41 13 15,12-3 7-15,-1 5-11 16,10-1 4-16,1 0-11 16,1-2 6-16,2-7-11 15,0-4 4-15,2-7-8 16,12-6 1-16,3-9-47 15,5-7-37-15,7 0-29 16,1-11-114-16</inkml:trace>
   <inkml:trace contextRef="#ctx0" brushRef="#br0" timeOffset="-16775.07">18503 14506 74 0,'0'0'254'15,"0"0"-181"-15,0 0-67 16,0 0 21-16,0 0 31 15,0 0-29-15,-15 72-15 16,15-54-8-16,0-1-2 16,7-5-1-16,2-4-3 15,0-5-8-15,7-3 8 16,1 0 9-16,1-17 0 16,-3-1-9-16,-4-4 3 15,-4 2-1-15,-6 0 22 0,-1-3-16 16,0 2 29-16,-6-2-21 15,-7 1-9-15,-1 3-7 16,3 6 0-16,1 8-27 16,4 5-50-16,2 0-108 15,1 17-164-15</inkml:trace>
@@ -4399,14 +4846,14 @@
   <inkml:trace contextRef="#ctx0" brushRef="#br0" timeOffset="8806.53">20257 16269 313 0,'0'0'64'0,"0"0"-50"15,0 0 30-15,0 0 10 16,0 0-15-16,0 0-22 16,25-60-16-16,-25 56 4 15,0 3-4-15,0 1-1 16,0 0-18-16,0 0-47 15,0 3-77-15,0 7-63 16</inkml:trace>
   <inkml:trace contextRef="#ctx0" brushRef="#br0" timeOffset="9241.99">20448 16010 300 0,'0'0'49'0,"0"0"-1"16,0 0 0-16,0 0-13 15,0 0 11-15,0 0-25 16,0-55 2-16,0 55-12 15,0 0-9-15,0 0-4 16,0 13-3-16,0 11 5 16,0 13 20-16,0 6 1 15,0-2-10-15,0 1 0 16,0 0-9-16,0-8 5 16,6 1-7-16,0-6 0 15,1-6 7-15,-1 1-7 16,-1-6 0-16,-1 1 0 15,0-5 5-15,-1-6-8 16,0-1 3-16,-2-4-15 16,3 0-18-16,-4-3-21 0,0 0 7 15,0 0-20-15,0 0-42 16,0-14-195-16</inkml:trace>
   <inkml:trace contextRef="#ctx0" brushRef="#br0" timeOffset="9585.02">20797 15620 138 0,'0'0'48'0,"-9"102"46"16,-3-43-10-16,-1 7-13 15,1 1-20-15,4 2-10 16,1 0-3-16,4-2-20 16,3-2 1-16,0-5-11 15,0-3-2-15,0-6-5 16,0-4 2-16,8-5-3 15,2-11 0-15,2-4-19 16,3-8-22-16,0-12-21 0,4-7-29 16,2 0-96-1</inkml:trace>
-  <inkml:trace contextRef="#ctx0" brushRef="#br0" timeOffset="10132.46">21090 16145 70 0,'0'0'74'16,"0"0"-34"-16,0 0-7 0,0 0 21 16,0 0 9-16,0 0-6 15,-12 52-32-15,12-52 38 16,-2 0 32-16,1-15-49 15,1-7-31-15,0-4-1 16,0-3-10-16,0-4-1 16,0-6-2-16,3-2-1 15,2-1-1-15,0 3-33 16,0 5 12-16,1 13 16 16,-3 9 2-16,0 9 3 15,1 3-11-15,3 9-3 16,-2 14 15-16,2 5 5 15,-3 0 10-15,-1-3-15 16,0-3 0-16,0-1 1 16,2-3 3-16,0-2-4 0,-2 0 1 15,0-4 1-15,0-3-4 16,-2-5 2-16,-1-4-18 16,2 0 15-16,-2 0 3 15,0 0 12-15,0 0-4 16,-3-14-8-16,-8 0 19 15,-5-3-11-15,-2 0-8 16,-3-3 7-16,-1 2-7 16,1 4-4-16,1 6 4 15,1 7-22-15,4 1-6 0,2 0-7 16,4 12-16 0,4 5-66-16,5 1-85 0</inkml:trace>
+  <inkml:trace contextRef="#ctx0" brushRef="#br0" timeOffset="10132.45">21090 16145 70 0,'0'0'74'16,"0"0"-34"-16,0 0-7 0,0 0 21 16,0 0 9-16,0 0-6 15,-12 52-32-15,12-52 38 16,-2 0 32-16,1-15-49 15,1-7-31-15,0-4-1 16,0-3-10-16,0-4-1 16,0-6-2-16,3-2-1 15,2-1-1-15,0 3-33 16,0 5 12-16,1 13 16 16,-3 9 2-16,0 9 3 15,1 3-11-15,3 9-3 16,-2 14 15-16,2 5 5 15,-3 0 10-15,-1-3-15 16,0-3 0-16,0-1 1 16,2-3 3-16,0-2-4 0,-2 0 1 15,0-4 1-15,0-3-4 16,-2-5 2-16,-1-4-18 16,2 0 15-16,-2 0 3 15,0 0 12-15,0 0-4 16,-3-14-8-16,-8 0 19 15,-5-3-11-15,-2 0-8 16,-3-3 7-16,-1 2-7 16,1 4-4-16,1 6 4 15,1 7-22-15,4 1-6 0,2 0-7 16,4 12-16 0,4 5-66-16,5 1-85 0</inkml:trace>
   <inkml:trace contextRef="#ctx0" brushRef="#br0" timeOffset="10755.73">21392 15943 163 0,'0'0'224'15,"0"0"-168"-15,0 0-13 16,0 0 6-16,0 0-25 0,0 0-24 16,-8-7 2-16,8 7-4 15,0 0 2-15,0 0-7 16,0 0 7-16,0 9 0 16,3 8 8-16,7 7 9 15,-1 6-12-15,0 8 2 16,-2 6-7-16,-2 3 0 15,-4 3 5-15,-1-4-5 16,0-3 0-16,0-7 2 16,-3-1-1-16,-7-2-1 0,-2-4 0 15,1-6 0 1,-2-11 0-16,3-12 4 0,2 0 6 16,-1-18 17-16,3-14-21 15,2-3 5-15,4-6-6 16,0 2-5-16,0 3 0 15,13 0-7-15,7 3 0 16,3 2-2-16,6-1-13 16,1 1 2-16,2 2 2 15,0 1-24-15,-1 3 35 16,-3 1-10-16,-5-2-40 16,-5 4 32-16,-6 5 25 15,-7 4 18-15,-5 9 0 16,0 4 3-16,0 0 24 15,0 0-36-15,0 4-9 0,-5 19-2 16,-4 4 2 0,3 2 6-16,1 3-6 0,5-6 0 15,0 1-3-15,0-6 0 16,0-5-66-16,9-6-86 16,0-10-154-16</inkml:trace>
   <inkml:trace contextRef="#ctx0" brushRef="#br0" timeOffset="11012.24">21953 15523 217 0,'0'0'77'16,"30"149"-9"-16,-21-73-10 15,-6-2 29-15,-3-5-15 16,0-4-42-16,-13-5-24 16,-6-7 3-16,-5-7-9 15,1-7 3-15,-4-5-6 16,0-4-19-16,2-7-26 16,3-7-86-16,2-7-230 15</inkml:trace>
   <inkml:trace contextRef="#ctx0" brushRef="#br0" timeOffset="11491.67">22859 15194 170 0,'0'0'0'0,"-143"-26"-61"0</inkml:trace>
   <inkml:trace contextRef="#ctx0" brushRef="#br0" timeOffset="12205.89">22446 15138 10 0,'-104'-5'77'0,"-9"5"-16"16,-9 0-35-16,-12 10 11 15,-12 12 6-15,-20 5-2 16,-19 5-13-16,-15 6 4 16,-10 2-9-16,-7 2-7 15,4 1-14-15,4 2 21 16,-1-2 0-16,5 2-16 16,1 5 13-16,1 0-16 0,-1 5 4 15,-2-1 0-15,-7 1-4 16,-4-1-4-16,-4 1 2 15,2-4-1-15,9-3 2 16,11-1-3-16,13-5 0 16,20-3-3-16,24-2 7 15,29-3-2-15,30 2 10 16,30 3-4-16,23 1-1 16,22 9-7-16,8 5-3 15,20 5 2-15,19 0 2 16,13-5 4-16,13-1-1 15,12-4-4-15,14-1 5 16,11-4-5-16,15-4-34 16,13-11 14-16,19-8 14 0,16-8-1 15,11-4-3-15,12-5 7 16,1 2 3-16,2 2 1 16,3 0 12-16,6-2-13 15,7-1 2-15,13 0 1 16,13-5-3-16,8 0 0 15,11-5-4-15,8-10 2 16,1-4-16-16,6-9 18 16,-5-3 7-16,-2-7 3 15,-11-4-10-15,-15-2 0 16,-14-7 20-16,-23-3-20 0,-24-10 8 16,-23-6 21-16,-24-4 0 15,-26 3 0-15,-21 7 6 16,-27 5-28-16,-22 3 1 15,-17 4-8-15,-13 4-17 16,-7 1-16-16,-29 1 22 16,-22 1-31-16,-23 1 26 15,-26 0-8-15,-23-1 9 16,-25 1 10-16,-21 2-2 16,-18 5-4-16,-13 2-6 15,-5-1-37-15,-3 3 34 16,-3-4-12-16,5 5 32 15,8 2 11-15,7 6-9 0,13 12-2 16,15 9-4 0,10 3-121-16</inkml:trace>
   <inkml:trace contextRef="#ctx0" brushRef="#br0" timeOffset="13163.71">23493 15795 153 0,'0'0'55'0,"0"0"-43"15,0 0 12-15,0 0 92 16,0 0-13-16,0 0-70 15,22-61-33-15,13 24 0 16,8-1-15-16,9-6 15 16,5 2 0-16,0 2 10 15,4 5-34-15,-3 11 24 16,-6 5-12-16,-8 11 4 16,-6 4 1-16,-9 4 1 15,-8 0-27-15,-4 0 24 16,-1 0-17-16,-2 4 10 15,-2-1-13-15,0-3 7 16,-3 0-11-16,-3 0 8 16,0 0-2-16,-4 0 27 0,-2-12 15 15,0-3-13-15,0-4-4 16,-6-4-4-16,-6 4-36 16,-2 4 25-16,5 5 17 15,6 7 52-15,2 3 56 16,1 0-61-16,0 0-47 15,0 0-28-15,0 10 9 16,4 4 19-16,8 5 0 16,3-4-3-16,-1 5-1 15,-1 1 4-15,-6 6 3 0,-7 1 9 16,0 0 6 0,0 2-17-16,-4-3 8 0,-5-3-9 15,0-1-21-15,5-4-68 16,2-4-100-16</inkml:trace>
   <inkml:trace contextRef="#ctx0" brushRef="#br0" timeOffset="16320">24936 15200 36 0,'0'0'50'15,"0"0"17"-15,0 0-2 16,0 0-3-16,0 0 14 15,0 0-23-15,-2-35-53 16,2 57-6-16,2 12 6 16,10 2 24-16,3 0-16 15,-2-4-8-15,2-7 4 0,5-9-7 16,-1-4 3 0,2-8-9-16,3-4 3 0,1 0 4 15,3-10 4-15,1-15 6 16,-3-6 3-16,-4 3 5 15,-8 2 20-15,-8 9 4 16,-4 10 20-16,-2 6-17 16,0 1-32-16,0 4-11 15,0 25-24-15,-14 20 15 16,-10 11 9-16,-1 6 8 16,-3 2-4-16,3-2 8 15,5-2-8-15,5-7-6 16,6-11 2-16,6-11-37 15,3-9 4-15,0-13-42 0,3-11-62 16,15-2-71-16</inkml:trace>
-  <inkml:trace contextRef="#ctx0" brushRef="#br0" timeOffset="16755.81">25014 15031 28 0,'0'0'71'0,"0"0"-39"16,0 0-24-16,0 0 25 16,0 0 52-16,0 0 3 15,0 0-20-15,-41-3-57 16,46-17-11-16,11-5 0 16,4 0 2-16,0 0 11 0,-2 7-13 15,2 7 0 1,-7 5 10-16,-3 6 0 0,1 0-10 15,2 0 0-15,1 15-7 16,1 3 5 0,-2-1 2-16,-1 4 0 0,0-2 0 15,-3 5-4-15,-1 2-26 16,-7 2-37-16,-1 2-12 16,0-2-48-16</inkml:trace>
+  <inkml:trace contextRef="#ctx0" brushRef="#br0" timeOffset="16755.8">25014 15031 28 0,'0'0'71'0,"0"0"-39"16,0 0-24-16,0 0 25 16,0 0 52-16,0 0 3 15,0 0-20-15,-41-3-57 16,46-17-11-16,11-5 0 16,4 0 2-16,0 0 11 0,-2 7-13 15,2 7 0 1,-7 5 10-16,-3 6 0 0,1 0-10 15,2 0 0-15,1 15-7 16,1 3 5 0,-2-1 2-16,-1 4 0 0,0-2 0 15,-3 5-4-15,-1 2-26 16,-7 2-37-16,-1 2-12 16,0-2-48-16</inkml:trace>
   <inkml:trace contextRef="#ctx0" brushRef="#br0" timeOffset="17926.94">25516 15293 186 0,'0'0'55'0,"0"0"-13"16,0 0 24-16,0 0 18 16,0 0-63-16,0 0-2 15,18 0-12-15,1 0-7 16,-2 0-6-16,1 0-59 15,-5 0-138-15</inkml:trace>
   <inkml:trace contextRef="#ctx0" brushRef="#br0" timeOffset="18075.75">25516 15293 67 0,'6'120'75'0,"-6"-104"-33"0,0-2-32 16,0-3 15-16,8-4 19 15,9-4-6-15,5-3-9 16,4 0-29-16,7 0-113 16</inkml:trace>
   <inkml:trace contextRef="#ctx0" brushRef="#br0" timeOffset="18631.93">25937 15265 353 0,'0'0'0'0,"0"0"6"16,0 0 17-16,0 84 11 15,0-68-11-15,0-6-16 16,0-4-6-16,0-5 0 16,8-1 6-16,5-3 16 15,0-14-3-15,2-6-18 0,-3 3 13 16,-3 1-15 0,-2 7 10-16,-4 6 1 0,-3 5 0 15,0 1-3-15,0 0-8 16,0 0-20-16,2 11 12 15,1 9 8-15,2-2 1 16,4-1 6-16,5-9-7 16,3-5-3-16,2-3 3 15,5 0 4-15,-2-7 1 16,-1-10-5-16,-1-2-10 16,-5 0 10-16,-2-1-2 15,-4-1 12-15,-4 2-2 0,-2-1 3 16,-2 6-3-1,-1 4-7-15,0 2-1 0,0 6 0 16,0 2-20 0,0 0-33-16,0 0 1 0,3 0 14 15,3 0-2-15,3 0-30 16,1-5 19-16,7-4-49 16,1-7-32-16</inkml:trace>
@@ -4422,10 +4869,10 @@
   <inkml:trace contextRef="#ctx0" brushRef="#br0" timeOffset="58034.91">12935 9762 17 0,'0'0'137'0,"0"0"-115"16,0 0 10-16,0 0 41 16,0 0-2-16,0 0-40 15,31 4 5-15,-19-4-20 16,0 0-8-16,-2 0 2 16,1-1-9-16,2-4-2 15,-2-5-13-15,-4 6-88 16,0 0-60-16</inkml:trace>
   <inkml:trace contextRef="#ctx0" brushRef="#br0" timeOffset="58191.56">13005 9815 42 0,'0'0'69'0,"0"0"1"16,0 0-10-16,0 0-32 15,0 0-1-15,25 86 1 16,-17-77-14-16,-1-1-10 15,0 2 1-15,1-3-5 16,-2 2-110-16</inkml:trace>
   <inkml:trace contextRef="#ctx0" brushRef="#br0" timeOffset="59789.25">14294 10023 6 0,'0'0'16'16,"0"0"-3"-16,0 0 1 15,0 0 1-15,0 0-3 0,0 0 0 16,-9 6 5 0,9-6 6-16,0 0-8 0,0 0-1 15,-3 0 8-15,0 0-7 16,-6 0 3-16,0 0 1 15,0 0 6-15,-1 0-6 16,-1 0 31-16,-1 0-30 16,0 1 5-16,3 2-12 15,0 0-1-15,3-1-3 16,1 3-4-16,0-2-4 16,4 2-1-16,-2 2 0 15,3 4 6-15,0 3-3 16,0 9-1-16,0 14 12 15,0 12 4-15,9 16 15 16,7 7-5-16,1 2-6 0,3-3-10 16,2-2-12-1,5-1 4-15,2 1 3 0,2-1-6 16,2-2-2-16,-2-1 2 16,-4-4-1-16,-4-3 1 15,-3-5-1-15,1-5 0 16,-4-10 0-16,0-2-1 15,-1-6 1-15,-3-7 0 16,-4-3 2-16,-2-2 1 16,0-7 0-16,0-3-3 15,-3-5 2-15,-1-2-2 16,0-1-3-16,-1 2-37 0,1-2-7 16,-2 0-4-16,-1 0-65 15,0 0 115-15,0 0-37 16,0-3-86-16</inkml:trace>
-  <inkml:trace contextRef="#ctx0" brushRef="#br0" timeOffset="60539.19">14659 9878 70 0,'0'0'91'16,"0"0"-61"-16,0 0-27 15,0 0 15-15,0 0 34 16,0 0-29-16,-22 4-18 16,22 3-2-16,0 1 30 15,15 2-17-15,12-2 24 16,8-2-16-16,6-3-23 15,-1-3 7-15,-1 0-5 0,-5 0-2 16,-4 0-1-16,-6 0 0 16,-8 0-4-1,-1 0 4-15,-6 0 0 0,-1 1 0 16,-2 8 4-16,0 5-2 16,5 10 22-16,2 12 8 15,3 21-4-15,0 13 3 16,4 11-14-16,-4 7 11 15,2-2-21-15,0 7 3 16,-3-4-4-16,1-4-5 16,-4-5 5-16,-1-11-6 15,-3-8 2-15,-2-8-1 16,1-9 0-16,-3-12 0 0,1-10-1 16,0-11 3-16,-3-7-7 15,2-4-19-15,2 0-56 16,-3-22-59-16</inkml:trace>
+  <inkml:trace contextRef="#ctx0" brushRef="#br0" timeOffset="60539.18">14659 9878 70 0,'0'0'91'16,"0"0"-61"-16,0 0-27 15,0 0 15-15,0 0 34 16,0 0-29-16,-22 4-18 16,22 3-2-16,0 1 30 15,15 2-17-15,12-2 24 16,8-2-16-16,6-3-23 15,-1-3 7-15,-1 0-5 0,-5 0-2 16,-4 0-1-16,-6 0 0 16,-8 0-4-1,-1 0 4-15,-6 0 0 0,-1 1 0 16,-2 8 4-16,0 5-2 16,5 10 22-16,2 12 8 15,3 21-4-15,0 13 3 16,4 11-14-16,-4 7 11 15,2-2-21-15,0 7 3 16,-3-4-4-16,1-4-5 16,-4-5 5-16,-1-11-6 15,-3-8 2-15,-2-8-1 16,1-9 0-16,-3-12 0 0,1-10-1 16,0-11 3-16,-3-7-7 15,2-4-19-15,2 0-56 16,-3-22-59-16</inkml:trace>
   <inkml:trace contextRef="#ctx0" brushRef="#br0" timeOffset="63083.87">14178 9590 11 0,'0'0'99'0,"0"0"-67"15,0 0-13-15,0 0 28 16,0 0-1-16,0 0-4 16,0 28 2-16,0-24-20 15,0 2 8-15,0 1-19 16,0-3-9-16,0 3 3 15,0 0-7-15,5 3 0 16,1-2-28-16,5 1-51 16,5-5-85-16</inkml:trace>
   <inkml:trace contextRef="#ctx0" brushRef="#br0" timeOffset="63545.66">14219 9578 35 0,'0'0'128'0,"0"0"-47"16,0 0-11-16,0 0 14 15,0 0-43-15,0 0-37 16,-1-3-8-16,1 11 4 16,0 4 0-16,0 1 15 15,0-2-15-15,4 2 7 16,2-2-2-16,0 1-4 0,3-4 2 16,1-1-3-16,1-3-34 15,4-4-20-15,-2 0-24 16,4 0-27-16,-4 0-60 15</inkml:trace>
-  <inkml:trace contextRef="#ctx0" brushRef="#br0" timeOffset="63876.19">14349 9516 54 0,'0'0'82'0,"0"0"-39"0,0 0 15 16,0 0-22-16,0 0-9 15,-19 91-13-15,19-79-11 16,0-5 4-16,0 0-6 16,1-3 0-16,6-4-1 15,1 0 1-15,1 0 2 16,0-5-3-16,0-6 2 15,-2-3 2-15,-2 0-3 16,-4-1-1-16,-1 0 18 16,0-1-9-16,0 4-3 15,0 1-6-15,0 6-15 16,-1 5-13-16,-1 0-43 16,1 0-98-16</inkml:trace>
+  <inkml:trace contextRef="#ctx0" brushRef="#br0" timeOffset="63876.18">14349 9516 54 0,'0'0'82'0,"0"0"-39"0,0 0 15 16,0 0-22-16,0 0-9 15,-19 91-13-15,19-79-11 16,0-5 4-16,0 0-6 16,1-3 0-16,6-4-1 15,1 0 1-15,1 0 2 16,0-5-3-16,0-6 2 15,-2-3 2-15,-2 0-3 16,-4-1-1-16,-1 0 18 16,0-1-9-16,0 4-3 15,0 1-6-15,0 6-15 16,-1 5-13-16,-1 0-43 16,1 0-98-16</inkml:trace>
   <inkml:trace contextRef="#ctx0" brushRef="#br0" timeOffset="63984.57">14349 9516 34 0</inkml:trace>
   <inkml:trace contextRef="#ctx0" brushRef="#br0" timeOffset="64356.77">14349 9516 34 0,'105'69'42'0,"-102"-83"16"0,1 0-6 0,-1 1-24 0,-2 4 13 16,-1-1-14-16,0 7 25 15,0 0 6-15,0 3-20 0,0 0-34 16,0 0-4-16,0 6-4 16,0 7 1-16,5-1 0 15,-1 1-5-15,2-6-12 16,5-2-7-16,-2-2 9 16,1-3-7-16,-1 0-3 15,3-10 16-15,-1-8-8 16,0-4-3-16,0-5-1 15,-2-3 15-15,1-3 7 16,-1-3 2-16,-3 5 0 16,-3 4 3-16,-1 13 24 15,-2 8 18-15,0 6 30 16,0 0-23-16,0 6-43 0,0 15-7 16,-2 6 10-16,-1-2 14 15,3 2-19-15,0-2 0 16,0-4-4-16,0-3 3 15,0-4-5-15,0-6 1 16,3 0-4-16,3-7-22 16,6-1-22-16,-1 0-12 15,2-9-28-15,2-9-46 16</inkml:trace>
   <inkml:trace contextRef="#ctx0" brushRef="#br0" timeOffset="64543.35">14727 9297 0 0,'0'0'113'16,"0"0"-75"-16,0 0 50 0,0 0-23 16,-19 106-10-16,14-70-25 15,2-3-15-15,0 1 11 16,0-4-22-16,1-2-2 16,1-7 1-16,1-1-3 15,-2-7-7-15,2-6-68 16,-3-7-66-16,2 0-47 15</inkml:trace>
@@ -4435,15 +4882,15 @@
   <inkml:trace contextRef="#ctx0" brushRef="#br0" timeOffset="69933.32">14501 10343 6 0,'0'0'25'15,"0"0"-8"-15,0 0-2 16,0 0 4-16,0 0-3 0,0 0-7 15,2 0 8-15,1 0 23 16,0-8-34-16,-2-6 0 16,-1-3-2-16,0-5-2 15,0-2-2-15,0-1 3 16,0 0-1-16,-6 0-2 16,-4 3 6-16,-1 4 5 15,2 5 34-15,5 6 13 16,1 6-5-16,1 1 2 15,2 0-55-15,-1 18 2 16,1 11-2-16,0 5 7 16,0 6 8-16,1 1-15 15,7-4 13-15,-1 0-13 0,-2-1 1 16,2-5 4 0,-2-3-5-16,-1-2 3 0,1-8-6 15,-4-5 3-15,2-8-12 16,-3-3-20-16,0-2-27 15,0 0 22-15,0-4-52 16</inkml:trace>
   <inkml:trace contextRef="#ctx0" brushRef="#br0" timeOffset="70093.28">14429 10400 17 0,'0'0'50'0,"0"0"28"15,0 0-3-15,0 0-35 16,0 0 17-16,0 0-8 15,38-2-15-15,-23 2-24 0,1 0-4 16,-2-4 0-16,3-3-6 16,-1 0-84-16,0-3-162 15</inkml:trace>
   <inkml:trace contextRef="#ctx0" brushRef="#br0" timeOffset="70273.81">14598 10456 55 0,'0'0'74'16,"0"0"-41"-16,0 0 37 15,0 0-17-15,0 0-21 16,0 82-26-16,0-77-4 0,0-2-2 16,0-3-23-16,0 0-40 15,0 0-1-15</inkml:trace>
-  <inkml:trace contextRef="#ctx0" brushRef="#br0" timeOffset="73573.99">14561 10078 6 0,'0'0'31'0,"0"0"19"16,0 0-9-16,0 0 6 16,0 0-15-16,0 0-4 15,-2-5 7-15,2 5-9 16,0 0-18-16,0 0-7 15,0 12 7-15,0 5 21 16,0 1 11-16,-1 4-21 16,1-4-18-16,0-2 12 15,-2 1-13-15,1 1 1 16,-1-4 4-16,0-6-4 0,2-1 4 16,0-5-5-16,-2-2 0 15,2 0-1-15,0 0 5 16,0 0 2-16,0-11-6 15,0-8-19-15,0-3-2 16,0 5 13-16,4-5-14 16,-2 4 2-16,-1 4-2 15,1 3 18-15,-2 8 4 16,0 3 0-16,0 0-2 16,0 0 2-16,0 3-12 15,0 17 12-15,0-1 14 16,0 3-4-16,0-1-3 0,0-5-6 15,0-3 4 1,0-4-5-16,0-6 0 0,0 1 2 16,0-4-1-16,0 0 5 15,0 0 16-15,0-2 8 16,1-12-27-16,1-3-1 16,-1-2-2-16,-1 1 0 15,0 2-12-15,0 0 4 16,0 2-7-16,0 1-19 15,0 3 12-15,0 3-21 16,0 7-16-16,2 0-103 16</inkml:trace>
+  <inkml:trace contextRef="#ctx0" brushRef="#br0" timeOffset="73573.98">14561 10078 6 0,'0'0'31'0,"0"0"19"16,0 0-9-16,0 0 6 16,0 0-15-16,0 0-4 15,-2-5 7-15,2 5-9 16,0 0-18-16,0 0-7 15,0 12 7-15,0 5 21 16,0 1 11-16,-1 4-21 16,1-4-18-16,0-2 12 15,-2 1-13-15,1 1 1 16,-1-4 4-16,0-6-4 0,2-1 4 16,0-5-5-16,-2-2 0 15,2 0-1-15,0 0 5 16,0 0 2-16,0-11-6 15,0-8-19-15,0-3-2 16,0 5 13-16,4-5-14 16,-2 4 2-16,-1 4-2 15,1 3 18-15,-2 8 4 16,0 3 0-16,0 0-2 16,0 0 2-16,0 3-12 15,0 17 12-15,0-1 14 16,0 3-4-16,0-1-3 0,0-5-6 15,0-3 4 1,0-4-5-16,0-6 0 0,0 1 2 16,0-4-1-16,0 0 5 15,0 0 16-15,0-2 8 16,1-12-27-16,1-3-1 16,-1-2-2-16,-1 1 0 15,0 2-12-15,0 0 4 16,0 2-7-16,0 1-19 15,0 3 12-15,0 3-21 16,0 7-16-16,2 0-103 16</inkml:trace>
   <inkml:trace contextRef="#ctx0" brushRef="#br0" timeOffset="74323.32">14774 10871 162 0,'0'0'76'0,"0"0"-70"16,0 0 0-16,0 0 12 16,0 0 25-16,-1-89-29 15,-11 72-12-15,1 2 24 16,1 2 22-16,0 2 13 0,2 8-18 15,2 1-4-15,3 1-1 16,0 1-27-16,3 0-11 16,-3 13-13-16,3 8 10 15,0 7 3-15,0 4 0 16,0 4 6-16,7 3-6 16,3 2 5-16,0 2-3 15,0-5 1-15,-1-5-3 16,-1-4-6-16,2-9-36 15,-4-5-24-15,-1-5-23 16,-2-9-68-16,0-1-76 16</inkml:trace>
   <inkml:trace contextRef="#ctx0" brushRef="#br0" timeOffset="74685.47">14761 11011 261 0,'0'0'109'0,"0"0"-39"15,0 0-9-15,0 0 0 16,0 0-31-16,0 0-28 15,12-33 1-15,1 28-3 16,2-1-1-16,0 0-7 16,1-1-24-16,-1 2-31 15,2-2-16-15,-2 2-20 16,1 4 32-16,-4 0 23 16,-3 1 16-16,1 0 3 15,-5 0 5-15,-1 7 19 0,1 6 1 16,-4 5 38-1,-1-2 10-15,0 2 2 0,0 0 2 16,0 0-4-16,0-1-25 16,0-2-6-16,-1-2 12 15,1-4 5-15,0-2-21 16,0-4-1-16,0-2-10 16,0-1 4-16,0 0 0 15,9 0 0-15,3 0-6 16,-2-9-20-16,5-10-25 15,-6-7-71-15,-3-2-73 16</inkml:trace>
-  <inkml:trace contextRef="#ctx0" brushRef="#br0" timeOffset="75176.54">14951 10617 154 0,'0'0'242'16,"0"0"-215"-16,0 0-27 15,0 0 0-15,0 0 0 16,0 0 1-16,0 0 3 16,0 0-2-16,0 0 8 15,0 0 11-15,0 0-9 16,0 0-5-16,0 0 6 0,0 0-5 15,0 0 2-15,0 0-2 16,0 0-7-16,0 0-1 16,0 11-9-16,0 2 9 15,0 3 4-15,0 1-4 16,0-4 0-16,0 1-1 16,2-2-4-16,1-2-11 15,-1-5 4-15,-2 1 5 16,0-2 6-16,0-1-4 15,0-1 2-15,0-2-1 16,0 0 4-16,0 0 24 16,0 0 15-16,0-2-10 15,0-11-26-15,0-2 2 0,-3-4-3 16,1-1-2-16,0-5-5 16,2-1-8-16,0-3-12 15,0 4-13-15,0 8 16 16,0 14-14-16,0 3-82 15,2 22-99-15</inkml:trace>
+  <inkml:trace contextRef="#ctx0" brushRef="#br0" timeOffset="75176.53">14951 10617 154 0,'0'0'242'16,"0"0"-215"-16,0 0-27 15,0 0 0-15,0 0 0 16,0 0 1-16,0 0 3 16,0 0-2-16,0 0 8 15,0 0 11-15,0 0-9 16,0 0-5-16,0 0 6 0,0 0-5 15,0 0 2-15,0 0-2 16,0 0-7-16,0 0-1 16,0 11-9-16,0 2 9 15,0 3 4-15,0 1-4 16,0-4 0-16,0 1-1 16,2-2-4-16,1-2-11 15,-1-5 4-15,-2 1 5 16,0-2 6-16,0-1-4 15,0-1 2-15,0-2-1 16,0 0 4-16,0 0 24 16,0 0 15-16,0-2-10 15,0-11-26-15,0-2 2 0,-3-4-3 16,1-1-2-16,0-5-5 16,2-1-8-16,0-3-12 15,0 4-13-15,0 8 16 16,0 14-14-16,0 3-82 15,2 22-99-15</inkml:trace>
   <inkml:trace contextRef="#ctx0" brushRef="#br0" timeOffset="79291.56">15441 10014 439 0,'0'0'72'0,"0"0"-68"15,0 0-3-15,0 0 10 0,0 0 37 16,0 0-29-16,0 0-11 16,103 3 7-16,-67-3-15 15,1-4-22-15,-1-6-64 16,-8-1-198-16</inkml:trace>
-  <inkml:trace contextRef="#ctx0" brushRef="#br0" timeOffset="79453.43">15564 10164 187 0,'0'0'77'0,"0"0"-75"15,0 0 0-15,99-32-1 16,-70 15-1-16,-1-5-65 16</inkml:trace>
+  <inkml:trace contextRef="#ctx0" brushRef="#br0" timeOffset="79453.42">15564 10164 187 0,'0'0'77'0,"0"0"-75"15,0 0 0-15,99-32-1 16,-70 15-1-16,-1-5-65 16</inkml:trace>
   <inkml:trace contextRef="#ctx0" brushRef="#br0" timeOffset="80414.75">15980 9663 104 0,'0'0'47'0,"0"0"-32"16,0 0 33-16,0 0 0 16,0 0-8-16,0 0-6 15,12 4-23-15,2-4 13 16,0 0-3-16,-1 0-11 0,-2 0-3 16,-1 0-1-16,-1-1-6 15,-4-4-27-15,-4 0-49 16,-1 0-167-16</inkml:trace>
   <inkml:trace contextRef="#ctx0" brushRef="#br0" timeOffset="80623.25">15893 9869 43 0,'0'0'71'0,"0"0"15"15,0 0 7-15,0 0 8 0,27 83-50 16,-19-70-23-16,-4-2-6 16,1-2-12-16,0-5-7 15,0 0 3-15,4-3-6 16,6-1-62-16,3 0-97 16</inkml:trace>
-  <inkml:trace contextRef="#ctx0" brushRef="#br0" timeOffset="81599.54">16284 9633 82 0,'0'0'60'0,"0"0"-38"15,0 0 19-15,0 0 10 16,0 0-18-16,0 0-8 15,-5 0-7-15,5 0-13 16,0 0-2-16,0 0 0 16,0 0-1-16,2 0 0 15,9 0 0-15,-1 0 4 0,2 0-6 16,-5 0 2-16,-1 0 3 16,-1 0-2-16,2 0 0 15,-1 4-2-15,0 10 5 16,-3 5 22-16,-1 4-12 15,-2-5-6-15,0 2-6 16,0-5-4-16,0-1-4 16,-3-1-36-16,-6-4-36 15,-5-2-98-15</inkml:trace>
+  <inkml:trace contextRef="#ctx0" brushRef="#br0" timeOffset="81599.53">16284 9633 82 0,'0'0'60'0,"0"0"-38"15,0 0 19-15,0 0 10 16,0 0-18-16,0 0-8 15,-5 0-7-15,5 0-13 16,0 0-2-16,0 0 0 16,0 0-1-16,2 0 0 15,9 0 0-15,-1 0 4 0,2 0-6 16,-5 0 2-16,-1 0 3 16,-1 0-2-16,2 0 0 15,-1 4-2-15,0 10 5 16,-3 5 22-16,-1 4-12 15,-2-5-6-15,0 2-6 16,0-5-4-16,0-1-4 16,-3-1-36-16,-6-4-36 15,-5-2-98-15</inkml:trace>
   <inkml:trace contextRef="#ctx0" brushRef="#br0" timeOffset="81978.55">15873 9194 182 0,'0'0'95'15,"0"0"-95"-15,0 0 4 16,0 0-4-16,0 0 8 16,0 0-4-16,83 46-3 0,-61-43-1 15,-4-2-12 1,-1-1 3-16,-8 0-8 0,-3 0 17 16,-1 0 4-16,-2 0-3 15,0-1 12-15,-1-2 2 16,-2 1 13-16,0 2-13 15,1 0-15-15,2 7-8 16,0 15 8-16,3 4 4 16,-1 3 1-16,1 2-5 15,-3-1-59-15,-3-1-103 16</inkml:trace>
 </inkml:ink>
 </file>
@@ -4647,17 +5094,17 @@
   <inkml:trace contextRef="#ctx0" brushRef="#br0" timeOffset="29070.7">3397 13930 10 0,'0'0'34'0,"0"0"7"16,0 0 23-16,-97-7 15 16,61 7-22-16,-3 0-25 15,-16 0-32-15,-8 7-4 16,-7 10-1-16,-7 4 3 15,-5 6-3-15,-5 8 5 16,-7 4 17-16,-4 0 11 16,1-4-14-16,-3-5 10 15,1-3 31-15,5-2 13 16,9 5 7-16,8 1-64 0,8 4-11 16,2 5-3-16,1 5 2 15,5 2-16-15,9 6 4 16,13-2 13-16,8-3 3 15,4-3-3-15,3-4-20 16,6-5 3-16,2-3 0 16,2-4 4-16,1-2 4 15,-1 0-9-15,-2-1 5 16,1 0 12-16,-4 0-7 16,-1 1-1-16,1 2 7 0,5-1 2 15,7 1-12 1,7-4 12-16,0 3 0 0,16 3 0 15,8 8 4-15,6-2 1 16,3 1-5-16,4-1-8 16,2 0 8-16,0 0-22 15,4-1 1-15,0-2 19 16,2-2-14-16,-5-3-27 16,-1-6 28-16,-1-4-4 15,-3-4 10-15,7-4-6 16,0-3 14-16,7-4 0 15,-1 1-14-15,10-5 15 16,8 0 4-16,2 0-3 16,7 0 3-16,-1-3-3 15,1-6 5-15,4-6 4 0,-3-8 13 16,3-8-2-16,-3-7-6 16,3-5 7-16,-4-5 10 15,5-1-22-15,-6 6 3 16,-4 6 14-16,-9 9-13 15,-4 2-14-15,-5 5 2 16,-3 1 13-16,2-4-7 16,-1 2-8-16,0-5 3 15,-1-1 2-15,3-7-5 16,-1 4-1-16,0-6 0 16,-5-1-6-16,-3-2 1 15,-7-1-24-15,-5-1 22 0,-10-2-11 16,-9-1-25-16,-9-3-17 15,-3 1 14-15,0 3-3 16,-9 1 41-16,-4 4 9 16,5 0 14-16,-1 7 7 15,0 3-9-15,-4 0 25 16,-2 1 4-16,-6 3 7 16,-3-2 15-16,-4-1-36 15,-3-2-12-15,-2-1 0 16,-3-2 13-16,3-3-16 15,-1 1 3-15,-1-4-9 16,-2 2-12-16,-6 2-2 16,1 0-6-16,-7 4 4 0,4 5-23 15,2 6 14 1,6 11-3-16,-1 9-27 0,-2 16-25 16,-17 31 36-16,-14 17-88 15</inkml:trace>
   <inkml:trace contextRef="#ctx0" brushRef="#br0" timeOffset="34621.06">4308 13684 6 0,'0'0'14'0,"0"0"-6"15,0 0-7-15,0 0 23 16,0 0-17-16,0 0 11 16,0 0-5-16,-16-29 12 0,10 27-9 15,3 0 18 1,0 1-18-16,3-1 18 0,0 1-7 15,0 1 1-15,0 0-25 16,0 0-3-16,6 14 0 16,15 7 3-16,1 0-1 15,-2 3 4-15,2-3-2 16,-5 2-4-16,0-4 11 16,-2 0-10-16,-6-3 6 15,0-2-3-15,-3-6-2 16,1 0-1-16,-2-2-1 15,-2-2-14-15,0-3-75 0,0-1-86 16</inkml:trace>
   <inkml:trace contextRef="#ctx0" brushRef="#br0" timeOffset="36074.47">4498 13611 16 0,'0'0'32'0,"0"0"-13"0,0 0-16 16,0 0 20-16,0 0-15 15,0 0-5-15,0-11 3 16,0 9 2-16,0 1-8 16,0-3 2-16,0 2 20 15,-2 0-13-15,1-2 16 16,-2 2-15-16,0-4 9 15,0 5-13-15,1-2 5 0,1 2-2 16,-2 0 9 0,0-4 2-16,2 5-18 0,-4 0-2 15,5 0 0-15,0 0-1 16,0 0 5-16,0 0 8 16,-3 0 1-16,3 0-13 15,0 0 0-15,-3 0 0 16,0 0 0-16,-3 5 1 15,4-1-1-15,1 1-1 16,1 2-9-16,-2-1 10 16,2 1 4-16,0 0-3 15,0 1 3-15,0 0-4 16,0-1 0-16,2 3 0 16,4-3 4-16,6-3-4 15,0 0 7-15,-2-2-5 0,1-2-4 16,-1 0 2-16,-1 0-2 15,-3 0-5-15,0 0 6 16,-1-7 0-16,0 0-2 16,0-2 0-16,-2 2 3 15,-3 0 0-15,0 2 4 16,0 4 1-16,0 0 7 16,0-1 0-16,0 2 7 15,0 0-19-15,3 0-8 16,0 0 2-16,6 0-3 15,1 0 8-15,4 9 1 16,2 5 0-16,4 3-1 16,2 4-1-16,-1-2 2 15,-3 4 2-15,0-4-1 0,-6 0-2 16,-2-5-1-16,-4-2-2 16,-5-4 0-16,-1-2 4 15,0 0 6-15,0-4 2 16,-3 3 5-16,-7-1 10 15,-3-3 10-15,-5-1 2 16,1 0 17-16,-2 0-40 16,2 0 0-16,1-8-2 15,4-2-5-15,-1-2-8 16,7-4 3-16,0-2 0 16,3-4 1-16,3-2-1 0,0-4-7 15,0 4-13 1,0 1-8-16,0 1 8 0,3 4 5 15,-3 4 8-15,0 2 7 16,0 4 3-16,0 1-1 16,-8-1 9-16,0 2-9 15,0 2 8-15,2 0 6 16,1 1-16-16,4 3-4 16,1 0-5-16,0 0-56 15,0 0-176-15</inkml:trace>
-  <inkml:trace contextRef="#ctx0" brushRef="#br0" timeOffset="36564.79">4950 13601 70 0,'0'0'141'0,"0"0"-96"16,0 0-16-16,0 0 25 15,0 0-15-15,0 0-14 16,13-4-15-16,-1-4-7 0,2-1 11 16,-1 1-4-16,5-3-5 15,4-4 4-15,1 1-9 16,5 1-2-16,-4 1-63 16,-8 3-155-16</inkml:trace>
+  <inkml:trace contextRef="#ctx0" brushRef="#br0" timeOffset="36564.78">4950 13601 70 0,'0'0'141'0,"0"0"-96"16,0 0-16-16,0 0 25 15,0 0-15-15,0 0-14 16,13-4-15-16,-1-4-7 0,2-1 11 16,-1 1-4-16,5-3-5 15,4-4 4-15,1 1-9 16,5 1-2-16,-4 1-63 16,-8 3-155-16</inkml:trace>
   <inkml:trace contextRef="#ctx0" brushRef="#br0" timeOffset="39540.97">5478 13072 1 0,'0'0'19'15,"0"0"4"-15,0 0 10 16,0 0-21-16,0 0 0 16,0 0 20-16,0-1-11 15,0-2 1-15,0-1-22 16,0-5 1-16,12 2-3 16,1-2-6-16,-2-1 8 15,-2 3-4-15,1-3 4 16,-1 4 2-16,-1 0-2 15,-2-1 0-15,4 4 0 0,-4 0 0 16,3 3-1-16,-1 0-8 16,-1 3-3-16,-4 7 11 15,-2 2-12-15,-1-1 13 16,0 1 6-16,0 1-6 16,0 1 27-16,-7-1-2 15,-3-2-10-15,-1 1-4 16,5-2-11-16,-3 0 21 15,3-3 8-15,2 0-23 16,2-4 1-16,2 1-7 16,0-3-5-16,0-1 4 15,0 0-6-15,0 0 7 16,0 0 7-16,0 0 0 16,0 0 2-16,9 0-8 15,6 0-1-15,2 0-1 0,0 0-1 16,1 0-1-16,-4 7-1 15,-2 1-8-15,-2 5 2 16,-7-4 5-16,0-1 0 16,0 1 2-16,-3-1 3 15,0-1 0-15,0 2 10 16,0 0-4-16,-3-1 35 16,-5 3-28-16,0-3 6 15,-1-1 1-15,1-3-2 16,2-1-14-16,-1-1 6 15,4-2-4-15,0 0-11 16,-2 0 9-16,1 0-8 0,1 0-14 16,-2-2-10-16,2-5-46 15,-2-1 5-15,0 1-46 16</inkml:trace>
   <inkml:trace contextRef="#ctx0" brushRef="#br0" timeOffset="40102.32">5715 12965 86 0,'0'0'74'0,"0"0"-55"15,0 0 10-15,0 0-1 16,0 0-10-16,0 0-5 16,27-39-13-16,-17 34-4 15,-2 1-15-15,-5 3-20 0,2-1 1 16,-4 0-34-1,-1 2-23-15</inkml:trace>
   <inkml:trace contextRef="#ctx0" brushRef="#br0" timeOffset="40544.43">5715 12965 23 0,'-7'54'19'15,"7"-43"19"-15,0 0-9 16,0-1-2-16,0 0-14 0,0-3-8 16,0-3 1-16,0 2-3 15,3-2-2-15,-3-3 7 16,4 1-8-16,-4-2 3 16,3 0 22-16,5 0-11 15,1 0 0-15,4-5-6 16,-1-3-6-16,0 2-3 15,3 1 2-15,-3 1-1 16,1 2 0-16,-2 2-3 16,-2 0 3-16,-2 0 0 15,-3 0-5-15,-2 9 5 16,-2-1 3-16,0 3 18 16,0 1 23-16,0-1-19 0,-3 1 4 15,-4-4 1 1,1 1-9-16,-2 2 3 0,1-4-15 15,-1 1-6-15,-1-1-1 16,3-1 3-16,2-2-5 16,-1 0 0-16,2-1-33 15,0 1-65-15,2-2-45 16,1-2-22-16</inkml:trace>
   <inkml:trace contextRef="#ctx0" brushRef="#br0" timeOffset="46907.39">3027 15276 116 0,'0'0'66'0,"0"0"-42"0,0 0-17 16,0 0 4-16,0 0-11 15,0 0 2-15,0 0-2 16,0 0-8-16,3-8 7 15,0 8-3-15,1 0 4 16,2 0 0-16,0 0 0 16,2 1 5-16,0 2 5 15,3 4 4-15,4 2 5 16,7 9-9-16,11 10 5 16,9 10 10-16,7 9 8 15,8 2 5-15,1-4-29 16,0-4 0-16,0-8 1 0,-5-11-7 15,-6-5-1-15,-8-5-1 16,-6-7 5-16,-8-3-12 16,-7-2-21-16,-7 0-80 15,-8-7-33-15</inkml:trace>
-  <inkml:trace contextRef="#ctx0" brushRef="#br0" timeOffset="47131.29">3512 15604 62 0,'0'0'61'0,"0"0"7"16,0 0-20-16,0 0-2 16,0 0 3-16,86 22-19 15,-77-22-3-15,-3 0-17 16,3 0-8-16,-3 0-2 15,-3 0-27-15,3-6-37 16,0-10-30-16,-1-1-74 16</inkml:trace>
+  <inkml:trace contextRef="#ctx0" brushRef="#br0" timeOffset="47131.28">3512 15604 62 0,'0'0'61'0,"0"0"7"16,0 0-20-16,0 0-2 16,0 0 3-16,86 22-19 15,-77-22-3-15,-3 0-17 16,3 0-8-16,-3 0-2 15,-3 0-27-15,3-6-37 16,0-10-30-16,-1-1-74 16</inkml:trace>
   <inkml:trace contextRef="#ctx0" brushRef="#br0" timeOffset="47260.09">3656 15550 19 0,'0'0'82'0,"0"0"-16"15,0 0-28-15,0 0-20 16,0 0-12-16,38 90-3 15,-35-78 2-15,-2-2-4 0,-1 1-2 16,0-4-36-16,0-4-75 16</inkml:trace>
   <inkml:trace contextRef="#ctx0" brushRef="#br0" timeOffset="48039.18">5244 13820 153 0,'0'0'122'0,"0"0"-117"16,0 0-5-16,0 0-1 16,0 0-1-16,0 0 2 15,16 6 0-15,-11 8 17 16,-2 3 4-16,0 6 28 16,-2 9-10-16,4 10-3 15,-2 15-17-15,1 11-5 16,-1 10 0-16,-2 3-12 15,-1 1-1-15,0 1 1 0,0-4 3 16,0 0-10-16,0-8-10 16,-4-12 6-16,1-9-31 15,3-5-86-15,0-13-108 16</inkml:trace>
   <inkml:trace contextRef="#ctx0" brushRef="#br0" timeOffset="48399.57">5223 14605 5 0,'0'0'193'16,"0"0"-114"-16,0 0-32 15,0 0-35-15,0 0 1 16,0 0 36-16,-2 65-14 16,2-31-8-16,5-2-21 15,1 2 11-15,0-3 6 16,0-5-10-16,0 1-3 16,-2-10-4-16,4-2-6 15,-2-6 6-15,-2-6-6 16,2-3 4-16,6 0 3 0,0-5-6 15,9-12-1-15,-6-2-8 16,1-2-12-16,-5 3-43 16,-4 2-90-16,-4 1-122 15</inkml:trace>
   <inkml:trace contextRef="#ctx0" brushRef="#br0" timeOffset="49374.8">3606 15752 11 0,'0'0'96'16,"0"0"-78"-16,0 0-2 0,0 0 34 16,0 0 1-16,0 0 2 15,47-4-44-15,-36-8 0 16,-2-2-9-16,-3-2 1 16,1-2-3-16,-1 2 4 15,-6-4 4-15,0 2 10 16,0 3 42-16,-3 0-12 15,0 0-20-15,-4 6-10 16,4 3 3-16,3 2-9 16,0 4 6-16,0 0-16 0,0 0 0 15,0 0 0-15,0 0-9 16,0 3-4-16,0 11 13 16,7 4 0-16,2 3 2 15,2 3-1-15,-1-1-1 16,-1 1 3-16,0 1-3 15,3 1-43-15,-5-1-72 16,-1-5-197-16</inkml:trace>
-  <inkml:trace contextRef="#ctx0" brushRef="#br0" timeOffset="52749.29">3762 16201 17 0,'0'0'130'0,"0"0"-74"16,0 0 10-16,0 0-20 15,0 0 17-15,0 0-28 16,0-19-21-16,0 19-4 15,0 0-6-15,3 0-4 0,9 0-5 16,3 13 5-16,6 5 1 16,-1 6 9-16,-3-2-5 15,-6-1 3-15,2-6-2 16,-5-3-2-16,-2-4 7 16,-2-1-10-16,-2-4 2 15,-1-3-1-15,-1 0 0 16,0 0 5-16,0 0 0 15,0 0 4-15,0-2 28 16,0-17-17-16,-1-5-21 16,-5-4-2-16,1 2 1 15,2 5-1-15,3 4 1 0,0 4 0 16,0 5 1-16,0 1-1 16,0 4 0-16,0 1 0 15,3 2-12-15,6 0 3 16,3 3 4-16,3 11 3 15,3 1-1-15,-5 2 3 16,2-3 0-16,-4-1 0 16,-2-1 1-16,-2-4-2 15,-3-3 1-15,-2-2-9 16,-2-3 6-16,0 0-15 16,0 0 7-16,0 0 10 15,3 0 2-15,0-18-2 16,-3-5-3-16,3-7-12 15,0 2 16-15,-3 5 3 16,3 4 0-16,-1 6 0 0,-1 7-2 16,-1 3 10-16,0 3-6 15,0 0-2-15,6 0-3 16,0 5-15-16,3 10 13 16,0 0 2-16,6 3 0 15,-3-2-2-15,2-1 2 16,0-4-3-16,2 0 2 15,-2-6-5-15,-5 0 2 16,1-5 1-16,-2 0-2 16,-1 0 3-16,-1 0 1 15,-2-11-11-15,-4-3-2 0,0-1 2 16,0-5 12-16,0 1-5 16,-10 1 2-16,-5-5 3 15,0 3 8-15,2 4 0 16,1 5 9-16,3 7 11 15,6 4-7-15,3 0-4 16,0 0-17-16,-3 0-15 16,3 9 5-16,0 10 10 15,0 1 5-15,0 0-3 16,0-2-2-16,12-1 0 16,3 0 1-16,-2-1 3 15,5-3-4-15,-3-2 1 16,3-5-2-16,-4-2 1 15,2-4-11-15,-4 0-4 0,-2 0 3 16,1-11 3-16,-5-8 3 16,0-5-13-16,-3-3 4 15,-3-2-14-15,0-3 2 16,0 1 27-16,0-2 8 16,-12 1 15-16,-6 2 6 15,1-2 9-15,-2 1-5 16,1 6-8-16,2 4 17 15,5 9-19-15,5 4-2 16,3 8 10-16,-1 0-18 16,4 2-13-16,0 26-18 15,10 11 16-15,8 9 2 0,3-1 0 16,1 0 2-16,1-8 0 16,5-2-2-16,-1-7-2 15,0-3 1-15,0-4-17 16,-4-4-20-16,-4-6-18 15,-6-7-22-15,-7-6-52 16,-6-1-105-16</inkml:trace>
+  <inkml:trace contextRef="#ctx0" brushRef="#br0" timeOffset="52749.28">3762 16201 17 0,'0'0'130'0,"0"0"-74"16,0 0 10-16,0 0-20 15,0 0 17-15,0 0-28 16,0-19-21-16,0 19-4 15,0 0-6-15,3 0-4 0,9 0-5 16,3 13 5-16,6 5 1 16,-1 6 9-16,-3-2-5 15,-6-1 3-15,2-6-2 16,-5-3-2-16,-2-4 7 16,-2-1-10-16,-2-4 2 15,-1-3-1-15,-1 0 0 16,0 0 5-16,0 0 0 15,0 0 4-15,0-2 28 16,0-17-17-16,-1-5-21 16,-5-4-2-16,1 2 1 15,2 5-1-15,3 4 1 0,0 4 0 16,0 5 1-16,0 1-1 16,0 4 0-16,0 1 0 15,3 2-12-15,6 0 3 16,3 3 4-16,3 11 3 15,3 1-1-15,-5 2 3 16,2-3 0-16,-4-1 0 16,-2-1 1-16,-2-4-2 15,-3-3 1-15,-2-2-9 16,-2-3 6-16,0 0-15 16,0 0 7-16,0 0 10 15,3 0 2-15,0-18-2 16,-3-5-3-16,3-7-12 15,0 2 16-15,-3 5 3 16,3 4 0-16,-1 6 0 0,-1 7-2 16,-1 3 10-16,0 3-6 15,0 0-2-15,6 0-3 16,0 5-15-16,3 10 13 16,0 0 2-16,6 3 0 15,-3-2-2-15,2-1 2 16,0-4-3-16,2 0 2 15,-2-6-5-15,-5 0 2 16,1-5 1-16,-2 0-2 16,-1 0 3-16,-1 0 1 15,-2-11-11-15,-4-3-2 0,0-1 2 16,0-5 12-16,0 1-5 16,-10 1 2-16,-5-5 3 15,0 3 8-15,2 4 0 16,1 5 9-16,3 7 11 15,6 4-7-15,3 0-4 16,0 0-17-16,-3 0-15 16,3 9 5-16,0 10 10 15,0 1 5-15,0 0-3 16,0-2-2-16,12-1 0 16,3 0 1-16,-2-1 3 15,5-3-4-15,-3-2 1 16,3-5-2-16,-4-2 1 15,2-4-11-15,-4 0-4 0,-2 0 3 16,1-11 3-16,-5-8 3 16,0-5-13-16,-3-3 4 15,-3-2-14-15,0-3 2 16,0 1 27-16,0-2 8 16,-12 1 15-16,-6 2 6 15,1-2 9-15,-2 1-5 16,1 6-8-16,2 4 17 15,5 9-19-15,5 4-2 16,3 8 10-16,-1 0-18 16,4 2-13-16,0 26-18 15,10 11 16-15,8 9 2 0,3-1 0 16,1 0 2-16,1-8 0 16,5-2-2-16,-1-7-2 15,0-3 1-15,0-4-17 16,-4-4-20-16,-4-6-18 15,-6-7-22-15,-7-6-52 16,-6-1-105-16</inkml:trace>
   <inkml:trace contextRef="#ctx0" brushRef="#br0" timeOffset="52916.08">4192 16019 32 0,'0'0'68'15,"0"0"-42"-15,0 0 39 16,0 0-12-16,0 0-26 16,0 0-27-16,91-58-10 15,-76 47-70-15,-6 4-101 16</inkml:trace>
   <inkml:trace contextRef="#ctx0" brushRef="#br0" timeOffset="53221.58">4499 16006 72 0,'0'0'90'0,"0"0"-42"16,0 0 12-16,0 0 1 0,0 0-15 16,0 0-14-16,76 72-6 15,-76-72 13-15,0 3 1 16,0-3 14-16,0 0 6 15,0 0-28-15,-5 0-17 16,-6-5-5-16,5-2-9 16,1-3 8-16,4 1-9 15,1-2-1-15,0 1-3 16,0-3-16-16,0 1-8 16,0 0 10-16,4 4-17 15,-2 3 16-15,-2 5 1 16,0 0-53-16,0-1-52 15</inkml:trace>
   <inkml:trace contextRef="#ctx0" brushRef="#br0" timeOffset="53362.12">4499 16006 30 0</inkml:trace>
@@ -4670,7 +5117,7 @@
   <inkml:trace contextRef="#ctx0" brushRef="#br0" timeOffset="56266.15">5987 15278 193 0,'0'0'75'16,"0"0"-70"-16,0 0 33 15,43-82 20-15,-34 68-53 16,-3 5-1-16,-1 4 2 16,-1 2 0-16,-3 3 27 0,-1 0-9 15,3 0-22-15,-3 7 1 16,2 15 24-16,1 7-4 16,0 2-16-16,4-1-7 15,1-1-15-15,5-8-29 16,-4-8-43-16,0-13 13 15,0 0 67-15,-3-11 7 16,0-12 22-16,3-2 5 16,0 0-15-16,-2 3 4 15,1 5 0-15,-2 6 22 16,6 7-2-16,-2 2-13 16,-1 2-7-16,3 0-1 15,-3 0-3-15,-1 0-5 16,0 0-3-16,-2 0 8 0,0 0-11 15,0 0 2-15,-1 0 0 16,-2 0-3-16,1 0-78 16,-4-8-191-16</inkml:trace>
   <inkml:trace contextRef="#ctx0" brushRef="#br0" timeOffset="63519.6">6354 10982 31 0,'0'0'61'0,"0"0"-18"16,0 0-14-16,0 0-8 15,0 0-17-15,0 0 21 16,0 59 28-16,0-35-20 16,0 1-16-16,0-4-9 15,0-2-7-15,0-5 6 0,0-2-7 16,0-6 0-16,0-4 3 16,0 0 0-16,0-2-3 15,0 0 10-15,0 0 7 16,0 0 8-16,0 0-10 15,0 0-4-15,0 0-2 16,0 0-9-16,0 0 0 16,3 0-6-16,7 0-23 15,1 0 20-15,2 0-11 16,-1 0-28-16,2-8-10 16,-1-1 13-16,-1-1-17 15,-3 0 12-15,-2-1 17 0,-2 0 4 16,-4 3 29-16,-1 2 43 15,0 1 24-15,0 4-30 16,0-1 21-16,0 2-21 16,0 0-4-16,0 0-19 15,0 5-13-15,0 10-1 16,0 5 24-16,0-1-19 16,0 1 5-16,0-4-7 15,0 0-2-15,0 0 1 16,2-5-2-16,1-1 0 15,-2-1 2-15,1-5-2 16,1-2-12-16,0-2-46 16,4 0-22-16,-3 0-22 15</inkml:trace>
   <inkml:trace contextRef="#ctx0" brushRef="#br0" timeOffset="63901.31">6597 10889 104 0,'0'0'137'0,"0"0"-102"16,0 0-32-16,0 0 10 16,0 0 7-16,0 0 5 0,-9 42-6 15,6-22-18 1,3 2 2-16,0-4 0 0,0-1 4 15,0 1 5-15,9-1-10 16,4-2-2-16,-2 0 6 16,-1-1-6-16,-2 0 0 15,4-1 2-15,-6-2 1 16,-2 0-3-16,-1 2 0 16,-3-2 0-16,0-1-1 15,0-1 5-15,0-1-4 16,0-1 6-16,0 2-3 15,0-2-4-15,-3 1 1 16,-1-4 0-16,-2 0-23 16,-2-2-7-16,1-2-30 15,2 0-89-15</inkml:trace>
-  <inkml:trace contextRef="#ctx0" brushRef="#br0" timeOffset="66827.24">7010 12527 49 0,'0'0'95'0,"0"0"-36"16,0 0-30-16,0 0 10 15,0 0-21-15,0 0 5 16,0 0 3-16,-16-2-5 0,16 2-15 16,0 0-6-16,0 0 0 15,0 2 0-15,0 3 1 16,6-1 5-16,1 0-6 15,4-3-3-15,-1-1 2 16,2 0-3-16,0 0-10 16,0-11 1-16,0 0-9 15,-3 0 13-15,-5 4 5 16,-1 0 8-16,-3 3 4 16,0 1-7-16,0 3 12 15,0 0 6-15,0 0-14 16,0 0-5-16,0 13-1 0,0 9 1 15,0 3 18-15,0 1-15 16,0-1 1-16,2-2 2 16,5 2-5-16,-2 1 0 15,-1-2 0-15,1-2 3 16,1 1-8-16,-2-6-3 16,3-3-52-16,-5-6-36 15,-2-5-103-15</inkml:trace>
+  <inkml:trace contextRef="#ctx0" brushRef="#br0" timeOffset="66827.23">7010 12527 49 0,'0'0'95'0,"0"0"-36"16,0 0-30-16,0 0 10 15,0 0-21-15,0 0 5 16,0 0 3-16,-16-2-5 0,16 2-15 16,0 0-6-16,0 0 0 15,0 2 0-15,0 3 1 16,6-1 5-16,1 0-6 15,4-3-3-15,-1-1 2 16,2 0-3-16,0 0-10 16,0-11 1-16,0 0-9 15,-3 0 13-15,-5 4 5 16,-1 0 8-16,-3 3 4 16,0 1-7-16,0 3 12 15,0 0 6-15,0 0-14 16,0 0-5-16,0 13-1 0,0 9 1 15,0 3 18-15,0 1-15 16,0-1 1-16,2-2 2 16,5 2-5-16,-2 1 0 15,-1-2 0-15,1-2 3 16,1 1-8-16,-2-6-3 16,3-3-52-16,-5-6-36 15,-2-5-103-15</inkml:trace>
   <inkml:trace contextRef="#ctx0" brushRef="#br0" timeOffset="67016.56">7101 12652 70 0,'0'0'79'15,"0"0"-48"-15,0 0 0 16,0 0-1-16,0 0-13 15,0 0-17-15,66-59-1 16,-48 51-5-16,1-1-72 16,2 0-50-16</inkml:trace>
   <inkml:trace contextRef="#ctx0" brushRef="#br0" timeOffset="67402.22">7365 12392 162 0,'0'0'111'0,"0"0"-84"16,0 0 60-16,0 0-31 16,0 0-50-16,0 0 5 15,-26-4-9-15,18 14-2 16,5 0 8-16,0 1-8 15,3 2 0-15,0 1 8 16,0 0-7-16,9 3 0 16,6-2 2-16,-2 4 1 0,2-2 3 15,-1 1-7 1,-2-2 0-16,-1-1 1 0,-6-2-1 16,-2-5 0-16,0-2 0 15,-3 1 1-15,0-2-2 16,0 6 5-16,-9-1-4 15,-1-1 0-15,-1-1-6 16,2-5 1-16,0-3-13 16,2 0-51-16,-1 0-43 15,2 0-83-15</inkml:trace>
   <inkml:trace contextRef="#ctx0" brushRef="#br0" timeOffset="68258.8">6640 11541 10 0,'0'0'60'0,"0"0"-8"16,20 92-11-16,-6-53-10 16,3 6 30-16,5 11-1 15,4 8 9-15,2 8-26 16,3-2-22-16,-1-3-9 16,1-4-10-16,-2-10-1 15,-5-8-1-15,1-8 6 16,-7-4-3-16,2-7-3 0,-6-2-5 15,-3-5-19-15,-1-5-15 16,1-5-58-16,-5-5-73 16</inkml:trace>
@@ -4696,24 +5143,24 @@
   <inkml:trace contextRef="#ctx0" brushRef="#br0" timeOffset="125485.07">13891 3671 184 0,'0'0'71'16,"0"0"-49"-16,0 0 32 15,0 0-54-15,0 0-25 16,0 0-137-16,11 3 128 15,0 8-4-15</inkml:trace>
   <inkml:trace contextRef="#ctx0" brushRef="#br0" timeOffset="125964.18">14128 3832 35 0,'0'0'113'16,"0"0"-19"-16,0 0 10 16,0 0-10-16,0 0-34 15,0 0-52-15,-82-53-1 16,60 74-6-16,5 6 3 15,1 3 1-15,1 8-2 16,7-2 0-16,3-4-3 16,5-6 0-16,0-12-15 0,0-10-36 15,13-4 23-15,7-8 28 16,3-16 8-16,3-10-6 16,-1-2 7-16,-4-2-4 15,-5 5 16-15,1 0-8 16,-5 11-13-16,-2 6 5 15,0 8-5-15,-5 4 6 16,-2 4 3-16,0 0-8 16,2 0 3-16,1 6-4 15,2 7 1-15,0 1 3 16,-2 3-3-16,0 3-2 0,-1 1-21 16,0 4-8-1,0 0-8-15,-1-7-69 0,1-5-99 16</inkml:trace>
   <inkml:trace contextRef="#ctx0" brushRef="#br0" timeOffset="126247.69">14523 3461 391 0,'0'0'58'0,"0"0"-5"0,-47 113 46 15,28-52-47-15,-1 6-21 16,4 12-22-16,4 6-8 16,6 4 8-16,6-6-9 15,0-10-6-15,7-11 5 16,15-16-25-16,3-6-6 15,1-13-30-15,0-8-67 16,-4-11-144-16</inkml:trace>
-  <inkml:trace contextRef="#ctx0" brushRef="#br0" timeOffset="127866.41">14691 3681 233 0,'0'0'25'16,"0"0"-8"-16,0 0 38 15,12 86 18-15,-11-53-30 16,-1 2-24-16,3-1-11 0,-3-3 4 16,0 0-12-16,0-9 6 15,0-6-6-15,0-7 3 16,0-8 1-16,0-1-4 15,0 0 9-15,0-6 6 16,0-15 15-16,1-12-30 16,7 0 0-16,7 2-1 15,0 8-6-15,-5 9 2 16,-2 7 5-16,-2 6 6 16,-2 1-6-16,4 0-1 15,2 13-3-15,3 3 4 16,1 7 0-16,2 4 0 15,1-2-1-15,2-1 1 16,2-3-10-16,-3-11-3 16,1-6 2-16,-2-4 5 0,1 0 5 15,2-21 2-15,2-7 2 16,1-6-3-16,0-6-1 16,-5 0-2-16,-2-1 0 15,-7-1 3-15,-6 0-2 16,-3 3 4-16,0 4 8 15,-14 8 13-15,0 10 0 16,5 10 21-16,3 7-18 16,0 6-24-16,-1 22-2 15,0 13-6-15,1 5 6 16,6 4 1-16,-1 0-1 16,1-1 2-16,0-2 0 0,0-1-2 15,0-8 0-15,4-8-6 16,2-10-34-16,2-10-28 15,-2-10-88-15,1 0-118 16</inkml:trace>
+  <inkml:trace contextRef="#ctx0" brushRef="#br0" timeOffset="127866.4">14691 3681 233 0,'0'0'25'16,"0"0"-8"-16,0 0 38 15,12 86 18-15,-11-53-30 16,-1 2-24-16,3-1-11 0,-3-3 4 16,0 0-12-16,0-9 6 15,0-6-6-15,0-7 3 16,0-8 1-16,0-1-4 15,0 0 9-15,0-6 6 16,0-15 15-16,1-12-30 16,7 0 0-16,7 2-1 15,0 8-6-15,-5 9 2 16,-2 7 5-16,-2 6 6 16,-2 1-6-16,4 0-1 15,2 13-3-15,3 3 4 16,1 7 0-16,2 4 0 15,1-2-1-15,2-1 1 16,2-3-10-16,-3-11-3 16,1-6 2-16,-2-4 5 0,1 0 5 15,2-21 2-15,2-7 2 16,1-6-3-16,0-6-1 16,-5 0-2-16,-2-1 0 15,-7-1 3-15,-6 0-2 16,-3 3 4-16,0 4 8 15,-14 8 13-15,0 10 0 16,5 10 21-16,3 7-18 16,0 6-24-16,-1 22-2 15,0 13-6-15,1 5 6 16,6 4 1-16,-1 0-1 16,1-1 2-16,0-2 0 0,0-1-2 15,0-8 0-15,4-8-6 16,2-10-34-16,2-10-28 15,-2-10-88-15,1 0-118 16</inkml:trace>
   <inkml:trace contextRef="#ctx0" brushRef="#br0" timeOffset="128027.53">14973 3731 248 0,'0'0'65'15,"0"0"-53"-15,0 0 14 0,0 0 12 16,0 0-32-16,91 4-6 16,-64-4-52-16,-1-11-61 15</inkml:trace>
   <inkml:trace contextRef="#ctx0" brushRef="#br0" timeOffset="128257.24">15286 3505 118 0,'0'0'136'0,"39"101"-73"16,-21-48 11-16,-1-4-7 0,-6-2-12 16,-6-4-17-1,-5 1-22-15,0-1-1 0,-2-3-9 16,-12-1-4-16,0-5-2 15,-3-5-14-15,1-2-64 16,-1-4-30-16,-2-8-190 16</inkml:trace>
   <inkml:trace contextRef="#ctx0" brushRef="#br0" timeOffset="128908.16">15774 3745 350 0,'0'0'26'15,"0"0"-26"-15,85-72 0 16,-32 50 2-16,19 3 11 16,18 3-13-16,13 1 0 15,7 9 0-15,-1 5 1 0,0 1-1 16,-6 1 0 0,-7 12-14-16,-4 1-31 0,-6 0 6 15,-7 0 9-15,-8 0 1 16,-13-4-12-16,-13 0 6 15,-12-6-5-15,-14-1 5 16,-12-3-12-16,-7 0 34 16,0 0 13-16,0-10 57 15,-4-8 23-15,-8-2-6 16,0 1-28-16,-2-3-23 16,4 7 13-16,1 1 6 15,3 5 18-15,3 4 5 16,3 5-2-16,0 0-15 15,0 0-39-15,0 0-7 16,0 0-4-16,3 0-1 0,8 9 3 16,3-2 5-1,-1 3-4-15,1 0 0 0,1 4-1 16,2 1 1-16,1-1-1 16,-1-2 0-16,1-1 0 15,-6-4 4-15,-6-1-4 16,-1 2 0-16,-5-2-2 15,0 6-3-15,0-2 4 16,-6 2-3-16,-9 0-18 16,-6-3-3-16,-3 3-21 15,0-8-70-15,2-1-294 16</inkml:trace>
   <inkml:trace contextRef="#ctx0" brushRef="#br0" timeOffset="130956.74">17772 3701 45 0,'0'0'25'0,"0"0"-6"15,0 0 1-15,0 0-10 16,50 85-1-16,-36-81-8 16,2-4 1-16,1 0 8 15,-1-13-6-15,-1-5 5 16,-2 0-8-16,-5-1 3 0,-4 5 30 16,-2 2 21-16,-1 4 2 15,-1 7 14-15,0 1-12 16,0 0-49-16,0 7-10 15,0 11 0-15,0 9 22 16,0-2-14-16,-6 4-1 16,0-1 4-16,-2 0-11 15,-3 0 8-15,-1 2-8 16,-3-6 0-16,5-6-8 16,2-6-43-16,5-10-6 15,-1-2-33-15,2-1-27 16</inkml:trace>
   <inkml:trace contextRef="#ctx0" brushRef="#br0" timeOffset="131316.56">17906 3381 173 0,'0'0'47'0,"0"0"0"16,0 0 5-16,-63 90 8 16,50-70-25-16,4 0-25 15,-1-4-10-15,2-1 3 16,3-6-2-16,4-3 1 0,1-4-2 16,0-2 4-16,0 0 7 15,0-4 59-15,10-15-59 16,8-4-6-16,0-2-2 15,2 3-3-15,-1 0-3 16,-3 9 1-16,1 8-5 16,-5 5 6-16,-2 0-6 15,4 5-4-15,2 13 4 16,3 1-16-16,2 4-40 16,-4-1-87-16,-3 2-110 15</inkml:trace>
-  <inkml:trace contextRef="#ctx0" brushRef="#br0" timeOffset="132645.35">19460 3566 28 0,'0'0'47'0,"0"0"-19"15,0 0 35-15,0 0 14 16,0 0-47-16,0 0 21 15,8-15-29-15,-8 15 9 16,0 0-6-16,3 0-25 16,2 0-1-16,3 13 1 15,-2 1 0-15,0 0 2 16,3 0-1-16,0 1-1 16,-1-4 2-16,2 2 0 0,-2-2-1 15,-1 0-1-15,0 1 0 16,-1-7-1-16,2-1-5 15,2-1 6-15,1-3-1 16,1 0-3-16,3-3 3 16,-3-6-5-16,-1-6 1 15,-2 0 5-15,-3 1 2 16,-1 1 0-16,-2 2 0 16,-3 2-1-16,3 6 24 15,-3 3 7-15,0 0-9 16,0 10-10-16,0 17-13 15,0 5 28-15,-6 7-6 0,3 2-13 16,3 1-1-16,-2 3-8 16,1 4 0-16,-5 2 2 15,-2-1 2-15,-3-1-4 16,0-14 0-16,4-12 1 16,2-12-5-16,1-9 8 15,2-2-4-15,1 0 13 16,-2-7 14-16,0-12-17 15,-2-8-10-15,4-5-14 16,-1-6-7-16,2-5-34 16,0 0-29-16,0 0-101 15</inkml:trace>
-  <inkml:trace contextRef="#ctx0" brushRef="#br0" timeOffset="134174.32">19610 3285 4 0,'0'0'65'0,"0"0"8"15,0 0-40-15,0 0-13 16,0 0-4-16,0 0 37 16,-14 1 7-16,14 1-21 15,0-1-31-15,0 4-8 16,0 1-3-16,0 5 3 16,0-3 1-16,0 1 1 0,0 3-1 15,0-6-1-15,-1 3 0 16,-2-4 0-16,0-3 4 15,1 3-4-15,-1-5 2 16,2 0-1-16,-1 0 12 16,1 0 3-16,-2 0 5 15,0 0 3-15,-1 0-16 16,1 0 6-16,1 0-10 16,1 0-3-16,-1 0 0 15,2 0-1-15,0 0 0 16,0 0 4-16,0 0-2 15,0-3 0-15,0 0-2 0,0 0 0 16,0 0-1-16,0 0 1 16,0-1-3-16,0 0-8 15,0 0 0-15,5-2 11 16,2 2-4-16,0-2 1 16,2-1-1-16,-1 2 4 15,0-2-7-15,-1 3 3 16,-4 2 6-16,0 2-2 15,-3 0 0-15,1 0-7 16,5 0 1-16,3 0-1 16,1 8 7-16,4 9-2 15,2 0 2-15,1 2-53 16,2 2-84-16,0-4-28 16</inkml:trace>
-  <inkml:trace contextRef="#ctx0" brushRef="#br0" timeOffset="134778.32">19915 3649 182 0,'0'0'138'0,"0"0"-119"0,0 0-2 16,0 0 30-1,0 0-10-15,0 0-22 0,93 18-8 16,-76-18-7-16,-3 3-6 16,-2-2-73-16,-1 1-143 15</inkml:trace>
+  <inkml:trace contextRef="#ctx0" brushRef="#br0" timeOffset="132645.34">19460 3566 28 0,'0'0'47'0,"0"0"-19"15,0 0 35-15,0 0 14 16,0 0-47-16,0 0 21 15,8-15-29-15,-8 15 9 16,0 0-6-16,3 0-25 16,2 0-1-16,3 13 1 15,-2 1 0-15,0 0 2 16,3 0-1-16,0 1-1 16,-1-4 2-16,2 2 0 0,-2-2-1 15,-1 0-1-15,0 1 0 16,-1-7-1-16,2-1-5 15,2-1 6-15,1-3-1 16,1 0-3-16,3-3 3 16,-3-6-5-16,-1-6 1 15,-2 0 5-15,-3 1 2 16,-1 1 0-16,-2 2 0 16,-3 2-1-16,3 6 24 15,-3 3 7-15,0 0-9 16,0 10-10-16,0 17-13 15,0 5 28-15,-6 7-6 0,3 2-13 16,3 1-1-16,-2 3-8 16,1 4 0-16,-5 2 2 15,-2-1 2-15,-3-1-4 16,0-14 0-16,4-12 1 16,2-12-5-16,1-9 8 15,2-2-4-15,1 0 13 16,-2-7 14-16,0-12-17 15,-2-8-10-15,4-5-14 16,-1-6-7-16,2-5-34 16,0 0-29-16,0 0-101 15</inkml:trace>
+  <inkml:trace contextRef="#ctx0" brushRef="#br0" timeOffset="134174.31">19610 3285 4 0,'0'0'65'0,"0"0"8"15,0 0-40-15,0 0-13 16,0 0-4-16,0 0 37 16,-14 1 7-16,14 1-21 15,0-1-31-15,0 4-8 16,0 1-3-16,0 5 3 16,0-3 1-16,0 1 1 0,0 3-1 15,0-6-1-15,-1 3 0 16,-2-4 0-16,0-3 4 15,1 3-4-15,-1-5 2 16,2 0-1-16,-1 0 12 16,1 0 3-16,-2 0 5 15,0 0 3-15,-1 0-16 16,1 0 6-16,1 0-10 16,1 0-3-16,-1 0 0 15,2 0-1-15,0 0 0 16,0 0 4-16,0 0-2 15,0-3 0-15,0 0-2 0,0 0 0 16,0 0-1-16,0 0 1 16,0-1-3-16,0 0-8 15,0 0 0-15,5-2 11 16,2 2-4-16,0-2 1 16,2-1-1-16,-1 2 4 15,0-2-7-15,-1 3 3 16,-4 2 6-16,0 2-2 15,-3 0 0-15,1 0-7 16,5 0 1-16,3 0-1 16,1 8 7-16,4 9-2 15,2 0 2-15,1 2-53 16,2 2-84-16,0-4-28 16</inkml:trace>
+  <inkml:trace contextRef="#ctx0" brushRef="#br0" timeOffset="134778.31">19915 3649 182 0,'0'0'138'0,"0"0"-119"0,0 0-2 16,0 0 30-1,0 0-10-15,0 0-22 0,93 18-8 16,-76-18-7-16,-3 3-6 16,-2-2-73-16,-1 1-143 15</inkml:trace>
   <inkml:trace contextRef="#ctx0" brushRef="#br0" timeOffset="135526.31">20285 3574 211 0,'0'0'96'16,"0"0"-70"-16,0 0-7 15,0 0 14-15,0 0 52 16,0 0-50-16,2 79-12 16,5-59-4-16,1-1-11 15,0-6 2-15,0-4-10 16,-2-4 1-16,3-3 5 15,4-2-6-15,4 0 5 16,5-16 1-16,4-8-4 16,-7-2-4-16,2-1 1 15,-3 7 1-15,-8 7 0 0,-3 6 1 16,-3 7-2 0,-4 0-2-16,0 24 3 0,0 10 20 15,0 7 11-15,-3 2-13 16,-6-2 1-16,-2 4-7 15,-2 5-3-15,1 2-7 16,-3-1 1-16,5-7-1 16,2-11-2-16,4-15 0 15,0-7 0-15,2-9 2 16,2-2 2-16,0 0 13 16,0-5 11-16,0-19 11 15,0-8-38-15,0-9 0 16,3-3-2-16,6-2-4 15,0 4-3-15,4 9-13 0,4 7-17 16,3 8 2-16,2 8-1 16,1 5-43-16,0 2-96 15</inkml:trace>
   <inkml:trace contextRef="#ctx0" brushRef="#br0" timeOffset="136136.2">20600 3021 312 0,'0'0'102'0,"-159"-105"-44"16,61 62-47-16,-13 8 38 15,-18 15 12-15,-9 20-57 16,-6 4-4-16,-6 33-4 16,-1 13 4-16,10 16 20 15,9 9-9-15,17 12-10 16,23 8-1-16,16 7-7 0,16 1 7 15,15 3-7 1,16 7 7-16,10 15 0 0,15 13-2 16,4 1 0-16,13-2 2 15,25-13 6-15,14-13 5 16,11-10 3-16,10-14-13 16,18-15 1-16,24-17-2 15,26-17 0-15,25-19 14 16,20-22-5-16,9-7-7 15,1-31 5-15,-9-18-6 16,-11-13-1-16,-20-17-1 16,-18-17-28-16,-22-12-5 15,-25-10-21-15,-22-11 31 0,-20 1 24 16,-19 5 41 0,-20 8-27-16,-10 14 4 0,-15 11 1 15,-23 5 20-15,-10 16-34 16,-7 11-1-16,-7 14-8 15,-3 14-20-15,-8 16-43 16,-2 13-27-16,2 8-101 16</inkml:trace>
-  <inkml:trace contextRef="#ctx0" brushRef="#br0" timeOffset="137297.39">20586 2610 168 0,'0'0'130'16,"0"0"-75"-16,0 0-24 15,0 0 55-15,0 0 11 16,0 0-50-16,14-55-20 15,8 28-17-15,13-5 1 16,13-11-10-16,18-8 1 16,22-10 0-16,19-9-2 15,14-3-8-15,4-3-36 0,-3-2-35 16,-14 1 24 0,-19 4-45-16,-17 5 76 0,-18 14-81 15,-18 16 81-15,-19 14 24 16,-12 13 20-16,-5 8 11 15,0 3-3-15,-3 0 8 16,-8 0-16-16,0 3-2 16,-2 5-11-16,3 0 3 15,-3-2 2-15,2 0-7 16,2-2 6-16,3-1-9 16,3-2-1-16,2-1 6 15,1 0-7-15,0 0 3 16,0 0-3-16,0 0-16 15,0 2 13-15,0-2 3 0,-3 0 3 16,1 0-3-16,1 0 4 16,-2 0-4-16,1 0 13 15,-1 0-12-15,0 0 6 16,-1 0-2-16,3-2 5 16,-1 1-4-16,1 1-5 15,1 0 3-15,-2 0-4 16,-1 0 0-16,-2 0-2 15,1 0-17-15,1 0 19 16,1 1 2-16,2 1-1 16,0-2-2-16,0 0 0 15,0 1-1-15,0 0 2 16,8 1 13-16,10-2 15 0,3 0-2 16,4 0-17-1,0-2 10-15,1-4-18 0,-7 0 2 16,-1 4-3-16,-6 2 0 15,1 0-5-15,-2 0 4 16,-2 13-3-16,-2 7 1 16,-7 4 1-16,0 6-42 15,-10 6-3-15,-10 1-67 16,-5-6-83-16</inkml:trace>
+  <inkml:trace contextRef="#ctx0" brushRef="#br0" timeOffset="137297.38">20586 2610 168 0,'0'0'130'16,"0"0"-75"-16,0 0-24 15,0 0 55-15,0 0 11 16,0 0-50-16,14-55-20 15,8 28-17-15,13-5 1 16,13-11-10-16,18-8 1 16,22-10 0-16,19-9-2 15,14-3-8-15,4-3-36 0,-3-2-35 16,-14 1 24 0,-19 4-45-16,-17 5 76 0,-18 14-81 15,-18 16 81-15,-19 14 24 16,-12 13 20-16,-5 8 11 15,0 3-3-15,-3 0 8 16,-8 0-16-16,0 3-2 16,-2 5-11-16,3 0 3 15,-3-2 2-15,2 0-7 16,2-2 6-16,3-1-9 16,3-2-1-16,2-1 6 15,1 0-7-15,0 0 3 16,0 0-3-16,0 0-16 15,0 2 13-15,0-2 3 0,-3 0 3 16,1 0-3-16,1 0 4 16,-2 0-4-16,1 0 13 15,-1 0-12-15,0 0 6 16,-1 0-2-16,3-2 5 16,-1 1-4-16,1 1-5 15,1 0 3-15,-2 0-4 16,-1 0 0-16,-2 0-2 15,1 0-17-15,1 0 19 16,1 1 2-16,2 1-1 16,0-2-2-16,0 0 0 15,0 1-1-15,0 0 2 16,8 1 13-16,10-2 15 0,3 0-2 16,4 0-17-1,0-2 10-15,1-4-18 0,-7 0 2 16,-1 4-3-16,-6 2 0 15,1 0-5-15,-2 0 4 16,-2 13-3-16,-2 7 1 16,-7 4 1-16,0 6-42 15,-10 6-3-15,-10 1-67 16,-5-6-83-16</inkml:trace>
   <inkml:trace contextRef="#ctx0" brushRef="#br0" timeOffset="149669.57">14340 4703 10 0,'0'0'26'16,"0"0"1"0,0 0 14-16,0 0-19 0,0 0-18 15,0 0-4-15,0 0 0 16,0 0-4-16,0-8-16 15,0 8 11-15,0 0 4 16,0 0 4-16,0 0-2 16,0 0 3-16,0 0-20 15,0 0-17-15,0 0 19 16,0 0 5-16</inkml:trace>
   <inkml:trace contextRef="#ctx0" brushRef="#br0" timeOffset="153111.96">14386 4687 10 0,'0'0'13'0,"0"0"0"15,0 0 4-15,0 0-7 16,0 0 11-16,0 0-6 16,0 0 0-16,0-5-7 15,0 5-6-15,0 0 5 16,0 0-6-16,0 0 8 0,0 0 6 15,0 0-1-15,0 0 8 16,0 0-13-16,0 0-4 16,0 0 9-16,0-2-9 15,0 2 2-15,0-1 11 16,0-2-10-16,0 2 5 16,0-1-3-16,0 2-2 15,0-1-2-15,0 1-3 16,0-2-1-16,0 1-2 15,0 1 2-15,0-1-2 16,0-1 4-16,2 2-2 16,1-2 1-16,0 0-1 15,4 0-2-15,1 0 0 16,-1-1 1-16,-1 1-1 16,1 1 0-16,-2 1 0 0,1 0-2 15,-1-4 3-15,-1 4-1 16,1 0 0-16,-1 0 1 15,2 0-3-15,0 0-1 16,0 4 3-16,-2 3 5 16,1 3 0-16,1 0-3 15,-3-2 1-15,0 4-1 16,-3-2-1-16,0-2 2 16,0 2 10-16,-2 0-1 15,-8-2-9-15,2 1 5 16,1-2-4-16,-5 0-2 15,5 0 3-15,-2 0-5 0,-1-3 0 16,0 2 2-16,4-3 0 16,2-3-2-16,2 2-3 15,2-2 1-15,0 0 2 16,0 0 0-16,0 0 3 16,0 0 18-16,0 0-11 15,9 0-3-15,3 0-7 16,0-5 3-16,0 0-4 15,1 3 1-15,1-1 0 16,1 2-2-16,-2 1 4 16,0 0-4-16,1 0 2 15,-2 4-2-15,-2 8 0 16,-2-2-1-16,-4 3 2 0,-2 2-2 16,-2 2 1-16,0-2 2 15,0 2 0-15,-2-4 2 16,-5-1 0-16,-1-1 0 15,0-5 3-15,0 0 4 16,-1-2-3-16,0-3 17 16,-1-1-1-16,-1 0-6 15,1 0 12-15,-4 0-7 16,1-3-7-16,-2-4 8 16,3 2-16-16,0-3-3 15,5 4-3-15,-1 1 1 16,5 1-2-16,2-1-58 0,1 0-37 15,0 2-130 1</inkml:trace>
   <inkml:trace contextRef="#ctx0" brushRef="#br0" timeOffset="154104.29">14288 4576 51 0,'0'0'74'16,"0"0"-48"-16,0 0 9 16,-64 96 7-16,55-66 7 15,1 3-19-15,4 3-7 16,4 4-3-16,0 3 7 16,1 0-3-16,14-3-6 15,3-2-11-15,5-5 1 16,0-2-8-16,3-3 0 0,-1-4 0 15,5-6-14 1,3-5 11-16,4-7 6 16,-1-6-2-16,0 0 10 0,-2-7-9 15,-1-12 0-15,0-4-2 16,-2-2-26-16,-1-4 8 16,-2-3-25-16,-4-2 24 15,-3-3 14-15,-8-4-9 16,-2-3 14-16,-7 0 1 15,-4 3 5-15,0 2 15 16,-19 1 9-16,-6 5 4 16,-5 2 8-16,-6 4-2 15,-2 2 9-15,-3 1-14 16,2 3-7-16,5 4-17 16,4 7-10-16,3 7 1 0,2 3-4 15,-2 0-21 1,1 0-43-16,4 14-39 0,7 2-93 15</inkml:trace>
   <inkml:trace contextRef="#ctx0" brushRef="#br0" timeOffset="154955.29">14876 4511 116 0,'0'0'37'0,"0"0"26"16,0 0-2-16,-6 103-15 15,6-72-13-15,0 4-24 16,0 1-3-16,0 2 5 15,0 1-4-15,0-5 0 16,3-3-7-16,1-7 6 16,-1-8-6-16,0-7 0 15,-1-6 5-15,-1-3-3 16,2 0 6-16,3-4 37 16,0-16-34-16,3-6-6 15,3-4-5-15,-3-1-2 16,0-4-2-16,-3 3-1 15,3 7 3-15,-3 5-1 16,1 12 6-16,-1 4-5 0,4 4 2 16,-1 1-7-16,4 18 7 15,1 4 6-15,0 4 11 16,2-1-8-16,-2-4-4 16,2-5 4-16,-2-2-3 15,0 0-5-15,-2-3 4 16,-1-7-5-16,-1-2 2 15,-2-3 3-15,1 0-1 16,-2 0 13-16,2-6 6 16,-1-10-16-16,-2-5 25 15,1-3-22-15,-1-5-3 16,-3-3-1-16,-2 0-2 16,-1-4 6-16,0 2-10 0,0 6 1 15,0 8 0 1,0 8 1-16,0 9 6 0,0 3 3 15,0 0-11-15,0 19-18 16,0 8 18-16,0 3 0 16,3 0 3-16,0-1-3 15,0-4 1-15,0-3-1 16,0-4-2-16,0-3-26 16,-1-2-24-16,-2-5-29 15,0-1-51-15,0-6-125 16</inkml:trace>
   <inkml:trace contextRef="#ctx0" brushRef="#br0" timeOffset="155108.78">15165 4693 111 0,'0'0'75'15,"0"0"-18"-15,0 0-2 16,0 0-39-16,0 0-16 15,0 0-101-15</inkml:trace>
-  <inkml:trace contextRef="#ctx0" brushRef="#br0" timeOffset="155656.48">14662 4428 25 0,'0'0'51'0,"0"0"2"0,0 0 0 16,0 0-28-16,0 0-14 15,33 86-6-15,-27-79-4 16,0-1 0-16,-2-3-1 16,1-3-38-16,1 0-38 15,-3 0-35-15</inkml:trace>
+  <inkml:trace contextRef="#ctx0" brushRef="#br0" timeOffset="155656.47">14662 4428 25 0,'0'0'51'0,"0"0"2"0,0 0 0 16,0 0-28-16,0 0-14 15,33 86-6-15,-27-79-4 16,0-1 0-16,-2-3-1 16,1-3-38-16,1 0-38 15,-3 0-35-15</inkml:trace>
   <inkml:trace contextRef="#ctx0" brushRef="#br0" timeOffset="155834.68">14662 4428 39 0,'68'17'84'0,"-68"-13"-77"0,0 10 41 16,0 0-18-16,1 2-7 16,-1-2 3-16,0-3-7 15,0 1 3-15,0-7-3 16,0 2-13-16,0-4-2 16,0 0-4-16,-3-2-10 15,-3-1-62-15,0 0-117 16</inkml:trace>
   <inkml:trace contextRef="#ctx0" brushRef="#br0" timeOffset="155927.57">14662 4428 25 0</inkml:trace>
   <inkml:trace contextRef="#ctx0" brushRef="#br0" timeOffset="155992.63">14662 4428 25 0,'27'25'18'0,"-27"-28"12"0,3 1-23 0,5-3 6 0,0 3-8 0,0-4-5 15,3 2-1-15,-4 1-64 16</inkml:trace>
@@ -4741,11 +5188,11 @@
   <inkml:trace contextRef="#ctx0" brushRef="#br0" timeOffset="-209648.26">4319 16645 16 0,'0'0'32'16,"-112"0"11"-16,45 14-28 15,-2 14 52-15,-6 8 27 16,-5 9-40-16,4 12 29 16,3 15 2-16,13 12-56 15,17 9-22-15,16 6-7 16,18-3-6-16,9-6-19 15,27-4 25-15,25-9-13 16,21-7 13-16,15-8-3 16,3-8-17-16,6-9-19 15,-6-7-3-15,3-10 39 16,-3-12-6-16,-7-15 4 0,-1-2 5 16,-11-35 5-16,-4-20 2 15,-5-11 4-15,-3-16 27 16,-3-7-18-16,-5-10-15 15,-8-6 4-15,-12-14-9 16,-16 1-20-16,-14-3 15 16,-2 8 5-16,-27 8 2 15,-16 12 6-15,-17 16 7 16,-10 21-3-16,-9 19-10 16,-2 15-3-16,2 12 1 15,9 11-8-15,4 10-38 16,8 27-59-16,6 16-38 0</inkml:trace>
   <inkml:trace contextRef="#ctx0" brushRef="#br0" timeOffset="-207059.57">18446 7490 11 0,'0'0'32'16,"0"0"-14"-16,0 0-16 16,0 0 32-16,0 0-8 15,0 0 32-15,0 0-10 16,-25 0-23-16,25 0 8 15,0-1-5-15,0-5-9 0,0-1-19 16,4-1-4-16,8 3 2 16,3-4-7-16,6 4 10 15,7-5-1-15,6 2 4 16,8-3 3-16,9-2 1 16,5 0 2-16,6 2-3 15,3 2 8-15,-2 2-11 16,0 3-2-16,-4-2 3 15,-2 1-5-15,-3-1 6 16,3-2-5-16,5-2-1 16,8-3 5-16,11-1-4 15,8-3 1-15,5 1 3 0,0 1-3 16,-4 2 7 0,-7 1-8-16,-8 2-1 0,-8 2 9 15,-5 4-6-15,-7-6 0 16,0 0 11-16,1 1-3 15,6-4 3-15,6 2-12 16,6-1 3-16,6 1 3 16,6 3 5-16,2-1 3 15,-5 3-16-15,-4 0 0 16,-12 1 1-16,-8 2-1 16,0-1 0-16,-4 4-1 15,1 0 1-15,-2 0 0 16,3 0 1-16,1 0 0 15,0 0-1-15,5 3 0 0,3 2 1 16,4 1-1-16,0 3 3 16,-3 1-7-16,-4 2 4 15,-5 0 0-15,-2 1 2 16,0 0-2-16,-4 0 0 16,-1-2-1-16,-6 2 0 15,-1 0 0-15,3-5 1 16,5 1 0-16,6-5 2 15,6 0-2-15,3-2 0 16,0-2 3-16,-2 0-2 16,-9 0-1-16,-5 0 1 15,-6 0 0-15,-4 0 4 16,3 0-5-16,2 0 0 16,6 0 0-16,8-6 5 15,6 3-5-15,5 2 10 0,4 1-9 16,-2 0 3-16,-5 0-4 15,-5 0 0-15,-8 0 0 16,1 1 2-16,2 6-2 16,0 0 0-16,0 2 3 15,-4-2-6-15,-5 0 3 16,0-1 0-16,-1 2 0 16,0-3 4-16,-3 0-5 15,-1 0 1-15,-3-3 0 16,-6-2 3-16,-2 0-3 0,-1 0 0 15,-7 0 0 1,-3 0 1-16,-5 0-1 0,-4 0 0 16,-2 0 3-16,-7-2-8 15,2 0-3-15,-5-3-23 16,-1 2-16-16,0 1-42 16,0-6-114-16</inkml:trace>
   <inkml:trace contextRef="#ctx0" brushRef="#br0" timeOffset="-203053.28">6018 13714 89 0,'0'0'56'0,"0"0"-48"16,0 0-2-16,0 0-3 16,0 0 83-16,0 0-27 15,0 0-45-15,-15-46-14 16,30 53-7-16,14 21 7 0,12 16 5 16,7 15 32-16,7 17-5 15,5 13-17-15,-4 6-1 16,-2 2-12-16,-9-2 2 15,-9-5 3-15,-9-7-7 16,-8-7 2-16,-7-12 2 16,0-14-4-16,-3-6 3 15,-2-7-3-15,-1-8-5 16,-3-6-26-16,-1-9-30 16,-2-5-33-16,0-9-62 15</inkml:trace>
-  <inkml:trace contextRef="#ctx0" brushRef="#br0" timeOffset="-202821.24">6443 14666 137 0,'0'0'50'0,"0"0"-50"15,0 0 0-15,0 0 5 16,0 0-4-16,0 0 1 16,54 66-2-16,-43-61 2 15,-3-2-2-15,1-3 1 16,2 0-1-16,-1-7 13 15,2-8-13-15,-3 1-4 16,0 2 4-16,-6 7 0 16,-2 4 25-16,-1 1-25 15,0 2-15-15,0 18 12 16,-10 9-17-16,-5 5-129 0</inkml:trace>
+  <inkml:trace contextRef="#ctx0" brushRef="#br0" timeOffset="-202821.25">6443 14666 137 0,'0'0'50'0,"0"0"-50"15,0 0 0-15,0 0 5 16,0 0-4-16,0 0 1 16,54 66-2-16,-43-61 2 15,-3-2-2-15,1-3 1 16,2 0-1-16,-1-7 13 15,2-8-13-15,-3 1-4 16,0 2 4-16,-6 7 0 16,-2 4 25-16,-1 1-25 15,0 2-15-15,0 18 12 16,-10 9-17-16,-5 5-129 0</inkml:trace>
   <inkml:trace contextRef="#ctx0" brushRef="#br0" timeOffset="-202123.48">6907 15512 262 0,'0'0'83'15,"0"0"-78"-15,0 0-2 16,0 0 22-16,0 0 23 16,-9 110-9-16,9-70-11 15,5-1-19-15,4-2-9 16,4-3 3-16,2-5-1 15,0-6-1-15,0-4 0 0,1-11-1 16,-2-4-29-16,1-4 19 16,0-11 8-16,-1-17 0 15,0-9-6-15,-1-6-10 16,-8 4 10-16,-5 5 8 16,0 5 40-16,-3 7-16 15,-12 3-20-15,-3 0-5 16,-1 4 1-16,1 0-18 15,3 4-29-15,2 4-86 16,5 3-69-16</inkml:trace>
   <inkml:trace contextRef="#ctx0" brushRef="#br0" timeOffset="-201929.54">7165 15539 225 0,'0'0'96'0,"0"0"-81"15,0 0 18-15,0 0-4 16,0 0-6-16,0 0-23 16,0-45-53-16,3 39-123 15</inkml:trace>
-  <inkml:trace contextRef="#ctx0" brushRef="#br0" timeOffset="-201539.21">7270 15418 51 0,'0'0'56'16,"0"0"-12"-16,0 0-3 15,0 0 2-15,0 0 16 16,0 0-11-16,43 14-30 16,-28-24-15-16,4-3-3 15,-4-1-94-15,-4-3-118 16</inkml:trace>
-  <inkml:trace contextRef="#ctx0" brushRef="#br0" timeOffset="-201335.74">7452 15189 185 0,'0'0'32'0,"0"0"-26"16,0 0-1-16,0 0 6 15,30 89 17-15,-20-62-8 16,3 1-11-16,-2-3-9 16,0-1 0-16,-3-7-1 15,0-4-72-15,-2-2-57 16</inkml:trace>
+  <inkml:trace contextRef="#ctx0" brushRef="#br0" timeOffset="-201539.22">7270 15418 51 0,'0'0'56'16,"0"0"-12"-16,0 0-3 15,0 0 2-15,0 0 16 16,0 0-11-16,43 14-30 16,-28-24-15-16,4-3-3 15,-4-1-94-15,-4-3-118 16</inkml:trace>
+  <inkml:trace contextRef="#ctx0" brushRef="#br0" timeOffset="-201335.75">7452 15189 185 0,'0'0'32'0,"0"0"-26"16,0 0-1-16,0 0 6 15,30 89 17-15,-20-62-8 16,3 1-11-16,-2-3-9 16,0-1 0-16,-3-7-1 15,0-4-72-15,-2-2-57 16</inkml:trace>
   <inkml:trace contextRef="#ctx0" brushRef="#br0" timeOffset="-200827.26">7625 14901 193 0,'0'0'76'16,"0"0"-68"-16,0 0 40 15,-81-67 35-15,50 55-36 16,-5 6 0-16,-10 6-37 16,-12 0-4-16,-12 23-6 15,-10 4 7-15,-5 8-5 16,-4 7-2-16,4 4 33 15,3 12-3-15,10 11 7 16,14 21-18-16,13 14-17 16,11 8-1-16,6 0 3 15,5-8-4-15,10-10 0 16,4-8-4-16,9-11 4 16,0-9-5-16,21-10-25 0,13-10-7 15,14-8 2-15,14-6-21 16,16-6 3-16,7-15 36 15,5-11 5-15,1-21 9 16,1-28 3-16,4-15-97 16,-2-7 28-16,-6-3 56 15,-9-8-54-15,-11-3-88 16,-11-6 155-16</inkml:trace>
   <inkml:trace contextRef="#ctx0" brushRef="#br0" timeOffset="-200698.33">7814 15062 59 0,'0'0'76'15,"-53"-116"53"-15,11 74-31 0,-10 7-44 16,-5 8 6-16,-1 7-60 16,-3 16-3-16,1 4-30 15,2 22-41-15,5 17-28 16,3 11-109-16</inkml:trace>
 </inkml:ink>
@@ -5176,7 +5623,7 @@
   <inkml:trace contextRef="#ctx0" brushRef="#br0" timeOffset="8841.61">5142 5368 76 0,'0'0'78'0,"0"0"-60"16,0 0 42-16,82-3 22 16,-43-13-82-16,0-8-1 15,-3-7-236-15</inkml:trace>
   <inkml:trace contextRef="#ctx0" brushRef="#br0" timeOffset="9203.67">5951 4222 168 0,'0'0'274'16,"0"0"-271"-16,0 0 1 0,19 90-3 15,-14-56 8-15,-2-1-9 16,0-4-4-16,0-3-134 16,-3-7-104-16</inkml:trace>
   <inkml:trace contextRef="#ctx0" brushRef="#br0" timeOffset="9396.16">5984 4349 230 0,'0'0'103'0,"0"0"-70"16,0 0-30-16,0 0-3 15,-84 12 22-15,74-5-9 16,5-2 15-16,4-4 12 16,1 0-17-16,0 1-23 0,0 0-4 15,16-2-137-15,17 0-28 16</inkml:trace>
-  <inkml:trace contextRef="#ctx0" brushRef="#br0" timeOffset="9719.85">6722 3606 113 0,'0'0'118'0,"0"0"-16"16,0 0-54-16,0 0-22 15,0 0-25-15,0 0 12 16,40 40 9-16,-32-18-19 16,4 1 5-16,1-4-8 15,2-7-96-15,0-7-244 16</inkml:trace>
+  <inkml:trace contextRef="#ctx0" brushRef="#br0" timeOffset="9719.84">6722 3606 113 0,'0'0'118'0,"0"0"-16"16,0 0-54-16,0 0-22 15,0 0-25-15,0 0 12 16,40 40 9-16,-32-18-19 16,4 1 5-16,1-4-8 15,2-7-96-15,0-7-244 16</inkml:trace>
   <inkml:trace contextRef="#ctx0" brushRef="#br0" timeOffset="9876.53">6870 3542 116 0,'0'0'23'15,"0"0"10"-15,-64 83-32 16,48-57 5-16,2 2-6 16,5-11-15-16,0-2-142 15</inkml:trace>
   <inkml:trace contextRef="#ctx0" brushRef="#br0" timeOffset="9969.14">6743 3692 49 0,'0'0'80'0,"0"0"-29"0,0 0-28 16,0 0-18-16,118-91-5 15,-70 70-104-15</inkml:trace>
   <inkml:trace contextRef="#ctx0" brushRef="#br0" timeOffset="10310.94">7883 2816 266 0,'0'0'184'0,"0"0"-134"16,0 0-49-16,0 0 3 15,0 0 43-15,11 100-22 16,0-71-22-16,1-3 11 15,6-7-14-15,2-5-40 0,2-10-111 16,2-4-103-16</inkml:trace>
@@ -5473,7 +5920,7 @@
           <a:p>
             <a:fld id="{B535DB69-913B-41DB-A53E-3F20C7706EC0}" type="datetimeFigureOut">
               <a:rPr lang="en-US" smtClean="0"/>
-              <a:t>16-Dec-22</a:t>
+              <a:t>20-Dec-22</a:t>
             </a:fld>
             <a:endParaRPr lang="en-US"/>
           </a:p>
@@ -5991,7 +6438,7 @@
           <a:p>
             <a:fld id="{E66EBA75-61DB-42BC-B227-112539E2E989}" type="datetimeFigureOut">
               <a:rPr lang="en-US" smtClean="0"/>
-              <a:t>16-Dec-22</a:t>
+              <a:t>20-Dec-22</a:t>
             </a:fld>
             <a:endParaRPr lang="en-US"/>
           </a:p>
@@ -6189,7 +6636,7 @@
           <a:p>
             <a:fld id="{E66EBA75-61DB-42BC-B227-112539E2E989}" type="datetimeFigureOut">
               <a:rPr lang="en-US" smtClean="0"/>
-              <a:t>16-Dec-22</a:t>
+              <a:t>20-Dec-22</a:t>
             </a:fld>
             <a:endParaRPr lang="en-US"/>
           </a:p>
@@ -6397,7 +6844,7 @@
           <a:p>
             <a:fld id="{E66EBA75-61DB-42BC-B227-112539E2E989}" type="datetimeFigureOut">
               <a:rPr lang="en-US" smtClean="0"/>
-              <a:t>16-Dec-22</a:t>
+              <a:t>20-Dec-22</a:t>
             </a:fld>
             <a:endParaRPr lang="en-US"/>
           </a:p>
@@ -6595,7 +7042,7 @@
           <a:p>
             <a:fld id="{E66EBA75-61DB-42BC-B227-112539E2E989}" type="datetimeFigureOut">
               <a:rPr lang="en-US" smtClean="0"/>
-              <a:t>16-Dec-22</a:t>
+              <a:t>20-Dec-22</a:t>
             </a:fld>
             <a:endParaRPr lang="en-US"/>
           </a:p>
@@ -6870,7 +7317,7 @@
           <a:p>
             <a:fld id="{E66EBA75-61DB-42BC-B227-112539E2E989}" type="datetimeFigureOut">
               <a:rPr lang="en-US" smtClean="0"/>
-              <a:t>16-Dec-22</a:t>
+              <a:t>20-Dec-22</a:t>
             </a:fld>
             <a:endParaRPr lang="en-US"/>
           </a:p>
@@ -7135,7 +7582,7 @@
           <a:p>
             <a:fld id="{E66EBA75-61DB-42BC-B227-112539E2E989}" type="datetimeFigureOut">
               <a:rPr lang="en-US" smtClean="0"/>
-              <a:t>16-Dec-22</a:t>
+              <a:t>20-Dec-22</a:t>
             </a:fld>
             <a:endParaRPr lang="en-US"/>
           </a:p>
@@ -7547,7 +7994,7 @@
           <a:p>
             <a:fld id="{E66EBA75-61DB-42BC-B227-112539E2E989}" type="datetimeFigureOut">
               <a:rPr lang="en-US" smtClean="0"/>
-              <a:t>16-Dec-22</a:t>
+              <a:t>20-Dec-22</a:t>
             </a:fld>
             <a:endParaRPr lang="en-US"/>
           </a:p>
@@ -7688,7 +8135,7 @@
           <a:p>
             <a:fld id="{E66EBA75-61DB-42BC-B227-112539E2E989}" type="datetimeFigureOut">
               <a:rPr lang="en-US" smtClean="0"/>
-              <a:t>16-Dec-22</a:t>
+              <a:t>20-Dec-22</a:t>
             </a:fld>
             <a:endParaRPr lang="en-US"/>
           </a:p>
@@ -7801,7 +8248,7 @@
           <a:p>
             <a:fld id="{E66EBA75-61DB-42BC-B227-112539E2E989}" type="datetimeFigureOut">
               <a:rPr lang="en-US" smtClean="0"/>
-              <a:t>16-Dec-22</a:t>
+              <a:t>20-Dec-22</a:t>
             </a:fld>
             <a:endParaRPr lang="en-US"/>
           </a:p>
@@ -8112,7 +8559,7 @@
           <a:p>
             <a:fld id="{E66EBA75-61DB-42BC-B227-112539E2E989}" type="datetimeFigureOut">
               <a:rPr lang="en-US" smtClean="0"/>
-              <a:t>16-Dec-22</a:t>
+              <a:t>20-Dec-22</a:t>
             </a:fld>
             <a:endParaRPr lang="en-US"/>
           </a:p>
@@ -8400,7 +8847,7 @@
           <a:p>
             <a:fld id="{E66EBA75-61DB-42BC-B227-112539E2E989}" type="datetimeFigureOut">
               <a:rPr lang="en-US" smtClean="0"/>
-              <a:t>16-Dec-22</a:t>
+              <a:t>20-Dec-22</a:t>
             </a:fld>
             <a:endParaRPr lang="en-US"/>
           </a:p>
@@ -8641,7 +9088,7 @@
           <a:p>
             <a:fld id="{E66EBA75-61DB-42BC-B227-112539E2E989}" type="datetimeFigureOut">
               <a:rPr lang="en-US" smtClean="0"/>
-              <a:t>16-Dec-22</a:t>
+              <a:t>20-Dec-22</a:t>
             </a:fld>
             <a:endParaRPr lang="en-US"/>
           </a:p>
@@ -11065,8 +11512,8 @@
           </p:pic>
         </mc:Fallback>
       </mc:AlternateContent>
-      <mc:AlternateContent xmlns:mc="http://schemas.openxmlformats.org/markup-compatibility/2006">
-        <mc:Choice xmlns:p14="http://schemas.microsoft.com/office/powerpoint/2010/main" Requires="p14">
+      <mc:AlternateContent xmlns:mc="http://schemas.openxmlformats.org/markup-compatibility/2006" xmlns:p14="http://schemas.microsoft.com/office/powerpoint/2010/main">
+        <mc:Choice Requires="p14">
           <p:contentPart p14:bwMode="auto" r:id="rId4">
             <p14:nvContentPartPr>
               <p14:cNvPr id="3" name="Ink 2">
@@ -11085,7 +11532,7 @@
             </p14:xfrm>
           </p:contentPart>
         </mc:Choice>
-        <mc:Fallback>
+        <mc:Fallback xmlns="">
           <p:pic>
             <p:nvPicPr>
               <p:cNvPr id="3" name="Ink 2">
@@ -11247,8 +11694,8 @@
           </p:pic>
         </mc:Fallback>
       </mc:AlternateContent>
-      <mc:AlternateContent xmlns:mc="http://schemas.openxmlformats.org/markup-compatibility/2006">
-        <mc:Choice xmlns:p14="http://schemas.microsoft.com/office/powerpoint/2010/main" Requires="p14">
+      <mc:AlternateContent xmlns:mc="http://schemas.openxmlformats.org/markup-compatibility/2006" xmlns:p14="http://schemas.microsoft.com/office/powerpoint/2010/main">
+        <mc:Choice Requires="p14">
           <p:contentPart p14:bwMode="auto" r:id="rId4">
             <p14:nvContentPartPr>
               <p14:cNvPr id="5" name="Ink 4">
@@ -11267,7 +11714,7 @@
             </p14:xfrm>
           </p:contentPart>
         </mc:Choice>
-        <mc:Fallback>
+        <mc:Fallback xmlns="">
           <p:pic>
             <p:nvPicPr>
               <p:cNvPr id="5" name="Ink 4">
@@ -11546,8 +11993,8 @@
           </a:extLst>
         </p:spPr>
       </p:pic>
-      <mc:AlternateContent xmlns:mc="http://schemas.openxmlformats.org/markup-compatibility/2006">
-        <mc:Choice xmlns:p14="http://schemas.microsoft.com/office/powerpoint/2010/main" Requires="p14">
+      <mc:AlternateContent xmlns:mc="http://schemas.openxmlformats.org/markup-compatibility/2006" xmlns:p14="http://schemas.microsoft.com/office/powerpoint/2010/main">
+        <mc:Choice Requires="p14">
           <p:contentPart p14:bwMode="auto" r:id="rId3">
             <p14:nvContentPartPr>
               <p14:cNvPr id="4" name="Ink 3">
@@ -11566,7 +12013,7 @@
             </p14:xfrm>
           </p:contentPart>
         </mc:Choice>
-        <mc:Fallback>
+        <mc:Fallback xmlns="">
           <p:pic>
             <p:nvPicPr>
               <p:cNvPr id="4" name="Ink 3">
@@ -11759,8 +12206,8 @@
           </p:pic>
         </mc:Fallback>
       </mc:AlternateContent>
-      <mc:AlternateContent xmlns:mc="http://schemas.openxmlformats.org/markup-compatibility/2006">
-        <mc:Choice xmlns:p14="http://schemas.microsoft.com/office/powerpoint/2010/main" Requires="p14">
+      <mc:AlternateContent xmlns:mc="http://schemas.openxmlformats.org/markup-compatibility/2006" xmlns:p14="http://schemas.microsoft.com/office/powerpoint/2010/main">
+        <mc:Choice Requires="p14">
           <p:contentPart p14:bwMode="auto" r:id="rId4">
             <p14:nvContentPartPr>
               <p14:cNvPr id="2" name="Ink 1">
@@ -11779,7 +12226,7 @@
             </p14:xfrm>
           </p:contentPart>
         </mc:Choice>
-        <mc:Fallback>
+        <mc:Fallback xmlns="">
           <p:pic>
             <p:nvPicPr>
               <p:cNvPr id="2" name="Ink 1">
@@ -12354,6 +12801,592 @@
     <p:extLst>
       <p:ext uri="{BB962C8B-B14F-4D97-AF65-F5344CB8AC3E}">
         <p14:creationId xmlns:p14="http://schemas.microsoft.com/office/powerpoint/2010/main" val="2082333441"/>
+      </p:ext>
+    </p:extLst>
+  </p:cSld>
+  <p:clrMapOvr>
+    <a:masterClrMapping/>
+  </p:clrMapOvr>
+</p:sld>
+</file>
+
+<file path=ppt/slides/slide33.xml><?xml version="1.0" encoding="utf-8"?>
+<p:sld xmlns:a="http://schemas.openxmlformats.org/drawingml/2006/main" xmlns:r="http://schemas.openxmlformats.org/officeDocument/2006/relationships" xmlns:p="http://schemas.openxmlformats.org/presentationml/2006/main">
+  <p:cSld>
+    <p:spTree>
+      <p:nvGrpSpPr>
+        <p:cNvPr id="1" name=""/>
+        <p:cNvGrpSpPr/>
+        <p:nvPr/>
+      </p:nvGrpSpPr>
+      <p:grpSpPr>
+        <a:xfrm>
+          <a:off x="0" y="0"/>
+          <a:ext cx="0" cy="0"/>
+          <a:chOff x="0" y="0"/>
+          <a:chExt cx="0" cy="0"/>
+        </a:xfrm>
+      </p:grpSpPr>
+      <p:sp>
+        <p:nvSpPr>
+          <p:cNvPr id="2" name="Title 1">
+            <a:extLst>
+              <a:ext uri="{FF2B5EF4-FFF2-40B4-BE49-F238E27FC236}">
+                <a16:creationId xmlns:a16="http://schemas.microsoft.com/office/drawing/2014/main" id="{1AD46C40-F0AD-AC1A-792A-CEFC91E48C6D}"/>
+              </a:ext>
+            </a:extLst>
+          </p:cNvPr>
+          <p:cNvSpPr>
+            <a:spLocks noGrp="1"/>
+          </p:cNvSpPr>
+          <p:nvPr>
+            <p:ph type="title"/>
+          </p:nvPr>
+        </p:nvSpPr>
+        <p:spPr/>
+        <p:txBody>
+          <a:bodyPr/>
+          <a:lstStyle/>
+          <a:p>
+            <a:r>
+              <a:rPr lang="en-US" dirty="0"/>
+              <a:t>Understanding of joins</a:t>
+            </a:r>
+          </a:p>
+        </p:txBody>
+      </p:sp>
+      <p:pic>
+        <p:nvPicPr>
+          <p:cNvPr id="5" name="Picture 4">
+            <a:extLst>
+              <a:ext uri="{FF2B5EF4-FFF2-40B4-BE49-F238E27FC236}">
+                <a16:creationId xmlns:a16="http://schemas.microsoft.com/office/drawing/2014/main" id="{5DC5AD7A-25DD-4917-7B7C-28FC874A853D}"/>
+              </a:ext>
+            </a:extLst>
+          </p:cNvPr>
+          <p:cNvPicPr>
+            <a:picLocks noChangeAspect="1"/>
+          </p:cNvPicPr>
+          <p:nvPr/>
+        </p:nvPicPr>
+        <p:blipFill>
+          <a:blip r:embed="rId2"/>
+          <a:stretch>
+            <a:fillRect/>
+          </a:stretch>
+        </p:blipFill>
+        <p:spPr>
+          <a:xfrm>
+            <a:off x="3389856" y="1668276"/>
+            <a:ext cx="5412288" cy="4234855"/>
+          </a:xfrm>
+          <a:prstGeom prst="rect">
+            <a:avLst/>
+          </a:prstGeom>
+        </p:spPr>
+      </p:pic>
+      <mc:AlternateContent xmlns:mc="http://schemas.openxmlformats.org/markup-compatibility/2006" xmlns:p14="http://schemas.microsoft.com/office/powerpoint/2010/main">
+        <mc:Choice Requires="p14">
+          <p:contentPart p14:bwMode="auto" r:id="rId3">
+            <p14:nvContentPartPr>
+              <p14:cNvPr id="6" name="Ink 5">
+                <a:extLst>
+                  <a:ext uri="{FF2B5EF4-FFF2-40B4-BE49-F238E27FC236}">
+                    <a16:creationId xmlns:a16="http://schemas.microsoft.com/office/drawing/2014/main" id="{D187D84A-62ED-B1E7-810A-EA511B08C349}"/>
+                  </a:ext>
+                </a:extLst>
+              </p14:cNvPr>
+              <p14:cNvContentPartPr/>
+              <p14:nvPr/>
+            </p14:nvContentPartPr>
+            <p14:xfrm>
+              <a:off x="154440" y="356040"/>
+              <a:ext cx="11969280" cy="5744880"/>
+            </p14:xfrm>
+          </p:contentPart>
+        </mc:Choice>
+        <mc:Fallback xmlns="">
+          <p:pic>
+            <p:nvPicPr>
+              <p:cNvPr id="6" name="Ink 5">
+                <a:extLst>
+                  <a:ext uri="{FF2B5EF4-FFF2-40B4-BE49-F238E27FC236}">
+                    <a16:creationId xmlns:a16="http://schemas.microsoft.com/office/drawing/2014/main" id="{D187D84A-62ED-B1E7-810A-EA511B08C349}"/>
+                  </a:ext>
+                </a:extLst>
+              </p:cNvPr>
+              <p:cNvPicPr/>
+              <p:nvPr/>
+            </p:nvPicPr>
+            <p:blipFill>
+              <a:blip r:embed="rId4"/>
+              <a:stretch>
+                <a:fillRect/>
+              </a:stretch>
+            </p:blipFill>
+            <p:spPr>
+              <a:xfrm>
+                <a:off x="145080" y="346680"/>
+                <a:ext cx="11988000" cy="5763600"/>
+              </a:xfrm>
+              <a:prstGeom prst="rect">
+                <a:avLst/>
+              </a:prstGeom>
+            </p:spPr>
+          </p:pic>
+        </mc:Fallback>
+      </mc:AlternateContent>
+    </p:spTree>
+    <p:extLst>
+      <p:ext uri="{BB962C8B-B14F-4D97-AF65-F5344CB8AC3E}">
+        <p14:creationId xmlns:p14="http://schemas.microsoft.com/office/powerpoint/2010/main" val="4007837230"/>
+      </p:ext>
+    </p:extLst>
+  </p:cSld>
+  <p:clrMapOvr>
+    <a:masterClrMapping/>
+  </p:clrMapOvr>
+</p:sld>
+</file>
+
+<file path=ppt/slides/slide34.xml><?xml version="1.0" encoding="utf-8"?>
+<p:sld xmlns:a="http://schemas.openxmlformats.org/drawingml/2006/main" xmlns:r="http://schemas.openxmlformats.org/officeDocument/2006/relationships" xmlns:p="http://schemas.openxmlformats.org/presentationml/2006/main">
+  <p:cSld>
+    <p:spTree>
+      <p:nvGrpSpPr>
+        <p:cNvPr id="1" name=""/>
+        <p:cNvGrpSpPr/>
+        <p:nvPr/>
+      </p:nvGrpSpPr>
+      <p:grpSpPr>
+        <a:xfrm>
+          <a:off x="0" y="0"/>
+          <a:ext cx="0" cy="0"/>
+          <a:chOff x="0" y="0"/>
+          <a:chExt cx="0" cy="0"/>
+        </a:xfrm>
+      </p:grpSpPr>
+      <p:sp>
+        <p:nvSpPr>
+          <p:cNvPr id="2" name="Title 1">
+            <a:extLst>
+              <a:ext uri="{FF2B5EF4-FFF2-40B4-BE49-F238E27FC236}">
+                <a16:creationId xmlns:a16="http://schemas.microsoft.com/office/drawing/2014/main" id="{1AD46C40-F0AD-AC1A-792A-CEFC91E48C6D}"/>
+              </a:ext>
+            </a:extLst>
+          </p:cNvPr>
+          <p:cNvSpPr>
+            <a:spLocks noGrp="1"/>
+          </p:cNvSpPr>
+          <p:nvPr>
+            <p:ph type="title"/>
+          </p:nvPr>
+        </p:nvSpPr>
+        <p:spPr/>
+        <p:txBody>
+          <a:bodyPr/>
+          <a:lstStyle/>
+          <a:p>
+            <a:r>
+              <a:rPr lang="en-US" dirty="0"/>
+              <a:t>Understanding of joins</a:t>
+            </a:r>
+          </a:p>
+        </p:txBody>
+      </p:sp>
+      <p:pic>
+        <p:nvPicPr>
+          <p:cNvPr id="4" name="Picture 3">
+            <a:extLst>
+              <a:ext uri="{FF2B5EF4-FFF2-40B4-BE49-F238E27FC236}">
+                <a16:creationId xmlns:a16="http://schemas.microsoft.com/office/drawing/2014/main" id="{4A1B5130-039A-918D-17F5-B1FBAF7CDEFB}"/>
+              </a:ext>
+            </a:extLst>
+          </p:cNvPr>
+          <p:cNvPicPr>
+            <a:picLocks noChangeAspect="1"/>
+          </p:cNvPicPr>
+          <p:nvPr/>
+        </p:nvPicPr>
+        <p:blipFill>
+          <a:blip r:embed="rId2"/>
+          <a:stretch>
+            <a:fillRect/>
+          </a:stretch>
+        </p:blipFill>
+        <p:spPr>
+          <a:xfrm>
+            <a:off x="3025177" y="1690688"/>
+            <a:ext cx="6141646" cy="4758461"/>
+          </a:xfrm>
+          <a:prstGeom prst="rect">
+            <a:avLst/>
+          </a:prstGeom>
+        </p:spPr>
+      </p:pic>
+      <mc:AlternateContent xmlns:mc="http://schemas.openxmlformats.org/markup-compatibility/2006" xmlns:p14="http://schemas.microsoft.com/office/powerpoint/2010/main">
+        <mc:Choice Requires="p14">
+          <p:contentPart p14:bwMode="auto" r:id="rId3">
+            <p14:nvContentPartPr>
+              <p14:cNvPr id="6" name="Ink 5">
+                <a:extLst>
+                  <a:ext uri="{FF2B5EF4-FFF2-40B4-BE49-F238E27FC236}">
+                    <a16:creationId xmlns:a16="http://schemas.microsoft.com/office/drawing/2014/main" id="{FC2BD654-58F8-706A-1B24-8C8C73170F94}"/>
+                  </a:ext>
+                </a:extLst>
+              </p14:cNvPr>
+              <p14:cNvContentPartPr/>
+              <p14:nvPr/>
+            </p14:nvContentPartPr>
+            <p14:xfrm>
+              <a:off x="4147200" y="2042280"/>
+              <a:ext cx="3360600" cy="3209040"/>
+            </p14:xfrm>
+          </p:contentPart>
+        </mc:Choice>
+        <mc:Fallback xmlns="">
+          <p:pic>
+            <p:nvPicPr>
+              <p:cNvPr id="6" name="Ink 5">
+                <a:extLst>
+                  <a:ext uri="{FF2B5EF4-FFF2-40B4-BE49-F238E27FC236}">
+                    <a16:creationId xmlns:a16="http://schemas.microsoft.com/office/drawing/2014/main" id="{FC2BD654-58F8-706A-1B24-8C8C73170F94}"/>
+                  </a:ext>
+                </a:extLst>
+              </p:cNvPr>
+              <p:cNvPicPr/>
+              <p:nvPr/>
+            </p:nvPicPr>
+            <p:blipFill>
+              <a:blip r:embed="rId4"/>
+              <a:stretch>
+                <a:fillRect/>
+              </a:stretch>
+            </p:blipFill>
+            <p:spPr>
+              <a:xfrm>
+                <a:off x="4137840" y="2032920"/>
+                <a:ext cx="3379320" cy="3227760"/>
+              </a:xfrm>
+              <a:prstGeom prst="rect">
+                <a:avLst/>
+              </a:prstGeom>
+            </p:spPr>
+          </p:pic>
+        </mc:Fallback>
+      </mc:AlternateContent>
+    </p:spTree>
+    <p:extLst>
+      <p:ext uri="{BB962C8B-B14F-4D97-AF65-F5344CB8AC3E}">
+        <p14:creationId xmlns:p14="http://schemas.microsoft.com/office/powerpoint/2010/main" val="1779350208"/>
+      </p:ext>
+    </p:extLst>
+  </p:cSld>
+  <p:clrMapOvr>
+    <a:masterClrMapping/>
+  </p:clrMapOvr>
+</p:sld>
+</file>
+
+<file path=ppt/slides/slide35.xml><?xml version="1.0" encoding="utf-8"?>
+<p:sld xmlns:a="http://schemas.openxmlformats.org/drawingml/2006/main" xmlns:r="http://schemas.openxmlformats.org/officeDocument/2006/relationships" xmlns:p="http://schemas.openxmlformats.org/presentationml/2006/main">
+  <p:cSld>
+    <p:spTree>
+      <p:nvGrpSpPr>
+        <p:cNvPr id="1" name=""/>
+        <p:cNvGrpSpPr/>
+        <p:nvPr/>
+      </p:nvGrpSpPr>
+      <p:grpSpPr>
+        <a:xfrm>
+          <a:off x="0" y="0"/>
+          <a:ext cx="0" cy="0"/>
+          <a:chOff x="0" y="0"/>
+          <a:chExt cx="0" cy="0"/>
+        </a:xfrm>
+      </p:grpSpPr>
+      <p:sp>
+        <p:nvSpPr>
+          <p:cNvPr id="2" name="Title 1">
+            <a:extLst>
+              <a:ext uri="{FF2B5EF4-FFF2-40B4-BE49-F238E27FC236}">
+                <a16:creationId xmlns:a16="http://schemas.microsoft.com/office/drawing/2014/main" id="{1AD46C40-F0AD-AC1A-792A-CEFC91E48C6D}"/>
+              </a:ext>
+            </a:extLst>
+          </p:cNvPr>
+          <p:cNvSpPr>
+            <a:spLocks noGrp="1"/>
+          </p:cNvSpPr>
+          <p:nvPr>
+            <p:ph type="title"/>
+          </p:nvPr>
+        </p:nvSpPr>
+        <p:spPr/>
+        <p:txBody>
+          <a:bodyPr/>
+          <a:lstStyle/>
+          <a:p>
+            <a:r>
+              <a:rPr lang="en-US" dirty="0"/>
+              <a:t>Understanding of joins</a:t>
+            </a:r>
+          </a:p>
+        </p:txBody>
+      </p:sp>
+      <p:pic>
+        <p:nvPicPr>
+          <p:cNvPr id="5" name="Picture 4">
+            <a:extLst>
+              <a:ext uri="{FF2B5EF4-FFF2-40B4-BE49-F238E27FC236}">
+                <a16:creationId xmlns:a16="http://schemas.microsoft.com/office/drawing/2014/main" id="{79DB6A77-0704-6B75-297F-07DE2B093B62}"/>
+              </a:ext>
+            </a:extLst>
+          </p:cNvPr>
+          <p:cNvPicPr>
+            <a:picLocks noChangeAspect="1"/>
+          </p:cNvPicPr>
+          <p:nvPr/>
+        </p:nvPicPr>
+        <p:blipFill>
+          <a:blip r:embed="rId2"/>
+          <a:stretch>
+            <a:fillRect/>
+          </a:stretch>
+        </p:blipFill>
+        <p:spPr>
+          <a:xfrm>
+            <a:off x="3361011" y="1501906"/>
+            <a:ext cx="5469978" cy="4990969"/>
+          </a:xfrm>
+          <a:prstGeom prst="rect">
+            <a:avLst/>
+          </a:prstGeom>
+        </p:spPr>
+      </p:pic>
+      <mc:AlternateContent xmlns:mc="http://schemas.openxmlformats.org/markup-compatibility/2006" xmlns:p14="http://schemas.microsoft.com/office/powerpoint/2010/main">
+        <mc:Choice Requires="p14">
+          <p:contentPart p14:bwMode="auto" r:id="rId3">
+            <p14:nvContentPartPr>
+              <p14:cNvPr id="6" name="Ink 5">
+                <a:extLst>
+                  <a:ext uri="{FF2B5EF4-FFF2-40B4-BE49-F238E27FC236}">
+                    <a16:creationId xmlns:a16="http://schemas.microsoft.com/office/drawing/2014/main" id="{BA45D18D-5C09-7210-F9D2-031D4B21FF6B}"/>
+                  </a:ext>
+                </a:extLst>
+              </p14:cNvPr>
+              <p14:cNvContentPartPr/>
+              <p14:nvPr/>
+            </p14:nvContentPartPr>
+            <p14:xfrm>
+              <a:off x="4111200" y="1860480"/>
+              <a:ext cx="3250080" cy="1076400"/>
+            </p14:xfrm>
+          </p:contentPart>
+        </mc:Choice>
+        <mc:Fallback xmlns="">
+          <p:pic>
+            <p:nvPicPr>
+              <p:cNvPr id="6" name="Ink 5">
+                <a:extLst>
+                  <a:ext uri="{FF2B5EF4-FFF2-40B4-BE49-F238E27FC236}">
+                    <a16:creationId xmlns:a16="http://schemas.microsoft.com/office/drawing/2014/main" id="{BA45D18D-5C09-7210-F9D2-031D4B21FF6B}"/>
+                  </a:ext>
+                </a:extLst>
+              </p:cNvPr>
+              <p:cNvPicPr/>
+              <p:nvPr/>
+            </p:nvPicPr>
+            <p:blipFill>
+              <a:blip r:embed="rId4"/>
+              <a:stretch>
+                <a:fillRect/>
+              </a:stretch>
+            </p:blipFill>
+            <p:spPr>
+              <a:xfrm>
+                <a:off x="4101840" y="1851120"/>
+                <a:ext cx="3268800" cy="1095120"/>
+              </a:xfrm>
+              <a:prstGeom prst="rect">
+                <a:avLst/>
+              </a:prstGeom>
+            </p:spPr>
+          </p:pic>
+        </mc:Fallback>
+      </mc:AlternateContent>
+    </p:spTree>
+    <p:extLst>
+      <p:ext uri="{BB962C8B-B14F-4D97-AF65-F5344CB8AC3E}">
+        <p14:creationId xmlns:p14="http://schemas.microsoft.com/office/powerpoint/2010/main" val="3564935998"/>
+      </p:ext>
+    </p:extLst>
+  </p:cSld>
+  <p:clrMapOvr>
+    <a:masterClrMapping/>
+  </p:clrMapOvr>
+</p:sld>
+</file>
+
+<file path=ppt/slides/slide36.xml><?xml version="1.0" encoding="utf-8"?>
+<p:sld xmlns:a="http://schemas.openxmlformats.org/drawingml/2006/main" xmlns:r="http://schemas.openxmlformats.org/officeDocument/2006/relationships" xmlns:p="http://schemas.openxmlformats.org/presentationml/2006/main">
+  <p:cSld>
+    <p:spTree>
+      <p:nvGrpSpPr>
+        <p:cNvPr id="1" name=""/>
+        <p:cNvGrpSpPr/>
+        <p:nvPr/>
+      </p:nvGrpSpPr>
+      <p:grpSpPr>
+        <a:xfrm>
+          <a:off x="0" y="0"/>
+          <a:ext cx="0" cy="0"/>
+          <a:chOff x="0" y="0"/>
+          <a:chExt cx="0" cy="0"/>
+        </a:xfrm>
+      </p:grpSpPr>
+      <p:sp>
+        <p:nvSpPr>
+          <p:cNvPr id="2" name="Title 1">
+            <a:extLst>
+              <a:ext uri="{FF2B5EF4-FFF2-40B4-BE49-F238E27FC236}">
+                <a16:creationId xmlns:a16="http://schemas.microsoft.com/office/drawing/2014/main" id="{1AD46C40-F0AD-AC1A-792A-CEFC91E48C6D}"/>
+              </a:ext>
+            </a:extLst>
+          </p:cNvPr>
+          <p:cNvSpPr>
+            <a:spLocks noGrp="1"/>
+          </p:cNvSpPr>
+          <p:nvPr>
+            <p:ph type="title"/>
+          </p:nvPr>
+        </p:nvSpPr>
+        <p:spPr/>
+        <p:txBody>
+          <a:bodyPr/>
+          <a:lstStyle/>
+          <a:p>
+            <a:r>
+              <a:rPr lang="en-US" dirty="0"/>
+              <a:t>Understanding of joins</a:t>
+            </a:r>
+          </a:p>
+        </p:txBody>
+      </p:sp>
+      <p:pic>
+        <p:nvPicPr>
+          <p:cNvPr id="4" name="Picture 3">
+            <a:extLst>
+              <a:ext uri="{FF2B5EF4-FFF2-40B4-BE49-F238E27FC236}">
+                <a16:creationId xmlns:a16="http://schemas.microsoft.com/office/drawing/2014/main" id="{43D2DB30-2D05-32C7-8FEE-3F69966F6ED9}"/>
+              </a:ext>
+            </a:extLst>
+          </p:cNvPr>
+          <p:cNvPicPr>
+            <a:picLocks noChangeAspect="1"/>
+          </p:cNvPicPr>
+          <p:nvPr/>
+        </p:nvPicPr>
+        <p:blipFill>
+          <a:blip r:embed="rId2"/>
+          <a:stretch>
+            <a:fillRect/>
+          </a:stretch>
+        </p:blipFill>
+        <p:spPr>
+          <a:xfrm>
+            <a:off x="3248462" y="1697781"/>
+            <a:ext cx="5695075" cy="4795094"/>
+          </a:xfrm>
+          <a:prstGeom prst="rect">
+            <a:avLst/>
+          </a:prstGeom>
+        </p:spPr>
+      </p:pic>
+    </p:spTree>
+    <p:extLst>
+      <p:ext uri="{BB962C8B-B14F-4D97-AF65-F5344CB8AC3E}">
+        <p14:creationId xmlns:p14="http://schemas.microsoft.com/office/powerpoint/2010/main" val="3237198655"/>
+      </p:ext>
+    </p:extLst>
+  </p:cSld>
+  <p:clrMapOvr>
+    <a:masterClrMapping/>
+  </p:clrMapOvr>
+</p:sld>
+</file>
+
+<file path=ppt/slides/slide37.xml><?xml version="1.0" encoding="utf-8"?>
+<p:sld xmlns:a="http://schemas.openxmlformats.org/drawingml/2006/main" xmlns:r="http://schemas.openxmlformats.org/officeDocument/2006/relationships" xmlns:p="http://schemas.openxmlformats.org/presentationml/2006/main">
+  <p:cSld>
+    <p:spTree>
+      <p:nvGrpSpPr>
+        <p:cNvPr id="1" name=""/>
+        <p:cNvGrpSpPr/>
+        <p:nvPr/>
+      </p:nvGrpSpPr>
+      <p:grpSpPr>
+        <a:xfrm>
+          <a:off x="0" y="0"/>
+          <a:ext cx="0" cy="0"/>
+          <a:chOff x="0" y="0"/>
+          <a:chExt cx="0" cy="0"/>
+        </a:xfrm>
+      </p:grpSpPr>
+      <mc:AlternateContent xmlns:mc="http://schemas.openxmlformats.org/markup-compatibility/2006" xmlns:p14="http://schemas.microsoft.com/office/powerpoint/2010/main">
+        <mc:Choice Requires="p14">
+          <p:contentPart p14:bwMode="auto" r:id="rId2">
+            <p14:nvContentPartPr>
+              <p14:cNvPr id="4" name="Ink 3">
+                <a:extLst>
+                  <a:ext uri="{FF2B5EF4-FFF2-40B4-BE49-F238E27FC236}">
+                    <a16:creationId xmlns:a16="http://schemas.microsoft.com/office/drawing/2014/main" id="{17BD2679-986A-2887-3E30-261842BA6C7D}"/>
+                  </a:ext>
+                </a:extLst>
+              </p14:cNvPr>
+              <p14:cNvContentPartPr/>
+              <p14:nvPr/>
+            </p14:nvContentPartPr>
+            <p14:xfrm>
+              <a:off x="671040" y="97560"/>
+              <a:ext cx="10945440" cy="6616440"/>
+            </p14:xfrm>
+          </p:contentPart>
+        </mc:Choice>
+        <mc:Fallback xmlns="">
+          <p:pic>
+            <p:nvPicPr>
+              <p:cNvPr id="4" name="Ink 3">
+                <a:extLst>
+                  <a:ext uri="{FF2B5EF4-FFF2-40B4-BE49-F238E27FC236}">
+                    <a16:creationId xmlns:a16="http://schemas.microsoft.com/office/drawing/2014/main" id="{17BD2679-986A-2887-3E30-261842BA6C7D}"/>
+                  </a:ext>
+                </a:extLst>
+              </p:cNvPr>
+              <p:cNvPicPr/>
+              <p:nvPr/>
+            </p:nvPicPr>
+            <p:blipFill>
+              <a:blip r:embed="rId3"/>
+              <a:stretch>
+                <a:fillRect/>
+              </a:stretch>
+            </p:blipFill>
+            <p:spPr>
+              <a:xfrm>
+                <a:off x="661680" y="88200"/>
+                <a:ext cx="10964160" cy="6635160"/>
+              </a:xfrm>
+              <a:prstGeom prst="rect">
+                <a:avLst/>
+              </a:prstGeom>
+            </p:spPr>
+          </p:pic>
+        </mc:Fallback>
+      </mc:AlternateContent>
+    </p:spTree>
+    <p:extLst>
+      <p:ext uri="{BB962C8B-B14F-4D97-AF65-F5344CB8AC3E}">
+        <p14:creationId xmlns:p14="http://schemas.microsoft.com/office/powerpoint/2010/main" val="3616353367"/>
       </p:ext>
     </p:extLst>
   </p:cSld>

</xml_diff>